<commit_message>
week 04: typos and slide update
</commit_message>
<xml_diff>
--- a/week_04/week_04.pptx
+++ b/week_04/week_04.pptx
@@ -4,6 +4,9 @@
   <p:sldMasterIdLst>
     <p:sldMasterId id="2147483840" r:id="rId1"/>
   </p:sldMasterIdLst>
+  <p:notesMasterIdLst>
+    <p:notesMasterId r:id="rId23"/>
+  </p:notesMasterIdLst>
   <p:sldIdLst>
     <p:sldId id="256" r:id="rId2"/>
     <p:sldId id="276" r:id="rId3"/>
@@ -132,6 +135,440 @@
 </p:presentation>
 </file>
 
+<file path=ppt/notesMasters/notesMaster1.xml><?xml version="1.0" encoding="utf-8"?>
+<p:notesMaster xmlns:a="http://schemas.openxmlformats.org/drawingml/2006/main" xmlns:r="http://schemas.openxmlformats.org/officeDocument/2006/relationships" xmlns:p="http://schemas.openxmlformats.org/presentationml/2006/main">
+  <p:cSld>
+    <p:bg>
+      <p:bgRef idx="1001">
+        <a:schemeClr val="bg1"/>
+      </p:bgRef>
+    </p:bg>
+    <p:spTree>
+      <p:nvGrpSpPr>
+        <p:cNvPr id="1" name=""/>
+        <p:cNvGrpSpPr/>
+        <p:nvPr/>
+      </p:nvGrpSpPr>
+      <p:grpSpPr>
+        <a:xfrm>
+          <a:off x="0" y="0"/>
+          <a:ext cx="0" cy="0"/>
+          <a:chOff x="0" y="0"/>
+          <a:chExt cx="0" cy="0"/>
+        </a:xfrm>
+      </p:grpSpPr>
+      <p:sp>
+        <p:nvSpPr>
+          <p:cNvPr id="2" name="Header Placeholder 1"/>
+          <p:cNvSpPr>
+            <a:spLocks noGrp="1"/>
+          </p:cNvSpPr>
+          <p:nvPr>
+            <p:ph type="hdr" sz="quarter"/>
+          </p:nvPr>
+        </p:nvSpPr>
+        <p:spPr>
+          <a:xfrm>
+            <a:off x="0" y="0"/>
+            <a:ext cx="2971800" cy="458788"/>
+          </a:xfrm>
+          <a:prstGeom prst="rect">
+            <a:avLst/>
+          </a:prstGeom>
+        </p:spPr>
+        <p:txBody>
+          <a:bodyPr vert="horz" lIns="91440" tIns="45720" rIns="91440" bIns="45720" rtlCol="0"/>
+          <a:lstStyle>
+            <a:lvl1pPr algn="l">
+              <a:defRPr sz="1200"/>
+            </a:lvl1pPr>
+          </a:lstStyle>
+          <a:p>
+            <a:endParaRPr lang="en-US"/>
+          </a:p>
+        </p:txBody>
+      </p:sp>
+      <p:sp>
+        <p:nvSpPr>
+          <p:cNvPr id="3" name="Date Placeholder 2"/>
+          <p:cNvSpPr>
+            <a:spLocks noGrp="1"/>
+          </p:cNvSpPr>
+          <p:nvPr>
+            <p:ph type="dt" idx="1"/>
+          </p:nvPr>
+        </p:nvSpPr>
+        <p:spPr>
+          <a:xfrm>
+            <a:off x="3884613" y="0"/>
+            <a:ext cx="2971800" cy="458788"/>
+          </a:xfrm>
+          <a:prstGeom prst="rect">
+            <a:avLst/>
+          </a:prstGeom>
+        </p:spPr>
+        <p:txBody>
+          <a:bodyPr vert="horz" lIns="91440" tIns="45720" rIns="91440" bIns="45720" rtlCol="0"/>
+          <a:lstStyle>
+            <a:lvl1pPr algn="r">
+              <a:defRPr sz="1200"/>
+            </a:lvl1pPr>
+          </a:lstStyle>
+          <a:p>
+            <a:fld id="{4E92CB9E-58B2-9B49-8C56-0B7366E3BE32}" type="datetimeFigureOut">
+              <a:rPr lang="en-US" smtClean="0"/>
+              <a:t>9/19/16</a:t>
+            </a:fld>
+            <a:endParaRPr lang="en-US"/>
+          </a:p>
+        </p:txBody>
+      </p:sp>
+      <p:sp>
+        <p:nvSpPr>
+          <p:cNvPr id="4" name="Slide Image Placeholder 3"/>
+          <p:cNvSpPr>
+            <a:spLocks noGrp="1" noRot="1" noChangeAspect="1"/>
+          </p:cNvSpPr>
+          <p:nvPr>
+            <p:ph type="sldImg" idx="2"/>
+          </p:nvPr>
+        </p:nvSpPr>
+        <p:spPr>
+          <a:xfrm>
+            <a:off x="685800" y="1143000"/>
+            <a:ext cx="5486400" cy="3086100"/>
+          </a:xfrm>
+          <a:prstGeom prst="rect">
+            <a:avLst/>
+          </a:prstGeom>
+          <a:noFill/>
+          <a:ln w="12700">
+            <a:solidFill>
+              <a:prstClr val="black"/>
+            </a:solidFill>
+          </a:ln>
+        </p:spPr>
+        <p:txBody>
+          <a:bodyPr vert="horz" lIns="91440" tIns="45720" rIns="91440" bIns="45720" rtlCol="0" anchor="ctr"/>
+          <a:lstStyle/>
+          <a:p>
+            <a:endParaRPr lang="en-US"/>
+          </a:p>
+        </p:txBody>
+      </p:sp>
+      <p:sp>
+        <p:nvSpPr>
+          <p:cNvPr id="5" name="Notes Placeholder 4"/>
+          <p:cNvSpPr>
+            <a:spLocks noGrp="1"/>
+          </p:cNvSpPr>
+          <p:nvPr>
+            <p:ph type="body" sz="quarter" idx="3"/>
+          </p:nvPr>
+        </p:nvSpPr>
+        <p:spPr>
+          <a:xfrm>
+            <a:off x="685800" y="4400550"/>
+            <a:ext cx="5486400" cy="3600450"/>
+          </a:xfrm>
+          <a:prstGeom prst="rect">
+            <a:avLst/>
+          </a:prstGeom>
+        </p:spPr>
+        <p:txBody>
+          <a:bodyPr vert="horz" lIns="91440" tIns="45720" rIns="91440" bIns="45720" rtlCol="0"/>
+          <a:lstStyle/>
+          <a:p>
+            <a:pPr lvl="0"/>
+            <a:r>
+              <a:rPr lang="en-US" smtClean="0"/>
+              <a:t>Click to edit Master text styles</a:t>
+            </a:r>
+          </a:p>
+          <a:p>
+            <a:pPr lvl="1"/>
+            <a:r>
+              <a:rPr lang="en-US" smtClean="0"/>
+              <a:t>Second level</a:t>
+            </a:r>
+          </a:p>
+          <a:p>
+            <a:pPr lvl="2"/>
+            <a:r>
+              <a:rPr lang="en-US" smtClean="0"/>
+              <a:t>Third level</a:t>
+            </a:r>
+          </a:p>
+          <a:p>
+            <a:pPr lvl="3"/>
+            <a:r>
+              <a:rPr lang="en-US" smtClean="0"/>
+              <a:t>Fourth level</a:t>
+            </a:r>
+          </a:p>
+          <a:p>
+            <a:pPr lvl="4"/>
+            <a:r>
+              <a:rPr lang="en-US" smtClean="0"/>
+              <a:t>Fifth level</a:t>
+            </a:r>
+            <a:endParaRPr lang="en-US"/>
+          </a:p>
+        </p:txBody>
+      </p:sp>
+      <p:sp>
+        <p:nvSpPr>
+          <p:cNvPr id="6" name="Footer Placeholder 5"/>
+          <p:cNvSpPr>
+            <a:spLocks noGrp="1"/>
+          </p:cNvSpPr>
+          <p:nvPr>
+            <p:ph type="ftr" sz="quarter" idx="4"/>
+          </p:nvPr>
+        </p:nvSpPr>
+        <p:spPr>
+          <a:xfrm>
+            <a:off x="0" y="8685213"/>
+            <a:ext cx="2971800" cy="458787"/>
+          </a:xfrm>
+          <a:prstGeom prst="rect">
+            <a:avLst/>
+          </a:prstGeom>
+        </p:spPr>
+        <p:txBody>
+          <a:bodyPr vert="horz" lIns="91440" tIns="45720" rIns="91440" bIns="45720" rtlCol="0" anchor="b"/>
+          <a:lstStyle>
+            <a:lvl1pPr algn="l">
+              <a:defRPr sz="1200"/>
+            </a:lvl1pPr>
+          </a:lstStyle>
+          <a:p>
+            <a:endParaRPr lang="en-US"/>
+          </a:p>
+        </p:txBody>
+      </p:sp>
+      <p:sp>
+        <p:nvSpPr>
+          <p:cNvPr id="7" name="Slide Number Placeholder 6"/>
+          <p:cNvSpPr>
+            <a:spLocks noGrp="1"/>
+          </p:cNvSpPr>
+          <p:nvPr>
+            <p:ph type="sldNum" sz="quarter" idx="5"/>
+          </p:nvPr>
+        </p:nvSpPr>
+        <p:spPr>
+          <a:xfrm>
+            <a:off x="3884613" y="8685213"/>
+            <a:ext cx="2971800" cy="458787"/>
+          </a:xfrm>
+          <a:prstGeom prst="rect">
+            <a:avLst/>
+          </a:prstGeom>
+        </p:spPr>
+        <p:txBody>
+          <a:bodyPr vert="horz" lIns="91440" tIns="45720" rIns="91440" bIns="45720" rtlCol="0" anchor="b"/>
+          <a:lstStyle>
+            <a:lvl1pPr algn="r">
+              <a:defRPr sz="1200"/>
+            </a:lvl1pPr>
+          </a:lstStyle>
+          <a:p>
+            <a:fld id="{5F37195C-EC44-934D-806B-D9BF8290AAAC}" type="slidenum">
+              <a:rPr lang="en-US" smtClean="0"/>
+              <a:t>‹#›</a:t>
+            </a:fld>
+            <a:endParaRPr lang="en-US"/>
+          </a:p>
+        </p:txBody>
+      </p:sp>
+    </p:spTree>
+    <p:extLst>
+      <p:ext uri="{BB962C8B-B14F-4D97-AF65-F5344CB8AC3E}">
+        <p14:creationId xmlns:p14="http://schemas.microsoft.com/office/powerpoint/2010/main" val="1828000873"/>
+      </p:ext>
+    </p:extLst>
+  </p:cSld>
+  <p:clrMap bg1="lt1" tx1="dk1" bg2="lt2" tx2="dk2" accent1="accent1" accent2="accent2" accent3="accent3" accent4="accent4" accent5="accent5" accent6="accent6" hlink="hlink" folHlink="folHlink"/>
+  <p:notesStyle>
+    <a:lvl1pPr marL="0" algn="l" defTabSz="914400" rtl="0" eaLnBrk="1" latinLnBrk="0" hangingPunct="1">
+      <a:defRPr sz="1200" kern="1200">
+        <a:solidFill>
+          <a:schemeClr val="tx1"/>
+        </a:solidFill>
+        <a:latin typeface="+mn-lt"/>
+        <a:ea typeface="+mn-ea"/>
+        <a:cs typeface="+mn-cs"/>
+      </a:defRPr>
+    </a:lvl1pPr>
+    <a:lvl2pPr marL="457200" algn="l" defTabSz="914400" rtl="0" eaLnBrk="1" latinLnBrk="0" hangingPunct="1">
+      <a:defRPr sz="1200" kern="1200">
+        <a:solidFill>
+          <a:schemeClr val="tx1"/>
+        </a:solidFill>
+        <a:latin typeface="+mn-lt"/>
+        <a:ea typeface="+mn-ea"/>
+        <a:cs typeface="+mn-cs"/>
+      </a:defRPr>
+    </a:lvl2pPr>
+    <a:lvl3pPr marL="914400" algn="l" defTabSz="914400" rtl="0" eaLnBrk="1" latinLnBrk="0" hangingPunct="1">
+      <a:defRPr sz="1200" kern="1200">
+        <a:solidFill>
+          <a:schemeClr val="tx1"/>
+        </a:solidFill>
+        <a:latin typeface="+mn-lt"/>
+        <a:ea typeface="+mn-ea"/>
+        <a:cs typeface="+mn-cs"/>
+      </a:defRPr>
+    </a:lvl3pPr>
+    <a:lvl4pPr marL="1371600" algn="l" defTabSz="914400" rtl="0" eaLnBrk="1" latinLnBrk="0" hangingPunct="1">
+      <a:defRPr sz="1200" kern="1200">
+        <a:solidFill>
+          <a:schemeClr val="tx1"/>
+        </a:solidFill>
+        <a:latin typeface="+mn-lt"/>
+        <a:ea typeface="+mn-ea"/>
+        <a:cs typeface="+mn-cs"/>
+      </a:defRPr>
+    </a:lvl4pPr>
+    <a:lvl5pPr marL="1828800" algn="l" defTabSz="914400" rtl="0" eaLnBrk="1" latinLnBrk="0" hangingPunct="1">
+      <a:defRPr sz="1200" kern="1200">
+        <a:solidFill>
+          <a:schemeClr val="tx1"/>
+        </a:solidFill>
+        <a:latin typeface="+mn-lt"/>
+        <a:ea typeface="+mn-ea"/>
+        <a:cs typeface="+mn-cs"/>
+      </a:defRPr>
+    </a:lvl5pPr>
+    <a:lvl6pPr marL="2286000" algn="l" defTabSz="914400" rtl="0" eaLnBrk="1" latinLnBrk="0" hangingPunct="1">
+      <a:defRPr sz="1200" kern="1200">
+        <a:solidFill>
+          <a:schemeClr val="tx1"/>
+        </a:solidFill>
+        <a:latin typeface="+mn-lt"/>
+        <a:ea typeface="+mn-ea"/>
+        <a:cs typeface="+mn-cs"/>
+      </a:defRPr>
+    </a:lvl6pPr>
+    <a:lvl7pPr marL="2743200" algn="l" defTabSz="914400" rtl="0" eaLnBrk="1" latinLnBrk="0" hangingPunct="1">
+      <a:defRPr sz="1200" kern="1200">
+        <a:solidFill>
+          <a:schemeClr val="tx1"/>
+        </a:solidFill>
+        <a:latin typeface="+mn-lt"/>
+        <a:ea typeface="+mn-ea"/>
+        <a:cs typeface="+mn-cs"/>
+      </a:defRPr>
+    </a:lvl7pPr>
+    <a:lvl8pPr marL="3200400" algn="l" defTabSz="914400" rtl="0" eaLnBrk="1" latinLnBrk="0" hangingPunct="1">
+      <a:defRPr sz="1200" kern="1200">
+        <a:solidFill>
+          <a:schemeClr val="tx1"/>
+        </a:solidFill>
+        <a:latin typeface="+mn-lt"/>
+        <a:ea typeface="+mn-ea"/>
+        <a:cs typeface="+mn-cs"/>
+      </a:defRPr>
+    </a:lvl8pPr>
+    <a:lvl9pPr marL="3657600" algn="l" defTabSz="914400" rtl="0" eaLnBrk="1" latinLnBrk="0" hangingPunct="1">
+      <a:defRPr sz="1200" kern="1200">
+        <a:solidFill>
+          <a:schemeClr val="tx1"/>
+        </a:solidFill>
+        <a:latin typeface="+mn-lt"/>
+        <a:ea typeface="+mn-ea"/>
+        <a:cs typeface="+mn-cs"/>
+      </a:defRPr>
+    </a:lvl9pPr>
+  </p:notesStyle>
+</p:notesMaster>
+</file>
+
+<file path=ppt/notesSlides/notesSlide1.xml><?xml version="1.0" encoding="utf-8"?>
+<p:notes xmlns:a="http://schemas.openxmlformats.org/drawingml/2006/main" xmlns:r="http://schemas.openxmlformats.org/officeDocument/2006/relationships" xmlns:p="http://schemas.openxmlformats.org/presentationml/2006/main">
+  <p:cSld>
+    <p:spTree>
+      <p:nvGrpSpPr>
+        <p:cNvPr id="1" name=""/>
+        <p:cNvGrpSpPr/>
+        <p:nvPr/>
+      </p:nvGrpSpPr>
+      <p:grpSpPr>
+        <a:xfrm>
+          <a:off x="0" y="0"/>
+          <a:ext cx="0" cy="0"/>
+          <a:chOff x="0" y="0"/>
+          <a:chExt cx="0" cy="0"/>
+        </a:xfrm>
+      </p:grpSpPr>
+      <p:sp>
+        <p:nvSpPr>
+          <p:cNvPr id="2" name="Slide Image Placeholder 1"/>
+          <p:cNvSpPr>
+            <a:spLocks noGrp="1" noRot="1" noChangeAspect="1"/>
+          </p:cNvSpPr>
+          <p:nvPr>
+            <p:ph type="sldImg"/>
+          </p:nvPr>
+        </p:nvSpPr>
+        <p:spPr/>
+      </p:sp>
+      <p:sp>
+        <p:nvSpPr>
+          <p:cNvPr id="3" name="Notes Placeholder 2"/>
+          <p:cNvSpPr>
+            <a:spLocks noGrp="1"/>
+          </p:cNvSpPr>
+          <p:nvPr>
+            <p:ph type="body" idx="1"/>
+          </p:nvPr>
+        </p:nvSpPr>
+        <p:spPr/>
+        <p:txBody>
+          <a:bodyPr/>
+          <a:lstStyle/>
+          <a:p>
+            <a:endParaRPr lang="en-US"/>
+          </a:p>
+        </p:txBody>
+      </p:sp>
+      <p:sp>
+        <p:nvSpPr>
+          <p:cNvPr id="4" name="Slide Number Placeholder 3"/>
+          <p:cNvSpPr>
+            <a:spLocks noGrp="1"/>
+          </p:cNvSpPr>
+          <p:nvPr>
+            <p:ph type="sldNum" sz="quarter" idx="10"/>
+          </p:nvPr>
+        </p:nvSpPr>
+        <p:spPr/>
+        <p:txBody>
+          <a:bodyPr/>
+          <a:lstStyle/>
+          <a:p>
+            <a:fld id="{5F37195C-EC44-934D-806B-D9BF8290AAAC}" type="slidenum">
+              <a:rPr lang="en-US" smtClean="0"/>
+              <a:t>1</a:t>
+            </a:fld>
+            <a:endParaRPr lang="en-US"/>
+          </a:p>
+        </p:txBody>
+      </p:sp>
+    </p:spTree>
+    <p:extLst>
+      <p:ext uri="{BB962C8B-B14F-4D97-AF65-F5344CB8AC3E}">
+        <p14:creationId xmlns:p14="http://schemas.microsoft.com/office/powerpoint/2010/main" val="1309618529"/>
+      </p:ext>
+    </p:extLst>
+  </p:cSld>
+  <p:clrMapOvr>
+    <a:masterClrMapping/>
+  </p:clrMapOvr>
+</p:notes>
+</file>
+
 <file path=ppt/slideLayouts/slideLayout1.xml><?xml version="1.0" encoding="utf-8"?>
 <p:sldLayout xmlns:a="http://schemas.openxmlformats.org/drawingml/2006/main" xmlns:r="http://schemas.openxmlformats.org/officeDocument/2006/relationships" xmlns:p="http://schemas.openxmlformats.org/presentationml/2006/main" showMasterSp="0" type="title" preserve="1">
   <p:cSld name="Title Slide">
@@ -298,9 +735,9 @@
             </a:lvl1pPr>
           </a:lstStyle>
           <a:p>
-            <a:fld id="{9E016143-E03C-4CFD-AFDC-14E5BDEA754C}" type="datetimeFigureOut">
-              <a:rPr lang="en-US" dirty="0"/>
-              <a:t>2/10/16</a:t>
+            <a:fld id="{FE38974B-290A-4C41-8C49-90C540DBAD36}" type="datetime1">
+              <a:rPr lang="en-US" smtClean="0"/>
+              <a:t>9/19/16</a:t>
             </a:fld>
             <a:endParaRPr lang="en-US" dirty="0"/>
           </a:p>
@@ -522,9 +959,9 @@
           <a:bodyPr/>
           <a:lstStyle/>
           <a:p>
-            <a:fld id="{C033E54A-A8CA-48C1-9504-691B58049D29}" type="datetimeFigureOut">
-              <a:rPr lang="en-US" dirty="0"/>
-              <a:t>2/10/16</a:t>
+            <a:fld id="{526A4AFB-0AB9-C64E-8179-7877DAC57909}" type="datetime1">
+              <a:rPr lang="en-US" smtClean="0"/>
+              <a:t>9/19/16</a:t>
             </a:fld>
             <a:endParaRPr lang="en-US" dirty="0"/>
           </a:p>
@@ -697,9 +1134,9 @@
           <a:bodyPr/>
           <a:lstStyle/>
           <a:p>
-            <a:fld id="{B5F6C806-BBF7-471C-9527-881CE2266695}" type="datetimeFigureOut">
-              <a:rPr lang="en-US" dirty="0"/>
-              <a:t>2/10/16</a:t>
+            <a:fld id="{92036B75-4FC2-834D-944C-2AFE563E18B1}" type="datetime1">
+              <a:rPr lang="en-US" smtClean="0"/>
+              <a:t>9/19/16</a:t>
             </a:fld>
             <a:endParaRPr lang="en-US" dirty="0"/>
           </a:p>
@@ -862,9 +1299,9 @@
           <a:bodyPr/>
           <a:lstStyle/>
           <a:p>
-            <a:fld id="{78C94063-DF36-4330-A365-08DA1FA5B7D6}" type="datetimeFigureOut">
-              <a:rPr lang="en-US" dirty="0"/>
-              <a:t>2/10/16</a:t>
+            <a:fld id="{CE0AAB4F-7769-204D-B341-72A0C20F6B84}" type="datetime1">
+              <a:rPr lang="en-US" smtClean="0"/>
+              <a:t>9/19/16</a:t>
             </a:fld>
             <a:endParaRPr lang="en-US" dirty="0"/>
           </a:p>
@@ -1111,9 +1548,9 @@
           <a:bodyPr/>
           <a:lstStyle/>
           <a:p>
-            <a:fld id="{908A7C6C-0F39-4D70-8E8D-FE5B9C95FA73}" type="datetimeFigureOut">
-              <a:rPr lang="en-US" dirty="0"/>
-              <a:t>2/10/16</a:t>
+            <a:fld id="{8F476637-351A-4D41-AF78-9B6899DEA63D}" type="datetime1">
+              <a:rPr lang="en-US" smtClean="0"/>
+              <a:t>9/19/16</a:t>
             </a:fld>
             <a:endParaRPr lang="en-US" dirty="0"/>
           </a:p>
@@ -1432,9 +1869,9 @@
           <a:bodyPr/>
           <a:lstStyle/>
           <a:p>
-            <a:fld id="{DFCFA4AC-08CC-42CE-BD01-C191750A04EC}" type="datetimeFigureOut">
-              <a:rPr lang="en-US" dirty="0"/>
-              <a:t>2/10/16</a:t>
+            <a:fld id="{BC4F34A5-49A6-CD45-A142-1CA91A9111B8}" type="datetime1">
+              <a:rPr lang="en-US" smtClean="0"/>
+              <a:t>9/19/16</a:t>
             </a:fld>
             <a:endParaRPr lang="en-US" dirty="0"/>
           </a:p>
@@ -1878,9 +2315,9 @@
           <a:bodyPr/>
           <a:lstStyle/>
           <a:p>
-            <a:fld id="{1BA7A723-92A7-435B-B681-F25B092FEFEB}" type="datetimeFigureOut">
-              <a:rPr lang="en-US" dirty="0"/>
-              <a:t>2/10/16</a:t>
+            <a:fld id="{B866243E-1468-7144-9EB5-2676D008A3F6}" type="datetime1">
+              <a:rPr lang="en-US" smtClean="0"/>
+              <a:t>9/19/16</a:t>
             </a:fld>
             <a:endParaRPr lang="en-US" dirty="0"/>
           </a:p>
@@ -1991,9 +2428,9 @@
           <a:bodyPr/>
           <a:lstStyle/>
           <a:p>
-            <a:fld id="{4F170639-886C-4FCF-9EAB-ABB5DA3F3F4A}" type="datetimeFigureOut">
-              <a:rPr lang="en-US" dirty="0"/>
-              <a:t>2/10/16</a:t>
+            <a:fld id="{A30A75AC-C56D-EE42-BDD2-17DB57AF2272}" type="datetime1">
+              <a:rPr lang="en-US" smtClean="0"/>
+              <a:t>9/19/16</a:t>
             </a:fld>
             <a:endParaRPr lang="en-US" dirty="0"/>
           </a:p>
@@ -2081,9 +2518,9 @@
           <a:bodyPr/>
           <a:lstStyle/>
           <a:p>
-            <a:fld id="{22230651-31F4-45D2-98AE-A2108F41BC07}" type="datetimeFigureOut">
-              <a:rPr lang="en-US" dirty="0"/>
-              <a:t>2/10/16</a:t>
+            <a:fld id="{9D395806-AD48-B544-944C-705355738331}" type="datetime1">
+              <a:rPr lang="en-US" smtClean="0"/>
+              <a:t>9/19/16</a:t>
             </a:fld>
             <a:endParaRPr lang="en-US" dirty="0"/>
           </a:p>
@@ -2363,9 +2800,9 @@
           <a:bodyPr/>
           <a:lstStyle/>
           <a:p>
-            <a:fld id="{6F53789A-C914-4DB1-8815-80B5EC7335C5}" type="datetimeFigureOut">
-              <a:rPr lang="en-US" dirty="0"/>
-              <a:t>2/10/16</a:t>
+            <a:fld id="{61B2DE48-3403-FC4B-B102-C9141BD28694}" type="datetime1">
+              <a:rPr lang="en-US" smtClean="0"/>
+              <a:t>9/19/16</a:t>
             </a:fld>
             <a:endParaRPr lang="en-US" dirty="0"/>
           </a:p>
@@ -2683,9 +3120,9 @@
           <a:bodyPr/>
           <a:lstStyle/>
           <a:p>
-            <a:fld id="{5E6440AA-91A0-436F-8FDB-C0F939DCAE21}" type="datetimeFigureOut">
-              <a:rPr lang="en-US" dirty="0"/>
-              <a:t>2/10/16</a:t>
+            <a:fld id="{E0D275B7-E62E-0047-A877-1D9C20268E81}" type="datetime1">
+              <a:rPr lang="en-US" smtClean="0"/>
+              <a:t>9/19/16</a:t>
             </a:fld>
             <a:endParaRPr lang="en-US" dirty="0"/>
           </a:p>
@@ -2932,9 +3369,9 @@
             </a:lvl1pPr>
           </a:lstStyle>
           <a:p>
-            <a:fld id="{0E59FD0C-5451-4CA0-86AF-E70AE3279989}" type="datetimeFigureOut">
-              <a:rPr lang="en-US" dirty="0"/>
-              <a:t>2/10/16</a:t>
+            <a:fld id="{47272CC5-79E2-7E45-936A-DFE9988DE469}" type="datetime1">
+              <a:rPr lang="en-US" smtClean="0"/>
+              <a:t>9/19/16</a:t>
             </a:fld>
             <a:endParaRPr lang="en-US" dirty="0"/>
           </a:p>
@@ -3039,7 +3476,7 @@
     <p:sldLayoutId id="2147483850" r:id="rId10"/>
     <p:sldLayoutId id="2147483851" r:id="rId11"/>
   </p:sldLayoutIdLst>
-  <p:hf sldNum="0" hdr="0" ftr="0" dt="0"/>
+  <p:hf hdr="0" ftr="0" dt="0"/>
   <p:txStyles>
     <p:titleStyle>
       <a:lvl1pPr algn="l" defTabSz="914400" rtl="0" eaLnBrk="1" latinLnBrk="0" hangingPunct="1">
@@ -3459,23 +3896,38 @@
           <a:p>
             <a:r>
               <a:rPr lang="en-US" dirty="0" smtClean="0"/>
-              <a:t>Week 4: Collection Types</a:t>
+              <a:t>Week 4: Collection </a:t>
+            </a:r>
+            <a:r>
+              <a:rPr lang="en-US" dirty="0" smtClean="0"/>
+              <a:t>Types</a:t>
             </a:r>
             <a:endParaRPr lang="en-US" dirty="0" smtClean="0"/>
           </a:p>
-          <a:p>
-            <a:r>
-              <a:rPr lang="en-US" dirty="0" smtClean="0"/>
-              <a:t>February </a:t>
-            </a:r>
-            <a:r>
-              <a:rPr lang="en-US" dirty="0" smtClean="0"/>
-              <a:t>11, </a:t>
-            </a:r>
-            <a:r>
-              <a:rPr lang="en-US" dirty="0" smtClean="0"/>
-              <a:t>2016</a:t>
-            </a:r>
+        </p:txBody>
+      </p:sp>
+      <p:sp>
+        <p:nvSpPr>
+          <p:cNvPr id="4" name="Slide Number Placeholder 3"/>
+          <p:cNvSpPr>
+            <a:spLocks noGrp="1"/>
+          </p:cNvSpPr>
+          <p:nvPr>
+            <p:ph type="sldNum" sz="quarter" idx="12"/>
+          </p:nvPr>
+        </p:nvSpPr>
+        <p:spPr/>
+        <p:txBody>
+          <a:bodyPr>
+            <a:normAutofit lnSpcReduction="10000"/>
+          </a:bodyPr>
+          <a:lstStyle/>
+          <a:p>
+            <a:fld id="{4FAB73BC-B049-4115-A692-8D63A059BFB8}" type="slidenum">
+              <a:rPr lang="en-US" smtClean="0"/>
+              <a:pPr/>
+              <a:t>1</a:t>
+            </a:fld>
             <a:endParaRPr lang="en-US" dirty="0"/>
           </a:p>
         </p:txBody>
@@ -3590,7 +4042,31 @@
               <a:rPr lang="en-US" sz="2800" dirty="0" smtClean="0"/>
               <a:t>Byte, Short, Integer, and Long</a:t>
             </a:r>
-            <a:endParaRPr lang="en-US" sz="2800" dirty="0" smtClean="0"/>
+          </a:p>
+        </p:txBody>
+      </p:sp>
+      <p:sp>
+        <p:nvSpPr>
+          <p:cNvPr id="2" name="Slide Number Placeholder 1"/>
+          <p:cNvSpPr>
+            <a:spLocks noGrp="1"/>
+          </p:cNvSpPr>
+          <p:nvPr>
+            <p:ph type="sldNum" sz="quarter" idx="12"/>
+          </p:nvPr>
+        </p:nvSpPr>
+        <p:spPr/>
+        <p:txBody>
+          <a:bodyPr>
+            <a:normAutofit lnSpcReduction="10000"/>
+          </a:bodyPr>
+          <a:lstStyle/>
+          <a:p>
+            <a:fld id="{4FAB73BC-B049-4115-A692-8D63A059BFB8}" type="slidenum">
+              <a:rPr lang="en-US" smtClean="0"/>
+              <a:t>10</a:t>
+            </a:fld>
+            <a:endParaRPr lang="en-US" dirty="0"/>
           </a:p>
         </p:txBody>
       </p:sp>
@@ -3670,14 +4146,12 @@
               <a:rPr lang="en-US" sz="3200" dirty="0" smtClean="0"/>
               <a:t>Unique namespace that contains classes and sub-packages</a:t>
             </a:r>
-            <a:endParaRPr lang="en-US" sz="3200" dirty="0" smtClean="0"/>
           </a:p>
           <a:p>
             <a:r>
               <a:rPr lang="en-US" sz="3200" dirty="0" smtClean="0"/>
               <a:t>Allow us to organize code similar to a folder structure for files</a:t>
             </a:r>
-            <a:endParaRPr lang="en-US" sz="3200" dirty="0" smtClean="0"/>
           </a:p>
           <a:p>
             <a:r>
@@ -3692,7 +4166,6 @@
               <a:rPr lang="en-US" sz="3200" dirty="0" smtClean="0"/>
               <a:t> statement</a:t>
             </a:r>
-            <a:endParaRPr lang="en-US" sz="3200" dirty="0" smtClean="0"/>
           </a:p>
           <a:p>
             <a:r>
@@ -3707,7 +4180,31 @@
               <a:rPr lang="en-US" sz="3200" dirty="0" smtClean="0"/>
               <a:t> statement</a:t>
             </a:r>
-            <a:endParaRPr lang="en-US" sz="3200" dirty="0" smtClean="0"/>
+          </a:p>
+        </p:txBody>
+      </p:sp>
+      <p:sp>
+        <p:nvSpPr>
+          <p:cNvPr id="4" name="Slide Number Placeholder 3"/>
+          <p:cNvSpPr>
+            <a:spLocks noGrp="1"/>
+          </p:cNvSpPr>
+          <p:nvPr>
+            <p:ph type="sldNum" sz="quarter" idx="12"/>
+          </p:nvPr>
+        </p:nvSpPr>
+        <p:spPr/>
+        <p:txBody>
+          <a:bodyPr>
+            <a:normAutofit lnSpcReduction="10000"/>
+          </a:bodyPr>
+          <a:lstStyle/>
+          <a:p>
+            <a:fld id="{4FAB73BC-B049-4115-A692-8D63A059BFB8}" type="slidenum">
+              <a:rPr lang="en-US" smtClean="0"/>
+              <a:t>11</a:t>
+            </a:fld>
+            <a:endParaRPr lang="en-US" dirty="0"/>
           </a:p>
         </p:txBody>
       </p:sp>
@@ -3787,6 +4284,31 @@
           </a:p>
         </p:txBody>
       </p:sp>
+      <p:sp>
+        <p:nvSpPr>
+          <p:cNvPr id="4" name="Slide Number Placeholder 3"/>
+          <p:cNvSpPr>
+            <a:spLocks noGrp="1"/>
+          </p:cNvSpPr>
+          <p:nvPr>
+            <p:ph type="sldNum" sz="quarter" idx="12"/>
+          </p:nvPr>
+        </p:nvSpPr>
+        <p:spPr/>
+        <p:txBody>
+          <a:bodyPr>
+            <a:normAutofit lnSpcReduction="10000"/>
+          </a:bodyPr>
+          <a:lstStyle/>
+          <a:p>
+            <a:fld id="{4FAB73BC-B049-4115-A692-8D63A059BFB8}" type="slidenum">
+              <a:rPr lang="en-US" smtClean="0"/>
+              <a:t>12</a:t>
+            </a:fld>
+            <a:endParaRPr lang="en-US" dirty="0"/>
+          </a:p>
+        </p:txBody>
+      </p:sp>
     </p:spTree>
     <p:extLst>
       <p:ext uri="{BB962C8B-B14F-4D97-AF65-F5344CB8AC3E}">
@@ -4154,6 +4676,31 @@
           </a:graphicData>
         </a:graphic>
       </p:graphicFrame>
+      <p:sp>
+        <p:nvSpPr>
+          <p:cNvPr id="3" name="Slide Number Placeholder 2"/>
+          <p:cNvSpPr>
+            <a:spLocks noGrp="1"/>
+          </p:cNvSpPr>
+          <p:nvPr>
+            <p:ph type="sldNum" sz="quarter" idx="12"/>
+          </p:nvPr>
+        </p:nvSpPr>
+        <p:spPr/>
+        <p:txBody>
+          <a:bodyPr>
+            <a:normAutofit lnSpcReduction="10000"/>
+          </a:bodyPr>
+          <a:lstStyle/>
+          <a:p>
+            <a:fld id="{4FAB73BC-B049-4115-A692-8D63A059BFB8}" type="slidenum">
+              <a:rPr lang="en-US" smtClean="0"/>
+              <a:t>13</a:t>
+            </a:fld>
+            <a:endParaRPr lang="en-US" dirty="0"/>
+          </a:p>
+        </p:txBody>
+      </p:sp>
     </p:spTree>
     <p:extLst>
       <p:ext uri="{BB962C8B-B14F-4D97-AF65-F5344CB8AC3E}">
@@ -4275,7 +4822,6 @@
               <a:rPr lang="en-US" sz="2800" dirty="0" smtClean="0"/>
               <a:t>Slower for updates</a:t>
             </a:r>
-            <a:endParaRPr lang="en-US" sz="2800" dirty="0" smtClean="0"/>
           </a:p>
         </p:txBody>
       </p:sp>
@@ -4346,6 +4892,31 @@
               <a:t>Faster for updates</a:t>
             </a:r>
             <a:endParaRPr lang="en-US" sz="2800" dirty="0"/>
+          </a:p>
+        </p:txBody>
+      </p:sp>
+      <p:sp>
+        <p:nvSpPr>
+          <p:cNvPr id="4" name="Slide Number Placeholder 3"/>
+          <p:cNvSpPr>
+            <a:spLocks noGrp="1"/>
+          </p:cNvSpPr>
+          <p:nvPr>
+            <p:ph type="sldNum" sz="quarter" idx="12"/>
+          </p:nvPr>
+        </p:nvSpPr>
+        <p:spPr/>
+        <p:txBody>
+          <a:bodyPr>
+            <a:normAutofit lnSpcReduction="10000"/>
+          </a:bodyPr>
+          <a:lstStyle/>
+          <a:p>
+            <a:fld id="{4FAB73BC-B049-4115-A692-8D63A059BFB8}" type="slidenum">
+              <a:rPr lang="en-US" smtClean="0"/>
+              <a:t>14</a:t>
+            </a:fld>
+            <a:endParaRPr lang="en-US" dirty="0"/>
           </a:p>
         </p:txBody>
       </p:sp>
@@ -4468,6 +5039,31 @@
           </a:p>
         </p:txBody>
       </p:sp>
+      <p:sp>
+        <p:nvSpPr>
+          <p:cNvPr id="4" name="Slide Number Placeholder 3"/>
+          <p:cNvSpPr>
+            <a:spLocks noGrp="1"/>
+          </p:cNvSpPr>
+          <p:nvPr>
+            <p:ph type="sldNum" sz="quarter" idx="12"/>
+          </p:nvPr>
+        </p:nvSpPr>
+        <p:spPr/>
+        <p:txBody>
+          <a:bodyPr>
+            <a:normAutofit lnSpcReduction="10000"/>
+          </a:bodyPr>
+          <a:lstStyle/>
+          <a:p>
+            <a:fld id="{4FAB73BC-B049-4115-A692-8D63A059BFB8}" type="slidenum">
+              <a:rPr lang="en-US" smtClean="0"/>
+              <a:t>15</a:t>
+            </a:fld>
+            <a:endParaRPr lang="en-US" dirty="0"/>
+          </a:p>
+        </p:txBody>
+      </p:sp>
     </p:spTree>
     <p:extLst>
       <p:ext uri="{BB962C8B-B14F-4D97-AF65-F5344CB8AC3E}">
@@ -4544,6 +5140,31 @@
           </a:p>
         </p:txBody>
       </p:sp>
+      <p:sp>
+        <p:nvSpPr>
+          <p:cNvPr id="4" name="Slide Number Placeholder 3"/>
+          <p:cNvSpPr>
+            <a:spLocks noGrp="1"/>
+          </p:cNvSpPr>
+          <p:nvPr>
+            <p:ph type="sldNum" sz="quarter" idx="12"/>
+          </p:nvPr>
+        </p:nvSpPr>
+        <p:spPr/>
+        <p:txBody>
+          <a:bodyPr>
+            <a:normAutofit lnSpcReduction="10000"/>
+          </a:bodyPr>
+          <a:lstStyle/>
+          <a:p>
+            <a:fld id="{4FAB73BC-B049-4115-A692-8D63A059BFB8}" type="slidenum">
+              <a:rPr lang="en-US" smtClean="0"/>
+              <a:t>16</a:t>
+            </a:fld>
+            <a:endParaRPr lang="en-US" dirty="0"/>
+          </a:p>
+        </p:txBody>
+      </p:sp>
     </p:spTree>
     <p:extLst>
       <p:ext uri="{BB962C8B-B14F-4D97-AF65-F5344CB8AC3E}">
@@ -4743,6 +5364,31 @@
           </a:p>
         </p:txBody>
       </p:sp>
+      <p:sp>
+        <p:nvSpPr>
+          <p:cNvPr id="4" name="Slide Number Placeholder 3"/>
+          <p:cNvSpPr>
+            <a:spLocks noGrp="1"/>
+          </p:cNvSpPr>
+          <p:nvPr>
+            <p:ph type="sldNum" sz="quarter" idx="12"/>
+          </p:nvPr>
+        </p:nvSpPr>
+        <p:spPr/>
+        <p:txBody>
+          <a:bodyPr>
+            <a:normAutofit lnSpcReduction="10000"/>
+          </a:bodyPr>
+          <a:lstStyle/>
+          <a:p>
+            <a:fld id="{4FAB73BC-B049-4115-A692-8D63A059BFB8}" type="slidenum">
+              <a:rPr lang="en-US" smtClean="0"/>
+              <a:t>17</a:t>
+            </a:fld>
+            <a:endParaRPr lang="en-US" dirty="0"/>
+          </a:p>
+        </p:txBody>
+      </p:sp>
     </p:spTree>
     <p:extLst>
       <p:ext uri="{BB962C8B-B14F-4D97-AF65-F5344CB8AC3E}">
@@ -4819,6 +5465,30 @@
               <a:rPr lang="en-US" dirty="0"/>
               <a:t>pairs where each key is unique and corresponds to at most one value</a:t>
             </a:r>
+          </a:p>
+        </p:txBody>
+      </p:sp>
+      <p:sp>
+        <p:nvSpPr>
+          <p:cNvPr id="4" name="Slide Number Placeholder 3"/>
+          <p:cNvSpPr>
+            <a:spLocks noGrp="1"/>
+          </p:cNvSpPr>
+          <p:nvPr>
+            <p:ph type="sldNum" sz="quarter" idx="12"/>
+          </p:nvPr>
+        </p:nvSpPr>
+        <p:spPr/>
+        <p:txBody>
+          <a:bodyPr>
+            <a:normAutofit lnSpcReduction="10000"/>
+          </a:bodyPr>
+          <a:lstStyle/>
+          <a:p>
+            <a:fld id="{4FAB73BC-B049-4115-A692-8D63A059BFB8}" type="slidenum">
+              <a:rPr lang="en-US" smtClean="0"/>
+              <a:t>18</a:t>
+            </a:fld>
             <a:endParaRPr lang="en-US" dirty="0"/>
           </a:p>
         </p:txBody>
@@ -5280,6 +5950,31 @@
           </a:graphicData>
         </a:graphic>
       </p:graphicFrame>
+      <p:sp>
+        <p:nvSpPr>
+          <p:cNvPr id="3" name="Slide Number Placeholder 2"/>
+          <p:cNvSpPr>
+            <a:spLocks noGrp="1"/>
+          </p:cNvSpPr>
+          <p:nvPr>
+            <p:ph type="sldNum" sz="quarter" idx="12"/>
+          </p:nvPr>
+        </p:nvSpPr>
+        <p:spPr/>
+        <p:txBody>
+          <a:bodyPr>
+            <a:normAutofit lnSpcReduction="10000"/>
+          </a:bodyPr>
+          <a:lstStyle/>
+          <a:p>
+            <a:fld id="{4FAB73BC-B049-4115-A692-8D63A059BFB8}" type="slidenum">
+              <a:rPr lang="en-US" smtClean="0"/>
+              <a:t>19</a:t>
+            </a:fld>
+            <a:endParaRPr lang="en-US" dirty="0"/>
+          </a:p>
+        </p:txBody>
+      </p:sp>
     </p:spTree>
     <p:extLst>
       <p:ext uri="{BB962C8B-B14F-4D97-AF65-F5344CB8AC3E}">
@@ -5370,6 +6065,31 @@
           </a:p>
         </p:txBody>
       </p:sp>
+      <p:sp>
+        <p:nvSpPr>
+          <p:cNvPr id="4" name="Slide Number Placeholder 3"/>
+          <p:cNvSpPr>
+            <a:spLocks noGrp="1"/>
+          </p:cNvSpPr>
+          <p:nvPr>
+            <p:ph type="sldNum" sz="quarter" idx="12"/>
+          </p:nvPr>
+        </p:nvSpPr>
+        <p:spPr/>
+        <p:txBody>
+          <a:bodyPr>
+            <a:normAutofit lnSpcReduction="10000"/>
+          </a:bodyPr>
+          <a:lstStyle/>
+          <a:p>
+            <a:fld id="{4FAB73BC-B049-4115-A692-8D63A059BFB8}" type="slidenum">
+              <a:rPr lang="en-US" smtClean="0"/>
+              <a:t>2</a:t>
+            </a:fld>
+            <a:endParaRPr lang="en-US" dirty="0"/>
+          </a:p>
+        </p:txBody>
+      </p:sp>
     </p:spTree>
     <p:extLst>
       <p:ext uri="{BB962C8B-B14F-4D97-AF65-F5344CB8AC3E}">
@@ -5491,7 +6211,6 @@
               <a:rPr lang="en-US" sz="2800" dirty="0" smtClean="0"/>
               <a:t>Slower for access</a:t>
             </a:r>
-            <a:endParaRPr lang="en-US" sz="2800" dirty="0" smtClean="0"/>
           </a:p>
         </p:txBody>
       </p:sp>
@@ -5561,6 +6280,31 @@
               <a:rPr lang="en-US" sz="2800" dirty="0" smtClean="0"/>
               <a:t>Faster for access</a:t>
             </a:r>
+          </a:p>
+        </p:txBody>
+      </p:sp>
+      <p:sp>
+        <p:nvSpPr>
+          <p:cNvPr id="4" name="Slide Number Placeholder 3"/>
+          <p:cNvSpPr>
+            <a:spLocks noGrp="1"/>
+          </p:cNvSpPr>
+          <p:nvPr>
+            <p:ph type="sldNum" sz="quarter" idx="12"/>
+          </p:nvPr>
+        </p:nvSpPr>
+        <p:spPr/>
+        <p:txBody>
+          <a:bodyPr>
+            <a:normAutofit lnSpcReduction="10000"/>
+          </a:bodyPr>
+          <a:lstStyle/>
+          <a:p>
+            <a:fld id="{4FAB73BC-B049-4115-A692-8D63A059BFB8}" type="slidenum">
+              <a:rPr lang="en-US" smtClean="0"/>
+              <a:t>20</a:t>
+            </a:fld>
+            <a:endParaRPr lang="en-US" dirty="0"/>
           </a:p>
         </p:txBody>
       </p:sp>
@@ -5675,6 +6419,31 @@
           </a:p>
         </p:txBody>
       </p:sp>
+      <p:sp>
+        <p:nvSpPr>
+          <p:cNvPr id="4" name="Slide Number Placeholder 3"/>
+          <p:cNvSpPr>
+            <a:spLocks noGrp="1"/>
+          </p:cNvSpPr>
+          <p:nvPr>
+            <p:ph type="sldNum" sz="quarter" idx="12"/>
+          </p:nvPr>
+        </p:nvSpPr>
+        <p:spPr/>
+        <p:txBody>
+          <a:bodyPr>
+            <a:normAutofit lnSpcReduction="10000"/>
+          </a:bodyPr>
+          <a:lstStyle/>
+          <a:p>
+            <a:fld id="{4FAB73BC-B049-4115-A692-8D63A059BFB8}" type="slidenum">
+              <a:rPr lang="en-US" smtClean="0"/>
+              <a:t>21</a:t>
+            </a:fld>
+            <a:endParaRPr lang="en-US" dirty="0"/>
+          </a:p>
+        </p:txBody>
+      </p:sp>
     </p:spTree>
     <p:extLst>
       <p:ext uri="{BB962C8B-B14F-4D97-AF65-F5344CB8AC3E}">
@@ -5751,13 +6520,34 @@
             </a:r>
             <a:r>
               <a:rPr lang="en-US" sz="2800" dirty="0" smtClean="0"/>
-              <a:t>, pp. </a:t>
-            </a:r>
-            <a:r>
-              <a:rPr lang="en-US" sz="2800" dirty="0" smtClean="0"/>
-              <a:t>305-318, 404-425, 448-456</a:t>
+              <a:t>, pp. 305-318, 404-425, 448-456</a:t>
             </a:r>
             <a:endParaRPr lang="en-US" sz="2800" i="1" dirty="0"/>
+          </a:p>
+        </p:txBody>
+      </p:sp>
+      <p:sp>
+        <p:nvSpPr>
+          <p:cNvPr id="4" name="Slide Number Placeholder 3"/>
+          <p:cNvSpPr>
+            <a:spLocks noGrp="1"/>
+          </p:cNvSpPr>
+          <p:nvPr>
+            <p:ph type="sldNum" sz="quarter" idx="12"/>
+          </p:nvPr>
+        </p:nvSpPr>
+        <p:spPr/>
+        <p:txBody>
+          <a:bodyPr>
+            <a:normAutofit lnSpcReduction="10000"/>
+          </a:bodyPr>
+          <a:lstStyle/>
+          <a:p>
+            <a:fld id="{4FAB73BC-B049-4115-A692-8D63A059BFB8}" type="slidenum">
+              <a:rPr lang="en-US" smtClean="0"/>
+              <a:t>3</a:t>
+            </a:fld>
+            <a:endParaRPr lang="en-US" dirty="0"/>
           </a:p>
         </p:txBody>
       </p:sp>
@@ -5837,6 +6627,31 @@
           </a:p>
         </p:txBody>
       </p:sp>
+      <p:sp>
+        <p:nvSpPr>
+          <p:cNvPr id="2" name="Slide Number Placeholder 1"/>
+          <p:cNvSpPr>
+            <a:spLocks noGrp="1"/>
+          </p:cNvSpPr>
+          <p:nvPr>
+            <p:ph type="sldNum" sz="quarter" idx="12"/>
+          </p:nvPr>
+        </p:nvSpPr>
+        <p:spPr/>
+        <p:txBody>
+          <a:bodyPr>
+            <a:normAutofit lnSpcReduction="10000"/>
+          </a:bodyPr>
+          <a:lstStyle/>
+          <a:p>
+            <a:fld id="{4FAB73BC-B049-4115-A692-8D63A059BFB8}" type="slidenum">
+              <a:rPr lang="en-US" smtClean="0"/>
+              <a:t>4</a:t>
+            </a:fld>
+            <a:endParaRPr lang="en-US" dirty="0"/>
+          </a:p>
+        </p:txBody>
+      </p:sp>
     </p:spTree>
     <p:extLst>
       <p:ext uri="{BB962C8B-B14F-4D97-AF65-F5344CB8AC3E}">
@@ -5933,7 +6748,6 @@
               <a:rPr lang="en-US" sz="3200" dirty="0" smtClean="0"/>
               <a:t> used to ignore certain files</a:t>
             </a:r>
-            <a:endParaRPr lang="en-US" sz="3200" dirty="0" smtClean="0"/>
           </a:p>
         </p:txBody>
       </p:sp>
@@ -5965,6 +6779,31 @@
           </a:xfrm>
         </p:spPr>
       </p:pic>
+      <p:sp>
+        <p:nvSpPr>
+          <p:cNvPr id="4" name="Slide Number Placeholder 3"/>
+          <p:cNvSpPr>
+            <a:spLocks noGrp="1"/>
+          </p:cNvSpPr>
+          <p:nvPr>
+            <p:ph type="sldNum" sz="quarter" idx="12"/>
+          </p:nvPr>
+        </p:nvSpPr>
+        <p:spPr/>
+        <p:txBody>
+          <a:bodyPr>
+            <a:normAutofit lnSpcReduction="10000"/>
+          </a:bodyPr>
+          <a:lstStyle/>
+          <a:p>
+            <a:fld id="{4FAB73BC-B049-4115-A692-8D63A059BFB8}" type="slidenum">
+              <a:rPr lang="en-US" smtClean="0"/>
+              <a:t>5</a:t>
+            </a:fld>
+            <a:endParaRPr lang="en-US" dirty="0"/>
+          </a:p>
+        </p:txBody>
+      </p:sp>
     </p:spTree>
     <p:extLst>
       <p:ext uri="{BB962C8B-B14F-4D97-AF65-F5344CB8AC3E}">
@@ -6083,6 +6922,31 @@
           </a:p>
         </p:txBody>
       </p:sp>
+      <p:sp>
+        <p:nvSpPr>
+          <p:cNvPr id="2" name="Slide Number Placeholder 1"/>
+          <p:cNvSpPr>
+            <a:spLocks noGrp="1"/>
+          </p:cNvSpPr>
+          <p:nvPr>
+            <p:ph type="sldNum" sz="quarter" idx="12"/>
+          </p:nvPr>
+        </p:nvSpPr>
+        <p:spPr/>
+        <p:txBody>
+          <a:bodyPr>
+            <a:normAutofit lnSpcReduction="10000"/>
+          </a:bodyPr>
+          <a:lstStyle/>
+          <a:p>
+            <a:fld id="{4FAB73BC-B049-4115-A692-8D63A059BFB8}" type="slidenum">
+              <a:rPr lang="en-US" smtClean="0"/>
+              <a:t>6</a:t>
+            </a:fld>
+            <a:endParaRPr lang="en-US" dirty="0"/>
+          </a:p>
+        </p:txBody>
+      </p:sp>
     </p:spTree>
     <p:extLst>
       <p:ext uri="{BB962C8B-B14F-4D97-AF65-F5344CB8AC3E}">
@@ -6159,6 +7023,31 @@
           </a:p>
         </p:txBody>
       </p:sp>
+      <p:sp>
+        <p:nvSpPr>
+          <p:cNvPr id="2" name="Slide Number Placeholder 1"/>
+          <p:cNvSpPr>
+            <a:spLocks noGrp="1"/>
+          </p:cNvSpPr>
+          <p:nvPr>
+            <p:ph type="sldNum" sz="quarter" idx="12"/>
+          </p:nvPr>
+        </p:nvSpPr>
+        <p:spPr/>
+        <p:txBody>
+          <a:bodyPr>
+            <a:normAutofit lnSpcReduction="10000"/>
+          </a:bodyPr>
+          <a:lstStyle/>
+          <a:p>
+            <a:fld id="{4FAB73BC-B049-4115-A692-8D63A059BFB8}" type="slidenum">
+              <a:rPr lang="en-US" smtClean="0"/>
+              <a:t>7</a:t>
+            </a:fld>
+            <a:endParaRPr lang="en-US" dirty="0"/>
+          </a:p>
+        </p:txBody>
+      </p:sp>
     </p:spTree>
     <p:extLst>
       <p:ext uri="{BB962C8B-B14F-4D97-AF65-F5344CB8AC3E}">
@@ -6391,6 +7280,31 @@
           </a:p>
         </p:txBody>
       </p:sp>
+      <p:sp>
+        <p:nvSpPr>
+          <p:cNvPr id="4" name="Slide Number Placeholder 3"/>
+          <p:cNvSpPr>
+            <a:spLocks noGrp="1"/>
+          </p:cNvSpPr>
+          <p:nvPr>
+            <p:ph type="sldNum" sz="quarter" idx="12"/>
+          </p:nvPr>
+        </p:nvSpPr>
+        <p:spPr/>
+        <p:txBody>
+          <a:bodyPr>
+            <a:normAutofit lnSpcReduction="10000"/>
+          </a:bodyPr>
+          <a:lstStyle/>
+          <a:p>
+            <a:fld id="{4FAB73BC-B049-4115-A692-8D63A059BFB8}" type="slidenum">
+              <a:rPr lang="en-US" smtClean="0"/>
+              <a:t>8</a:t>
+            </a:fld>
+            <a:endParaRPr lang="en-US" dirty="0"/>
+          </a:p>
+        </p:txBody>
+      </p:sp>
     </p:spTree>
     <p:extLst>
       <p:ext uri="{BB962C8B-B14F-4D97-AF65-F5344CB8AC3E}">
@@ -6761,6 +7675,31 @@
           </a:graphicData>
         </a:graphic>
       </p:graphicFrame>
+      <p:sp>
+        <p:nvSpPr>
+          <p:cNvPr id="2" name="Slide Number Placeholder 1"/>
+          <p:cNvSpPr>
+            <a:spLocks noGrp="1"/>
+          </p:cNvSpPr>
+          <p:nvPr>
+            <p:ph type="sldNum" sz="quarter" idx="12"/>
+          </p:nvPr>
+        </p:nvSpPr>
+        <p:spPr/>
+        <p:txBody>
+          <a:bodyPr>
+            <a:normAutofit lnSpcReduction="10000"/>
+          </a:bodyPr>
+          <a:lstStyle/>
+          <a:p>
+            <a:fld id="{4FAB73BC-B049-4115-A692-8D63A059BFB8}" type="slidenum">
+              <a:rPr lang="en-US" smtClean="0"/>
+              <a:t>9</a:t>
+            </a:fld>
+            <a:endParaRPr lang="en-US" dirty="0"/>
+          </a:p>
+        </p:txBody>
+      </p:sp>
     </p:spTree>
     <p:extLst>
       <p:ext uri="{BB962C8B-B14F-4D97-AF65-F5344CB8AC3E}">
@@ -7025,4 +7964,265 @@
     </a:ext>
   </a:extLst>
 </a:theme>
+</file>
+
+<file path=ppt/theme/theme2.xml><?xml version="1.0" encoding="utf-8"?>
+<a:theme xmlns:a="http://schemas.openxmlformats.org/drawingml/2006/main" name="Office Theme">
+  <a:themeElements>
+    <a:clrScheme name="Office">
+      <a:dk1>
+        <a:sysClr val="windowText" lastClr="000000"/>
+      </a:dk1>
+      <a:lt1>
+        <a:sysClr val="window" lastClr="FFFFFF"/>
+      </a:lt1>
+      <a:dk2>
+        <a:srgbClr val="44546A"/>
+      </a:dk2>
+      <a:lt2>
+        <a:srgbClr val="E7E6E6"/>
+      </a:lt2>
+      <a:accent1>
+        <a:srgbClr val="5B9BD5"/>
+      </a:accent1>
+      <a:accent2>
+        <a:srgbClr val="ED7D31"/>
+      </a:accent2>
+      <a:accent3>
+        <a:srgbClr val="A5A5A5"/>
+      </a:accent3>
+      <a:accent4>
+        <a:srgbClr val="FFC000"/>
+      </a:accent4>
+      <a:accent5>
+        <a:srgbClr val="4472C4"/>
+      </a:accent5>
+      <a:accent6>
+        <a:srgbClr val="70AD47"/>
+      </a:accent6>
+      <a:hlink>
+        <a:srgbClr val="0563C1"/>
+      </a:hlink>
+      <a:folHlink>
+        <a:srgbClr val="954F72"/>
+      </a:folHlink>
+    </a:clrScheme>
+    <a:fontScheme name="Office">
+      <a:majorFont>
+        <a:latin typeface="Calibri Light" panose="020F0302020204030204"/>
+        <a:ea typeface=""/>
+        <a:cs typeface=""/>
+        <a:font script="Jpan" typeface="Yu Gothic Light"/>
+        <a:font script="Hang" typeface="맑은 고딕"/>
+        <a:font script="Hans" typeface="DengXian Light"/>
+        <a:font script="Hant" typeface="新細明體"/>
+        <a:font script="Arab" typeface="Times New Roman"/>
+        <a:font script="Hebr" typeface="Times New Roman"/>
+        <a:font script="Thai" typeface="Angsana New"/>
+        <a:font script="Ethi" typeface="Nyala"/>
+        <a:font script="Beng" typeface="Vrinda"/>
+        <a:font script="Gujr" typeface="Shruti"/>
+        <a:font script="Khmr" typeface="MoolBoran"/>
+        <a:font script="Knda" typeface="Tunga"/>
+        <a:font script="Guru" typeface="Raavi"/>
+        <a:font script="Cans" typeface="Euphemia"/>
+        <a:font script="Cher" typeface="Plantagenet Cherokee"/>
+        <a:font script="Yiii" typeface="Microsoft Yi Baiti"/>
+        <a:font script="Tibt" typeface="Microsoft Himalaya"/>
+        <a:font script="Thaa" typeface="MV Boli"/>
+        <a:font script="Deva" typeface="Mangal"/>
+        <a:font script="Telu" typeface="Gautami"/>
+        <a:font script="Taml" typeface="Latha"/>
+        <a:font script="Syrc" typeface="Estrangelo Edessa"/>
+        <a:font script="Orya" typeface="Kalinga"/>
+        <a:font script="Mlym" typeface="Kartika"/>
+        <a:font script="Laoo" typeface="DokChampa"/>
+        <a:font script="Sinh" typeface="Iskoola Pota"/>
+        <a:font script="Mong" typeface="Mongolian Baiti"/>
+        <a:font script="Viet" typeface="Times New Roman"/>
+        <a:font script="Uigh" typeface="Microsoft Uighur"/>
+        <a:font script="Geor" typeface="Sylfaen"/>
+      </a:majorFont>
+      <a:minorFont>
+        <a:latin typeface="Calibri" panose="020F0502020204030204"/>
+        <a:ea typeface=""/>
+        <a:cs typeface=""/>
+        <a:font script="Jpan" typeface="Yu Gothic"/>
+        <a:font script="Hang" typeface="맑은 고딕"/>
+        <a:font script="Hans" typeface="DengXian"/>
+        <a:font script="Hant" typeface="新細明體"/>
+        <a:font script="Arab" typeface="Arial"/>
+        <a:font script="Hebr" typeface="Arial"/>
+        <a:font script="Thai" typeface="Cordia New"/>
+        <a:font script="Ethi" typeface="Nyala"/>
+        <a:font script="Beng" typeface="Vrinda"/>
+        <a:font script="Gujr" typeface="Shruti"/>
+        <a:font script="Khmr" typeface="DaunPenh"/>
+        <a:font script="Knda" typeface="Tunga"/>
+        <a:font script="Guru" typeface="Raavi"/>
+        <a:font script="Cans" typeface="Euphemia"/>
+        <a:font script="Cher" typeface="Plantagenet Cherokee"/>
+        <a:font script="Yiii" typeface="Microsoft Yi Baiti"/>
+        <a:font script="Tibt" typeface="Microsoft Himalaya"/>
+        <a:font script="Thaa" typeface="MV Boli"/>
+        <a:font script="Deva" typeface="Mangal"/>
+        <a:font script="Telu" typeface="Gautami"/>
+        <a:font script="Taml" typeface="Latha"/>
+        <a:font script="Syrc" typeface="Estrangelo Edessa"/>
+        <a:font script="Orya" typeface="Kalinga"/>
+        <a:font script="Mlym" typeface="Kartika"/>
+        <a:font script="Laoo" typeface="DokChampa"/>
+        <a:font script="Sinh" typeface="Iskoola Pota"/>
+        <a:font script="Mong" typeface="Mongolian Baiti"/>
+        <a:font script="Viet" typeface="Arial"/>
+        <a:font script="Uigh" typeface="Microsoft Uighur"/>
+        <a:font script="Geor" typeface="Sylfaen"/>
+      </a:minorFont>
+    </a:fontScheme>
+    <a:fmtScheme name="Office">
+      <a:fillStyleLst>
+        <a:solidFill>
+          <a:schemeClr val="phClr"/>
+        </a:solidFill>
+        <a:gradFill rotWithShape="1">
+          <a:gsLst>
+            <a:gs pos="0">
+              <a:schemeClr val="phClr">
+                <a:lumMod val="110000"/>
+                <a:satMod val="105000"/>
+                <a:tint val="67000"/>
+              </a:schemeClr>
+            </a:gs>
+            <a:gs pos="50000">
+              <a:schemeClr val="phClr">
+                <a:lumMod val="105000"/>
+                <a:satMod val="103000"/>
+                <a:tint val="73000"/>
+              </a:schemeClr>
+            </a:gs>
+            <a:gs pos="100000">
+              <a:schemeClr val="phClr">
+                <a:lumMod val="105000"/>
+                <a:satMod val="109000"/>
+                <a:tint val="81000"/>
+              </a:schemeClr>
+            </a:gs>
+          </a:gsLst>
+          <a:lin ang="5400000" scaled="0"/>
+        </a:gradFill>
+        <a:gradFill rotWithShape="1">
+          <a:gsLst>
+            <a:gs pos="0">
+              <a:schemeClr val="phClr">
+                <a:satMod val="103000"/>
+                <a:lumMod val="102000"/>
+                <a:tint val="94000"/>
+              </a:schemeClr>
+            </a:gs>
+            <a:gs pos="50000">
+              <a:schemeClr val="phClr">
+                <a:satMod val="110000"/>
+                <a:lumMod val="100000"/>
+                <a:shade val="100000"/>
+              </a:schemeClr>
+            </a:gs>
+            <a:gs pos="100000">
+              <a:schemeClr val="phClr">
+                <a:lumMod val="99000"/>
+                <a:satMod val="120000"/>
+                <a:shade val="78000"/>
+              </a:schemeClr>
+            </a:gs>
+          </a:gsLst>
+          <a:lin ang="5400000" scaled="0"/>
+        </a:gradFill>
+      </a:fillStyleLst>
+      <a:lnStyleLst>
+        <a:ln w="6350" cap="flat" cmpd="sng" algn="ctr">
+          <a:solidFill>
+            <a:schemeClr val="phClr"/>
+          </a:solidFill>
+          <a:prstDash val="solid"/>
+          <a:miter lim="800000"/>
+        </a:ln>
+        <a:ln w="12700" cap="flat" cmpd="sng" algn="ctr">
+          <a:solidFill>
+            <a:schemeClr val="phClr"/>
+          </a:solidFill>
+          <a:prstDash val="solid"/>
+          <a:miter lim="800000"/>
+        </a:ln>
+        <a:ln w="19050" cap="flat" cmpd="sng" algn="ctr">
+          <a:solidFill>
+            <a:schemeClr val="phClr"/>
+          </a:solidFill>
+          <a:prstDash val="solid"/>
+          <a:miter lim="800000"/>
+        </a:ln>
+      </a:lnStyleLst>
+      <a:effectStyleLst>
+        <a:effectStyle>
+          <a:effectLst/>
+        </a:effectStyle>
+        <a:effectStyle>
+          <a:effectLst/>
+        </a:effectStyle>
+        <a:effectStyle>
+          <a:effectLst>
+            <a:outerShdw blurRad="57150" dist="19050" dir="5400000" algn="ctr" rotWithShape="0">
+              <a:srgbClr val="000000">
+                <a:alpha val="63000"/>
+              </a:srgbClr>
+            </a:outerShdw>
+          </a:effectLst>
+        </a:effectStyle>
+      </a:effectStyleLst>
+      <a:bgFillStyleLst>
+        <a:solidFill>
+          <a:schemeClr val="phClr"/>
+        </a:solidFill>
+        <a:solidFill>
+          <a:schemeClr val="phClr">
+            <a:tint val="95000"/>
+            <a:satMod val="170000"/>
+          </a:schemeClr>
+        </a:solidFill>
+        <a:gradFill rotWithShape="1">
+          <a:gsLst>
+            <a:gs pos="0">
+              <a:schemeClr val="phClr">
+                <a:tint val="93000"/>
+                <a:satMod val="150000"/>
+                <a:shade val="98000"/>
+                <a:lumMod val="102000"/>
+              </a:schemeClr>
+            </a:gs>
+            <a:gs pos="50000">
+              <a:schemeClr val="phClr">
+                <a:tint val="98000"/>
+                <a:satMod val="130000"/>
+                <a:shade val="90000"/>
+                <a:lumMod val="103000"/>
+              </a:schemeClr>
+            </a:gs>
+            <a:gs pos="100000">
+              <a:schemeClr val="phClr">
+                <a:shade val="63000"/>
+                <a:satMod val="120000"/>
+              </a:schemeClr>
+            </a:gs>
+          </a:gsLst>
+          <a:lin ang="5400000" scaled="0"/>
+        </a:gradFill>
+      </a:bgFillStyleLst>
+    </a:fmtScheme>
+  </a:themeElements>
+  <a:objectDefaults/>
+  <a:extraClrSchemeLst/>
+  <a:extLst>
+    <a:ext uri="{05A4C25C-085E-4340-85A3-A5531E510DB2}">
+      <thm15:themeFamily xmlns:thm15="http://schemas.microsoft.com/office/thememl/2012/main" name="Office Theme" id="{62F939B6-93AF-4DB8-9C6B-D6C7DFDC589F}" vid="{4A3C46E8-61CC-4603-A589-7422A47A8E4A}"/>
+    </a:ext>
+  </a:extLst>
+</a:theme>
 </file>
</xml_diff>

<commit_message>
week_04: remove github forking, moving to second class
</commit_message>
<xml_diff>
--- a/week_04/week_04.pptx
+++ b/week_04/week_04.pptx
@@ -5,30 +5,27 @@
     <p:sldMasterId id="2147483840" r:id="rId1"/>
   </p:sldMasterIdLst>
   <p:notesMasterIdLst>
-    <p:notesMasterId r:id="rId23"/>
+    <p:notesMasterId r:id="rId20"/>
   </p:notesMasterIdLst>
   <p:sldIdLst>
     <p:sldId id="256" r:id="rId2"/>
     <p:sldId id="276" r:id="rId3"/>
     <p:sldId id="258" r:id="rId4"/>
-    <p:sldId id="260" r:id="rId5"/>
-    <p:sldId id="257" r:id="rId6"/>
-    <p:sldId id="277" r:id="rId7"/>
-    <p:sldId id="278" r:id="rId8"/>
-    <p:sldId id="259" r:id="rId9"/>
-    <p:sldId id="280" r:id="rId10"/>
-    <p:sldId id="261" r:id="rId11"/>
-    <p:sldId id="262" r:id="rId12"/>
-    <p:sldId id="264" r:id="rId13"/>
-    <p:sldId id="263" r:id="rId14"/>
-    <p:sldId id="275" r:id="rId15"/>
-    <p:sldId id="265" r:id="rId16"/>
-    <p:sldId id="284" r:id="rId17"/>
-    <p:sldId id="286" r:id="rId18"/>
-    <p:sldId id="281" r:id="rId19"/>
-    <p:sldId id="282" r:id="rId20"/>
-    <p:sldId id="283" r:id="rId21"/>
-    <p:sldId id="273" r:id="rId22"/>
+    <p:sldId id="278" r:id="rId5"/>
+    <p:sldId id="259" r:id="rId6"/>
+    <p:sldId id="280" r:id="rId7"/>
+    <p:sldId id="261" r:id="rId8"/>
+    <p:sldId id="262" r:id="rId9"/>
+    <p:sldId id="264" r:id="rId10"/>
+    <p:sldId id="263" r:id="rId11"/>
+    <p:sldId id="275" r:id="rId12"/>
+    <p:sldId id="265" r:id="rId13"/>
+    <p:sldId id="284" r:id="rId14"/>
+    <p:sldId id="286" r:id="rId15"/>
+    <p:sldId id="281" r:id="rId16"/>
+    <p:sldId id="282" r:id="rId17"/>
+    <p:sldId id="283" r:id="rId18"/>
+    <p:sldId id="273" r:id="rId19"/>
   </p:sldIdLst>
   <p:sldSz cx="12192000" cy="6858000"/>
   <p:notesSz cx="6858000" cy="9144000"/>
@@ -217,7 +214,7 @@
           <a:p>
             <a:fld id="{4E92CB9E-58B2-9B49-8C56-0B7366E3BE32}" type="datetimeFigureOut">
               <a:rPr lang="en-US" smtClean="0"/>
-              <a:t>9/19/16</a:t>
+              <a:t>9/21/16</a:t>
             </a:fld>
             <a:endParaRPr lang="en-US"/>
           </a:p>
@@ -737,7 +734,7 @@
           <a:p>
             <a:fld id="{FE38974B-290A-4C41-8C49-90C540DBAD36}" type="datetime1">
               <a:rPr lang="en-US" smtClean="0"/>
-              <a:t>9/19/16</a:t>
+              <a:t>9/21/16</a:t>
             </a:fld>
             <a:endParaRPr lang="en-US" dirty="0"/>
           </a:p>
@@ -961,7 +958,7 @@
           <a:p>
             <a:fld id="{526A4AFB-0AB9-C64E-8179-7877DAC57909}" type="datetime1">
               <a:rPr lang="en-US" smtClean="0"/>
-              <a:t>9/19/16</a:t>
+              <a:t>9/21/16</a:t>
             </a:fld>
             <a:endParaRPr lang="en-US" dirty="0"/>
           </a:p>
@@ -1136,7 +1133,7 @@
           <a:p>
             <a:fld id="{92036B75-4FC2-834D-944C-2AFE563E18B1}" type="datetime1">
               <a:rPr lang="en-US" smtClean="0"/>
-              <a:t>9/19/16</a:t>
+              <a:t>9/21/16</a:t>
             </a:fld>
             <a:endParaRPr lang="en-US" dirty="0"/>
           </a:p>
@@ -1301,7 +1298,7 @@
           <a:p>
             <a:fld id="{CE0AAB4F-7769-204D-B341-72A0C20F6B84}" type="datetime1">
               <a:rPr lang="en-US" smtClean="0"/>
-              <a:t>9/19/16</a:t>
+              <a:t>9/21/16</a:t>
             </a:fld>
             <a:endParaRPr lang="en-US" dirty="0"/>
           </a:p>
@@ -1550,7 +1547,7 @@
           <a:p>
             <a:fld id="{8F476637-351A-4D41-AF78-9B6899DEA63D}" type="datetime1">
               <a:rPr lang="en-US" smtClean="0"/>
-              <a:t>9/19/16</a:t>
+              <a:t>9/21/16</a:t>
             </a:fld>
             <a:endParaRPr lang="en-US" dirty="0"/>
           </a:p>
@@ -1871,7 +1868,7 @@
           <a:p>
             <a:fld id="{BC4F34A5-49A6-CD45-A142-1CA91A9111B8}" type="datetime1">
               <a:rPr lang="en-US" smtClean="0"/>
-              <a:t>9/19/16</a:t>
+              <a:t>9/21/16</a:t>
             </a:fld>
             <a:endParaRPr lang="en-US" dirty="0"/>
           </a:p>
@@ -2317,7 +2314,7 @@
           <a:p>
             <a:fld id="{B866243E-1468-7144-9EB5-2676D008A3F6}" type="datetime1">
               <a:rPr lang="en-US" smtClean="0"/>
-              <a:t>9/19/16</a:t>
+              <a:t>9/21/16</a:t>
             </a:fld>
             <a:endParaRPr lang="en-US" dirty="0"/>
           </a:p>
@@ -2430,7 +2427,7 @@
           <a:p>
             <a:fld id="{A30A75AC-C56D-EE42-BDD2-17DB57AF2272}" type="datetime1">
               <a:rPr lang="en-US" smtClean="0"/>
-              <a:t>9/19/16</a:t>
+              <a:t>9/21/16</a:t>
             </a:fld>
             <a:endParaRPr lang="en-US" dirty="0"/>
           </a:p>
@@ -2520,7 +2517,7 @@
           <a:p>
             <a:fld id="{9D395806-AD48-B544-944C-705355738331}" type="datetime1">
               <a:rPr lang="en-US" smtClean="0"/>
-              <a:t>9/19/16</a:t>
+              <a:t>9/21/16</a:t>
             </a:fld>
             <a:endParaRPr lang="en-US" dirty="0"/>
           </a:p>
@@ -2802,7 +2799,7 @@
           <a:p>
             <a:fld id="{61B2DE48-3403-FC4B-B102-C9141BD28694}" type="datetime1">
               <a:rPr lang="en-US" smtClean="0"/>
-              <a:t>9/19/16</a:t>
+              <a:t>9/21/16</a:t>
             </a:fld>
             <a:endParaRPr lang="en-US" dirty="0"/>
           </a:p>
@@ -3122,7 +3119,7 @@
           <a:p>
             <a:fld id="{E0D275B7-E62E-0047-A877-1D9C20268E81}" type="datetime1">
               <a:rPr lang="en-US" smtClean="0"/>
-              <a:t>9/19/16</a:t>
+              <a:t>9/21/16</a:t>
             </a:fld>
             <a:endParaRPr lang="en-US" dirty="0"/>
           </a:p>
@@ -3371,7 +3368,7 @@
           <a:p>
             <a:fld id="{47272CC5-79E2-7E45-936A-DFE9988DE469}" type="datetime1">
               <a:rPr lang="en-US" smtClean="0"/>
-              <a:t>9/19/16</a:t>
+              <a:t>9/21/16</a:t>
             </a:fld>
             <a:endParaRPr lang="en-US" dirty="0"/>
           </a:p>
@@ -3896,13 +3893,8 @@
           <a:p>
             <a:r>
               <a:rPr lang="en-US" dirty="0" smtClean="0"/>
-              <a:t>Week 4: Collection </a:t>
-            </a:r>
-            <a:r>
-              <a:rPr lang="en-US" dirty="0" smtClean="0"/>
-              <a:t>Types</a:t>
-            </a:r>
-            <a:endParaRPr lang="en-US" dirty="0" smtClean="0"/>
+              <a:t>Week 4: Collection Types</a:t>
+            </a:r>
           </a:p>
         </p:txBody>
       </p:sp>
@@ -3964,7 +3956,7 @@
       </p:grpSpPr>
       <p:sp>
         <p:nvSpPr>
-          <p:cNvPr id="4" name="Title 3"/>
+          <p:cNvPr id="2" name="Title 1"/>
           <p:cNvSpPr>
             <a:spLocks noGrp="1"/>
           </p:cNvSpPr>
@@ -3981,73 +3973,327 @@
           <a:p>
             <a:r>
               <a:rPr lang="en-US" sz="4800" dirty="0" smtClean="0"/>
-              <a:t>Primitive Type Wrappers</a:t>
+              <a:t>List Interface</a:t>
             </a:r>
             <a:endParaRPr lang="en-US" sz="4800" dirty="0"/>
           </a:p>
         </p:txBody>
       </p:sp>
-      <p:sp>
-        <p:nvSpPr>
-          <p:cNvPr id="5" name="Content Placeholder 4"/>
-          <p:cNvSpPr>
-            <a:spLocks noGrp="1"/>
-          </p:cNvSpPr>
+      <p:graphicFrame>
+        <p:nvGraphicFramePr>
+          <p:cNvPr id="4" name="Content Placeholder 3"/>
+          <p:cNvGraphicFramePr>
+            <a:graphicFrameLocks noGrp="1"/>
+          </p:cNvGraphicFramePr>
           <p:nvPr>
             <p:ph idx="1"/>
-          </p:nvPr>
-        </p:nvSpPr>
-        <p:spPr/>
-        <p:txBody>
-          <a:bodyPr anchor="ctr">
-            <a:normAutofit/>
-          </a:bodyPr>
-          <a:lstStyle/>
-          <a:p>
-            <a:r>
-              <a:rPr lang="en-US" sz="2800" dirty="0" smtClean="0"/>
-              <a:t>Objects created from classes implementing the Collection interface cannot store elements with primitive types</a:t>
-            </a:r>
-          </a:p>
-          <a:p>
-            <a:r>
-              <a:rPr lang="en-US" sz="2800" dirty="0" smtClean="0"/>
-              <a:t>Special classes exist to represent primitive types</a:t>
-            </a:r>
-          </a:p>
-          <a:p>
-            <a:pPr lvl="1"/>
-            <a:r>
-              <a:rPr lang="en-US" sz="2800" dirty="0" smtClean="0"/>
-              <a:t>Boolean</a:t>
-            </a:r>
-          </a:p>
-          <a:p>
-            <a:pPr lvl="1"/>
-            <a:r>
-              <a:rPr lang="en-US" sz="2800" dirty="0" smtClean="0"/>
-              <a:t>Character</a:t>
-            </a:r>
-          </a:p>
-          <a:p>
-            <a:pPr lvl="1"/>
-            <a:r>
-              <a:rPr lang="en-US" sz="2800" dirty="0" smtClean="0"/>
-              <a:t>Float and Double</a:t>
-            </a:r>
-          </a:p>
-          <a:p>
-            <a:pPr lvl="1"/>
-            <a:r>
-              <a:rPr lang="en-US" sz="2800" dirty="0" smtClean="0"/>
-              <a:t>Byte, Short, Integer, and Long</a:t>
-            </a:r>
-          </a:p>
-        </p:txBody>
-      </p:sp>
-      <p:sp>
-        <p:nvSpPr>
-          <p:cNvPr id="2" name="Slide Number Placeholder 1"/>
+            <p:extLst>
+              <p:ext uri="{D42A27DB-BD31-4B8C-83A1-F6EECF244321}">
+                <p14:modId xmlns:p14="http://schemas.microsoft.com/office/powerpoint/2010/main" val="507152792"/>
+              </p:ext>
+            </p:extLst>
+          </p:nvPr>
+        </p:nvGraphicFramePr>
+        <p:xfrm>
+          <a:off x="1262063" y="1828800"/>
+          <a:ext cx="8594726" cy="4211320"/>
+        </p:xfrm>
+        <a:graphic>
+          <a:graphicData uri="http://schemas.openxmlformats.org/drawingml/2006/table">
+            <a:tbl>
+              <a:tblPr firstRow="1" bandRow="1">
+                <a:tableStyleId>{5C22544A-7EE6-4342-B048-85BDC9FD1C3A}</a:tableStyleId>
+              </a:tblPr>
+              <a:tblGrid>
+                <a:gridCol w="3239599"/>
+                <a:gridCol w="5355127"/>
+              </a:tblGrid>
+              <a:tr h="370840">
+                <a:tc>
+                  <a:txBody>
+                    <a:bodyPr/>
+                    <a:lstStyle/>
+                    <a:p>
+                      <a:pPr algn="l"/>
+                      <a:r>
+                        <a:rPr lang="en-US" dirty="0"/>
+                        <a:t>Method</a:t>
+                      </a:r>
+                    </a:p>
+                  </a:txBody>
+                  <a:tcPr anchor="ctr"/>
+                </a:tc>
+                <a:tc>
+                  <a:txBody>
+                    <a:bodyPr/>
+                    <a:lstStyle/>
+                    <a:p>
+                      <a:pPr algn="l"/>
+                      <a:r>
+                        <a:rPr lang="en-US"/>
+                        <a:t>Description</a:t>
+                      </a:r>
+                    </a:p>
+                  </a:txBody>
+                  <a:tcPr anchor="ctr"/>
+                </a:tc>
+              </a:tr>
+              <a:tr h="370840">
+                <a:tc>
+                  <a:txBody>
+                    <a:bodyPr/>
+                    <a:lstStyle/>
+                    <a:p>
+                      <a:pPr algn="l"/>
+                      <a:r>
+                        <a:rPr lang="en-US"/>
+                        <a:t>void add(int index, E e)</a:t>
+                      </a:r>
+                    </a:p>
+                  </a:txBody>
+                  <a:tcPr anchor="ctr"/>
+                </a:tc>
+                <a:tc>
+                  <a:txBody>
+                    <a:bodyPr/>
+                    <a:lstStyle/>
+                    <a:p>
+                      <a:pPr algn="l"/>
+                      <a:r>
+                        <a:rPr lang="en-US"/>
+                        <a:t>Insert element </a:t>
+                      </a:r>
+                      <a:r>
+                        <a:rPr lang="en-US" i="1"/>
+                        <a:t>e</a:t>
+                      </a:r>
+                      <a:r>
+                        <a:rPr lang="en-US"/>
+                        <a:t> into the list at position </a:t>
+                      </a:r>
+                      <a:r>
+                        <a:rPr lang="en-US" i="1"/>
+                        <a:t>index</a:t>
+                      </a:r>
+                      <a:r>
+                        <a:rPr lang="en-US"/>
+                        <a:t> and shift elements to the right as necessary</a:t>
+                      </a:r>
+                    </a:p>
+                  </a:txBody>
+                  <a:tcPr anchor="ctr"/>
+                </a:tc>
+              </a:tr>
+              <a:tr h="370840">
+                <a:tc>
+                  <a:txBody>
+                    <a:bodyPr/>
+                    <a:lstStyle/>
+                    <a:p>
+                      <a:pPr algn="l"/>
+                      <a:r>
+                        <a:rPr lang="en-US"/>
+                        <a:t>E get(int index)</a:t>
+                      </a:r>
+                    </a:p>
+                  </a:txBody>
+                  <a:tcPr anchor="ctr"/>
+                </a:tc>
+                <a:tc>
+                  <a:txBody>
+                    <a:bodyPr/>
+                    <a:lstStyle/>
+                    <a:p>
+                      <a:pPr algn="l"/>
+                      <a:r>
+                        <a:rPr lang="en-US"/>
+                        <a:t>Returns the element of type </a:t>
+                      </a:r>
+                      <a:r>
+                        <a:rPr lang="en-US" i="1"/>
+                        <a:t>E</a:t>
+                      </a:r>
+                      <a:r>
+                        <a:rPr lang="en-US"/>
+                        <a:t> stored at position </a:t>
+                      </a:r>
+                      <a:r>
+                        <a:rPr lang="en-US" i="1"/>
+                        <a:t>index</a:t>
+                      </a:r>
+                      <a:endParaRPr lang="en-US"/>
+                    </a:p>
+                  </a:txBody>
+                  <a:tcPr anchor="ctr"/>
+                </a:tc>
+              </a:tr>
+              <a:tr h="370840">
+                <a:tc>
+                  <a:txBody>
+                    <a:bodyPr/>
+                    <a:lstStyle/>
+                    <a:p>
+                      <a:pPr algn="l"/>
+                      <a:r>
+                        <a:rPr lang="en-US"/>
+                        <a:t>int indexOf(Object o)</a:t>
+                      </a:r>
+                    </a:p>
+                  </a:txBody>
+                  <a:tcPr anchor="ctr"/>
+                </a:tc>
+                <a:tc>
+                  <a:txBody>
+                    <a:bodyPr/>
+                    <a:lstStyle/>
+                    <a:p>
+                      <a:pPr algn="l"/>
+                      <a:r>
+                        <a:rPr lang="en-US"/>
+                        <a:t>Returns the index of the first occurrence of element </a:t>
+                      </a:r>
+                      <a:r>
+                        <a:rPr lang="en-US" i="1"/>
+                        <a:t>o</a:t>
+                      </a:r>
+                      <a:r>
+                        <a:rPr lang="en-US"/>
+                        <a:t> in the list</a:t>
+                      </a:r>
+                    </a:p>
+                  </a:txBody>
+                  <a:tcPr anchor="ctr"/>
+                </a:tc>
+              </a:tr>
+              <a:tr h="370840">
+                <a:tc>
+                  <a:txBody>
+                    <a:bodyPr/>
+                    <a:lstStyle/>
+                    <a:p>
+                      <a:pPr algn="l"/>
+                      <a:r>
+                        <a:rPr lang="en-US"/>
+                        <a:t>int lastIndexOf(Object o)</a:t>
+                      </a:r>
+                    </a:p>
+                  </a:txBody>
+                  <a:tcPr anchor="ctr"/>
+                </a:tc>
+                <a:tc>
+                  <a:txBody>
+                    <a:bodyPr/>
+                    <a:lstStyle/>
+                    <a:p>
+                      <a:pPr algn="l"/>
+                      <a:r>
+                        <a:rPr lang="en-US"/>
+                        <a:t>Returns the index of the last occurrence of element </a:t>
+                      </a:r>
+                      <a:r>
+                        <a:rPr lang="en-US" i="1"/>
+                        <a:t>o</a:t>
+                      </a:r>
+                      <a:r>
+                        <a:rPr lang="en-US"/>
+                        <a:t> in the list</a:t>
+                      </a:r>
+                    </a:p>
+                  </a:txBody>
+                  <a:tcPr anchor="ctr"/>
+                </a:tc>
+              </a:tr>
+              <a:tr h="370840">
+                <a:tc>
+                  <a:txBody>
+                    <a:bodyPr/>
+                    <a:lstStyle/>
+                    <a:p>
+                      <a:pPr algn="l"/>
+                      <a:r>
+                        <a:rPr lang="en-US"/>
+                        <a:t>E remove(int index)</a:t>
+                      </a:r>
+                    </a:p>
+                  </a:txBody>
+                  <a:tcPr anchor="ctr"/>
+                </a:tc>
+                <a:tc>
+                  <a:txBody>
+                    <a:bodyPr/>
+                    <a:lstStyle/>
+                    <a:p>
+                      <a:pPr algn="l"/>
+                      <a:r>
+                        <a:rPr lang="en-US"/>
+                        <a:t>Remove and return the element at </a:t>
+                      </a:r>
+                      <a:r>
+                        <a:rPr lang="en-US" i="1"/>
+                        <a:t>index</a:t>
+                      </a:r>
+                      <a:r>
+                        <a:rPr lang="en-US"/>
+                        <a:t> in the list</a:t>
+                      </a:r>
+                    </a:p>
+                  </a:txBody>
+                  <a:tcPr anchor="ctr"/>
+                </a:tc>
+              </a:tr>
+              <a:tr h="370840">
+                <a:tc>
+                  <a:txBody>
+                    <a:bodyPr/>
+                    <a:lstStyle/>
+                    <a:p>
+                      <a:pPr algn="l"/>
+                      <a:r>
+                        <a:rPr lang="en-US"/>
+                        <a:t>E set(int index, E e)</a:t>
+                      </a:r>
+                    </a:p>
+                  </a:txBody>
+                  <a:tcPr anchor="ctr"/>
+                </a:tc>
+                <a:tc>
+                  <a:txBody>
+                    <a:bodyPr/>
+                    <a:lstStyle/>
+                    <a:p>
+                      <a:pPr algn="l"/>
+                      <a:r>
+                        <a:rPr lang="en-US" dirty="0"/>
+                        <a:t>Replace the element at position </a:t>
+                      </a:r>
+                      <a:r>
+                        <a:rPr lang="en-US" i="1" dirty="0"/>
+                        <a:t>index</a:t>
+                      </a:r>
+                      <a:r>
+                        <a:rPr lang="en-US" dirty="0"/>
+                        <a:t> in the list with element </a:t>
+                      </a:r>
+                      <a:r>
+                        <a:rPr lang="en-US" i="1" dirty="0"/>
+                        <a:t>e</a:t>
+                      </a:r>
+                      <a:r>
+                        <a:rPr lang="en-US" dirty="0"/>
+                        <a:t> and return the previous element</a:t>
+                      </a:r>
+                    </a:p>
+                  </a:txBody>
+                  <a:tcPr anchor="ctr"/>
+                </a:tc>
+              </a:tr>
+            </a:tbl>
+          </a:graphicData>
+        </a:graphic>
+      </p:graphicFrame>
+      <p:sp>
+        <p:nvSpPr>
+          <p:cNvPr id="3" name="Slide Number Placeholder 2"/>
           <p:cNvSpPr>
             <a:spLocks noGrp="1"/>
           </p:cNvSpPr>
@@ -4073,7 +4319,7 @@
     </p:spTree>
     <p:extLst>
       <p:ext uri="{BB962C8B-B14F-4D97-AF65-F5344CB8AC3E}">
-        <p14:creationId xmlns:p14="http://schemas.microsoft.com/office/powerpoint/2010/main" val="984603941"/>
+        <p14:creationId xmlns:p14="http://schemas.microsoft.com/office/powerpoint/2010/main" val="1501518188"/>
       </p:ext>
     </p:extLst>
   </p:cSld>
@@ -4119,7 +4365,7 @@
           <a:p>
             <a:r>
               <a:rPr lang="en-US" sz="4800" dirty="0" smtClean="0"/>
-              <a:t>Packages</a:t>
+              <a:t>List Implementations</a:t>
             </a:r>
             <a:endParaRPr lang="en-US" sz="4800" dirty="0"/>
           </a:p>
@@ -4127,59 +4373,140 @@
       </p:sp>
       <p:sp>
         <p:nvSpPr>
-          <p:cNvPr id="3" name="Content Placeholder 2"/>
-          <p:cNvSpPr>
-            <a:spLocks noGrp="1"/>
-          </p:cNvSpPr>
-          <p:nvPr>
-            <p:ph idx="1"/>
-          </p:nvPr>
-        </p:nvSpPr>
-        <p:spPr/>
-        <p:txBody>
-          <a:bodyPr anchor="ctr">
+          <p:cNvPr id="5" name="Text Placeholder 4"/>
+          <p:cNvSpPr>
+            <a:spLocks noGrp="1"/>
+          </p:cNvSpPr>
+          <p:nvPr>
+            <p:ph type="body" idx="1"/>
+          </p:nvPr>
+        </p:nvSpPr>
+        <p:spPr/>
+        <p:txBody>
+          <a:bodyPr>
             <a:normAutofit/>
           </a:bodyPr>
           <a:lstStyle/>
           <a:p>
             <a:r>
-              <a:rPr lang="en-US" sz="3200" dirty="0" smtClean="0"/>
-              <a:t>Unique namespace that contains classes and sub-packages</a:t>
-            </a:r>
-          </a:p>
-          <a:p>
-            <a:r>
-              <a:rPr lang="en-US" sz="3200" dirty="0" smtClean="0"/>
-              <a:t>Allow us to organize code similar to a folder structure for files</a:t>
-            </a:r>
-          </a:p>
-          <a:p>
-            <a:r>
-              <a:rPr lang="en-US" sz="3200" dirty="0" smtClean="0"/>
-              <a:t>Declare packages with </a:t>
-            </a:r>
-            <a:r>
-              <a:rPr lang="en-US" sz="3200" i="1" dirty="0" smtClean="0"/>
-              <a:t>package</a:t>
-            </a:r>
-            <a:r>
-              <a:rPr lang="en-US" sz="3200" dirty="0" smtClean="0"/>
-              <a:t> statement</a:t>
-            </a:r>
-          </a:p>
-          <a:p>
-            <a:r>
-              <a:rPr lang="en-US" sz="3200" dirty="0" smtClean="0"/>
-              <a:t>Use packages with the </a:t>
-            </a:r>
-            <a:r>
-              <a:rPr lang="en-US" sz="3200" i="1" dirty="0" smtClean="0"/>
-              <a:t>import</a:t>
-            </a:r>
-            <a:r>
-              <a:rPr lang="en-US" sz="3200" dirty="0" smtClean="0"/>
-              <a:t> statement</a:t>
-            </a:r>
+              <a:rPr lang="en-US" sz="3200" b="1" dirty="0" err="1" smtClean="0">
+                <a:solidFill>
+                  <a:schemeClr val="tx1"/>
+                </a:solidFill>
+              </a:rPr>
+              <a:t>ArrayList</a:t>
+            </a:r>
+            <a:endParaRPr lang="en-US" sz="3200" b="1" dirty="0">
+              <a:solidFill>
+                <a:schemeClr val="tx1"/>
+              </a:solidFill>
+            </a:endParaRPr>
+          </a:p>
+        </p:txBody>
+      </p:sp>
+      <p:sp>
+        <p:nvSpPr>
+          <p:cNvPr id="3" name="Content Placeholder 2"/>
+          <p:cNvSpPr>
+            <a:spLocks noGrp="1"/>
+          </p:cNvSpPr>
+          <p:nvPr>
+            <p:ph sz="half" idx="2"/>
+          </p:nvPr>
+        </p:nvSpPr>
+        <p:spPr/>
+        <p:txBody>
+          <a:bodyPr anchor="t">
+            <a:normAutofit/>
+          </a:bodyPr>
+          <a:lstStyle/>
+          <a:p>
+            <a:r>
+              <a:rPr lang="en-US" sz="2800" dirty="0" smtClean="0"/>
+              <a:t>Implementation based on arrays</a:t>
+            </a:r>
+          </a:p>
+          <a:p>
+            <a:r>
+              <a:rPr lang="en-US" sz="2800" dirty="0" smtClean="0"/>
+              <a:t>Faster access to elements</a:t>
+            </a:r>
+          </a:p>
+          <a:p>
+            <a:r>
+              <a:rPr lang="en-US" sz="2800" dirty="0" smtClean="0"/>
+              <a:t>Slower for updates</a:t>
+            </a:r>
+          </a:p>
+        </p:txBody>
+      </p:sp>
+      <p:sp>
+        <p:nvSpPr>
+          <p:cNvPr id="6" name="Text Placeholder 5"/>
+          <p:cNvSpPr>
+            <a:spLocks noGrp="1"/>
+          </p:cNvSpPr>
+          <p:nvPr>
+            <p:ph type="body" sz="quarter" idx="3"/>
+          </p:nvPr>
+        </p:nvSpPr>
+        <p:spPr/>
+        <p:txBody>
+          <a:bodyPr>
+            <a:normAutofit/>
+          </a:bodyPr>
+          <a:lstStyle/>
+          <a:p>
+            <a:r>
+              <a:rPr lang="en-US" sz="3200" b="1" smtClean="0">
+                <a:solidFill>
+                  <a:schemeClr val="tx1"/>
+                </a:solidFill>
+              </a:rPr>
+              <a:t>LinkedList</a:t>
+            </a:r>
+            <a:endParaRPr lang="en-US" sz="3200" b="1" dirty="0">
+              <a:solidFill>
+                <a:schemeClr val="tx1"/>
+              </a:solidFill>
+            </a:endParaRPr>
+          </a:p>
+        </p:txBody>
+      </p:sp>
+      <p:sp>
+        <p:nvSpPr>
+          <p:cNvPr id="7" name="Content Placeholder 6"/>
+          <p:cNvSpPr>
+            <a:spLocks noGrp="1"/>
+          </p:cNvSpPr>
+          <p:nvPr>
+            <p:ph sz="quarter" idx="4"/>
+          </p:nvPr>
+        </p:nvSpPr>
+        <p:spPr/>
+        <p:txBody>
+          <a:bodyPr anchor="t">
+            <a:noAutofit/>
+          </a:bodyPr>
+          <a:lstStyle/>
+          <a:p>
+            <a:r>
+              <a:rPr lang="en-US" sz="2800" dirty="0" smtClean="0"/>
+              <a:t>Implementation based on linked nodes (includes a value and location in memory of next node)</a:t>
+            </a:r>
+          </a:p>
+          <a:p>
+            <a:r>
+              <a:rPr lang="en-US" sz="2800" dirty="0" smtClean="0"/>
+              <a:t>Slower access to elements</a:t>
+            </a:r>
+          </a:p>
+          <a:p>
+            <a:r>
+              <a:rPr lang="en-US" sz="2800" dirty="0" smtClean="0"/>
+              <a:t>Faster for updates</a:t>
+            </a:r>
+            <a:endParaRPr lang="en-US" sz="2800" dirty="0"/>
           </a:p>
         </p:txBody>
       </p:sp>
@@ -4211,7 +4538,7 @@
     </p:spTree>
     <p:extLst>
       <p:ext uri="{BB962C8B-B14F-4D97-AF65-F5344CB8AC3E}">
-        <p14:creationId xmlns:p14="http://schemas.microsoft.com/office/powerpoint/2010/main" val="6759569"/>
+        <p14:creationId xmlns:p14="http://schemas.microsoft.com/office/powerpoint/2010/main" val="646817815"/>
       </p:ext>
     </p:extLst>
   </p:cSld>
@@ -4250,37 +4577,80 @@
         </p:nvSpPr>
         <p:spPr/>
         <p:txBody>
-          <a:bodyPr/>
-          <a:lstStyle/>
-          <a:p>
-            <a:r>
-              <a:rPr lang="en-US" dirty="0" smtClean="0"/>
-              <a:t>Lists</a:t>
-            </a:r>
-            <a:endParaRPr lang="en-US" dirty="0"/>
-          </a:p>
-        </p:txBody>
-      </p:sp>
-      <p:sp>
-        <p:nvSpPr>
-          <p:cNvPr id="3" name="Text Placeholder 2"/>
-          <p:cNvSpPr>
-            <a:spLocks noGrp="1"/>
-          </p:cNvSpPr>
-          <p:nvPr>
-            <p:ph type="body" idx="1"/>
-          </p:nvPr>
-        </p:nvSpPr>
-        <p:spPr/>
-        <p:txBody>
-          <a:bodyPr/>
-          <a:lstStyle/>
-          <a:p>
-            <a:r>
-              <a:rPr lang="en-US" dirty="0" smtClean="0"/>
-              <a:t>An ordered collection of elements</a:t>
-            </a:r>
-            <a:endParaRPr lang="en-US" dirty="0"/>
+          <a:bodyPr>
+            <a:normAutofit fontScale="90000"/>
+          </a:bodyPr>
+          <a:lstStyle/>
+          <a:p>
+            <a:r>
+              <a:rPr lang="en-US" sz="4800" dirty="0"/>
+              <a:t>Program to an interface, not an implementation</a:t>
+            </a:r>
+            <a:endParaRPr lang="en-US" dirty="0"/>
+          </a:p>
+        </p:txBody>
+      </p:sp>
+      <p:sp>
+        <p:nvSpPr>
+          <p:cNvPr id="3" name="Content Placeholder 2"/>
+          <p:cNvSpPr>
+            <a:spLocks noGrp="1"/>
+          </p:cNvSpPr>
+          <p:nvPr>
+            <p:ph idx="1"/>
+          </p:nvPr>
+        </p:nvSpPr>
+        <p:spPr/>
+        <p:txBody>
+          <a:bodyPr anchor="ctr">
+            <a:normAutofit/>
+          </a:bodyPr>
+          <a:lstStyle/>
+          <a:p>
+            <a:pPr marL="0" indent="0">
+              <a:buNone/>
+            </a:pPr>
+            <a:r>
+              <a:rPr lang="en-US" sz="3200" dirty="0"/>
+              <a:t>W</a:t>
+            </a:r>
+            <a:r>
+              <a:rPr lang="en-US" sz="3200" dirty="0" smtClean="0"/>
+              <a:t>hen </a:t>
+            </a:r>
+            <a:r>
+              <a:rPr lang="en-US" sz="3200" dirty="0"/>
+              <a:t>declaring a variable or defining a method, its often more convenient to use the name of the most </a:t>
+            </a:r>
+            <a:r>
+              <a:rPr lang="en-US" sz="3200" dirty="0" smtClean="0"/>
+              <a:t>basic class or </a:t>
+            </a:r>
+            <a:r>
+              <a:rPr lang="en-US" sz="3200" dirty="0"/>
+              <a:t>interface that supports your needs as the data type </a:t>
+            </a:r>
+            <a:r>
+              <a:rPr lang="en-US" sz="3200" dirty="0" smtClean="0"/>
+              <a:t>than </a:t>
+            </a:r>
+            <a:r>
+              <a:rPr lang="en-US" sz="3200" dirty="0"/>
+              <a:t>the class </a:t>
+            </a:r>
+            <a:r>
+              <a:rPr lang="en-US" sz="3200" dirty="0" smtClean="0"/>
+              <a:t>of the </a:t>
+            </a:r>
+            <a:r>
+              <a:rPr lang="en-US" sz="3200" dirty="0"/>
+              <a:t>instance you might be creating or passing to a </a:t>
+            </a:r>
+            <a:r>
+              <a:rPr lang="en-US" sz="3200" dirty="0" smtClean="0"/>
+              <a:t>method.</a:t>
+            </a:r>
+            <a:endParaRPr lang="en-US" sz="3200" dirty="0"/>
           </a:p>
         </p:txBody>
       </p:sp>
@@ -4312,7 +4682,7 @@
     </p:spTree>
     <p:extLst>
       <p:ext uri="{BB962C8B-B14F-4D97-AF65-F5344CB8AC3E}">
-        <p14:creationId xmlns:p14="http://schemas.microsoft.com/office/powerpoint/2010/main" val="657677305"/>
+        <p14:creationId xmlns:p14="http://schemas.microsoft.com/office/powerpoint/2010/main" val="1941037786"/>
       </p:ext>
     </p:extLst>
   </p:cSld>
@@ -4351,334 +4721,43 @@
         </p:nvSpPr>
         <p:spPr/>
         <p:txBody>
-          <a:bodyPr>
-            <a:normAutofit/>
-          </a:bodyPr>
-          <a:lstStyle/>
-          <a:p>
-            <a:r>
-              <a:rPr lang="en-US" sz="4800" dirty="0" smtClean="0"/>
-              <a:t>List Interface</a:t>
-            </a:r>
-            <a:endParaRPr lang="en-US" sz="4800" dirty="0"/>
-          </a:p>
-        </p:txBody>
-      </p:sp>
-      <p:graphicFrame>
-        <p:nvGraphicFramePr>
-          <p:cNvPr id="4" name="Content Placeholder 3"/>
-          <p:cNvGraphicFramePr>
-            <a:graphicFrameLocks noGrp="1"/>
-          </p:cNvGraphicFramePr>
-          <p:nvPr>
-            <p:ph idx="1"/>
-            <p:extLst>
-              <p:ext uri="{D42A27DB-BD31-4B8C-83A1-F6EECF244321}">
-                <p14:modId xmlns:p14="http://schemas.microsoft.com/office/powerpoint/2010/main" val="507152792"/>
-              </p:ext>
-            </p:extLst>
-          </p:nvPr>
-        </p:nvGraphicFramePr>
-        <p:xfrm>
-          <a:off x="1262063" y="1828800"/>
-          <a:ext cx="8594726" cy="4211320"/>
-        </p:xfrm>
-        <a:graphic>
-          <a:graphicData uri="http://schemas.openxmlformats.org/drawingml/2006/table">
-            <a:tbl>
-              <a:tblPr firstRow="1" bandRow="1">
-                <a:tableStyleId>{5C22544A-7EE6-4342-B048-85BDC9FD1C3A}</a:tableStyleId>
-              </a:tblPr>
-              <a:tblGrid>
-                <a:gridCol w="3239599"/>
-                <a:gridCol w="5355127"/>
-              </a:tblGrid>
-              <a:tr h="370840">
-                <a:tc>
-                  <a:txBody>
-                    <a:bodyPr/>
-                    <a:lstStyle/>
-                    <a:p>
-                      <a:pPr algn="l"/>
-                      <a:r>
-                        <a:rPr lang="en-US" dirty="0"/>
-                        <a:t>Method</a:t>
-                      </a:r>
-                    </a:p>
-                  </a:txBody>
-                  <a:tcPr anchor="ctr"/>
-                </a:tc>
-                <a:tc>
-                  <a:txBody>
-                    <a:bodyPr/>
-                    <a:lstStyle/>
-                    <a:p>
-                      <a:pPr algn="l"/>
-                      <a:r>
-                        <a:rPr lang="en-US"/>
-                        <a:t>Description</a:t>
-                      </a:r>
-                    </a:p>
-                  </a:txBody>
-                  <a:tcPr anchor="ctr"/>
-                </a:tc>
-              </a:tr>
-              <a:tr h="370840">
-                <a:tc>
-                  <a:txBody>
-                    <a:bodyPr/>
-                    <a:lstStyle/>
-                    <a:p>
-                      <a:pPr algn="l"/>
-                      <a:r>
-                        <a:rPr lang="en-US"/>
-                        <a:t>void add(int index, E e)</a:t>
-                      </a:r>
-                    </a:p>
-                  </a:txBody>
-                  <a:tcPr anchor="ctr"/>
-                </a:tc>
-                <a:tc>
-                  <a:txBody>
-                    <a:bodyPr/>
-                    <a:lstStyle/>
-                    <a:p>
-                      <a:pPr algn="l"/>
-                      <a:r>
-                        <a:rPr lang="en-US"/>
-                        <a:t>Insert element </a:t>
-                      </a:r>
-                      <a:r>
-                        <a:rPr lang="en-US" i="1"/>
-                        <a:t>e</a:t>
-                      </a:r>
-                      <a:r>
-                        <a:rPr lang="en-US"/>
-                        <a:t> into the list at position </a:t>
-                      </a:r>
-                      <a:r>
-                        <a:rPr lang="en-US" i="1"/>
-                        <a:t>index</a:t>
-                      </a:r>
-                      <a:r>
-                        <a:rPr lang="en-US"/>
-                        <a:t> and shift elements to the right as necessary</a:t>
-                      </a:r>
-                    </a:p>
-                  </a:txBody>
-                  <a:tcPr anchor="ctr"/>
-                </a:tc>
-              </a:tr>
-              <a:tr h="370840">
-                <a:tc>
-                  <a:txBody>
-                    <a:bodyPr/>
-                    <a:lstStyle/>
-                    <a:p>
-                      <a:pPr algn="l"/>
-                      <a:r>
-                        <a:rPr lang="en-US"/>
-                        <a:t>E get(int index)</a:t>
-                      </a:r>
-                    </a:p>
-                  </a:txBody>
-                  <a:tcPr anchor="ctr"/>
-                </a:tc>
-                <a:tc>
-                  <a:txBody>
-                    <a:bodyPr/>
-                    <a:lstStyle/>
-                    <a:p>
-                      <a:pPr algn="l"/>
-                      <a:r>
-                        <a:rPr lang="en-US"/>
-                        <a:t>Returns the element of type </a:t>
-                      </a:r>
-                      <a:r>
-                        <a:rPr lang="en-US" i="1"/>
-                        <a:t>E</a:t>
-                      </a:r>
-                      <a:r>
-                        <a:rPr lang="en-US"/>
-                        <a:t> stored at position </a:t>
-                      </a:r>
-                      <a:r>
-                        <a:rPr lang="en-US" i="1"/>
-                        <a:t>index</a:t>
-                      </a:r>
-                      <a:endParaRPr lang="en-US"/>
-                    </a:p>
-                  </a:txBody>
-                  <a:tcPr anchor="ctr"/>
-                </a:tc>
-              </a:tr>
-              <a:tr h="370840">
-                <a:tc>
-                  <a:txBody>
-                    <a:bodyPr/>
-                    <a:lstStyle/>
-                    <a:p>
-                      <a:pPr algn="l"/>
-                      <a:r>
-                        <a:rPr lang="en-US"/>
-                        <a:t>int indexOf(Object o)</a:t>
-                      </a:r>
-                    </a:p>
-                  </a:txBody>
-                  <a:tcPr anchor="ctr"/>
-                </a:tc>
-                <a:tc>
-                  <a:txBody>
-                    <a:bodyPr/>
-                    <a:lstStyle/>
-                    <a:p>
-                      <a:pPr algn="l"/>
-                      <a:r>
-                        <a:rPr lang="en-US"/>
-                        <a:t>Returns the index of the first occurrence of element </a:t>
-                      </a:r>
-                      <a:r>
-                        <a:rPr lang="en-US" i="1"/>
-                        <a:t>o</a:t>
-                      </a:r>
-                      <a:r>
-                        <a:rPr lang="en-US"/>
-                        <a:t> in the list</a:t>
-                      </a:r>
-                    </a:p>
-                  </a:txBody>
-                  <a:tcPr anchor="ctr"/>
-                </a:tc>
-              </a:tr>
-              <a:tr h="370840">
-                <a:tc>
-                  <a:txBody>
-                    <a:bodyPr/>
-                    <a:lstStyle/>
-                    <a:p>
-                      <a:pPr algn="l"/>
-                      <a:r>
-                        <a:rPr lang="en-US"/>
-                        <a:t>int lastIndexOf(Object o)</a:t>
-                      </a:r>
-                    </a:p>
-                  </a:txBody>
-                  <a:tcPr anchor="ctr"/>
-                </a:tc>
-                <a:tc>
-                  <a:txBody>
-                    <a:bodyPr/>
-                    <a:lstStyle/>
-                    <a:p>
-                      <a:pPr algn="l"/>
-                      <a:r>
-                        <a:rPr lang="en-US"/>
-                        <a:t>Returns the index of the last occurrence of element </a:t>
-                      </a:r>
-                      <a:r>
-                        <a:rPr lang="en-US" i="1"/>
-                        <a:t>o</a:t>
-                      </a:r>
-                      <a:r>
-                        <a:rPr lang="en-US"/>
-                        <a:t> in the list</a:t>
-                      </a:r>
-                    </a:p>
-                  </a:txBody>
-                  <a:tcPr anchor="ctr"/>
-                </a:tc>
-              </a:tr>
-              <a:tr h="370840">
-                <a:tc>
-                  <a:txBody>
-                    <a:bodyPr/>
-                    <a:lstStyle/>
-                    <a:p>
-                      <a:pPr algn="l"/>
-                      <a:r>
-                        <a:rPr lang="en-US"/>
-                        <a:t>E remove(int index)</a:t>
-                      </a:r>
-                    </a:p>
-                  </a:txBody>
-                  <a:tcPr anchor="ctr"/>
-                </a:tc>
-                <a:tc>
-                  <a:txBody>
-                    <a:bodyPr/>
-                    <a:lstStyle/>
-                    <a:p>
-                      <a:pPr algn="l"/>
-                      <a:r>
-                        <a:rPr lang="en-US"/>
-                        <a:t>Remove and return the element at </a:t>
-                      </a:r>
-                      <a:r>
-                        <a:rPr lang="en-US" i="1"/>
-                        <a:t>index</a:t>
-                      </a:r>
-                      <a:r>
-                        <a:rPr lang="en-US"/>
-                        <a:t> in the list</a:t>
-                      </a:r>
-                    </a:p>
-                  </a:txBody>
-                  <a:tcPr anchor="ctr"/>
-                </a:tc>
-              </a:tr>
-              <a:tr h="370840">
-                <a:tc>
-                  <a:txBody>
-                    <a:bodyPr/>
-                    <a:lstStyle/>
-                    <a:p>
-                      <a:pPr algn="l"/>
-                      <a:r>
-                        <a:rPr lang="en-US"/>
-                        <a:t>E set(int index, E e)</a:t>
-                      </a:r>
-                    </a:p>
-                  </a:txBody>
-                  <a:tcPr anchor="ctr"/>
-                </a:tc>
-                <a:tc>
-                  <a:txBody>
-                    <a:bodyPr/>
-                    <a:lstStyle/>
-                    <a:p>
-                      <a:pPr algn="l"/>
-                      <a:r>
-                        <a:rPr lang="en-US" dirty="0"/>
-                        <a:t>Replace the element at position </a:t>
-                      </a:r>
-                      <a:r>
-                        <a:rPr lang="en-US" i="1" dirty="0"/>
-                        <a:t>index</a:t>
-                      </a:r>
-                      <a:r>
-                        <a:rPr lang="en-US" dirty="0"/>
-                        <a:t> in the list with element </a:t>
-                      </a:r>
-                      <a:r>
-                        <a:rPr lang="en-US" i="1" dirty="0"/>
-                        <a:t>e</a:t>
-                      </a:r>
-                      <a:r>
-                        <a:rPr lang="en-US" dirty="0"/>
-                        <a:t> and return the previous element</a:t>
-                      </a:r>
-                    </a:p>
-                  </a:txBody>
-                  <a:tcPr anchor="ctr"/>
-                </a:tc>
-              </a:tr>
-            </a:tbl>
-          </a:graphicData>
-        </a:graphic>
-      </p:graphicFrame>
-      <p:sp>
-        <p:nvSpPr>
-          <p:cNvPr id="3" name="Slide Number Placeholder 2"/>
+          <a:bodyPr/>
+          <a:lstStyle/>
+          <a:p>
+            <a:r>
+              <a:rPr lang="en-US" dirty="0" smtClean="0"/>
+              <a:t>Sets</a:t>
+            </a:r>
+            <a:endParaRPr lang="en-US" dirty="0"/>
+          </a:p>
+        </p:txBody>
+      </p:sp>
+      <p:sp>
+        <p:nvSpPr>
+          <p:cNvPr id="3" name="Text Placeholder 2"/>
+          <p:cNvSpPr>
+            <a:spLocks noGrp="1"/>
+          </p:cNvSpPr>
+          <p:nvPr>
+            <p:ph type="body" idx="1"/>
+          </p:nvPr>
+        </p:nvSpPr>
+        <p:spPr/>
+        <p:txBody>
+          <a:bodyPr/>
+          <a:lstStyle/>
+          <a:p>
+            <a:r>
+              <a:rPr lang="en-US" dirty="0" smtClean="0"/>
+              <a:t>A collection that contains no duplicate elements</a:t>
+            </a:r>
+            <a:endParaRPr lang="en-US" dirty="0"/>
+          </a:p>
+        </p:txBody>
+      </p:sp>
+      <p:sp>
+        <p:nvSpPr>
+          <p:cNvPr id="4" name="Slide Number Placeholder 3"/>
           <p:cNvSpPr>
             <a:spLocks noGrp="1"/>
           </p:cNvSpPr>
@@ -4704,7 +4783,7 @@
     </p:spTree>
     <p:extLst>
       <p:ext uri="{BB962C8B-B14F-4D97-AF65-F5344CB8AC3E}">
-        <p14:creationId xmlns:p14="http://schemas.microsoft.com/office/powerpoint/2010/main" val="1501518188"/>
+        <p14:creationId xmlns:p14="http://schemas.microsoft.com/office/powerpoint/2010/main" val="1619270737"/>
       </p:ext>
     </p:extLst>
   </p:cSld>
@@ -4750,7 +4829,7 @@
           <a:p>
             <a:r>
               <a:rPr lang="en-US" sz="4800" dirty="0" smtClean="0"/>
-              <a:t>List Implementations</a:t>
+              <a:t>Set Implementations</a:t>
             </a:r>
             <a:endParaRPr lang="en-US" sz="4800" dirty="0"/>
           </a:p>
@@ -4779,7 +4858,7 @@
                   <a:schemeClr val="tx1"/>
                 </a:solidFill>
               </a:rPr>
-              <a:t>ArrayList</a:t>
+              <a:t>TreeSet</a:t>
             </a:r>
             <a:endParaRPr lang="en-US" sz="3200" b="1" dirty="0">
               <a:solidFill>
@@ -4808,19 +4887,19 @@
           <a:p>
             <a:r>
               <a:rPr lang="en-US" sz="2800" dirty="0" smtClean="0"/>
-              <a:t>Implementation based on arrays</a:t>
+              <a:t>Implementation based on tree structure</a:t>
             </a:r>
           </a:p>
           <a:p>
             <a:r>
               <a:rPr lang="en-US" sz="2800" dirty="0" smtClean="0"/>
-              <a:t>Faster access to elements</a:t>
+              <a:t>Elements stored in sorted order</a:t>
             </a:r>
           </a:p>
           <a:p>
             <a:r>
               <a:rPr lang="en-US" sz="2800" dirty="0" smtClean="0"/>
-              <a:t>Slower for updates</a:t>
+              <a:t>Slower access</a:t>
             </a:r>
           </a:p>
         </p:txBody>
@@ -4843,12 +4922,12 @@
           <a:lstStyle/>
           <a:p>
             <a:r>
-              <a:rPr lang="en-US" sz="3200" b="1" smtClean="0">
+              <a:rPr lang="en-US" sz="3200" b="1" dirty="0" err="1" smtClean="0">
                 <a:solidFill>
                   <a:schemeClr val="tx1"/>
                 </a:solidFill>
               </a:rPr>
-              <a:t>LinkedList</a:t>
+              <a:t>HashSet</a:t>
             </a:r>
             <a:endParaRPr lang="en-US" sz="3200" b="1" dirty="0">
               <a:solidFill>
@@ -4877,19 +4956,24 @@
           <a:p>
             <a:r>
               <a:rPr lang="en-US" sz="2800" dirty="0" smtClean="0"/>
-              <a:t>Implementation based on linked nodes (includes a value and location in memory of next node)</a:t>
-            </a:r>
+              <a:t>Implementation based on </a:t>
+            </a:r>
+            <a:r>
+              <a:rPr lang="en-US" sz="2800" dirty="0" err="1" smtClean="0"/>
+              <a:t>HashMaps</a:t>
+            </a:r>
+            <a:endParaRPr lang="en-US" sz="2800" dirty="0" smtClean="0"/>
           </a:p>
           <a:p>
             <a:r>
               <a:rPr lang="en-US" sz="2800" dirty="0" smtClean="0"/>
-              <a:t>Slower access to elements</a:t>
+              <a:t>No guarantee about order</a:t>
             </a:r>
           </a:p>
           <a:p>
             <a:r>
               <a:rPr lang="en-US" sz="2800" dirty="0" smtClean="0"/>
-              <a:t>Faster for updates</a:t>
+              <a:t>Faster access</a:t>
             </a:r>
             <a:endParaRPr lang="en-US" sz="2800" dirty="0"/>
           </a:p>
@@ -4923,7 +5007,7 @@
     </p:spTree>
     <p:extLst>
       <p:ext uri="{BB962C8B-B14F-4D97-AF65-F5344CB8AC3E}">
-        <p14:creationId xmlns:p14="http://schemas.microsoft.com/office/powerpoint/2010/main" val="646817815"/>
+        <p14:creationId xmlns:p14="http://schemas.microsoft.com/office/powerpoint/2010/main" val="321982236"/>
       </p:ext>
     </p:extLst>
   </p:cSld>
@@ -4962,80 +5046,40 @@
         </p:nvSpPr>
         <p:spPr/>
         <p:txBody>
-          <a:bodyPr>
-            <a:normAutofit fontScale="90000"/>
-          </a:bodyPr>
-          <a:lstStyle/>
-          <a:p>
-            <a:r>
-              <a:rPr lang="en-US" sz="4800" dirty="0"/>
-              <a:t>Program to an interface, not an implementation</a:t>
-            </a:r>
-            <a:endParaRPr lang="en-US" dirty="0"/>
-          </a:p>
-        </p:txBody>
-      </p:sp>
-      <p:sp>
-        <p:nvSpPr>
-          <p:cNvPr id="3" name="Content Placeholder 2"/>
-          <p:cNvSpPr>
-            <a:spLocks noGrp="1"/>
-          </p:cNvSpPr>
-          <p:nvPr>
-            <p:ph idx="1"/>
-          </p:nvPr>
-        </p:nvSpPr>
-        <p:spPr/>
-        <p:txBody>
-          <a:bodyPr anchor="ctr">
-            <a:normAutofit/>
-          </a:bodyPr>
-          <a:lstStyle/>
-          <a:p>
-            <a:pPr marL="0" indent="0">
-              <a:buNone/>
-            </a:pPr>
-            <a:r>
-              <a:rPr lang="en-US" sz="3200" dirty="0"/>
-              <a:t>W</a:t>
-            </a:r>
-            <a:r>
-              <a:rPr lang="en-US" sz="3200" dirty="0" smtClean="0"/>
-              <a:t>hen </a:t>
-            </a:r>
-            <a:r>
-              <a:rPr lang="en-US" sz="3200" dirty="0"/>
-              <a:t>declaring a variable or defining a method, its often more convenient to use the name of the most </a:t>
-            </a:r>
-            <a:r>
-              <a:rPr lang="en-US" sz="3200" dirty="0" smtClean="0"/>
-              <a:t>basic class or </a:t>
-            </a:r>
-            <a:r>
-              <a:rPr lang="en-US" sz="3200" dirty="0"/>
-              <a:t>interface that supports your needs as the data type </a:t>
-            </a:r>
-            <a:r>
-              <a:rPr lang="en-US" sz="3200" dirty="0" smtClean="0"/>
-              <a:t>than </a:t>
-            </a:r>
-            <a:r>
-              <a:rPr lang="en-US" sz="3200" dirty="0"/>
-              <a:t>the class </a:t>
-            </a:r>
-            <a:r>
-              <a:rPr lang="en-US" sz="3200" dirty="0" smtClean="0"/>
-              <a:t>of the </a:t>
-            </a:r>
-            <a:r>
-              <a:rPr lang="en-US" sz="3200" dirty="0"/>
-              <a:t>instance you might be creating or passing to a </a:t>
-            </a:r>
-            <a:r>
-              <a:rPr lang="en-US" sz="3200" dirty="0" smtClean="0"/>
-              <a:t>method.</a:t>
-            </a:r>
-            <a:endParaRPr lang="en-US" sz="3200" dirty="0"/>
+          <a:bodyPr/>
+          <a:lstStyle/>
+          <a:p>
+            <a:r>
+              <a:rPr lang="en-US" dirty="0" smtClean="0"/>
+              <a:t>Maps</a:t>
+            </a:r>
+            <a:endParaRPr lang="en-US" dirty="0"/>
+          </a:p>
+        </p:txBody>
+      </p:sp>
+      <p:sp>
+        <p:nvSpPr>
+          <p:cNvPr id="3" name="Text Placeholder 2"/>
+          <p:cNvSpPr>
+            <a:spLocks noGrp="1"/>
+          </p:cNvSpPr>
+          <p:nvPr>
+            <p:ph type="body" idx="1"/>
+          </p:nvPr>
+        </p:nvSpPr>
+        <p:spPr/>
+        <p:txBody>
+          <a:bodyPr/>
+          <a:lstStyle/>
+          <a:p>
+            <a:r>
+              <a:rPr lang="en-US" dirty="0" smtClean="0"/>
+              <a:t>A collection of key/value </a:t>
+            </a:r>
+            <a:r>
+              <a:rPr lang="en-US" dirty="0"/>
+              <a:t>pairs where each key is unique and corresponds to at most one value</a:t>
+            </a:r>
           </a:p>
         </p:txBody>
       </p:sp>
@@ -5067,7 +5111,7 @@
     </p:spTree>
     <p:extLst>
       <p:ext uri="{BB962C8B-B14F-4D97-AF65-F5344CB8AC3E}">
-        <p14:creationId xmlns:p14="http://schemas.microsoft.com/office/powerpoint/2010/main" val="1941037786"/>
+        <p14:creationId xmlns:p14="http://schemas.microsoft.com/office/powerpoint/2010/main" val="780207109"/>
       </p:ext>
     </p:extLst>
   </p:cSld>
@@ -5104,45 +5148,426 @@
             <p:ph type="title"/>
           </p:nvPr>
         </p:nvSpPr>
-        <p:spPr/>
-        <p:txBody>
-          <a:bodyPr/>
-          <a:lstStyle/>
-          <a:p>
-            <a:r>
-              <a:rPr lang="en-US" dirty="0" smtClean="0"/>
-              <a:t>Sets</a:t>
-            </a:r>
-            <a:endParaRPr lang="en-US" dirty="0"/>
-          </a:p>
-        </p:txBody>
-      </p:sp>
-      <p:sp>
-        <p:nvSpPr>
-          <p:cNvPr id="3" name="Text Placeholder 2"/>
-          <p:cNvSpPr>
-            <a:spLocks noGrp="1"/>
-          </p:cNvSpPr>
-          <p:nvPr>
-            <p:ph type="body" idx="1"/>
-          </p:nvPr>
-        </p:nvSpPr>
-        <p:spPr/>
-        <p:txBody>
-          <a:bodyPr/>
-          <a:lstStyle/>
-          <a:p>
-            <a:r>
-              <a:rPr lang="en-US" dirty="0" smtClean="0"/>
-              <a:t>A collection that contains no duplicate elements</a:t>
-            </a:r>
-            <a:endParaRPr lang="en-US" dirty="0"/>
-          </a:p>
-        </p:txBody>
-      </p:sp>
-      <p:sp>
-        <p:nvSpPr>
-          <p:cNvPr id="4" name="Slide Number Placeholder 3"/>
+        <p:spPr>
+          <a:xfrm>
+            <a:off x="1261871" y="201637"/>
+            <a:ext cx="9692640" cy="712763"/>
+          </a:xfrm>
+        </p:spPr>
+        <p:txBody>
+          <a:bodyPr>
+            <a:normAutofit fontScale="90000"/>
+          </a:bodyPr>
+          <a:lstStyle/>
+          <a:p>
+            <a:r>
+              <a:rPr lang="en-US" sz="4800" smtClean="0"/>
+              <a:t>Map Interface</a:t>
+            </a:r>
+            <a:endParaRPr lang="en-US" sz="4800" dirty="0"/>
+          </a:p>
+        </p:txBody>
+      </p:sp>
+      <p:graphicFrame>
+        <p:nvGraphicFramePr>
+          <p:cNvPr id="5" name="Content Placeholder 4"/>
+          <p:cNvGraphicFramePr>
+            <a:graphicFrameLocks noGrp="1"/>
+          </p:cNvGraphicFramePr>
+          <p:nvPr>
+            <p:ph idx="1"/>
+            <p:extLst>
+              <p:ext uri="{D42A27DB-BD31-4B8C-83A1-F6EECF244321}">
+                <p14:modId xmlns:p14="http://schemas.microsoft.com/office/powerpoint/2010/main" val="2015340369"/>
+              </p:ext>
+            </p:extLst>
+          </p:nvPr>
+        </p:nvGraphicFramePr>
+        <p:xfrm>
+          <a:off x="583457" y="1090246"/>
+          <a:ext cx="11049469" cy="5603240"/>
+        </p:xfrm>
+        <a:graphic>
+          <a:graphicData uri="http://schemas.openxmlformats.org/drawingml/2006/table">
+            <a:tbl>
+              <a:tblPr firstRow="1" bandRow="1">
+                <a:tableStyleId>{5C22544A-7EE6-4342-B048-85BDC9FD1C3A}</a:tableStyleId>
+              </a:tblPr>
+              <a:tblGrid>
+                <a:gridCol w="4082328"/>
+                <a:gridCol w="6967141"/>
+              </a:tblGrid>
+              <a:tr h="370840">
+                <a:tc>
+                  <a:txBody>
+                    <a:bodyPr/>
+                    <a:lstStyle/>
+                    <a:p>
+                      <a:pPr algn="l"/>
+                      <a:r>
+                        <a:rPr lang="en-US" dirty="0"/>
+                        <a:t>Method</a:t>
+                      </a:r>
+                    </a:p>
+                  </a:txBody>
+                  <a:tcPr anchor="ctr"/>
+                </a:tc>
+                <a:tc>
+                  <a:txBody>
+                    <a:bodyPr/>
+                    <a:lstStyle/>
+                    <a:p>
+                      <a:pPr algn="l"/>
+                      <a:r>
+                        <a:rPr lang="en-US"/>
+                        <a:t>Description</a:t>
+                      </a:r>
+                    </a:p>
+                  </a:txBody>
+                  <a:tcPr anchor="ctr"/>
+                </a:tc>
+              </a:tr>
+              <a:tr h="370840">
+                <a:tc>
+                  <a:txBody>
+                    <a:bodyPr/>
+                    <a:lstStyle/>
+                    <a:p>
+                      <a:pPr algn="l"/>
+                      <a:r>
+                        <a:rPr lang="en-US"/>
+                        <a:t>void clear()</a:t>
+                      </a:r>
+                    </a:p>
+                  </a:txBody>
+                  <a:tcPr anchor="ctr"/>
+                </a:tc>
+                <a:tc>
+                  <a:txBody>
+                    <a:bodyPr/>
+                    <a:lstStyle/>
+                    <a:p>
+                      <a:pPr algn="l"/>
+                      <a:r>
+                        <a:rPr lang="en-US"/>
+                        <a:t>Removes all entries from the map.</a:t>
+                      </a:r>
+                    </a:p>
+                  </a:txBody>
+                  <a:tcPr anchor="ctr"/>
+                </a:tc>
+              </a:tr>
+              <a:tr h="370840">
+                <a:tc>
+                  <a:txBody>
+                    <a:bodyPr/>
+                    <a:lstStyle/>
+                    <a:p>
+                      <a:pPr algn="l"/>
+                      <a:r>
+                        <a:rPr lang="en-US"/>
+                        <a:t>boolean containsKey(Object key)</a:t>
+                      </a:r>
+                    </a:p>
+                  </a:txBody>
+                  <a:tcPr anchor="ctr"/>
+                </a:tc>
+                <a:tc>
+                  <a:txBody>
+                    <a:bodyPr/>
+                    <a:lstStyle/>
+                    <a:p>
+                      <a:pPr algn="l"/>
+                      <a:r>
+                        <a:rPr lang="en-US"/>
+                        <a:t>Returns true when the map contains an entry for the specified </a:t>
+                      </a:r>
+                      <a:r>
+                        <a:rPr lang="en-US" i="1"/>
+                        <a:t>key</a:t>
+                      </a:r>
+                      <a:r>
+                        <a:rPr lang="en-US"/>
+                        <a:t> and false otherwise.</a:t>
+                      </a:r>
+                    </a:p>
+                  </a:txBody>
+                  <a:tcPr anchor="ctr"/>
+                </a:tc>
+              </a:tr>
+              <a:tr h="370840">
+                <a:tc>
+                  <a:txBody>
+                    <a:bodyPr/>
+                    <a:lstStyle/>
+                    <a:p>
+                      <a:pPr algn="l"/>
+                      <a:r>
+                        <a:rPr lang="en-US"/>
+                        <a:t>boolean containsValue(Object value)</a:t>
+                      </a:r>
+                    </a:p>
+                  </a:txBody>
+                  <a:tcPr anchor="ctr"/>
+                </a:tc>
+                <a:tc>
+                  <a:txBody>
+                    <a:bodyPr/>
+                    <a:lstStyle/>
+                    <a:p>
+                      <a:pPr algn="l"/>
+                      <a:r>
+                        <a:rPr lang="en-US" dirty="0"/>
+                        <a:t>Returns true when the map maps one or more keys to </a:t>
+                      </a:r>
+                      <a:r>
+                        <a:rPr lang="en-US" i="1" dirty="0"/>
+                        <a:t>value</a:t>
+                      </a:r>
+                      <a:r>
+                        <a:rPr lang="en-US" dirty="0"/>
+                        <a:t>.</a:t>
+                      </a:r>
+                    </a:p>
+                  </a:txBody>
+                  <a:tcPr anchor="ctr"/>
+                </a:tc>
+              </a:tr>
+              <a:tr h="370840">
+                <a:tc>
+                  <a:txBody>
+                    <a:bodyPr/>
+                    <a:lstStyle/>
+                    <a:p>
+                      <a:pPr algn="l"/>
+                      <a:r>
+                        <a:rPr lang="en-US"/>
+                        <a:t>V get(Object key)</a:t>
+                      </a:r>
+                    </a:p>
+                  </a:txBody>
+                  <a:tcPr anchor="ctr"/>
+                </a:tc>
+                <a:tc>
+                  <a:txBody>
+                    <a:bodyPr/>
+                    <a:lstStyle/>
+                    <a:p>
+                      <a:pPr algn="l"/>
+                      <a:r>
+                        <a:rPr lang="en-US" dirty="0"/>
+                        <a:t>Return the value to which </a:t>
+                      </a:r>
+                      <a:r>
+                        <a:rPr lang="en-US" i="1" dirty="0"/>
+                        <a:t>key</a:t>
+                      </a:r>
+                      <a:r>
+                        <a:rPr lang="en-US" dirty="0"/>
+                        <a:t> is mapped or null if the map doesn't contain the key.</a:t>
+                      </a:r>
+                    </a:p>
+                  </a:txBody>
+                  <a:tcPr anchor="ctr"/>
+                </a:tc>
+              </a:tr>
+              <a:tr h="370840">
+                <a:tc>
+                  <a:txBody>
+                    <a:bodyPr/>
+                    <a:lstStyle/>
+                    <a:p>
+                      <a:pPr algn="l"/>
+                      <a:r>
+                        <a:rPr lang="en-US"/>
+                        <a:t>Set keySet()</a:t>
+                      </a:r>
+                    </a:p>
+                  </a:txBody>
+                  <a:tcPr anchor="ctr"/>
+                </a:tc>
+                <a:tc>
+                  <a:txBody>
+                    <a:bodyPr/>
+                    <a:lstStyle/>
+                    <a:p>
+                      <a:pPr algn="l"/>
+                      <a:r>
+                        <a:rPr lang="en-US"/>
+                        <a:t>returns a Set view of the keys contained in the map. Because this is a view, changes made to the map are reflected in the set and vice versa.</a:t>
+                      </a:r>
+                    </a:p>
+                  </a:txBody>
+                  <a:tcPr anchor="ctr"/>
+                </a:tc>
+              </a:tr>
+              <a:tr h="370840">
+                <a:tc>
+                  <a:txBody>
+                    <a:bodyPr/>
+                    <a:lstStyle/>
+                    <a:p>
+                      <a:pPr algn="l"/>
+                      <a:r>
+                        <a:rPr lang="en-US"/>
+                        <a:t>V put(K key, V value)</a:t>
+                      </a:r>
+                    </a:p>
+                  </a:txBody>
+                  <a:tcPr anchor="ctr"/>
+                </a:tc>
+                <a:tc>
+                  <a:txBody>
+                    <a:bodyPr/>
+                    <a:lstStyle/>
+                    <a:p>
+                      <a:pPr algn="l"/>
+                      <a:r>
+                        <a:rPr lang="en-US"/>
+                        <a:t>Associates </a:t>
+                      </a:r>
+                      <a:r>
+                        <a:rPr lang="en-US" i="1"/>
+                        <a:t>value</a:t>
+                      </a:r>
+                      <a:r>
+                        <a:rPr lang="en-US"/>
+                        <a:t> with </a:t>
+                      </a:r>
+                      <a:r>
+                        <a:rPr lang="en-US" i="1"/>
+                        <a:t>key</a:t>
+                      </a:r>
+                      <a:r>
+                        <a:rPr lang="en-US"/>
+                        <a:t> in the map. If the map previously contained a value for </a:t>
+                      </a:r>
+                      <a:r>
+                        <a:rPr lang="en-US" i="1"/>
+                        <a:t>key</a:t>
+                      </a:r>
+                      <a:r>
+                        <a:rPr lang="en-US"/>
+                        <a:t>, the value is replaced and the old value is returned.</a:t>
+                      </a:r>
+                    </a:p>
+                  </a:txBody>
+                  <a:tcPr anchor="ctr"/>
+                </a:tc>
+              </a:tr>
+              <a:tr h="370840">
+                <a:tc>
+                  <a:txBody>
+                    <a:bodyPr/>
+                    <a:lstStyle/>
+                    <a:p>
+                      <a:pPr algn="l"/>
+                      <a:r>
+                        <a:rPr lang="en-US"/>
+                        <a:t>V remove(Object key)</a:t>
+                      </a:r>
+                    </a:p>
+                  </a:txBody>
+                  <a:tcPr anchor="ctr"/>
+                </a:tc>
+                <a:tc>
+                  <a:txBody>
+                    <a:bodyPr/>
+                    <a:lstStyle/>
+                    <a:p>
+                      <a:pPr algn="l"/>
+                      <a:r>
+                        <a:rPr lang="en-US"/>
+                        <a:t>Removes the entry for </a:t>
+                      </a:r>
+                      <a:r>
+                        <a:rPr lang="en-US" i="1"/>
+                        <a:t>key</a:t>
+                      </a:r>
+                      <a:r>
+                        <a:rPr lang="en-US"/>
+                        <a:t> from the map and returns the associated value if the map contained an entry for </a:t>
+                      </a:r>
+                      <a:r>
+                        <a:rPr lang="en-US" i="1"/>
+                        <a:t>key</a:t>
+                      </a:r>
+                      <a:r>
+                        <a:rPr lang="en-US"/>
+                        <a:t>.</a:t>
+                      </a:r>
+                    </a:p>
+                  </a:txBody>
+                  <a:tcPr anchor="ctr"/>
+                </a:tc>
+              </a:tr>
+              <a:tr h="370840">
+                <a:tc>
+                  <a:txBody>
+                    <a:bodyPr/>
+                    <a:lstStyle/>
+                    <a:p>
+                      <a:pPr algn="l"/>
+                      <a:r>
+                        <a:rPr lang="en-US"/>
+                        <a:t>int size()</a:t>
+                      </a:r>
+                    </a:p>
+                  </a:txBody>
+                  <a:tcPr anchor="ctr"/>
+                </a:tc>
+                <a:tc>
+                  <a:txBody>
+                    <a:bodyPr/>
+                    <a:lstStyle/>
+                    <a:p>
+                      <a:pPr algn="l"/>
+                      <a:r>
+                        <a:rPr lang="en-US"/>
+                        <a:t>Returns the number of entries in the map.</a:t>
+                      </a:r>
+                    </a:p>
+                  </a:txBody>
+                  <a:tcPr anchor="ctr"/>
+                </a:tc>
+              </a:tr>
+              <a:tr h="370840">
+                <a:tc>
+                  <a:txBody>
+                    <a:bodyPr/>
+                    <a:lstStyle/>
+                    <a:p>
+                      <a:pPr algn="l"/>
+                      <a:r>
+                        <a:rPr lang="en-US"/>
+                        <a:t>Collection values()</a:t>
+                      </a:r>
+                    </a:p>
+                  </a:txBody>
+                  <a:tcPr anchor="ctr"/>
+                </a:tc>
+                <a:tc>
+                  <a:txBody>
+                    <a:bodyPr/>
+                    <a:lstStyle/>
+                    <a:p>
+                      <a:pPr algn="l"/>
+                      <a:r>
+                        <a:rPr lang="en-US" dirty="0"/>
+                        <a:t>Returns a Collection view of the values contained in the map.</a:t>
+                      </a:r>
+                    </a:p>
+                  </a:txBody>
+                  <a:tcPr anchor="ctr"/>
+                </a:tc>
+              </a:tr>
+            </a:tbl>
+          </a:graphicData>
+        </a:graphic>
+      </p:graphicFrame>
+      <p:sp>
+        <p:nvSpPr>
+          <p:cNvPr id="3" name="Slide Number Placeholder 2"/>
           <p:cNvSpPr>
             <a:spLocks noGrp="1"/>
           </p:cNvSpPr>
@@ -5168,7 +5593,7 @@
     </p:spTree>
     <p:extLst>
       <p:ext uri="{BB962C8B-B14F-4D97-AF65-F5344CB8AC3E}">
-        <p14:creationId xmlns:p14="http://schemas.microsoft.com/office/powerpoint/2010/main" val="1619270737"/>
+        <p14:creationId xmlns:p14="http://schemas.microsoft.com/office/powerpoint/2010/main" val="405732381"/>
       </p:ext>
     </p:extLst>
   </p:cSld>
@@ -5214,7 +5639,7 @@
           <a:p>
             <a:r>
               <a:rPr lang="en-US" sz="4800" dirty="0" smtClean="0"/>
-              <a:t>Set Implementations</a:t>
+              <a:t>Map Implementations</a:t>
             </a:r>
             <a:endParaRPr lang="en-US" sz="4800" dirty="0"/>
           </a:p>
@@ -5243,7 +5668,7 @@
                   <a:schemeClr val="tx1"/>
                 </a:solidFill>
               </a:rPr>
-              <a:t>TreeSet</a:t>
+              <a:t>TreeMap</a:t>
             </a:r>
             <a:endParaRPr lang="en-US" sz="3200" b="1" dirty="0">
               <a:solidFill>
@@ -5278,13 +5703,13 @@
           <a:p>
             <a:r>
               <a:rPr lang="en-US" sz="2800" dirty="0" smtClean="0"/>
-              <a:t>Elements stored in sorted order</a:t>
+              <a:t>Entries sorted based on keys</a:t>
             </a:r>
           </a:p>
           <a:p>
             <a:r>
               <a:rPr lang="en-US" sz="2800" dirty="0" smtClean="0"/>
-              <a:t>Slower access</a:t>
+              <a:t>Slower for access</a:t>
             </a:r>
           </a:p>
         </p:txBody>
@@ -5312,7 +5737,7 @@
                   <a:schemeClr val="tx1"/>
                 </a:solidFill>
               </a:rPr>
-              <a:t>HashSet</a:t>
+              <a:t>HashMap</a:t>
             </a:r>
             <a:endParaRPr lang="en-US" sz="3200" b="1" dirty="0">
               <a:solidFill>
@@ -5341,13 +5766,8 @@
           <a:p>
             <a:r>
               <a:rPr lang="en-US" sz="2800" dirty="0" smtClean="0"/>
-              <a:t>Implementation based on </a:t>
-            </a:r>
-            <a:r>
-              <a:rPr lang="en-US" sz="2800" dirty="0" err="1" smtClean="0"/>
-              <a:t>HashMaps</a:t>
-            </a:r>
-            <a:endParaRPr lang="en-US" sz="2800" dirty="0" smtClean="0"/>
+              <a:t>Implementation based on hash table using hash code of keys</a:t>
+            </a:r>
           </a:p>
           <a:p>
             <a:r>
@@ -5358,9 +5778,8 @@
           <a:p>
             <a:r>
               <a:rPr lang="en-US" sz="2800" dirty="0" smtClean="0"/>
-              <a:t>Faster access</a:t>
-            </a:r>
-            <a:endParaRPr lang="en-US" sz="2800" dirty="0"/>
+              <a:t>Faster for access</a:t>
+            </a:r>
           </a:p>
         </p:txBody>
       </p:sp>
@@ -5392,7 +5811,7 @@
     </p:spTree>
     <p:extLst>
       <p:ext uri="{BB962C8B-B14F-4D97-AF65-F5344CB8AC3E}">
-        <p14:creationId xmlns:p14="http://schemas.microsoft.com/office/powerpoint/2010/main" val="321982236"/>
+        <p14:creationId xmlns:p14="http://schemas.microsoft.com/office/powerpoint/2010/main" val="883548242"/>
       </p:ext>
     </p:extLst>
   </p:cSld>
@@ -5436,20 +5855,20 @@
           <a:p>
             <a:r>
               <a:rPr lang="en-US" dirty="0" smtClean="0"/>
-              <a:t>Maps</a:t>
-            </a:r>
-            <a:endParaRPr lang="en-US" dirty="0"/>
-          </a:p>
-        </p:txBody>
-      </p:sp>
-      <p:sp>
-        <p:nvSpPr>
-          <p:cNvPr id="3" name="Text Placeholder 2"/>
-          <p:cNvSpPr>
-            <a:spLocks noGrp="1"/>
-          </p:cNvSpPr>
-          <p:nvPr>
-            <p:ph type="body" idx="1"/>
+              <a:t>Exercise</a:t>
+            </a:r>
+            <a:endParaRPr lang="en-US" dirty="0"/>
+          </a:p>
+        </p:txBody>
+      </p:sp>
+      <p:sp>
+        <p:nvSpPr>
+          <p:cNvPr id="3" name="Content Placeholder 2"/>
+          <p:cNvSpPr>
+            <a:spLocks noGrp="1"/>
+          </p:cNvSpPr>
+          <p:nvPr>
+            <p:ph idx="1"/>
           </p:nvPr>
         </p:nvSpPr>
         <p:spPr/>
@@ -5457,13 +5876,45 @@
           <a:bodyPr/>
           <a:lstStyle/>
           <a:p>
-            <a:r>
-              <a:rPr lang="en-US" dirty="0" smtClean="0"/>
-              <a:t>A collection of key/value </a:t>
-            </a:r>
+            <a:pPr marL="0" indent="0">
+              <a:buNone/>
+            </a:pPr>
             <a:r>
               <a:rPr lang="en-US" dirty="0"/>
-              <a:t>pairs where each key is unique and corresponds to at most one value</a:t>
+              <a:t>Write a program that first prompts the user to enter a list of city names, one at a time until the user specifies "END". Next, the program should prompt the user to enter the average daily temperature for each of the next five days for each city. The program should store the user's cities and temperature data in one data structure. Next, calculate the five-day average for each city.</a:t>
+            </a:r>
+            <a:br>
+              <a:rPr lang="en-US" dirty="0"/>
+            </a:br>
+            <a:r>
+              <a:rPr lang="en-US" dirty="0"/>
+              <a:t>Finally, display a message containing the city's name and the average for each city.</a:t>
+            </a:r>
+          </a:p>
+          <a:p>
+            <a:pPr marL="0" indent="0">
+              <a:buNone/>
+            </a:pPr>
+            <a:r>
+              <a:rPr lang="en-US" dirty="0"/>
+              <a:t>The code to prompt the user for input, to calculate the five-day average, and to display the results should be in separate methods.</a:t>
+            </a:r>
+          </a:p>
+          <a:p>
+            <a:pPr marL="0" indent="0">
+              <a:buNone/>
+            </a:pPr>
+            <a:r>
+              <a:rPr lang="en-US" dirty="0"/>
+              <a:t>Hint: You can use </a:t>
+            </a:r>
+            <a:r>
+              <a:rPr lang="en-US" dirty="0" err="1"/>
+              <a:t>String.split</a:t>
+            </a:r>
+            <a:r>
+              <a:rPr lang="en-US" dirty="0"/>
+              <a:t>(" ") to split a string into an array of strings based on where spaces occur in the original string. </a:t>
             </a:r>
           </a:p>
         </p:txBody>
@@ -5496,489 +5947,7 @@
     </p:spTree>
     <p:extLst>
       <p:ext uri="{BB962C8B-B14F-4D97-AF65-F5344CB8AC3E}">
-        <p14:creationId xmlns:p14="http://schemas.microsoft.com/office/powerpoint/2010/main" val="780207109"/>
-      </p:ext>
-    </p:extLst>
-  </p:cSld>
-  <p:clrMapOvr>
-    <a:masterClrMapping/>
-  </p:clrMapOvr>
-</p:sld>
-</file>
-
-<file path=ppt/slides/slide19.xml><?xml version="1.0" encoding="utf-8"?>
-<p:sld xmlns:a="http://schemas.openxmlformats.org/drawingml/2006/main" xmlns:r="http://schemas.openxmlformats.org/officeDocument/2006/relationships" xmlns:p="http://schemas.openxmlformats.org/presentationml/2006/main">
-  <p:cSld>
-    <p:spTree>
-      <p:nvGrpSpPr>
-        <p:cNvPr id="1" name=""/>
-        <p:cNvGrpSpPr/>
-        <p:nvPr/>
-      </p:nvGrpSpPr>
-      <p:grpSpPr>
-        <a:xfrm>
-          <a:off x="0" y="0"/>
-          <a:ext cx="0" cy="0"/>
-          <a:chOff x="0" y="0"/>
-          <a:chExt cx="0" cy="0"/>
-        </a:xfrm>
-      </p:grpSpPr>
-      <p:sp>
-        <p:nvSpPr>
-          <p:cNvPr id="2" name="Title 1"/>
-          <p:cNvSpPr>
-            <a:spLocks noGrp="1"/>
-          </p:cNvSpPr>
-          <p:nvPr>
-            <p:ph type="title"/>
-          </p:nvPr>
-        </p:nvSpPr>
-        <p:spPr>
-          <a:xfrm>
-            <a:off x="1261871" y="201637"/>
-            <a:ext cx="9692640" cy="712763"/>
-          </a:xfrm>
-        </p:spPr>
-        <p:txBody>
-          <a:bodyPr>
-            <a:normAutofit fontScale="90000"/>
-          </a:bodyPr>
-          <a:lstStyle/>
-          <a:p>
-            <a:r>
-              <a:rPr lang="en-US" sz="4800" smtClean="0"/>
-              <a:t>Map Interface</a:t>
-            </a:r>
-            <a:endParaRPr lang="en-US" sz="4800" dirty="0"/>
-          </a:p>
-        </p:txBody>
-      </p:sp>
-      <p:graphicFrame>
-        <p:nvGraphicFramePr>
-          <p:cNvPr id="5" name="Content Placeholder 4"/>
-          <p:cNvGraphicFramePr>
-            <a:graphicFrameLocks noGrp="1"/>
-          </p:cNvGraphicFramePr>
-          <p:nvPr>
-            <p:ph idx="1"/>
-            <p:extLst>
-              <p:ext uri="{D42A27DB-BD31-4B8C-83A1-F6EECF244321}">
-                <p14:modId xmlns:p14="http://schemas.microsoft.com/office/powerpoint/2010/main" val="2015340369"/>
-              </p:ext>
-            </p:extLst>
-          </p:nvPr>
-        </p:nvGraphicFramePr>
-        <p:xfrm>
-          <a:off x="583457" y="1090246"/>
-          <a:ext cx="11049469" cy="5603240"/>
-        </p:xfrm>
-        <a:graphic>
-          <a:graphicData uri="http://schemas.openxmlformats.org/drawingml/2006/table">
-            <a:tbl>
-              <a:tblPr firstRow="1" bandRow="1">
-                <a:tableStyleId>{5C22544A-7EE6-4342-B048-85BDC9FD1C3A}</a:tableStyleId>
-              </a:tblPr>
-              <a:tblGrid>
-                <a:gridCol w="4082328"/>
-                <a:gridCol w="6967141"/>
-              </a:tblGrid>
-              <a:tr h="370840">
-                <a:tc>
-                  <a:txBody>
-                    <a:bodyPr/>
-                    <a:lstStyle/>
-                    <a:p>
-                      <a:pPr algn="l"/>
-                      <a:r>
-                        <a:rPr lang="en-US" dirty="0"/>
-                        <a:t>Method</a:t>
-                      </a:r>
-                    </a:p>
-                  </a:txBody>
-                  <a:tcPr anchor="ctr"/>
-                </a:tc>
-                <a:tc>
-                  <a:txBody>
-                    <a:bodyPr/>
-                    <a:lstStyle/>
-                    <a:p>
-                      <a:pPr algn="l"/>
-                      <a:r>
-                        <a:rPr lang="en-US"/>
-                        <a:t>Description</a:t>
-                      </a:r>
-                    </a:p>
-                  </a:txBody>
-                  <a:tcPr anchor="ctr"/>
-                </a:tc>
-              </a:tr>
-              <a:tr h="370840">
-                <a:tc>
-                  <a:txBody>
-                    <a:bodyPr/>
-                    <a:lstStyle/>
-                    <a:p>
-                      <a:pPr algn="l"/>
-                      <a:r>
-                        <a:rPr lang="en-US"/>
-                        <a:t>void clear()</a:t>
-                      </a:r>
-                    </a:p>
-                  </a:txBody>
-                  <a:tcPr anchor="ctr"/>
-                </a:tc>
-                <a:tc>
-                  <a:txBody>
-                    <a:bodyPr/>
-                    <a:lstStyle/>
-                    <a:p>
-                      <a:pPr algn="l"/>
-                      <a:r>
-                        <a:rPr lang="en-US"/>
-                        <a:t>Removes all entries from the map.</a:t>
-                      </a:r>
-                    </a:p>
-                  </a:txBody>
-                  <a:tcPr anchor="ctr"/>
-                </a:tc>
-              </a:tr>
-              <a:tr h="370840">
-                <a:tc>
-                  <a:txBody>
-                    <a:bodyPr/>
-                    <a:lstStyle/>
-                    <a:p>
-                      <a:pPr algn="l"/>
-                      <a:r>
-                        <a:rPr lang="en-US"/>
-                        <a:t>boolean containsKey(Object key)</a:t>
-                      </a:r>
-                    </a:p>
-                  </a:txBody>
-                  <a:tcPr anchor="ctr"/>
-                </a:tc>
-                <a:tc>
-                  <a:txBody>
-                    <a:bodyPr/>
-                    <a:lstStyle/>
-                    <a:p>
-                      <a:pPr algn="l"/>
-                      <a:r>
-                        <a:rPr lang="en-US"/>
-                        <a:t>Returns true when the map contains an entry for the specified </a:t>
-                      </a:r>
-                      <a:r>
-                        <a:rPr lang="en-US" i="1"/>
-                        <a:t>key</a:t>
-                      </a:r>
-                      <a:r>
-                        <a:rPr lang="en-US"/>
-                        <a:t> and false otherwise.</a:t>
-                      </a:r>
-                    </a:p>
-                  </a:txBody>
-                  <a:tcPr anchor="ctr"/>
-                </a:tc>
-              </a:tr>
-              <a:tr h="370840">
-                <a:tc>
-                  <a:txBody>
-                    <a:bodyPr/>
-                    <a:lstStyle/>
-                    <a:p>
-                      <a:pPr algn="l"/>
-                      <a:r>
-                        <a:rPr lang="en-US"/>
-                        <a:t>boolean containsValue(Object value)</a:t>
-                      </a:r>
-                    </a:p>
-                  </a:txBody>
-                  <a:tcPr anchor="ctr"/>
-                </a:tc>
-                <a:tc>
-                  <a:txBody>
-                    <a:bodyPr/>
-                    <a:lstStyle/>
-                    <a:p>
-                      <a:pPr algn="l"/>
-                      <a:r>
-                        <a:rPr lang="en-US" dirty="0"/>
-                        <a:t>Returns true when the map maps one or more keys to </a:t>
-                      </a:r>
-                      <a:r>
-                        <a:rPr lang="en-US" i="1" dirty="0"/>
-                        <a:t>value</a:t>
-                      </a:r>
-                      <a:r>
-                        <a:rPr lang="en-US" dirty="0"/>
-                        <a:t>.</a:t>
-                      </a:r>
-                    </a:p>
-                  </a:txBody>
-                  <a:tcPr anchor="ctr"/>
-                </a:tc>
-              </a:tr>
-              <a:tr h="370840">
-                <a:tc>
-                  <a:txBody>
-                    <a:bodyPr/>
-                    <a:lstStyle/>
-                    <a:p>
-                      <a:pPr algn="l"/>
-                      <a:r>
-                        <a:rPr lang="en-US"/>
-                        <a:t>V get(Object key)</a:t>
-                      </a:r>
-                    </a:p>
-                  </a:txBody>
-                  <a:tcPr anchor="ctr"/>
-                </a:tc>
-                <a:tc>
-                  <a:txBody>
-                    <a:bodyPr/>
-                    <a:lstStyle/>
-                    <a:p>
-                      <a:pPr algn="l"/>
-                      <a:r>
-                        <a:rPr lang="en-US" dirty="0"/>
-                        <a:t>Return the value to which </a:t>
-                      </a:r>
-                      <a:r>
-                        <a:rPr lang="en-US" i="1" dirty="0"/>
-                        <a:t>key</a:t>
-                      </a:r>
-                      <a:r>
-                        <a:rPr lang="en-US" dirty="0"/>
-                        <a:t> is mapped or null if the map doesn't contain the key.</a:t>
-                      </a:r>
-                    </a:p>
-                  </a:txBody>
-                  <a:tcPr anchor="ctr"/>
-                </a:tc>
-              </a:tr>
-              <a:tr h="370840">
-                <a:tc>
-                  <a:txBody>
-                    <a:bodyPr/>
-                    <a:lstStyle/>
-                    <a:p>
-                      <a:pPr algn="l"/>
-                      <a:r>
-                        <a:rPr lang="en-US"/>
-                        <a:t>Set keySet()</a:t>
-                      </a:r>
-                    </a:p>
-                  </a:txBody>
-                  <a:tcPr anchor="ctr"/>
-                </a:tc>
-                <a:tc>
-                  <a:txBody>
-                    <a:bodyPr/>
-                    <a:lstStyle/>
-                    <a:p>
-                      <a:pPr algn="l"/>
-                      <a:r>
-                        <a:rPr lang="en-US"/>
-                        <a:t>returns a Set view of the keys contained in the map. Because this is a view, changes made to the map are reflected in the set and vice versa.</a:t>
-                      </a:r>
-                    </a:p>
-                  </a:txBody>
-                  <a:tcPr anchor="ctr"/>
-                </a:tc>
-              </a:tr>
-              <a:tr h="370840">
-                <a:tc>
-                  <a:txBody>
-                    <a:bodyPr/>
-                    <a:lstStyle/>
-                    <a:p>
-                      <a:pPr algn="l"/>
-                      <a:r>
-                        <a:rPr lang="en-US"/>
-                        <a:t>V put(K key, V value)</a:t>
-                      </a:r>
-                    </a:p>
-                  </a:txBody>
-                  <a:tcPr anchor="ctr"/>
-                </a:tc>
-                <a:tc>
-                  <a:txBody>
-                    <a:bodyPr/>
-                    <a:lstStyle/>
-                    <a:p>
-                      <a:pPr algn="l"/>
-                      <a:r>
-                        <a:rPr lang="en-US"/>
-                        <a:t>Associates </a:t>
-                      </a:r>
-                      <a:r>
-                        <a:rPr lang="en-US" i="1"/>
-                        <a:t>value</a:t>
-                      </a:r>
-                      <a:r>
-                        <a:rPr lang="en-US"/>
-                        <a:t> with </a:t>
-                      </a:r>
-                      <a:r>
-                        <a:rPr lang="en-US" i="1"/>
-                        <a:t>key</a:t>
-                      </a:r>
-                      <a:r>
-                        <a:rPr lang="en-US"/>
-                        <a:t> in the map. If the map previously contained a value for </a:t>
-                      </a:r>
-                      <a:r>
-                        <a:rPr lang="en-US" i="1"/>
-                        <a:t>key</a:t>
-                      </a:r>
-                      <a:r>
-                        <a:rPr lang="en-US"/>
-                        <a:t>, the value is replaced and the old value is returned.</a:t>
-                      </a:r>
-                    </a:p>
-                  </a:txBody>
-                  <a:tcPr anchor="ctr"/>
-                </a:tc>
-              </a:tr>
-              <a:tr h="370840">
-                <a:tc>
-                  <a:txBody>
-                    <a:bodyPr/>
-                    <a:lstStyle/>
-                    <a:p>
-                      <a:pPr algn="l"/>
-                      <a:r>
-                        <a:rPr lang="en-US"/>
-                        <a:t>V remove(Object key)</a:t>
-                      </a:r>
-                    </a:p>
-                  </a:txBody>
-                  <a:tcPr anchor="ctr"/>
-                </a:tc>
-                <a:tc>
-                  <a:txBody>
-                    <a:bodyPr/>
-                    <a:lstStyle/>
-                    <a:p>
-                      <a:pPr algn="l"/>
-                      <a:r>
-                        <a:rPr lang="en-US"/>
-                        <a:t>Removes the entry for </a:t>
-                      </a:r>
-                      <a:r>
-                        <a:rPr lang="en-US" i="1"/>
-                        <a:t>key</a:t>
-                      </a:r>
-                      <a:r>
-                        <a:rPr lang="en-US"/>
-                        <a:t> from the map and returns the associated value if the map contained an entry for </a:t>
-                      </a:r>
-                      <a:r>
-                        <a:rPr lang="en-US" i="1"/>
-                        <a:t>key</a:t>
-                      </a:r>
-                      <a:r>
-                        <a:rPr lang="en-US"/>
-                        <a:t>.</a:t>
-                      </a:r>
-                    </a:p>
-                  </a:txBody>
-                  <a:tcPr anchor="ctr"/>
-                </a:tc>
-              </a:tr>
-              <a:tr h="370840">
-                <a:tc>
-                  <a:txBody>
-                    <a:bodyPr/>
-                    <a:lstStyle/>
-                    <a:p>
-                      <a:pPr algn="l"/>
-                      <a:r>
-                        <a:rPr lang="en-US"/>
-                        <a:t>int size()</a:t>
-                      </a:r>
-                    </a:p>
-                  </a:txBody>
-                  <a:tcPr anchor="ctr"/>
-                </a:tc>
-                <a:tc>
-                  <a:txBody>
-                    <a:bodyPr/>
-                    <a:lstStyle/>
-                    <a:p>
-                      <a:pPr algn="l"/>
-                      <a:r>
-                        <a:rPr lang="en-US"/>
-                        <a:t>Returns the number of entries in the map.</a:t>
-                      </a:r>
-                    </a:p>
-                  </a:txBody>
-                  <a:tcPr anchor="ctr"/>
-                </a:tc>
-              </a:tr>
-              <a:tr h="370840">
-                <a:tc>
-                  <a:txBody>
-                    <a:bodyPr/>
-                    <a:lstStyle/>
-                    <a:p>
-                      <a:pPr algn="l"/>
-                      <a:r>
-                        <a:rPr lang="en-US"/>
-                        <a:t>Collection values()</a:t>
-                      </a:r>
-                    </a:p>
-                  </a:txBody>
-                  <a:tcPr anchor="ctr"/>
-                </a:tc>
-                <a:tc>
-                  <a:txBody>
-                    <a:bodyPr/>
-                    <a:lstStyle/>
-                    <a:p>
-                      <a:pPr algn="l"/>
-                      <a:r>
-                        <a:rPr lang="en-US" dirty="0"/>
-                        <a:t>Returns a Collection view of the values contained in the map.</a:t>
-                      </a:r>
-                    </a:p>
-                  </a:txBody>
-                  <a:tcPr anchor="ctr"/>
-                </a:tc>
-              </a:tr>
-            </a:tbl>
-          </a:graphicData>
-        </a:graphic>
-      </p:graphicFrame>
-      <p:sp>
-        <p:nvSpPr>
-          <p:cNvPr id="3" name="Slide Number Placeholder 2"/>
-          <p:cNvSpPr>
-            <a:spLocks noGrp="1"/>
-          </p:cNvSpPr>
-          <p:nvPr>
-            <p:ph type="sldNum" sz="quarter" idx="12"/>
-          </p:nvPr>
-        </p:nvSpPr>
-        <p:spPr/>
-        <p:txBody>
-          <a:bodyPr>
-            <a:normAutofit lnSpcReduction="10000"/>
-          </a:bodyPr>
-          <a:lstStyle/>
-          <a:p>
-            <a:fld id="{4FAB73BC-B049-4115-A692-8D63A059BFB8}" type="slidenum">
-              <a:rPr lang="en-US" smtClean="0"/>
-              <a:t>19</a:t>
-            </a:fld>
-            <a:endParaRPr lang="en-US" dirty="0"/>
-          </a:p>
-        </p:txBody>
-      </p:sp>
-    </p:spTree>
-    <p:extLst>
-      <p:ext uri="{BB962C8B-B14F-4D97-AF65-F5344CB8AC3E}">
-        <p14:creationId xmlns:p14="http://schemas.microsoft.com/office/powerpoint/2010/main" val="405732381"/>
+        <p14:creationId xmlns:p14="http://schemas.microsoft.com/office/powerpoint/2010/main" val="1328491333"/>
       </p:ext>
     </p:extLst>
   </p:cSld>
@@ -6094,360 +6063,6 @@
     <p:extLst>
       <p:ext uri="{BB962C8B-B14F-4D97-AF65-F5344CB8AC3E}">
         <p14:creationId xmlns:p14="http://schemas.microsoft.com/office/powerpoint/2010/main" val="705223229"/>
-      </p:ext>
-    </p:extLst>
-  </p:cSld>
-  <p:clrMapOvr>
-    <a:masterClrMapping/>
-  </p:clrMapOvr>
-</p:sld>
-</file>
-
-<file path=ppt/slides/slide20.xml><?xml version="1.0" encoding="utf-8"?>
-<p:sld xmlns:a="http://schemas.openxmlformats.org/drawingml/2006/main" xmlns:r="http://schemas.openxmlformats.org/officeDocument/2006/relationships" xmlns:p="http://schemas.openxmlformats.org/presentationml/2006/main">
-  <p:cSld>
-    <p:spTree>
-      <p:nvGrpSpPr>
-        <p:cNvPr id="1" name=""/>
-        <p:cNvGrpSpPr/>
-        <p:nvPr/>
-      </p:nvGrpSpPr>
-      <p:grpSpPr>
-        <a:xfrm>
-          <a:off x="0" y="0"/>
-          <a:ext cx="0" cy="0"/>
-          <a:chOff x="0" y="0"/>
-          <a:chExt cx="0" cy="0"/>
-        </a:xfrm>
-      </p:grpSpPr>
-      <p:sp>
-        <p:nvSpPr>
-          <p:cNvPr id="2" name="Title 1"/>
-          <p:cNvSpPr>
-            <a:spLocks noGrp="1"/>
-          </p:cNvSpPr>
-          <p:nvPr>
-            <p:ph type="title"/>
-          </p:nvPr>
-        </p:nvSpPr>
-        <p:spPr/>
-        <p:txBody>
-          <a:bodyPr>
-            <a:normAutofit/>
-          </a:bodyPr>
-          <a:lstStyle/>
-          <a:p>
-            <a:r>
-              <a:rPr lang="en-US" sz="4800" dirty="0" smtClean="0"/>
-              <a:t>Map Implementations</a:t>
-            </a:r>
-            <a:endParaRPr lang="en-US" sz="4800" dirty="0"/>
-          </a:p>
-        </p:txBody>
-      </p:sp>
-      <p:sp>
-        <p:nvSpPr>
-          <p:cNvPr id="5" name="Text Placeholder 4"/>
-          <p:cNvSpPr>
-            <a:spLocks noGrp="1"/>
-          </p:cNvSpPr>
-          <p:nvPr>
-            <p:ph type="body" idx="1"/>
-          </p:nvPr>
-        </p:nvSpPr>
-        <p:spPr/>
-        <p:txBody>
-          <a:bodyPr>
-            <a:normAutofit/>
-          </a:bodyPr>
-          <a:lstStyle/>
-          <a:p>
-            <a:r>
-              <a:rPr lang="en-US" sz="3200" b="1" dirty="0" err="1" smtClean="0">
-                <a:solidFill>
-                  <a:schemeClr val="tx1"/>
-                </a:solidFill>
-              </a:rPr>
-              <a:t>TreeMap</a:t>
-            </a:r>
-            <a:endParaRPr lang="en-US" sz="3200" b="1" dirty="0">
-              <a:solidFill>
-                <a:schemeClr val="tx1"/>
-              </a:solidFill>
-            </a:endParaRPr>
-          </a:p>
-        </p:txBody>
-      </p:sp>
-      <p:sp>
-        <p:nvSpPr>
-          <p:cNvPr id="3" name="Content Placeholder 2"/>
-          <p:cNvSpPr>
-            <a:spLocks noGrp="1"/>
-          </p:cNvSpPr>
-          <p:nvPr>
-            <p:ph sz="half" idx="2"/>
-          </p:nvPr>
-        </p:nvSpPr>
-        <p:spPr/>
-        <p:txBody>
-          <a:bodyPr anchor="t">
-            <a:normAutofit/>
-          </a:bodyPr>
-          <a:lstStyle/>
-          <a:p>
-            <a:r>
-              <a:rPr lang="en-US" sz="2800" dirty="0" smtClean="0"/>
-              <a:t>Implementation based on tree structure</a:t>
-            </a:r>
-          </a:p>
-          <a:p>
-            <a:r>
-              <a:rPr lang="en-US" sz="2800" dirty="0" smtClean="0"/>
-              <a:t>Entries sorted based on keys</a:t>
-            </a:r>
-          </a:p>
-          <a:p>
-            <a:r>
-              <a:rPr lang="en-US" sz="2800" dirty="0" smtClean="0"/>
-              <a:t>Slower for access</a:t>
-            </a:r>
-          </a:p>
-        </p:txBody>
-      </p:sp>
-      <p:sp>
-        <p:nvSpPr>
-          <p:cNvPr id="6" name="Text Placeholder 5"/>
-          <p:cNvSpPr>
-            <a:spLocks noGrp="1"/>
-          </p:cNvSpPr>
-          <p:nvPr>
-            <p:ph type="body" sz="quarter" idx="3"/>
-          </p:nvPr>
-        </p:nvSpPr>
-        <p:spPr/>
-        <p:txBody>
-          <a:bodyPr>
-            <a:normAutofit/>
-          </a:bodyPr>
-          <a:lstStyle/>
-          <a:p>
-            <a:r>
-              <a:rPr lang="en-US" sz="3200" b="1" dirty="0" err="1" smtClean="0">
-                <a:solidFill>
-                  <a:schemeClr val="tx1"/>
-                </a:solidFill>
-              </a:rPr>
-              <a:t>HashMap</a:t>
-            </a:r>
-            <a:endParaRPr lang="en-US" sz="3200" b="1" dirty="0">
-              <a:solidFill>
-                <a:schemeClr val="tx1"/>
-              </a:solidFill>
-            </a:endParaRPr>
-          </a:p>
-        </p:txBody>
-      </p:sp>
-      <p:sp>
-        <p:nvSpPr>
-          <p:cNvPr id="7" name="Content Placeholder 6"/>
-          <p:cNvSpPr>
-            <a:spLocks noGrp="1"/>
-          </p:cNvSpPr>
-          <p:nvPr>
-            <p:ph sz="quarter" idx="4"/>
-          </p:nvPr>
-        </p:nvSpPr>
-        <p:spPr/>
-        <p:txBody>
-          <a:bodyPr anchor="t">
-            <a:noAutofit/>
-          </a:bodyPr>
-          <a:lstStyle/>
-          <a:p>
-            <a:r>
-              <a:rPr lang="en-US" sz="2800" dirty="0" smtClean="0"/>
-              <a:t>Implementation based on hash table using hash code of keys</a:t>
-            </a:r>
-          </a:p>
-          <a:p>
-            <a:r>
-              <a:rPr lang="en-US" sz="2800" dirty="0" smtClean="0"/>
-              <a:t>No guarantee about order</a:t>
-            </a:r>
-          </a:p>
-          <a:p>
-            <a:r>
-              <a:rPr lang="en-US" sz="2800" dirty="0" smtClean="0"/>
-              <a:t>Faster for access</a:t>
-            </a:r>
-          </a:p>
-        </p:txBody>
-      </p:sp>
-      <p:sp>
-        <p:nvSpPr>
-          <p:cNvPr id="4" name="Slide Number Placeholder 3"/>
-          <p:cNvSpPr>
-            <a:spLocks noGrp="1"/>
-          </p:cNvSpPr>
-          <p:nvPr>
-            <p:ph type="sldNum" sz="quarter" idx="12"/>
-          </p:nvPr>
-        </p:nvSpPr>
-        <p:spPr/>
-        <p:txBody>
-          <a:bodyPr>
-            <a:normAutofit lnSpcReduction="10000"/>
-          </a:bodyPr>
-          <a:lstStyle/>
-          <a:p>
-            <a:fld id="{4FAB73BC-B049-4115-A692-8D63A059BFB8}" type="slidenum">
-              <a:rPr lang="en-US" smtClean="0"/>
-              <a:t>20</a:t>
-            </a:fld>
-            <a:endParaRPr lang="en-US" dirty="0"/>
-          </a:p>
-        </p:txBody>
-      </p:sp>
-    </p:spTree>
-    <p:extLst>
-      <p:ext uri="{BB962C8B-B14F-4D97-AF65-F5344CB8AC3E}">
-        <p14:creationId xmlns:p14="http://schemas.microsoft.com/office/powerpoint/2010/main" val="883548242"/>
-      </p:ext>
-    </p:extLst>
-  </p:cSld>
-  <p:clrMapOvr>
-    <a:masterClrMapping/>
-  </p:clrMapOvr>
-</p:sld>
-</file>
-
-<file path=ppt/slides/slide21.xml><?xml version="1.0" encoding="utf-8"?>
-<p:sld xmlns:a="http://schemas.openxmlformats.org/drawingml/2006/main" xmlns:r="http://schemas.openxmlformats.org/officeDocument/2006/relationships" xmlns:p="http://schemas.openxmlformats.org/presentationml/2006/main">
-  <p:cSld>
-    <p:spTree>
-      <p:nvGrpSpPr>
-        <p:cNvPr id="1" name=""/>
-        <p:cNvGrpSpPr/>
-        <p:nvPr/>
-      </p:nvGrpSpPr>
-      <p:grpSpPr>
-        <a:xfrm>
-          <a:off x="0" y="0"/>
-          <a:ext cx="0" cy="0"/>
-          <a:chOff x="0" y="0"/>
-          <a:chExt cx="0" cy="0"/>
-        </a:xfrm>
-      </p:grpSpPr>
-      <p:sp>
-        <p:nvSpPr>
-          <p:cNvPr id="2" name="Title 1"/>
-          <p:cNvSpPr>
-            <a:spLocks noGrp="1"/>
-          </p:cNvSpPr>
-          <p:nvPr>
-            <p:ph type="title"/>
-          </p:nvPr>
-        </p:nvSpPr>
-        <p:spPr/>
-        <p:txBody>
-          <a:bodyPr/>
-          <a:lstStyle/>
-          <a:p>
-            <a:r>
-              <a:rPr lang="en-US" dirty="0" smtClean="0"/>
-              <a:t>Exercise</a:t>
-            </a:r>
-            <a:endParaRPr lang="en-US" dirty="0"/>
-          </a:p>
-        </p:txBody>
-      </p:sp>
-      <p:sp>
-        <p:nvSpPr>
-          <p:cNvPr id="3" name="Content Placeholder 2"/>
-          <p:cNvSpPr>
-            <a:spLocks noGrp="1"/>
-          </p:cNvSpPr>
-          <p:nvPr>
-            <p:ph idx="1"/>
-          </p:nvPr>
-        </p:nvSpPr>
-        <p:spPr/>
-        <p:txBody>
-          <a:bodyPr/>
-          <a:lstStyle/>
-          <a:p>
-            <a:pPr marL="0" indent="0">
-              <a:buNone/>
-            </a:pPr>
-            <a:r>
-              <a:rPr lang="en-US" dirty="0"/>
-              <a:t>Write a program that first prompts the user to enter a list of city names, one at a time until the user specifies "END". Next, the program should prompt the user to enter the average daily temperature for each of the next five days for each city. The program should store the user's cities and temperature data in one data structure. Next, calculate the five-day average for each city.</a:t>
-            </a:r>
-            <a:br>
-              <a:rPr lang="en-US" dirty="0"/>
-            </a:br>
-            <a:r>
-              <a:rPr lang="en-US" dirty="0"/>
-              <a:t>Finally, display a message containing the city's name and the average for each city.</a:t>
-            </a:r>
-          </a:p>
-          <a:p>
-            <a:pPr marL="0" indent="0">
-              <a:buNone/>
-            </a:pPr>
-            <a:r>
-              <a:rPr lang="en-US" dirty="0"/>
-              <a:t>The code to prompt the user for input, to calculate the five-day average, and to display the results should be in separate methods.</a:t>
-            </a:r>
-          </a:p>
-          <a:p>
-            <a:pPr marL="0" indent="0">
-              <a:buNone/>
-            </a:pPr>
-            <a:r>
-              <a:rPr lang="en-US" dirty="0"/>
-              <a:t>Hint: You can use </a:t>
-            </a:r>
-            <a:r>
-              <a:rPr lang="en-US" dirty="0" err="1"/>
-              <a:t>String.split</a:t>
-            </a:r>
-            <a:r>
-              <a:rPr lang="en-US" dirty="0"/>
-              <a:t>(" ") to split a string into an array of strings based on where spaces occur in the original string. </a:t>
-            </a:r>
-          </a:p>
-        </p:txBody>
-      </p:sp>
-      <p:sp>
-        <p:nvSpPr>
-          <p:cNvPr id="4" name="Slide Number Placeholder 3"/>
-          <p:cNvSpPr>
-            <a:spLocks noGrp="1"/>
-          </p:cNvSpPr>
-          <p:nvPr>
-            <p:ph type="sldNum" sz="quarter" idx="12"/>
-          </p:nvPr>
-        </p:nvSpPr>
-        <p:spPr/>
-        <p:txBody>
-          <a:bodyPr>
-            <a:normAutofit lnSpcReduction="10000"/>
-          </a:bodyPr>
-          <a:lstStyle/>
-          <a:p>
-            <a:fld id="{4FAB73BC-B049-4115-A692-8D63A059BFB8}" type="slidenum">
-              <a:rPr lang="en-US" smtClean="0"/>
-              <a:t>21</a:t>
-            </a:fld>
-            <a:endParaRPr lang="en-US" dirty="0"/>
-          </a:p>
-        </p:txBody>
-      </p:sp>
-    </p:spTree>
-    <p:extLst>
-      <p:ext uri="{BB962C8B-B14F-4D97-AF65-F5344CB8AC3E}">
-        <p14:creationId xmlns:p14="http://schemas.microsoft.com/office/powerpoint/2010/main" val="1328491333"/>
       </p:ext>
     </p:extLst>
   </p:cSld>
@@ -6598,7 +6213,7 @@
           <a:p>
             <a:r>
               <a:rPr lang="en-US" dirty="0" smtClean="0"/>
-              <a:t>Collaboration on GitHub</a:t>
+              <a:t>Introduction to Object-Oriented Programming Topics</a:t>
             </a:r>
             <a:endParaRPr lang="en-US" dirty="0"/>
           </a:p>
@@ -6621,7 +6236,7 @@
           <a:p>
             <a:r>
               <a:rPr lang="en-US" dirty="0" smtClean="0"/>
-              <a:t>Forks and Pull Requests</a:t>
+              <a:t>Classes, Instances, Interfaces, and Objects</a:t>
             </a:r>
             <a:endParaRPr lang="en-US" dirty="0"/>
           </a:p>
@@ -6655,7 +6270,7 @@
     </p:spTree>
     <p:extLst>
       <p:ext uri="{BB962C8B-B14F-4D97-AF65-F5344CB8AC3E}">
-        <p14:creationId xmlns:p14="http://schemas.microsoft.com/office/powerpoint/2010/main" val="375396569"/>
+        <p14:creationId xmlns:p14="http://schemas.microsoft.com/office/powerpoint/2010/main" val="797379249"/>
       </p:ext>
     </p:extLst>
   </p:cSld>
@@ -6684,7 +6299,7 @@
       </p:grpSpPr>
       <p:sp>
         <p:nvSpPr>
-          <p:cNvPr id="3" name="Title 2"/>
+          <p:cNvPr id="2" name="Title 1"/>
           <p:cNvSpPr>
             <a:spLocks noGrp="1"/>
           </p:cNvSpPr>
@@ -6699,86 +6314,191 @@
           <a:p>
             <a:r>
               <a:rPr lang="en-US" dirty="0" smtClean="0"/>
-              <a:t>Forks</a:t>
-            </a:r>
-            <a:endParaRPr lang="en-US" dirty="0"/>
-          </a:p>
-        </p:txBody>
-      </p:sp>
-      <p:sp>
-        <p:nvSpPr>
-          <p:cNvPr id="2" name="Content Placeholder 1"/>
-          <p:cNvSpPr>
-            <a:spLocks noGrp="1"/>
-          </p:cNvSpPr>
-          <p:nvPr>
-            <p:ph sz="half" idx="1"/>
+              <a:t>Definitions</a:t>
+            </a:r>
+            <a:endParaRPr lang="en-US" dirty="0"/>
+          </a:p>
+        </p:txBody>
+      </p:sp>
+      <p:sp>
+        <p:nvSpPr>
+          <p:cNvPr id="3" name="Content Placeholder 2"/>
+          <p:cNvSpPr>
+            <a:spLocks noGrp="1"/>
+          </p:cNvSpPr>
+          <p:nvPr>
+            <p:ph idx="1"/>
           </p:nvPr>
         </p:nvSpPr>
         <p:spPr/>
         <p:txBody>
           <a:bodyPr anchor="ctr">
-            <a:normAutofit lnSpcReduction="10000"/>
+            <a:normAutofit/>
           </a:bodyPr>
           <a:lstStyle/>
           <a:p>
-            <a:r>
-              <a:rPr lang="en-US" sz="3200" dirty="0" smtClean="0"/>
-              <a:t>A copy of a repository</a:t>
-            </a:r>
-          </a:p>
-          <a:p>
-            <a:r>
-              <a:rPr lang="en-US" sz="3200" dirty="0" smtClean="0"/>
-              <a:t>GitHub keeps track of upstream changes</a:t>
-            </a:r>
-          </a:p>
-          <a:p>
-            <a:r>
-              <a:rPr lang="en-US" sz="3200" dirty="0" smtClean="0"/>
-              <a:t>We can import the project from GitHub into IntelliJ</a:t>
-            </a:r>
-          </a:p>
-          <a:p>
-            <a:r>
-              <a:rPr lang="en-US" sz="3200" dirty="0" err="1" smtClean="0"/>
-              <a:t>gitignore</a:t>
-            </a:r>
-            <a:r>
-              <a:rPr lang="en-US" sz="3200" dirty="0" smtClean="0"/>
-              <a:t> used to ignore certain files</a:t>
-            </a:r>
-          </a:p>
-        </p:txBody>
-      </p:sp>
-      <p:pic>
-        <p:nvPicPr>
-          <p:cNvPr id="6" name="Content Placeholder 5"/>
-          <p:cNvPicPr>
-            <a:picLocks noGrp="1" noChangeAspect="1"/>
-          </p:cNvPicPr>
-          <p:nvPr>
-            <p:ph sz="half" idx="2"/>
-          </p:nvPr>
-        </p:nvPicPr>
-        <p:blipFill rotWithShape="1">
-          <a:blip r:embed="rId2">
-            <a:extLst>
-              <a:ext uri="{28A0092B-C50C-407E-A947-70E740481C1C}">
-                <a14:useLocalDpi xmlns:a14="http://schemas.microsoft.com/office/drawing/2010/main" val="0"/>
-              </a:ext>
-            </a:extLst>
-          </a:blip>
-          <a:srcRect l="61323"/>
-          <a:stretch/>
-        </p:blipFill>
-        <p:spPr>
-          <a:xfrm>
-            <a:off x="6108192" y="1828800"/>
-            <a:ext cx="4136537" cy="4077385"/>
-          </a:xfrm>
-        </p:spPr>
-      </p:pic>
+            <a:pPr>
+              <a:lnSpc>
+                <a:spcPct val="100000"/>
+              </a:lnSpc>
+              <a:spcBef>
+                <a:spcPts val="0"/>
+              </a:spcBef>
+              <a:spcAft>
+                <a:spcPts val="600"/>
+              </a:spcAft>
+            </a:pPr>
+            <a:r>
+              <a:rPr lang="en-US" sz="2400" dirty="0" smtClean="0">
+                <a:ea typeface="Consolas" charset="0"/>
+                <a:cs typeface="Consolas" charset="0"/>
+              </a:rPr>
+              <a:t>An </a:t>
+            </a:r>
+            <a:r>
+              <a:rPr lang="en-US" sz="2400" b="1" i="1" dirty="0" smtClean="0">
+                <a:ea typeface="Consolas" charset="0"/>
+                <a:cs typeface="Consolas" charset="0"/>
+              </a:rPr>
+              <a:t>class </a:t>
+            </a:r>
+            <a:r>
+              <a:rPr lang="en-US" sz="2400" dirty="0" smtClean="0">
+                <a:ea typeface="Consolas" charset="0"/>
+                <a:cs typeface="Consolas" charset="0"/>
+              </a:rPr>
+              <a:t>specifies a structure consisting of data attributes and code for acting on these attributes</a:t>
+            </a:r>
+          </a:p>
+          <a:p>
+            <a:pPr>
+              <a:lnSpc>
+                <a:spcPct val="100000"/>
+              </a:lnSpc>
+              <a:spcBef>
+                <a:spcPts val="0"/>
+              </a:spcBef>
+              <a:spcAft>
+                <a:spcPts val="600"/>
+              </a:spcAft>
+            </a:pPr>
+            <a:r>
+              <a:rPr lang="en-US" sz="2400" dirty="0" smtClean="0">
+                <a:ea typeface="Consolas" charset="0"/>
+                <a:cs typeface="Consolas" charset="0"/>
+              </a:rPr>
+              <a:t>An </a:t>
+            </a:r>
+            <a:r>
+              <a:rPr lang="en-US" sz="2400" b="1" i="1" dirty="0" smtClean="0">
+                <a:ea typeface="Consolas" charset="0"/>
+                <a:cs typeface="Consolas" charset="0"/>
+              </a:rPr>
+              <a:t>object</a:t>
+            </a:r>
+            <a:r>
+              <a:rPr lang="en-US" sz="2400" b="1" dirty="0" smtClean="0">
+                <a:ea typeface="Consolas" charset="0"/>
+                <a:cs typeface="Consolas" charset="0"/>
+              </a:rPr>
+              <a:t> </a:t>
+            </a:r>
+            <a:r>
+              <a:rPr lang="en-US" sz="2400" dirty="0" smtClean="0">
+                <a:ea typeface="Consolas" charset="0"/>
+                <a:cs typeface="Consolas" charset="0"/>
+              </a:rPr>
+              <a:t>is a specific instance of a class, created with the </a:t>
+            </a:r>
+            <a:r>
+              <a:rPr lang="en-US" sz="2400" i="1" dirty="0" smtClean="0">
+                <a:ea typeface="Consolas" charset="0"/>
+                <a:cs typeface="Consolas" charset="0"/>
+              </a:rPr>
+              <a:t>new</a:t>
+            </a:r>
+            <a:r>
+              <a:rPr lang="en-US" sz="2400" dirty="0" smtClean="0">
+                <a:ea typeface="Consolas" charset="0"/>
+                <a:cs typeface="Consolas" charset="0"/>
+              </a:rPr>
+              <a:t> operator,  allowing us to use specific values for attributes</a:t>
+            </a:r>
+          </a:p>
+          <a:p>
+            <a:pPr>
+              <a:lnSpc>
+                <a:spcPct val="100000"/>
+              </a:lnSpc>
+              <a:spcBef>
+                <a:spcPts val="0"/>
+              </a:spcBef>
+              <a:spcAft>
+                <a:spcPts val="600"/>
+              </a:spcAft>
+            </a:pPr>
+            <a:r>
+              <a:rPr lang="en-US" sz="2400" dirty="0" smtClean="0">
+                <a:ea typeface="Consolas" charset="0"/>
+                <a:cs typeface="Consolas" charset="0"/>
+              </a:rPr>
+              <a:t>An </a:t>
+            </a:r>
+            <a:r>
+              <a:rPr lang="en-US" sz="2400" b="1" i="1" dirty="0" smtClean="0">
+                <a:ea typeface="Consolas" charset="0"/>
+                <a:cs typeface="Consolas" charset="0"/>
+              </a:rPr>
+              <a:t>instance method</a:t>
+            </a:r>
+            <a:r>
+              <a:rPr lang="en-US" sz="2400" dirty="0" smtClean="0">
+                <a:ea typeface="Consolas" charset="0"/>
+                <a:cs typeface="Consolas" charset="0"/>
+              </a:rPr>
+              <a:t> allow us to use or alter values unique to a given object</a:t>
+            </a:r>
+          </a:p>
+          <a:p>
+            <a:pPr>
+              <a:lnSpc>
+                <a:spcPct val="100000"/>
+              </a:lnSpc>
+              <a:spcBef>
+                <a:spcPts val="0"/>
+              </a:spcBef>
+              <a:spcAft>
+                <a:spcPts val="600"/>
+              </a:spcAft>
+            </a:pPr>
+            <a:r>
+              <a:rPr lang="en-US" sz="2400" dirty="0" smtClean="0">
+                <a:ea typeface="Consolas" charset="0"/>
+                <a:cs typeface="Consolas" charset="0"/>
+              </a:rPr>
+              <a:t>An </a:t>
+            </a:r>
+            <a:r>
+              <a:rPr lang="en-US" sz="2400" b="1" i="1" dirty="0" smtClean="0">
+                <a:ea typeface="Consolas" charset="0"/>
+                <a:cs typeface="Consolas" charset="0"/>
+              </a:rPr>
+              <a:t>interface </a:t>
+            </a:r>
+            <a:r>
+              <a:rPr lang="en-US" sz="2400" dirty="0" smtClean="0">
+                <a:ea typeface="Consolas" charset="0"/>
+                <a:cs typeface="Consolas" charset="0"/>
+              </a:rPr>
+              <a:t>specifies what attributes or methods a class will have.</a:t>
+            </a:r>
+            <a:endParaRPr lang="en-US" sz="2400" dirty="0">
+              <a:ea typeface="Consolas" charset="0"/>
+              <a:cs typeface="Consolas" charset="0"/>
+            </a:endParaRPr>
+          </a:p>
+        </p:txBody>
+      </p:sp>
       <p:sp>
         <p:nvSpPr>
           <p:cNvPr id="4" name="Slide Number Placeholder 3"/>
@@ -6807,7 +6527,7 @@
     </p:spTree>
     <p:extLst>
       <p:ext uri="{BB962C8B-B14F-4D97-AF65-F5344CB8AC3E}">
-        <p14:creationId xmlns:p14="http://schemas.microsoft.com/office/powerpoint/2010/main" val="204353980"/>
+        <p14:creationId xmlns:p14="http://schemas.microsoft.com/office/powerpoint/2010/main" val="1548663387"/>
       </p:ext>
     </p:extLst>
   </p:cSld>
@@ -6836,7 +6556,7 @@
       </p:grpSpPr>
       <p:sp>
         <p:nvSpPr>
-          <p:cNvPr id="3" name="Title 2"/>
+          <p:cNvPr id="4" name="Title 3"/>
           <p:cNvSpPr>
             <a:spLocks noGrp="1"/>
           </p:cNvSpPr>
@@ -6851,77 +6571,329 @@
           <a:p>
             <a:r>
               <a:rPr lang="en-US" dirty="0" smtClean="0"/>
-              <a:t>Pull Requests</a:t>
-            </a:r>
-            <a:endParaRPr lang="en-US" dirty="0"/>
-          </a:p>
-        </p:txBody>
-      </p:sp>
-      <p:pic>
-        <p:nvPicPr>
-          <p:cNvPr id="5" name="Content Placeholder 4"/>
-          <p:cNvPicPr>
-            <a:picLocks noGrp="1" noChangeAspect="1"/>
-          </p:cNvPicPr>
-          <p:nvPr>
-            <p:ph sz="half" idx="1"/>
-          </p:nvPr>
-        </p:nvPicPr>
-        <p:blipFill rotWithShape="1">
-          <a:blip r:embed="rId2">
-            <a:extLst>
-              <a:ext uri="{28A0092B-C50C-407E-A947-70E740481C1C}">
-                <a14:useLocalDpi xmlns:a14="http://schemas.microsoft.com/office/drawing/2010/main" val="0"/>
-              </a:ext>
-            </a:extLst>
-          </a:blip>
-          <a:srcRect r="58565"/>
-          <a:stretch/>
-        </p:blipFill>
-        <p:spPr>
-          <a:xfrm>
-            <a:off x="1261872" y="1812610"/>
-            <a:ext cx="3291023" cy="4383715"/>
-          </a:xfrm>
-        </p:spPr>
-      </p:pic>
-      <p:sp>
-        <p:nvSpPr>
-          <p:cNvPr id="4" name="Content Placeholder 3"/>
-          <p:cNvSpPr>
-            <a:spLocks noGrp="1"/>
-          </p:cNvSpPr>
-          <p:nvPr>
-            <p:ph sz="half" idx="2"/>
-          </p:nvPr>
-        </p:nvSpPr>
-        <p:spPr/>
-        <p:txBody>
-          <a:bodyPr anchor="ctr">
-            <a:noAutofit/>
-          </a:bodyPr>
-          <a:lstStyle/>
-          <a:p>
-            <a:r>
-              <a:rPr lang="en-US" sz="2800" dirty="0" smtClean="0"/>
-              <a:t>Used to incorporate changes into original repository</a:t>
-            </a:r>
-          </a:p>
-          <a:p>
-            <a:r>
-              <a:rPr lang="en-US" sz="2800" dirty="0" smtClean="0"/>
-              <a:t>Owner can approve changes by merging the pull request</a:t>
-            </a:r>
-          </a:p>
-          <a:p>
-            <a:r>
-              <a:rPr lang="en-US" sz="2800" dirty="0" smtClean="0"/>
-              <a:t>We can get upstream changes using pull requests and by switching the base</a:t>
-            </a:r>
-            <a:endParaRPr lang="en-US" sz="2800" dirty="0"/>
-          </a:p>
-        </p:txBody>
-      </p:sp>
+              <a:t>Collection Interface</a:t>
+            </a:r>
+            <a:endParaRPr lang="en-US" dirty="0"/>
+          </a:p>
+        </p:txBody>
+      </p:sp>
+      <p:graphicFrame>
+        <p:nvGraphicFramePr>
+          <p:cNvPr id="7" name="Content Placeholder 6"/>
+          <p:cNvGraphicFramePr>
+            <a:graphicFrameLocks noGrp="1"/>
+          </p:cNvGraphicFramePr>
+          <p:nvPr>
+            <p:ph idx="1"/>
+            <p:extLst>
+              <p:ext uri="{D42A27DB-BD31-4B8C-83A1-F6EECF244321}">
+                <p14:modId xmlns:p14="http://schemas.microsoft.com/office/powerpoint/2010/main" val="1935234159"/>
+              </p:ext>
+            </p:extLst>
+          </p:nvPr>
+        </p:nvGraphicFramePr>
+        <p:xfrm>
+          <a:off x="1262063" y="1828800"/>
+          <a:ext cx="8594726" cy="4460240"/>
+        </p:xfrm>
+        <a:graphic>
+          <a:graphicData uri="http://schemas.openxmlformats.org/drawingml/2006/table">
+            <a:tbl>
+              <a:tblPr firstRow="1" bandRow="1">
+                <a:tableStyleId>{5C22544A-7EE6-4342-B048-85BDC9FD1C3A}</a:tableStyleId>
+              </a:tblPr>
+              <a:tblGrid>
+                <a:gridCol w="2770675"/>
+                <a:gridCol w="5824051"/>
+              </a:tblGrid>
+              <a:tr h="370840">
+                <a:tc>
+                  <a:txBody>
+                    <a:bodyPr/>
+                    <a:lstStyle/>
+                    <a:p>
+                      <a:pPr algn="l"/>
+                      <a:r>
+                        <a:rPr lang="en-US" sz="1600" dirty="0"/>
+                        <a:t>Method Signature</a:t>
+                      </a:r>
+                    </a:p>
+                  </a:txBody>
+                  <a:tcPr marL="129257" marR="129257" anchor="ctr"/>
+                </a:tc>
+                <a:tc>
+                  <a:txBody>
+                    <a:bodyPr/>
+                    <a:lstStyle/>
+                    <a:p>
+                      <a:pPr algn="l"/>
+                      <a:r>
+                        <a:rPr lang="en-US" sz="1600"/>
+                        <a:t>Description</a:t>
+                      </a:r>
+                    </a:p>
+                  </a:txBody>
+                  <a:tcPr marL="129257" marR="129257" anchor="ctr"/>
+                </a:tc>
+              </a:tr>
+              <a:tr h="370840">
+                <a:tc>
+                  <a:txBody>
+                    <a:bodyPr/>
+                    <a:lstStyle/>
+                    <a:p>
+                      <a:pPr algn="l"/>
+                      <a:r>
+                        <a:rPr lang="en-US" sz="1600"/>
+                        <a:t>boolean add(E e)</a:t>
+                      </a:r>
+                    </a:p>
+                  </a:txBody>
+                  <a:tcPr marL="129257" marR="129257" anchor="ctr"/>
+                </a:tc>
+                <a:tc>
+                  <a:txBody>
+                    <a:bodyPr/>
+                    <a:lstStyle/>
+                    <a:p>
+                      <a:pPr algn="l"/>
+                      <a:r>
+                        <a:rPr lang="en-US" sz="1600"/>
+                        <a:t>Add an element, </a:t>
+                      </a:r>
+                      <a:r>
+                        <a:rPr lang="en-US" sz="1600" i="1"/>
+                        <a:t>e</a:t>
+                      </a:r>
+                      <a:r>
+                        <a:rPr lang="en-US" sz="1600"/>
+                        <a:t> of type </a:t>
+                      </a:r>
+                      <a:r>
+                        <a:rPr lang="en-US" sz="1600" i="1"/>
+                        <a:t>E</a:t>
+                      </a:r>
+                      <a:r>
+                        <a:rPr lang="en-US" sz="1600"/>
+                        <a:t> to the collection; returns true if the element is added and false otherwise</a:t>
+                      </a:r>
+                    </a:p>
+                  </a:txBody>
+                  <a:tcPr marL="129257" marR="129257" anchor="ctr"/>
+                </a:tc>
+              </a:tr>
+              <a:tr h="370840">
+                <a:tc>
+                  <a:txBody>
+                    <a:bodyPr/>
+                    <a:lstStyle/>
+                    <a:p>
+                      <a:pPr algn="l"/>
+                      <a:r>
+                        <a:rPr lang="en-US" sz="1600"/>
+                        <a:t>void clear()</a:t>
+                      </a:r>
+                    </a:p>
+                  </a:txBody>
+                  <a:tcPr marL="129257" marR="129257" anchor="ctr"/>
+                </a:tc>
+                <a:tc>
+                  <a:txBody>
+                    <a:bodyPr/>
+                    <a:lstStyle/>
+                    <a:p>
+                      <a:pPr algn="l"/>
+                      <a:r>
+                        <a:rPr lang="en-US" sz="1600"/>
+                        <a:t>Remove all elements from the collection</a:t>
+                      </a:r>
+                    </a:p>
+                  </a:txBody>
+                  <a:tcPr marL="129257" marR="129257" anchor="ctr"/>
+                </a:tc>
+              </a:tr>
+              <a:tr h="370840">
+                <a:tc>
+                  <a:txBody>
+                    <a:bodyPr/>
+                    <a:lstStyle/>
+                    <a:p>
+                      <a:pPr algn="l"/>
+                      <a:r>
+                        <a:rPr lang="en-US" sz="1600"/>
+                        <a:t>boolean contains(Object o)</a:t>
+                      </a:r>
+                    </a:p>
+                  </a:txBody>
+                  <a:tcPr marL="129257" marR="129257" anchor="ctr"/>
+                </a:tc>
+                <a:tc>
+                  <a:txBody>
+                    <a:bodyPr/>
+                    <a:lstStyle/>
+                    <a:p>
+                      <a:pPr algn="l"/>
+                      <a:r>
+                        <a:rPr lang="en-US" sz="1600" dirty="0"/>
+                        <a:t>Returns true if the element </a:t>
+                      </a:r>
+                      <a:r>
+                        <a:rPr lang="en-US" sz="1600" i="1" dirty="0"/>
+                        <a:t>o</a:t>
+                      </a:r>
+                      <a:r>
+                        <a:rPr lang="en-US" sz="1600" dirty="0"/>
+                        <a:t> is present in the collection and false otherwise</a:t>
+                      </a:r>
+                    </a:p>
+                  </a:txBody>
+                  <a:tcPr marL="129257" marR="129257" anchor="ctr"/>
+                </a:tc>
+              </a:tr>
+              <a:tr h="370840">
+                <a:tc>
+                  <a:txBody>
+                    <a:bodyPr/>
+                    <a:lstStyle/>
+                    <a:p>
+                      <a:pPr algn="l"/>
+                      <a:r>
+                        <a:rPr lang="en-US" sz="1600" dirty="0" err="1"/>
+                        <a:t>boolean</a:t>
+                      </a:r>
+                      <a:r>
+                        <a:rPr lang="en-US" sz="1600" dirty="0"/>
+                        <a:t> </a:t>
+                      </a:r>
+                      <a:r>
+                        <a:rPr lang="en-US" sz="1600" dirty="0" err="1"/>
+                        <a:t>isEmpty</a:t>
+                      </a:r>
+                      <a:r>
+                        <a:rPr lang="en-US" sz="1600" dirty="0"/>
+                        <a:t>()</a:t>
+                      </a:r>
+                    </a:p>
+                  </a:txBody>
+                  <a:tcPr marL="129257" marR="129257" anchor="ctr"/>
+                </a:tc>
+                <a:tc>
+                  <a:txBody>
+                    <a:bodyPr/>
+                    <a:lstStyle/>
+                    <a:p>
+                      <a:pPr algn="l"/>
+                      <a:r>
+                        <a:rPr lang="en-US" sz="1600"/>
+                        <a:t>Returns true when the collection has no elements and false otherwise</a:t>
+                      </a:r>
+                    </a:p>
+                  </a:txBody>
+                  <a:tcPr marL="129257" marR="129257" anchor="ctr"/>
+                </a:tc>
+              </a:tr>
+              <a:tr h="370840">
+                <a:tc>
+                  <a:txBody>
+                    <a:bodyPr/>
+                    <a:lstStyle/>
+                    <a:p>
+                      <a:pPr algn="l"/>
+                      <a:r>
+                        <a:rPr lang="en-US" sz="1600"/>
+                        <a:t>boolean remove(Object o)</a:t>
+                      </a:r>
+                    </a:p>
+                  </a:txBody>
+                  <a:tcPr marL="129257" marR="129257" anchor="ctr"/>
+                </a:tc>
+                <a:tc>
+                  <a:txBody>
+                    <a:bodyPr/>
+                    <a:lstStyle/>
+                    <a:p>
+                      <a:pPr algn="l"/>
+                      <a:r>
+                        <a:rPr lang="en-US" sz="1600"/>
+                        <a:t>Removes the element identified as </a:t>
+                      </a:r>
+                      <a:r>
+                        <a:rPr lang="en-US" sz="1600" i="1"/>
+                        <a:t>o</a:t>
+                      </a:r>
+                      <a:r>
+                        <a:rPr lang="en-US" sz="1600"/>
+                        <a:t> from the collection; returns true if the element is removed and false otherwise</a:t>
+                      </a:r>
+                    </a:p>
+                  </a:txBody>
+                  <a:tcPr marL="129257" marR="129257" anchor="ctr"/>
+                </a:tc>
+              </a:tr>
+              <a:tr h="370840">
+                <a:tc>
+                  <a:txBody>
+                    <a:bodyPr/>
+                    <a:lstStyle/>
+                    <a:p>
+                      <a:pPr algn="l"/>
+                      <a:r>
+                        <a:rPr lang="en-US" sz="1600"/>
+                        <a:t>int size()</a:t>
+                      </a:r>
+                    </a:p>
+                  </a:txBody>
+                  <a:tcPr marL="129257" marR="129257" anchor="ctr"/>
+                </a:tc>
+                <a:tc>
+                  <a:txBody>
+                    <a:bodyPr/>
+                    <a:lstStyle/>
+                    <a:p>
+                      <a:pPr algn="l"/>
+                      <a:r>
+                        <a:rPr lang="en-US" sz="1600"/>
+                        <a:t>Returns the number of elements in the collection or java.lang.Integer.MAX_VALUE if there are more elements than the the largest value represented by an int</a:t>
+                      </a:r>
+                    </a:p>
+                  </a:txBody>
+                  <a:tcPr marL="129257" marR="129257" anchor="ctr"/>
+                </a:tc>
+              </a:tr>
+              <a:tr h="370840">
+                <a:tc>
+                  <a:txBody>
+                    <a:bodyPr/>
+                    <a:lstStyle/>
+                    <a:p>
+                      <a:pPr algn="l"/>
+                      <a:r>
+                        <a:rPr lang="en-US" sz="1600"/>
+                        <a:t>Object[] toArray()</a:t>
+                      </a:r>
+                    </a:p>
+                  </a:txBody>
+                  <a:tcPr marL="129257" marR="129257" anchor="ctr"/>
+                </a:tc>
+                <a:tc>
+                  <a:txBody>
+                    <a:bodyPr/>
+                    <a:lstStyle/>
+                    <a:p>
+                      <a:pPr algn="l"/>
+                      <a:r>
+                        <a:rPr lang="en-US" sz="1600" dirty="0"/>
+                        <a:t>Returns an array containing all the elements stored in the collection</a:t>
+                      </a:r>
+                    </a:p>
+                  </a:txBody>
+                  <a:tcPr marL="129257" marR="129257" anchor="ctr"/>
+                </a:tc>
+              </a:tr>
+            </a:tbl>
+          </a:graphicData>
+        </a:graphic>
+      </p:graphicFrame>
       <p:sp>
         <p:nvSpPr>
           <p:cNvPr id="2" name="Slide Number Placeholder 1"/>
@@ -6950,7 +6922,7 @@
     </p:spTree>
     <p:extLst>
       <p:ext uri="{BB962C8B-B14F-4D97-AF65-F5344CB8AC3E}">
-        <p14:creationId xmlns:p14="http://schemas.microsoft.com/office/powerpoint/2010/main" val="636289610"/>
+        <p14:creationId xmlns:p14="http://schemas.microsoft.com/office/powerpoint/2010/main" val="431935434"/>
       </p:ext>
     </p:extLst>
   </p:cSld>
@@ -6979,7 +6951,7 @@
       </p:grpSpPr>
       <p:sp>
         <p:nvSpPr>
-          <p:cNvPr id="9" name="Title 8"/>
+          <p:cNvPr id="4" name="Title 3"/>
           <p:cNvSpPr>
             <a:spLocks noGrp="1"/>
           </p:cNvSpPr>
@@ -6989,37 +6961,74 @@
         </p:nvSpPr>
         <p:spPr/>
         <p:txBody>
-          <a:bodyPr/>
-          <a:lstStyle/>
-          <a:p>
-            <a:r>
-              <a:rPr lang="en-US" dirty="0" smtClean="0"/>
-              <a:t>Introduction to Object-Oriented Programming Topics</a:t>
-            </a:r>
-            <a:endParaRPr lang="en-US" dirty="0"/>
-          </a:p>
-        </p:txBody>
-      </p:sp>
-      <p:sp>
-        <p:nvSpPr>
-          <p:cNvPr id="10" name="Text Placeholder 9"/>
-          <p:cNvSpPr>
-            <a:spLocks noGrp="1"/>
-          </p:cNvSpPr>
-          <p:nvPr>
-            <p:ph type="body" idx="1"/>
-          </p:nvPr>
-        </p:nvSpPr>
-        <p:spPr/>
-        <p:txBody>
-          <a:bodyPr/>
-          <a:lstStyle/>
-          <a:p>
-            <a:r>
-              <a:rPr lang="en-US" dirty="0" smtClean="0"/>
-              <a:t>Classes, Instances, Interfaces, and Objects</a:t>
-            </a:r>
-            <a:endParaRPr lang="en-US" dirty="0"/>
+          <a:bodyPr>
+            <a:normAutofit/>
+          </a:bodyPr>
+          <a:lstStyle/>
+          <a:p>
+            <a:r>
+              <a:rPr lang="en-US" sz="4800" dirty="0" smtClean="0"/>
+              <a:t>Primitive Type Wrappers</a:t>
+            </a:r>
+            <a:endParaRPr lang="en-US" sz="4800" dirty="0"/>
+          </a:p>
+        </p:txBody>
+      </p:sp>
+      <p:sp>
+        <p:nvSpPr>
+          <p:cNvPr id="5" name="Content Placeholder 4"/>
+          <p:cNvSpPr>
+            <a:spLocks noGrp="1"/>
+          </p:cNvSpPr>
+          <p:nvPr>
+            <p:ph idx="1"/>
+          </p:nvPr>
+        </p:nvSpPr>
+        <p:spPr/>
+        <p:txBody>
+          <a:bodyPr anchor="ctr">
+            <a:normAutofit/>
+          </a:bodyPr>
+          <a:lstStyle/>
+          <a:p>
+            <a:r>
+              <a:rPr lang="en-US" sz="2800" dirty="0" smtClean="0"/>
+              <a:t>Objects created from classes implementing the Collection interface cannot store elements with primitive types</a:t>
+            </a:r>
+          </a:p>
+          <a:p>
+            <a:r>
+              <a:rPr lang="en-US" sz="2800" dirty="0" smtClean="0"/>
+              <a:t>Special classes exist to represent primitive types</a:t>
+            </a:r>
+          </a:p>
+          <a:p>
+            <a:pPr lvl="1"/>
+            <a:r>
+              <a:rPr lang="en-US" sz="2800" dirty="0" smtClean="0"/>
+              <a:t>Boolean</a:t>
+            </a:r>
+          </a:p>
+          <a:p>
+            <a:pPr lvl="1"/>
+            <a:r>
+              <a:rPr lang="en-US" sz="2800" dirty="0" smtClean="0"/>
+              <a:t>Character</a:t>
+            </a:r>
+          </a:p>
+          <a:p>
+            <a:pPr lvl="1"/>
+            <a:r>
+              <a:rPr lang="en-US" sz="2800" dirty="0" smtClean="0"/>
+              <a:t>Float and Double</a:t>
+            </a:r>
+          </a:p>
+          <a:p>
+            <a:pPr lvl="1"/>
+            <a:r>
+              <a:rPr lang="en-US" sz="2800" dirty="0" smtClean="0"/>
+              <a:t>Byte, Short, Integer, and Long</a:t>
+            </a:r>
           </a:p>
         </p:txBody>
       </p:sp>
@@ -7051,7 +7060,7 @@
     </p:spTree>
     <p:extLst>
       <p:ext uri="{BB962C8B-B14F-4D97-AF65-F5344CB8AC3E}">
-        <p14:creationId xmlns:p14="http://schemas.microsoft.com/office/powerpoint/2010/main" val="797379249"/>
+        <p14:creationId xmlns:p14="http://schemas.microsoft.com/office/powerpoint/2010/main" val="984603941"/>
       </p:ext>
     </p:extLst>
   </p:cSld>
@@ -7090,14 +7099,16 @@
         </p:nvSpPr>
         <p:spPr/>
         <p:txBody>
-          <a:bodyPr/>
-          <a:lstStyle/>
-          <a:p>
-            <a:r>
-              <a:rPr lang="en-US" dirty="0" smtClean="0"/>
-              <a:t>Definitions</a:t>
-            </a:r>
-            <a:endParaRPr lang="en-US" dirty="0"/>
+          <a:bodyPr>
+            <a:normAutofit/>
+          </a:bodyPr>
+          <a:lstStyle/>
+          <a:p>
+            <a:r>
+              <a:rPr lang="en-US" sz="4800" dirty="0" smtClean="0"/>
+              <a:t>Packages</a:t>
+            </a:r>
+            <a:endParaRPr lang="en-US" sz="4800" dirty="0"/>
           </a:p>
         </p:txBody>
       </p:sp>
@@ -7118,165 +7129,44 @@
           </a:bodyPr>
           <a:lstStyle/>
           <a:p>
-            <a:pPr>
-              <a:lnSpc>
-                <a:spcPct val="100000"/>
-              </a:lnSpc>
-              <a:spcBef>
-                <a:spcPts val="0"/>
-              </a:spcBef>
-              <a:spcAft>
-                <a:spcPts val="600"/>
-              </a:spcAft>
-            </a:pPr>
-            <a:r>
-              <a:rPr lang="en-US" sz="2400" dirty="0" smtClean="0">
-                <a:ea typeface="Consolas" charset="0"/>
-                <a:cs typeface="Consolas" charset="0"/>
-              </a:rPr>
-              <a:t>An </a:t>
-            </a:r>
-            <a:r>
-              <a:rPr lang="en-US" sz="2400" b="1" i="1" dirty="0" smtClean="0">
-                <a:ea typeface="Consolas" charset="0"/>
-                <a:cs typeface="Consolas" charset="0"/>
-              </a:rPr>
-              <a:t>class </a:t>
-            </a:r>
-            <a:r>
-              <a:rPr lang="en-US" sz="2400" dirty="0" smtClean="0">
-                <a:ea typeface="Consolas" charset="0"/>
-                <a:cs typeface="Consolas" charset="0"/>
-              </a:rPr>
-              <a:t>specifies a structure consisting of data attributes and code for acting on these attributes</a:t>
-            </a:r>
-          </a:p>
-          <a:p>
-            <a:pPr>
-              <a:lnSpc>
-                <a:spcPct val="100000"/>
-              </a:lnSpc>
-              <a:spcBef>
-                <a:spcPts val="0"/>
-              </a:spcBef>
-              <a:spcAft>
-                <a:spcPts val="600"/>
-              </a:spcAft>
-            </a:pPr>
-            <a:r>
-              <a:rPr lang="en-US" sz="2400" dirty="0" smtClean="0">
-                <a:ea typeface="Consolas" charset="0"/>
-                <a:cs typeface="Consolas" charset="0"/>
-              </a:rPr>
-              <a:t>An </a:t>
-            </a:r>
-            <a:r>
-              <a:rPr lang="en-US" sz="2400" b="1" i="1" dirty="0" smtClean="0">
-                <a:ea typeface="Consolas" charset="0"/>
-                <a:cs typeface="Consolas" charset="0"/>
-              </a:rPr>
-              <a:t>object</a:t>
-            </a:r>
-            <a:r>
-              <a:rPr lang="en-US" sz="2400" b="1" dirty="0" smtClean="0">
-                <a:ea typeface="Consolas" charset="0"/>
-                <a:cs typeface="Consolas" charset="0"/>
-              </a:rPr>
-              <a:t> </a:t>
-            </a:r>
-            <a:r>
-              <a:rPr lang="en-US" sz="2400" dirty="0" smtClean="0">
-                <a:ea typeface="Consolas" charset="0"/>
-                <a:cs typeface="Consolas" charset="0"/>
-              </a:rPr>
-              <a:t>is a specific instance of a class, created with the </a:t>
-            </a:r>
-            <a:r>
-              <a:rPr lang="en-US" sz="2400" i="1" dirty="0" smtClean="0">
-                <a:ea typeface="Consolas" charset="0"/>
-                <a:cs typeface="Consolas" charset="0"/>
-              </a:rPr>
-              <a:t>new</a:t>
-            </a:r>
-            <a:r>
-              <a:rPr lang="en-US" sz="2400" dirty="0" smtClean="0">
-                <a:ea typeface="Consolas" charset="0"/>
-                <a:cs typeface="Consolas" charset="0"/>
-              </a:rPr>
-              <a:t> operator,  allowing us to use specific values for attributes</a:t>
-            </a:r>
-          </a:p>
-          <a:p>
-            <a:pPr>
-              <a:lnSpc>
-                <a:spcPct val="100000"/>
-              </a:lnSpc>
-              <a:spcBef>
-                <a:spcPts val="0"/>
-              </a:spcBef>
-              <a:spcAft>
-                <a:spcPts val="600"/>
-              </a:spcAft>
-            </a:pPr>
-            <a:r>
-              <a:rPr lang="en-US" sz="2400" dirty="0" smtClean="0">
-                <a:ea typeface="Consolas" charset="0"/>
-                <a:cs typeface="Consolas" charset="0"/>
-              </a:rPr>
-              <a:t>An </a:t>
-            </a:r>
-            <a:r>
-              <a:rPr lang="en-US" sz="2400" b="1" i="1" dirty="0" smtClean="0">
-                <a:ea typeface="Consolas" charset="0"/>
-                <a:cs typeface="Consolas" charset="0"/>
-              </a:rPr>
-              <a:t>instance method</a:t>
-            </a:r>
-            <a:r>
-              <a:rPr lang="en-US" sz="2400" dirty="0" smtClean="0">
-                <a:ea typeface="Consolas" charset="0"/>
-                <a:cs typeface="Consolas" charset="0"/>
-              </a:rPr>
-              <a:t> allow us to use or alter values unique to a given object</a:t>
-            </a:r>
-          </a:p>
-          <a:p>
-            <a:pPr>
-              <a:lnSpc>
-                <a:spcPct val="100000"/>
-              </a:lnSpc>
-              <a:spcBef>
-                <a:spcPts val="0"/>
-              </a:spcBef>
-              <a:spcAft>
-                <a:spcPts val="600"/>
-              </a:spcAft>
-            </a:pPr>
-            <a:r>
-              <a:rPr lang="en-US" sz="2400" dirty="0" smtClean="0">
-                <a:ea typeface="Consolas" charset="0"/>
-                <a:cs typeface="Consolas" charset="0"/>
-              </a:rPr>
-              <a:t>An </a:t>
-            </a:r>
-            <a:r>
-              <a:rPr lang="en-US" sz="2400" b="1" i="1" dirty="0" smtClean="0">
-                <a:ea typeface="Consolas" charset="0"/>
-                <a:cs typeface="Consolas" charset="0"/>
-              </a:rPr>
-              <a:t>interface </a:t>
-            </a:r>
-            <a:r>
-              <a:rPr lang="en-US" sz="2400" dirty="0" smtClean="0">
-                <a:ea typeface="Consolas" charset="0"/>
-                <a:cs typeface="Consolas" charset="0"/>
-              </a:rPr>
-              <a:t>specifies what attributes or methods a class will have.</a:t>
-            </a:r>
-            <a:endParaRPr lang="en-US" sz="2400" dirty="0">
-              <a:ea typeface="Consolas" charset="0"/>
-              <a:cs typeface="Consolas" charset="0"/>
-            </a:endParaRPr>
+            <a:r>
+              <a:rPr lang="en-US" sz="3200" dirty="0" smtClean="0"/>
+              <a:t>Unique namespace that contains classes and sub-packages</a:t>
+            </a:r>
+          </a:p>
+          <a:p>
+            <a:r>
+              <a:rPr lang="en-US" sz="3200" dirty="0" smtClean="0"/>
+              <a:t>Allow us to organize code similar to a folder structure for files</a:t>
+            </a:r>
+          </a:p>
+          <a:p>
+            <a:r>
+              <a:rPr lang="en-US" sz="3200" dirty="0" smtClean="0"/>
+              <a:t>Declare packages with </a:t>
+            </a:r>
+            <a:r>
+              <a:rPr lang="en-US" sz="3200" i="1" dirty="0" smtClean="0"/>
+              <a:t>package</a:t>
+            </a:r>
+            <a:r>
+              <a:rPr lang="en-US" sz="3200" dirty="0" smtClean="0"/>
+              <a:t> statement</a:t>
+            </a:r>
+          </a:p>
+          <a:p>
+            <a:r>
+              <a:rPr lang="en-US" sz="3200" dirty="0" smtClean="0"/>
+              <a:t>Use packages with the </a:t>
+            </a:r>
+            <a:r>
+              <a:rPr lang="en-US" sz="3200" i="1" dirty="0" smtClean="0"/>
+              <a:t>import</a:t>
+            </a:r>
+            <a:r>
+              <a:rPr lang="en-US" sz="3200" dirty="0" smtClean="0"/>
+              <a:t> statement</a:t>
+            </a:r>
           </a:p>
         </p:txBody>
       </p:sp>
@@ -7308,7 +7198,7 @@
     </p:spTree>
     <p:extLst>
       <p:ext uri="{BB962C8B-B14F-4D97-AF65-F5344CB8AC3E}">
-        <p14:creationId xmlns:p14="http://schemas.microsoft.com/office/powerpoint/2010/main" val="1548663387"/>
+        <p14:creationId xmlns:p14="http://schemas.microsoft.com/office/powerpoint/2010/main" val="6759569"/>
       </p:ext>
     </p:extLst>
   </p:cSld>
@@ -7337,7 +7227,7 @@
       </p:grpSpPr>
       <p:sp>
         <p:nvSpPr>
-          <p:cNvPr id="4" name="Title 3"/>
+          <p:cNvPr id="2" name="Title 1"/>
           <p:cNvSpPr>
             <a:spLocks noGrp="1"/>
           </p:cNvSpPr>
@@ -7352,332 +7242,38 @@
           <a:p>
             <a:r>
               <a:rPr lang="en-US" dirty="0" smtClean="0"/>
-              <a:t>Collection Interface</a:t>
-            </a:r>
-            <a:endParaRPr lang="en-US" dirty="0"/>
-          </a:p>
-        </p:txBody>
-      </p:sp>
-      <p:graphicFrame>
-        <p:nvGraphicFramePr>
-          <p:cNvPr id="7" name="Content Placeholder 6"/>
-          <p:cNvGraphicFramePr>
-            <a:graphicFrameLocks noGrp="1"/>
-          </p:cNvGraphicFramePr>
-          <p:nvPr>
-            <p:ph idx="1"/>
-            <p:extLst>
-              <p:ext uri="{D42A27DB-BD31-4B8C-83A1-F6EECF244321}">
-                <p14:modId xmlns:p14="http://schemas.microsoft.com/office/powerpoint/2010/main" val="1935234159"/>
-              </p:ext>
-            </p:extLst>
-          </p:nvPr>
-        </p:nvGraphicFramePr>
-        <p:xfrm>
-          <a:off x="1262063" y="1828800"/>
-          <a:ext cx="8594726" cy="4460240"/>
-        </p:xfrm>
-        <a:graphic>
-          <a:graphicData uri="http://schemas.openxmlformats.org/drawingml/2006/table">
-            <a:tbl>
-              <a:tblPr firstRow="1" bandRow="1">
-                <a:tableStyleId>{5C22544A-7EE6-4342-B048-85BDC9FD1C3A}</a:tableStyleId>
-              </a:tblPr>
-              <a:tblGrid>
-                <a:gridCol w="2770675"/>
-                <a:gridCol w="5824051"/>
-              </a:tblGrid>
-              <a:tr h="370840">
-                <a:tc>
-                  <a:txBody>
-                    <a:bodyPr/>
-                    <a:lstStyle/>
-                    <a:p>
-                      <a:pPr algn="l"/>
-                      <a:r>
-                        <a:rPr lang="en-US" sz="1600" dirty="0"/>
-                        <a:t>Method Signature</a:t>
-                      </a:r>
-                    </a:p>
-                  </a:txBody>
-                  <a:tcPr marL="129257" marR="129257" anchor="ctr"/>
-                </a:tc>
-                <a:tc>
-                  <a:txBody>
-                    <a:bodyPr/>
-                    <a:lstStyle/>
-                    <a:p>
-                      <a:pPr algn="l"/>
-                      <a:r>
-                        <a:rPr lang="en-US" sz="1600"/>
-                        <a:t>Description</a:t>
-                      </a:r>
-                    </a:p>
-                  </a:txBody>
-                  <a:tcPr marL="129257" marR="129257" anchor="ctr"/>
-                </a:tc>
-              </a:tr>
-              <a:tr h="370840">
-                <a:tc>
-                  <a:txBody>
-                    <a:bodyPr/>
-                    <a:lstStyle/>
-                    <a:p>
-                      <a:pPr algn="l"/>
-                      <a:r>
-                        <a:rPr lang="en-US" sz="1600"/>
-                        <a:t>boolean add(E e)</a:t>
-                      </a:r>
-                    </a:p>
-                  </a:txBody>
-                  <a:tcPr marL="129257" marR="129257" anchor="ctr"/>
-                </a:tc>
-                <a:tc>
-                  <a:txBody>
-                    <a:bodyPr/>
-                    <a:lstStyle/>
-                    <a:p>
-                      <a:pPr algn="l"/>
-                      <a:r>
-                        <a:rPr lang="en-US" sz="1600"/>
-                        <a:t>Add an element, </a:t>
-                      </a:r>
-                      <a:r>
-                        <a:rPr lang="en-US" sz="1600" i="1"/>
-                        <a:t>e</a:t>
-                      </a:r>
-                      <a:r>
-                        <a:rPr lang="en-US" sz="1600"/>
-                        <a:t> of type </a:t>
-                      </a:r>
-                      <a:r>
-                        <a:rPr lang="en-US" sz="1600" i="1"/>
-                        <a:t>E</a:t>
-                      </a:r>
-                      <a:r>
-                        <a:rPr lang="en-US" sz="1600"/>
-                        <a:t> to the collection; returns true if the element is added and false otherwise</a:t>
-                      </a:r>
-                    </a:p>
-                  </a:txBody>
-                  <a:tcPr marL="129257" marR="129257" anchor="ctr"/>
-                </a:tc>
-              </a:tr>
-              <a:tr h="370840">
-                <a:tc>
-                  <a:txBody>
-                    <a:bodyPr/>
-                    <a:lstStyle/>
-                    <a:p>
-                      <a:pPr algn="l"/>
-                      <a:r>
-                        <a:rPr lang="en-US" sz="1600"/>
-                        <a:t>void clear()</a:t>
-                      </a:r>
-                    </a:p>
-                  </a:txBody>
-                  <a:tcPr marL="129257" marR="129257" anchor="ctr"/>
-                </a:tc>
-                <a:tc>
-                  <a:txBody>
-                    <a:bodyPr/>
-                    <a:lstStyle/>
-                    <a:p>
-                      <a:pPr algn="l"/>
-                      <a:r>
-                        <a:rPr lang="en-US" sz="1600"/>
-                        <a:t>Remove all elements from the collection</a:t>
-                      </a:r>
-                    </a:p>
-                  </a:txBody>
-                  <a:tcPr marL="129257" marR="129257" anchor="ctr"/>
-                </a:tc>
-              </a:tr>
-              <a:tr h="370840">
-                <a:tc>
-                  <a:txBody>
-                    <a:bodyPr/>
-                    <a:lstStyle/>
-                    <a:p>
-                      <a:pPr algn="l"/>
-                      <a:r>
-                        <a:rPr lang="en-US" sz="1600"/>
-                        <a:t>boolean contains(Object o)</a:t>
-                      </a:r>
-                    </a:p>
-                  </a:txBody>
-                  <a:tcPr marL="129257" marR="129257" anchor="ctr"/>
-                </a:tc>
-                <a:tc>
-                  <a:txBody>
-                    <a:bodyPr/>
-                    <a:lstStyle/>
-                    <a:p>
-                      <a:pPr algn="l"/>
-                      <a:r>
-                        <a:rPr lang="en-US" sz="1600" dirty="0"/>
-                        <a:t>Returns true if the element </a:t>
-                      </a:r>
-                      <a:r>
-                        <a:rPr lang="en-US" sz="1600" i="1" dirty="0"/>
-                        <a:t>o</a:t>
-                      </a:r>
-                      <a:r>
-                        <a:rPr lang="en-US" sz="1600" dirty="0"/>
-                        <a:t> is present in the collection and false otherwise</a:t>
-                      </a:r>
-                    </a:p>
-                  </a:txBody>
-                  <a:tcPr marL="129257" marR="129257" anchor="ctr"/>
-                </a:tc>
-              </a:tr>
-              <a:tr h="370840">
-                <a:tc>
-                  <a:txBody>
-                    <a:bodyPr/>
-                    <a:lstStyle/>
-                    <a:p>
-                      <a:pPr algn="l"/>
-                      <a:r>
-                        <a:rPr lang="en-US" sz="1600" dirty="0" err="1"/>
-                        <a:t>boolean</a:t>
-                      </a:r>
-                      <a:r>
-                        <a:rPr lang="en-US" sz="1600" dirty="0"/>
-                        <a:t> </a:t>
-                      </a:r>
-                      <a:r>
-                        <a:rPr lang="en-US" sz="1600" dirty="0" err="1"/>
-                        <a:t>isEmpty</a:t>
-                      </a:r>
-                      <a:r>
-                        <a:rPr lang="en-US" sz="1600" dirty="0"/>
-                        <a:t>()</a:t>
-                      </a:r>
-                    </a:p>
-                  </a:txBody>
-                  <a:tcPr marL="129257" marR="129257" anchor="ctr"/>
-                </a:tc>
-                <a:tc>
-                  <a:txBody>
-                    <a:bodyPr/>
-                    <a:lstStyle/>
-                    <a:p>
-                      <a:pPr algn="l"/>
-                      <a:r>
-                        <a:rPr lang="en-US" sz="1600"/>
-                        <a:t>Returns true when the collection has no elements and false otherwise</a:t>
-                      </a:r>
-                    </a:p>
-                  </a:txBody>
-                  <a:tcPr marL="129257" marR="129257" anchor="ctr"/>
-                </a:tc>
-              </a:tr>
-              <a:tr h="370840">
-                <a:tc>
-                  <a:txBody>
-                    <a:bodyPr/>
-                    <a:lstStyle/>
-                    <a:p>
-                      <a:pPr algn="l"/>
-                      <a:r>
-                        <a:rPr lang="en-US" sz="1600"/>
-                        <a:t>boolean remove(Object o)</a:t>
-                      </a:r>
-                    </a:p>
-                  </a:txBody>
-                  <a:tcPr marL="129257" marR="129257" anchor="ctr"/>
-                </a:tc>
-                <a:tc>
-                  <a:txBody>
-                    <a:bodyPr/>
-                    <a:lstStyle/>
-                    <a:p>
-                      <a:pPr algn="l"/>
-                      <a:r>
-                        <a:rPr lang="en-US" sz="1600"/>
-                        <a:t>Removes the element identified as </a:t>
-                      </a:r>
-                      <a:r>
-                        <a:rPr lang="en-US" sz="1600" i="1"/>
-                        <a:t>o</a:t>
-                      </a:r>
-                      <a:r>
-                        <a:rPr lang="en-US" sz="1600"/>
-                        <a:t> from the collection; returns true if the element is removed and false otherwise</a:t>
-                      </a:r>
-                    </a:p>
-                  </a:txBody>
-                  <a:tcPr marL="129257" marR="129257" anchor="ctr"/>
-                </a:tc>
-              </a:tr>
-              <a:tr h="370840">
-                <a:tc>
-                  <a:txBody>
-                    <a:bodyPr/>
-                    <a:lstStyle/>
-                    <a:p>
-                      <a:pPr algn="l"/>
-                      <a:r>
-                        <a:rPr lang="en-US" sz="1600"/>
-                        <a:t>int size()</a:t>
-                      </a:r>
-                    </a:p>
-                  </a:txBody>
-                  <a:tcPr marL="129257" marR="129257" anchor="ctr"/>
-                </a:tc>
-                <a:tc>
-                  <a:txBody>
-                    <a:bodyPr/>
-                    <a:lstStyle/>
-                    <a:p>
-                      <a:pPr algn="l"/>
-                      <a:r>
-                        <a:rPr lang="en-US" sz="1600"/>
-                        <a:t>Returns the number of elements in the collection or java.lang.Integer.MAX_VALUE if there are more elements than the the largest value represented by an int</a:t>
-                      </a:r>
-                    </a:p>
-                  </a:txBody>
-                  <a:tcPr marL="129257" marR="129257" anchor="ctr"/>
-                </a:tc>
-              </a:tr>
-              <a:tr h="370840">
-                <a:tc>
-                  <a:txBody>
-                    <a:bodyPr/>
-                    <a:lstStyle/>
-                    <a:p>
-                      <a:pPr algn="l"/>
-                      <a:r>
-                        <a:rPr lang="en-US" sz="1600"/>
-                        <a:t>Object[] toArray()</a:t>
-                      </a:r>
-                    </a:p>
-                  </a:txBody>
-                  <a:tcPr marL="129257" marR="129257" anchor="ctr"/>
-                </a:tc>
-                <a:tc>
-                  <a:txBody>
-                    <a:bodyPr/>
-                    <a:lstStyle/>
-                    <a:p>
-                      <a:pPr algn="l"/>
-                      <a:r>
-                        <a:rPr lang="en-US" sz="1600" dirty="0"/>
-                        <a:t>Returns an array containing all the elements stored in the collection</a:t>
-                      </a:r>
-                    </a:p>
-                  </a:txBody>
-                  <a:tcPr marL="129257" marR="129257" anchor="ctr"/>
-                </a:tc>
-              </a:tr>
-            </a:tbl>
-          </a:graphicData>
-        </a:graphic>
-      </p:graphicFrame>
-      <p:sp>
-        <p:nvSpPr>
-          <p:cNvPr id="2" name="Slide Number Placeholder 1"/>
+              <a:t>Lists</a:t>
+            </a:r>
+            <a:endParaRPr lang="en-US" dirty="0"/>
+          </a:p>
+        </p:txBody>
+      </p:sp>
+      <p:sp>
+        <p:nvSpPr>
+          <p:cNvPr id="3" name="Text Placeholder 2"/>
+          <p:cNvSpPr>
+            <a:spLocks noGrp="1"/>
+          </p:cNvSpPr>
+          <p:nvPr>
+            <p:ph type="body" idx="1"/>
+          </p:nvPr>
+        </p:nvSpPr>
+        <p:spPr/>
+        <p:txBody>
+          <a:bodyPr/>
+          <a:lstStyle/>
+          <a:p>
+            <a:r>
+              <a:rPr lang="en-US" dirty="0" smtClean="0"/>
+              <a:t>An ordered collection of elements</a:t>
+            </a:r>
+            <a:endParaRPr lang="en-US" dirty="0"/>
+          </a:p>
+        </p:txBody>
+      </p:sp>
+      <p:sp>
+        <p:nvSpPr>
+          <p:cNvPr id="4" name="Slide Number Placeholder 3"/>
           <p:cNvSpPr>
             <a:spLocks noGrp="1"/>
           </p:cNvSpPr>
@@ -7703,7 +7299,7 @@
     </p:spTree>
     <p:extLst>
       <p:ext uri="{BB962C8B-B14F-4D97-AF65-F5344CB8AC3E}">
-        <p14:creationId xmlns:p14="http://schemas.microsoft.com/office/powerpoint/2010/main" val="431935434"/>
+        <p14:creationId xmlns:p14="http://schemas.microsoft.com/office/powerpoint/2010/main" val="657677305"/>
       </p:ext>
     </p:extLst>
   </p:cSld>

</xml_diff>

<commit_message>
week 4: correct typos
</commit_message>
<xml_diff>
--- a/week_04/week_04.pptx
+++ b/week_04/week_04.pptx
@@ -5,27 +5,26 @@
     <p:sldMasterId id="2147483840" r:id="rId1"/>
   </p:sldMasterIdLst>
   <p:notesMasterIdLst>
-    <p:notesMasterId r:id="rId20"/>
+    <p:notesMasterId r:id="rId19"/>
   </p:notesMasterIdLst>
   <p:sldIdLst>
     <p:sldId id="256" r:id="rId2"/>
-    <p:sldId id="276" r:id="rId3"/>
-    <p:sldId id="258" r:id="rId4"/>
-    <p:sldId id="278" r:id="rId5"/>
-    <p:sldId id="259" r:id="rId6"/>
-    <p:sldId id="280" r:id="rId7"/>
-    <p:sldId id="261" r:id="rId8"/>
-    <p:sldId id="262" r:id="rId9"/>
-    <p:sldId id="264" r:id="rId10"/>
-    <p:sldId id="263" r:id="rId11"/>
-    <p:sldId id="275" r:id="rId12"/>
-    <p:sldId id="265" r:id="rId13"/>
-    <p:sldId id="284" r:id="rId14"/>
-    <p:sldId id="286" r:id="rId15"/>
-    <p:sldId id="281" r:id="rId16"/>
-    <p:sldId id="282" r:id="rId17"/>
-    <p:sldId id="283" r:id="rId18"/>
-    <p:sldId id="273" r:id="rId19"/>
+    <p:sldId id="258" r:id="rId3"/>
+    <p:sldId id="278" r:id="rId4"/>
+    <p:sldId id="259" r:id="rId5"/>
+    <p:sldId id="280" r:id="rId6"/>
+    <p:sldId id="261" r:id="rId7"/>
+    <p:sldId id="262" r:id="rId8"/>
+    <p:sldId id="264" r:id="rId9"/>
+    <p:sldId id="263" r:id="rId10"/>
+    <p:sldId id="275" r:id="rId11"/>
+    <p:sldId id="265" r:id="rId12"/>
+    <p:sldId id="284" r:id="rId13"/>
+    <p:sldId id="286" r:id="rId14"/>
+    <p:sldId id="281" r:id="rId15"/>
+    <p:sldId id="282" r:id="rId16"/>
+    <p:sldId id="283" r:id="rId17"/>
+    <p:sldId id="273" r:id="rId18"/>
   </p:sldIdLst>
   <p:sldSz cx="12192000" cy="6858000"/>
   <p:notesSz cx="6858000" cy="9144000"/>
@@ -214,7 +213,7 @@
           <a:p>
             <a:fld id="{4E92CB9E-58B2-9B49-8C56-0B7366E3BE32}" type="datetimeFigureOut">
               <a:rPr lang="en-US" smtClean="0"/>
-              <a:t>9/21/16</a:t>
+              <a:t>2/7/17</a:t>
             </a:fld>
             <a:endParaRPr lang="en-US"/>
           </a:p>
@@ -734,7 +733,7 @@
           <a:p>
             <a:fld id="{FE38974B-290A-4C41-8C49-90C540DBAD36}" type="datetime1">
               <a:rPr lang="en-US" smtClean="0"/>
-              <a:t>9/21/16</a:t>
+              <a:t>2/7/17</a:t>
             </a:fld>
             <a:endParaRPr lang="en-US" dirty="0"/>
           </a:p>
@@ -958,7 +957,7 @@
           <a:p>
             <a:fld id="{526A4AFB-0AB9-C64E-8179-7877DAC57909}" type="datetime1">
               <a:rPr lang="en-US" smtClean="0"/>
-              <a:t>9/21/16</a:t>
+              <a:t>2/7/17</a:t>
             </a:fld>
             <a:endParaRPr lang="en-US" dirty="0"/>
           </a:p>
@@ -1133,7 +1132,7 @@
           <a:p>
             <a:fld id="{92036B75-4FC2-834D-944C-2AFE563E18B1}" type="datetime1">
               <a:rPr lang="en-US" smtClean="0"/>
-              <a:t>9/21/16</a:t>
+              <a:t>2/7/17</a:t>
             </a:fld>
             <a:endParaRPr lang="en-US" dirty="0"/>
           </a:p>
@@ -1298,7 +1297,7 @@
           <a:p>
             <a:fld id="{CE0AAB4F-7769-204D-B341-72A0C20F6B84}" type="datetime1">
               <a:rPr lang="en-US" smtClean="0"/>
-              <a:t>9/21/16</a:t>
+              <a:t>2/7/17</a:t>
             </a:fld>
             <a:endParaRPr lang="en-US" dirty="0"/>
           </a:p>
@@ -1547,7 +1546,7 @@
           <a:p>
             <a:fld id="{8F476637-351A-4D41-AF78-9B6899DEA63D}" type="datetime1">
               <a:rPr lang="en-US" smtClean="0"/>
-              <a:t>9/21/16</a:t>
+              <a:t>2/7/17</a:t>
             </a:fld>
             <a:endParaRPr lang="en-US" dirty="0"/>
           </a:p>
@@ -1868,7 +1867,7 @@
           <a:p>
             <a:fld id="{BC4F34A5-49A6-CD45-A142-1CA91A9111B8}" type="datetime1">
               <a:rPr lang="en-US" smtClean="0"/>
-              <a:t>9/21/16</a:t>
+              <a:t>2/7/17</a:t>
             </a:fld>
             <a:endParaRPr lang="en-US" dirty="0"/>
           </a:p>
@@ -2314,7 +2313,7 @@
           <a:p>
             <a:fld id="{B866243E-1468-7144-9EB5-2676D008A3F6}" type="datetime1">
               <a:rPr lang="en-US" smtClean="0"/>
-              <a:t>9/21/16</a:t>
+              <a:t>2/7/17</a:t>
             </a:fld>
             <a:endParaRPr lang="en-US" dirty="0"/>
           </a:p>
@@ -2427,7 +2426,7 @@
           <a:p>
             <a:fld id="{A30A75AC-C56D-EE42-BDD2-17DB57AF2272}" type="datetime1">
               <a:rPr lang="en-US" smtClean="0"/>
-              <a:t>9/21/16</a:t>
+              <a:t>2/7/17</a:t>
             </a:fld>
             <a:endParaRPr lang="en-US" dirty="0"/>
           </a:p>
@@ -2517,7 +2516,7 @@
           <a:p>
             <a:fld id="{9D395806-AD48-B544-944C-705355738331}" type="datetime1">
               <a:rPr lang="en-US" smtClean="0"/>
-              <a:t>9/21/16</a:t>
+              <a:t>2/7/17</a:t>
             </a:fld>
             <a:endParaRPr lang="en-US" dirty="0"/>
           </a:p>
@@ -2799,7 +2798,7 @@
           <a:p>
             <a:fld id="{61B2DE48-3403-FC4B-B102-C9141BD28694}" type="datetime1">
               <a:rPr lang="en-US" smtClean="0"/>
-              <a:t>9/21/16</a:t>
+              <a:t>2/7/17</a:t>
             </a:fld>
             <a:endParaRPr lang="en-US" dirty="0"/>
           </a:p>
@@ -3119,7 +3118,7 @@
           <a:p>
             <a:fld id="{E0D275B7-E62E-0047-A877-1D9C20268E81}" type="datetime1">
               <a:rPr lang="en-US" smtClean="0"/>
-              <a:t>9/21/16</a:t>
+              <a:t>2/7/17</a:t>
             </a:fld>
             <a:endParaRPr lang="en-US" dirty="0"/>
           </a:p>
@@ -3368,7 +3367,7 @@
           <a:p>
             <a:fld id="{47272CC5-79E2-7E45-936A-DFE9988DE469}" type="datetime1">
               <a:rPr lang="en-US" smtClean="0"/>
-              <a:t>9/21/16</a:t>
+              <a:t>2/7/17</a:t>
             </a:fld>
             <a:endParaRPr lang="en-US" dirty="0"/>
           </a:p>
@@ -3973,327 +3972,154 @@
           <a:p>
             <a:r>
               <a:rPr lang="en-US" sz="4800" dirty="0" smtClean="0"/>
-              <a:t>List Interface</a:t>
+              <a:t>List Implementations</a:t>
             </a:r>
             <a:endParaRPr lang="en-US" sz="4800" dirty="0"/>
           </a:p>
         </p:txBody>
       </p:sp>
-      <p:graphicFrame>
-        <p:nvGraphicFramePr>
-          <p:cNvPr id="4" name="Content Placeholder 3"/>
-          <p:cNvGraphicFramePr>
-            <a:graphicFrameLocks noGrp="1"/>
-          </p:cNvGraphicFramePr>
-          <p:nvPr>
-            <p:ph idx="1"/>
-            <p:extLst>
-              <p:ext uri="{D42A27DB-BD31-4B8C-83A1-F6EECF244321}">
-                <p14:modId xmlns:p14="http://schemas.microsoft.com/office/powerpoint/2010/main" val="507152792"/>
-              </p:ext>
-            </p:extLst>
-          </p:nvPr>
-        </p:nvGraphicFramePr>
-        <p:xfrm>
-          <a:off x="1262063" y="1828800"/>
-          <a:ext cx="8594726" cy="4211320"/>
-        </p:xfrm>
-        <a:graphic>
-          <a:graphicData uri="http://schemas.openxmlformats.org/drawingml/2006/table">
-            <a:tbl>
-              <a:tblPr firstRow="1" bandRow="1">
-                <a:tableStyleId>{5C22544A-7EE6-4342-B048-85BDC9FD1C3A}</a:tableStyleId>
-              </a:tblPr>
-              <a:tblGrid>
-                <a:gridCol w="3239599"/>
-                <a:gridCol w="5355127"/>
-              </a:tblGrid>
-              <a:tr h="370840">
-                <a:tc>
-                  <a:txBody>
-                    <a:bodyPr/>
-                    <a:lstStyle/>
-                    <a:p>
-                      <a:pPr algn="l"/>
-                      <a:r>
-                        <a:rPr lang="en-US" dirty="0"/>
-                        <a:t>Method</a:t>
-                      </a:r>
-                    </a:p>
-                  </a:txBody>
-                  <a:tcPr anchor="ctr"/>
-                </a:tc>
-                <a:tc>
-                  <a:txBody>
-                    <a:bodyPr/>
-                    <a:lstStyle/>
-                    <a:p>
-                      <a:pPr algn="l"/>
-                      <a:r>
-                        <a:rPr lang="en-US"/>
-                        <a:t>Description</a:t>
-                      </a:r>
-                    </a:p>
-                  </a:txBody>
-                  <a:tcPr anchor="ctr"/>
-                </a:tc>
-              </a:tr>
-              <a:tr h="370840">
-                <a:tc>
-                  <a:txBody>
-                    <a:bodyPr/>
-                    <a:lstStyle/>
-                    <a:p>
-                      <a:pPr algn="l"/>
-                      <a:r>
-                        <a:rPr lang="en-US"/>
-                        <a:t>void add(int index, E e)</a:t>
-                      </a:r>
-                    </a:p>
-                  </a:txBody>
-                  <a:tcPr anchor="ctr"/>
-                </a:tc>
-                <a:tc>
-                  <a:txBody>
-                    <a:bodyPr/>
-                    <a:lstStyle/>
-                    <a:p>
-                      <a:pPr algn="l"/>
-                      <a:r>
-                        <a:rPr lang="en-US"/>
-                        <a:t>Insert element </a:t>
-                      </a:r>
-                      <a:r>
-                        <a:rPr lang="en-US" i="1"/>
-                        <a:t>e</a:t>
-                      </a:r>
-                      <a:r>
-                        <a:rPr lang="en-US"/>
-                        <a:t> into the list at position </a:t>
-                      </a:r>
-                      <a:r>
-                        <a:rPr lang="en-US" i="1"/>
-                        <a:t>index</a:t>
-                      </a:r>
-                      <a:r>
-                        <a:rPr lang="en-US"/>
-                        <a:t> and shift elements to the right as necessary</a:t>
-                      </a:r>
-                    </a:p>
-                  </a:txBody>
-                  <a:tcPr anchor="ctr"/>
-                </a:tc>
-              </a:tr>
-              <a:tr h="370840">
-                <a:tc>
-                  <a:txBody>
-                    <a:bodyPr/>
-                    <a:lstStyle/>
-                    <a:p>
-                      <a:pPr algn="l"/>
-                      <a:r>
-                        <a:rPr lang="en-US"/>
-                        <a:t>E get(int index)</a:t>
-                      </a:r>
-                    </a:p>
-                  </a:txBody>
-                  <a:tcPr anchor="ctr"/>
-                </a:tc>
-                <a:tc>
-                  <a:txBody>
-                    <a:bodyPr/>
-                    <a:lstStyle/>
-                    <a:p>
-                      <a:pPr algn="l"/>
-                      <a:r>
-                        <a:rPr lang="en-US"/>
-                        <a:t>Returns the element of type </a:t>
-                      </a:r>
-                      <a:r>
-                        <a:rPr lang="en-US" i="1"/>
-                        <a:t>E</a:t>
-                      </a:r>
-                      <a:r>
-                        <a:rPr lang="en-US"/>
-                        <a:t> stored at position </a:t>
-                      </a:r>
-                      <a:r>
-                        <a:rPr lang="en-US" i="1"/>
-                        <a:t>index</a:t>
-                      </a:r>
-                      <a:endParaRPr lang="en-US"/>
-                    </a:p>
-                  </a:txBody>
-                  <a:tcPr anchor="ctr"/>
-                </a:tc>
-              </a:tr>
-              <a:tr h="370840">
-                <a:tc>
-                  <a:txBody>
-                    <a:bodyPr/>
-                    <a:lstStyle/>
-                    <a:p>
-                      <a:pPr algn="l"/>
-                      <a:r>
-                        <a:rPr lang="en-US"/>
-                        <a:t>int indexOf(Object o)</a:t>
-                      </a:r>
-                    </a:p>
-                  </a:txBody>
-                  <a:tcPr anchor="ctr"/>
-                </a:tc>
-                <a:tc>
-                  <a:txBody>
-                    <a:bodyPr/>
-                    <a:lstStyle/>
-                    <a:p>
-                      <a:pPr algn="l"/>
-                      <a:r>
-                        <a:rPr lang="en-US"/>
-                        <a:t>Returns the index of the first occurrence of element </a:t>
-                      </a:r>
-                      <a:r>
-                        <a:rPr lang="en-US" i="1"/>
-                        <a:t>o</a:t>
-                      </a:r>
-                      <a:r>
-                        <a:rPr lang="en-US"/>
-                        <a:t> in the list</a:t>
-                      </a:r>
-                    </a:p>
-                  </a:txBody>
-                  <a:tcPr anchor="ctr"/>
-                </a:tc>
-              </a:tr>
-              <a:tr h="370840">
-                <a:tc>
-                  <a:txBody>
-                    <a:bodyPr/>
-                    <a:lstStyle/>
-                    <a:p>
-                      <a:pPr algn="l"/>
-                      <a:r>
-                        <a:rPr lang="en-US"/>
-                        <a:t>int lastIndexOf(Object o)</a:t>
-                      </a:r>
-                    </a:p>
-                  </a:txBody>
-                  <a:tcPr anchor="ctr"/>
-                </a:tc>
-                <a:tc>
-                  <a:txBody>
-                    <a:bodyPr/>
-                    <a:lstStyle/>
-                    <a:p>
-                      <a:pPr algn="l"/>
-                      <a:r>
-                        <a:rPr lang="en-US"/>
-                        <a:t>Returns the index of the last occurrence of element </a:t>
-                      </a:r>
-                      <a:r>
-                        <a:rPr lang="en-US" i="1"/>
-                        <a:t>o</a:t>
-                      </a:r>
-                      <a:r>
-                        <a:rPr lang="en-US"/>
-                        <a:t> in the list</a:t>
-                      </a:r>
-                    </a:p>
-                  </a:txBody>
-                  <a:tcPr anchor="ctr"/>
-                </a:tc>
-              </a:tr>
-              <a:tr h="370840">
-                <a:tc>
-                  <a:txBody>
-                    <a:bodyPr/>
-                    <a:lstStyle/>
-                    <a:p>
-                      <a:pPr algn="l"/>
-                      <a:r>
-                        <a:rPr lang="en-US"/>
-                        <a:t>E remove(int index)</a:t>
-                      </a:r>
-                    </a:p>
-                  </a:txBody>
-                  <a:tcPr anchor="ctr"/>
-                </a:tc>
-                <a:tc>
-                  <a:txBody>
-                    <a:bodyPr/>
-                    <a:lstStyle/>
-                    <a:p>
-                      <a:pPr algn="l"/>
-                      <a:r>
-                        <a:rPr lang="en-US"/>
-                        <a:t>Remove and return the element at </a:t>
-                      </a:r>
-                      <a:r>
-                        <a:rPr lang="en-US" i="1"/>
-                        <a:t>index</a:t>
-                      </a:r>
-                      <a:r>
-                        <a:rPr lang="en-US"/>
-                        <a:t> in the list</a:t>
-                      </a:r>
-                    </a:p>
-                  </a:txBody>
-                  <a:tcPr anchor="ctr"/>
-                </a:tc>
-              </a:tr>
-              <a:tr h="370840">
-                <a:tc>
-                  <a:txBody>
-                    <a:bodyPr/>
-                    <a:lstStyle/>
-                    <a:p>
-                      <a:pPr algn="l"/>
-                      <a:r>
-                        <a:rPr lang="en-US"/>
-                        <a:t>E set(int index, E e)</a:t>
-                      </a:r>
-                    </a:p>
-                  </a:txBody>
-                  <a:tcPr anchor="ctr"/>
-                </a:tc>
-                <a:tc>
-                  <a:txBody>
-                    <a:bodyPr/>
-                    <a:lstStyle/>
-                    <a:p>
-                      <a:pPr algn="l"/>
-                      <a:r>
-                        <a:rPr lang="en-US" dirty="0"/>
-                        <a:t>Replace the element at position </a:t>
-                      </a:r>
-                      <a:r>
-                        <a:rPr lang="en-US" i="1" dirty="0"/>
-                        <a:t>index</a:t>
-                      </a:r>
-                      <a:r>
-                        <a:rPr lang="en-US" dirty="0"/>
-                        <a:t> in the list with element </a:t>
-                      </a:r>
-                      <a:r>
-                        <a:rPr lang="en-US" i="1" dirty="0"/>
-                        <a:t>e</a:t>
-                      </a:r>
-                      <a:r>
-                        <a:rPr lang="en-US" dirty="0"/>
-                        <a:t> and return the previous element</a:t>
-                      </a:r>
-                    </a:p>
-                  </a:txBody>
-                  <a:tcPr anchor="ctr"/>
-                </a:tc>
-              </a:tr>
-            </a:tbl>
-          </a:graphicData>
-        </a:graphic>
-      </p:graphicFrame>
-      <p:sp>
-        <p:nvSpPr>
-          <p:cNvPr id="3" name="Slide Number Placeholder 2"/>
+      <p:sp>
+        <p:nvSpPr>
+          <p:cNvPr id="5" name="Text Placeholder 4"/>
+          <p:cNvSpPr>
+            <a:spLocks noGrp="1"/>
+          </p:cNvSpPr>
+          <p:nvPr>
+            <p:ph type="body" idx="1"/>
+          </p:nvPr>
+        </p:nvSpPr>
+        <p:spPr/>
+        <p:txBody>
+          <a:bodyPr>
+            <a:normAutofit/>
+          </a:bodyPr>
+          <a:lstStyle/>
+          <a:p>
+            <a:r>
+              <a:rPr lang="en-US" sz="3200" b="1" dirty="0" err="1" smtClean="0">
+                <a:solidFill>
+                  <a:schemeClr val="tx1"/>
+                </a:solidFill>
+              </a:rPr>
+              <a:t>ArrayList</a:t>
+            </a:r>
+            <a:endParaRPr lang="en-US" sz="3200" b="1" dirty="0">
+              <a:solidFill>
+                <a:schemeClr val="tx1"/>
+              </a:solidFill>
+            </a:endParaRPr>
+          </a:p>
+        </p:txBody>
+      </p:sp>
+      <p:sp>
+        <p:nvSpPr>
+          <p:cNvPr id="3" name="Content Placeholder 2"/>
+          <p:cNvSpPr>
+            <a:spLocks noGrp="1"/>
+          </p:cNvSpPr>
+          <p:nvPr>
+            <p:ph sz="half" idx="2"/>
+          </p:nvPr>
+        </p:nvSpPr>
+        <p:spPr/>
+        <p:txBody>
+          <a:bodyPr anchor="t">
+            <a:normAutofit/>
+          </a:bodyPr>
+          <a:lstStyle/>
+          <a:p>
+            <a:r>
+              <a:rPr lang="en-US" sz="2800" dirty="0" smtClean="0"/>
+              <a:t>Implementation based on arrays</a:t>
+            </a:r>
+          </a:p>
+          <a:p>
+            <a:r>
+              <a:rPr lang="en-US" sz="2800" dirty="0" smtClean="0"/>
+              <a:t>Faster access to elements</a:t>
+            </a:r>
+          </a:p>
+          <a:p>
+            <a:r>
+              <a:rPr lang="en-US" sz="2800" dirty="0" smtClean="0"/>
+              <a:t>Slower for updates</a:t>
+            </a:r>
+          </a:p>
+        </p:txBody>
+      </p:sp>
+      <p:sp>
+        <p:nvSpPr>
+          <p:cNvPr id="6" name="Text Placeholder 5"/>
+          <p:cNvSpPr>
+            <a:spLocks noGrp="1"/>
+          </p:cNvSpPr>
+          <p:nvPr>
+            <p:ph type="body" sz="quarter" idx="3"/>
+          </p:nvPr>
+        </p:nvSpPr>
+        <p:spPr/>
+        <p:txBody>
+          <a:bodyPr>
+            <a:normAutofit/>
+          </a:bodyPr>
+          <a:lstStyle/>
+          <a:p>
+            <a:r>
+              <a:rPr lang="en-US" sz="3200" b="1" smtClean="0">
+                <a:solidFill>
+                  <a:schemeClr val="tx1"/>
+                </a:solidFill>
+              </a:rPr>
+              <a:t>LinkedList</a:t>
+            </a:r>
+            <a:endParaRPr lang="en-US" sz="3200" b="1" dirty="0">
+              <a:solidFill>
+                <a:schemeClr val="tx1"/>
+              </a:solidFill>
+            </a:endParaRPr>
+          </a:p>
+        </p:txBody>
+      </p:sp>
+      <p:sp>
+        <p:nvSpPr>
+          <p:cNvPr id="7" name="Content Placeholder 6"/>
+          <p:cNvSpPr>
+            <a:spLocks noGrp="1"/>
+          </p:cNvSpPr>
+          <p:nvPr>
+            <p:ph sz="quarter" idx="4"/>
+          </p:nvPr>
+        </p:nvSpPr>
+        <p:spPr/>
+        <p:txBody>
+          <a:bodyPr anchor="t">
+            <a:noAutofit/>
+          </a:bodyPr>
+          <a:lstStyle/>
+          <a:p>
+            <a:r>
+              <a:rPr lang="en-US" sz="2800" dirty="0" smtClean="0"/>
+              <a:t>Implementation based on linked nodes (includes a value and location in memory of next node)</a:t>
+            </a:r>
+          </a:p>
+          <a:p>
+            <a:r>
+              <a:rPr lang="en-US" sz="2800" dirty="0" smtClean="0"/>
+              <a:t>Slower access to elements</a:t>
+            </a:r>
+          </a:p>
+          <a:p>
+            <a:r>
+              <a:rPr lang="en-US" sz="2800" dirty="0" smtClean="0"/>
+              <a:t>Faster for updates</a:t>
+            </a:r>
+            <a:endParaRPr lang="en-US" sz="2800" dirty="0"/>
+          </a:p>
+        </p:txBody>
+      </p:sp>
+      <p:sp>
+        <p:nvSpPr>
+          <p:cNvPr id="4" name="Slide Number Placeholder 3"/>
           <p:cNvSpPr>
             <a:spLocks noGrp="1"/>
           </p:cNvSpPr>
@@ -4319,7 +4145,7 @@
     </p:spTree>
     <p:extLst>
       <p:ext uri="{BB962C8B-B14F-4D97-AF65-F5344CB8AC3E}">
-        <p14:creationId xmlns:p14="http://schemas.microsoft.com/office/powerpoint/2010/main" val="1501518188"/>
+        <p14:creationId xmlns:p14="http://schemas.microsoft.com/office/powerpoint/2010/main" val="646817815"/>
       </p:ext>
     </p:extLst>
   </p:cSld>
@@ -4359,154 +4185,79 @@
         <p:spPr/>
         <p:txBody>
           <a:bodyPr>
+            <a:normAutofit fontScale="90000"/>
+          </a:bodyPr>
+          <a:lstStyle/>
+          <a:p>
+            <a:r>
+              <a:rPr lang="en-US" sz="4800" dirty="0"/>
+              <a:t>Program to an interface, not an implementation</a:t>
+            </a:r>
+            <a:endParaRPr lang="en-US" dirty="0"/>
+          </a:p>
+        </p:txBody>
+      </p:sp>
+      <p:sp>
+        <p:nvSpPr>
+          <p:cNvPr id="3" name="Content Placeholder 2"/>
+          <p:cNvSpPr>
+            <a:spLocks noGrp="1"/>
+          </p:cNvSpPr>
+          <p:nvPr>
+            <p:ph idx="1"/>
+          </p:nvPr>
+        </p:nvSpPr>
+        <p:spPr/>
+        <p:txBody>
+          <a:bodyPr anchor="ctr">
             <a:normAutofit/>
           </a:bodyPr>
           <a:lstStyle/>
           <a:p>
-            <a:r>
-              <a:rPr lang="en-US" sz="4800" dirty="0" smtClean="0"/>
-              <a:t>List Implementations</a:t>
-            </a:r>
-            <a:endParaRPr lang="en-US" sz="4800" dirty="0"/>
-          </a:p>
-        </p:txBody>
-      </p:sp>
-      <p:sp>
-        <p:nvSpPr>
-          <p:cNvPr id="5" name="Text Placeholder 4"/>
-          <p:cNvSpPr>
-            <a:spLocks noGrp="1"/>
-          </p:cNvSpPr>
-          <p:nvPr>
-            <p:ph type="body" idx="1"/>
-          </p:nvPr>
-        </p:nvSpPr>
-        <p:spPr/>
-        <p:txBody>
-          <a:bodyPr>
-            <a:normAutofit/>
-          </a:bodyPr>
-          <a:lstStyle/>
-          <a:p>
-            <a:r>
-              <a:rPr lang="en-US" sz="3200" b="1" dirty="0" err="1" smtClean="0">
-                <a:solidFill>
-                  <a:schemeClr val="tx1"/>
-                </a:solidFill>
-              </a:rPr>
-              <a:t>ArrayList</a:t>
-            </a:r>
-            <a:endParaRPr lang="en-US" sz="3200" b="1" dirty="0">
-              <a:solidFill>
-                <a:schemeClr val="tx1"/>
-              </a:solidFill>
-            </a:endParaRPr>
-          </a:p>
-        </p:txBody>
-      </p:sp>
-      <p:sp>
-        <p:nvSpPr>
-          <p:cNvPr id="3" name="Content Placeholder 2"/>
-          <p:cNvSpPr>
-            <a:spLocks noGrp="1"/>
-          </p:cNvSpPr>
-          <p:nvPr>
-            <p:ph sz="half" idx="2"/>
-          </p:nvPr>
-        </p:nvSpPr>
-        <p:spPr/>
-        <p:txBody>
-          <a:bodyPr anchor="t">
-            <a:normAutofit/>
-          </a:bodyPr>
-          <a:lstStyle/>
-          <a:p>
-            <a:r>
-              <a:rPr lang="en-US" sz="2800" dirty="0" smtClean="0"/>
-              <a:t>Implementation based on arrays</a:t>
-            </a:r>
-          </a:p>
-          <a:p>
-            <a:r>
-              <a:rPr lang="en-US" sz="2800" dirty="0" smtClean="0"/>
-              <a:t>Faster access to elements</a:t>
-            </a:r>
-          </a:p>
-          <a:p>
-            <a:r>
-              <a:rPr lang="en-US" sz="2800" dirty="0" smtClean="0"/>
-              <a:t>Slower for updates</a:t>
-            </a:r>
-          </a:p>
-        </p:txBody>
-      </p:sp>
-      <p:sp>
-        <p:nvSpPr>
-          <p:cNvPr id="6" name="Text Placeholder 5"/>
-          <p:cNvSpPr>
-            <a:spLocks noGrp="1"/>
-          </p:cNvSpPr>
-          <p:nvPr>
-            <p:ph type="body" sz="quarter" idx="3"/>
-          </p:nvPr>
-        </p:nvSpPr>
-        <p:spPr/>
-        <p:txBody>
-          <a:bodyPr>
-            <a:normAutofit/>
-          </a:bodyPr>
-          <a:lstStyle/>
-          <a:p>
-            <a:r>
-              <a:rPr lang="en-US" sz="3200" b="1" smtClean="0">
-                <a:solidFill>
-                  <a:schemeClr val="tx1"/>
-                </a:solidFill>
-              </a:rPr>
-              <a:t>LinkedList</a:t>
-            </a:r>
-            <a:endParaRPr lang="en-US" sz="3200" b="1" dirty="0">
-              <a:solidFill>
-                <a:schemeClr val="tx1"/>
-              </a:solidFill>
-            </a:endParaRPr>
-          </a:p>
-        </p:txBody>
-      </p:sp>
-      <p:sp>
-        <p:nvSpPr>
-          <p:cNvPr id="7" name="Content Placeholder 6"/>
-          <p:cNvSpPr>
-            <a:spLocks noGrp="1"/>
-          </p:cNvSpPr>
-          <p:nvPr>
-            <p:ph sz="quarter" idx="4"/>
-          </p:nvPr>
-        </p:nvSpPr>
-        <p:spPr/>
-        <p:txBody>
-          <a:bodyPr anchor="t">
-            <a:noAutofit/>
-          </a:bodyPr>
-          <a:lstStyle/>
-          <a:p>
-            <a:r>
-              <a:rPr lang="en-US" sz="2800" dirty="0" smtClean="0"/>
-              <a:t>Implementation based on linked nodes (includes a value and location in memory of next node)</a:t>
-            </a:r>
-          </a:p>
-          <a:p>
-            <a:r>
-              <a:rPr lang="en-US" sz="2800" dirty="0" smtClean="0"/>
-              <a:t>Slower access to elements</a:t>
-            </a:r>
-          </a:p>
-          <a:p>
-            <a:r>
-              <a:rPr lang="en-US" sz="2800" dirty="0" smtClean="0"/>
-              <a:t>Faster for updates</a:t>
-            </a:r>
-            <a:endParaRPr lang="en-US" sz="2800" dirty="0"/>
+            <a:pPr marL="0" indent="0">
+              <a:buNone/>
+            </a:pPr>
+            <a:r>
+              <a:rPr lang="en-US" sz="3200" dirty="0"/>
+              <a:t>W</a:t>
+            </a:r>
+            <a:r>
+              <a:rPr lang="en-US" sz="3200" dirty="0" smtClean="0"/>
+              <a:t>hen </a:t>
+            </a:r>
+            <a:r>
+              <a:rPr lang="en-US" sz="3200" dirty="0"/>
+              <a:t>declaring a variable or defining a method, its often more convenient to use the name of the most </a:t>
+            </a:r>
+            <a:r>
+              <a:rPr lang="en-US" sz="3200" dirty="0" smtClean="0"/>
+              <a:t>basic class or </a:t>
+            </a:r>
+            <a:r>
+              <a:rPr lang="en-US" sz="3200" dirty="0"/>
+              <a:t>interface that supports your needs as the data type </a:t>
+            </a:r>
+            <a:r>
+              <a:rPr lang="en-US" sz="3200" dirty="0" smtClean="0"/>
+              <a:t>than </a:t>
+            </a:r>
+            <a:r>
+              <a:rPr lang="en-US" sz="3200" dirty="0"/>
+              <a:t>the class </a:t>
+            </a:r>
+            <a:r>
+              <a:rPr lang="en-US" sz="3200" dirty="0" smtClean="0"/>
+              <a:t>of the </a:t>
+            </a:r>
+            <a:r>
+              <a:rPr lang="en-US" sz="3200" dirty="0"/>
+              <a:t>instance you might be creating or passing to a </a:t>
+            </a:r>
+            <a:r>
+              <a:rPr lang="en-US" sz="3200" dirty="0" smtClean="0"/>
+              <a:t>method.</a:t>
+            </a:r>
+            <a:endParaRPr lang="en-US" sz="3200" dirty="0"/>
           </a:p>
         </p:txBody>
       </p:sp>
@@ -4538,7 +4289,7 @@
     </p:spTree>
     <p:extLst>
       <p:ext uri="{BB962C8B-B14F-4D97-AF65-F5344CB8AC3E}">
-        <p14:creationId xmlns:p14="http://schemas.microsoft.com/office/powerpoint/2010/main" val="646817815"/>
+        <p14:creationId xmlns:p14="http://schemas.microsoft.com/office/powerpoint/2010/main" val="1941037786"/>
       </p:ext>
     </p:extLst>
   </p:cSld>
@@ -4577,80 +4328,37 @@
         </p:nvSpPr>
         <p:spPr/>
         <p:txBody>
-          <a:bodyPr>
-            <a:normAutofit fontScale="90000"/>
-          </a:bodyPr>
-          <a:lstStyle/>
-          <a:p>
-            <a:r>
-              <a:rPr lang="en-US" sz="4800" dirty="0"/>
-              <a:t>Program to an interface, not an implementation</a:t>
-            </a:r>
-            <a:endParaRPr lang="en-US" dirty="0"/>
-          </a:p>
-        </p:txBody>
-      </p:sp>
-      <p:sp>
-        <p:nvSpPr>
-          <p:cNvPr id="3" name="Content Placeholder 2"/>
-          <p:cNvSpPr>
-            <a:spLocks noGrp="1"/>
-          </p:cNvSpPr>
-          <p:nvPr>
-            <p:ph idx="1"/>
-          </p:nvPr>
-        </p:nvSpPr>
-        <p:spPr/>
-        <p:txBody>
-          <a:bodyPr anchor="ctr">
-            <a:normAutofit/>
-          </a:bodyPr>
-          <a:lstStyle/>
-          <a:p>
-            <a:pPr marL="0" indent="0">
-              <a:buNone/>
-            </a:pPr>
-            <a:r>
-              <a:rPr lang="en-US" sz="3200" dirty="0"/>
-              <a:t>W</a:t>
-            </a:r>
-            <a:r>
-              <a:rPr lang="en-US" sz="3200" dirty="0" smtClean="0"/>
-              <a:t>hen </a:t>
-            </a:r>
-            <a:r>
-              <a:rPr lang="en-US" sz="3200" dirty="0"/>
-              <a:t>declaring a variable or defining a method, its often more convenient to use the name of the most </a:t>
-            </a:r>
-            <a:r>
-              <a:rPr lang="en-US" sz="3200" dirty="0" smtClean="0"/>
-              <a:t>basic class or </a:t>
-            </a:r>
-            <a:r>
-              <a:rPr lang="en-US" sz="3200" dirty="0"/>
-              <a:t>interface that supports your needs as the data type </a:t>
-            </a:r>
-            <a:r>
-              <a:rPr lang="en-US" sz="3200" dirty="0" smtClean="0"/>
-              <a:t>than </a:t>
-            </a:r>
-            <a:r>
-              <a:rPr lang="en-US" sz="3200" dirty="0"/>
-              <a:t>the class </a:t>
-            </a:r>
-            <a:r>
-              <a:rPr lang="en-US" sz="3200" dirty="0" smtClean="0"/>
-              <a:t>of the </a:t>
-            </a:r>
-            <a:r>
-              <a:rPr lang="en-US" sz="3200" dirty="0"/>
-              <a:t>instance you might be creating or passing to a </a:t>
-            </a:r>
-            <a:r>
-              <a:rPr lang="en-US" sz="3200" dirty="0" smtClean="0"/>
-              <a:t>method.</a:t>
-            </a:r>
-            <a:endParaRPr lang="en-US" sz="3200" dirty="0"/>
+          <a:bodyPr/>
+          <a:lstStyle/>
+          <a:p>
+            <a:r>
+              <a:rPr lang="en-US" dirty="0" smtClean="0"/>
+              <a:t>Sets</a:t>
+            </a:r>
+            <a:endParaRPr lang="en-US" dirty="0"/>
+          </a:p>
+        </p:txBody>
+      </p:sp>
+      <p:sp>
+        <p:nvSpPr>
+          <p:cNvPr id="3" name="Text Placeholder 2"/>
+          <p:cNvSpPr>
+            <a:spLocks noGrp="1"/>
+          </p:cNvSpPr>
+          <p:nvPr>
+            <p:ph type="body" idx="1"/>
+          </p:nvPr>
+        </p:nvSpPr>
+        <p:spPr/>
+        <p:txBody>
+          <a:bodyPr/>
+          <a:lstStyle/>
+          <a:p>
+            <a:r>
+              <a:rPr lang="en-US" dirty="0" smtClean="0"/>
+              <a:t>A collection that contains no duplicate elements</a:t>
+            </a:r>
+            <a:endParaRPr lang="en-US" dirty="0"/>
           </a:p>
         </p:txBody>
       </p:sp>
@@ -4682,7 +4390,7 @@
     </p:spTree>
     <p:extLst>
       <p:ext uri="{BB962C8B-B14F-4D97-AF65-F5344CB8AC3E}">
-        <p14:creationId xmlns:p14="http://schemas.microsoft.com/office/powerpoint/2010/main" val="1941037786"/>
+        <p14:creationId xmlns:p14="http://schemas.microsoft.com/office/powerpoint/2010/main" val="1619270737"/>
       </p:ext>
     </p:extLst>
   </p:cSld>
@@ -4721,20 +4429,22 @@
         </p:nvSpPr>
         <p:spPr/>
         <p:txBody>
-          <a:bodyPr/>
-          <a:lstStyle/>
-          <a:p>
-            <a:r>
-              <a:rPr lang="en-US" dirty="0" smtClean="0"/>
-              <a:t>Sets</a:t>
-            </a:r>
-            <a:endParaRPr lang="en-US" dirty="0"/>
-          </a:p>
-        </p:txBody>
-      </p:sp>
-      <p:sp>
-        <p:nvSpPr>
-          <p:cNvPr id="3" name="Text Placeholder 2"/>
+          <a:bodyPr>
+            <a:normAutofit/>
+          </a:bodyPr>
+          <a:lstStyle/>
+          <a:p>
+            <a:r>
+              <a:rPr lang="en-US" sz="4800" dirty="0" smtClean="0"/>
+              <a:t>Set Implementations</a:t>
+            </a:r>
+            <a:endParaRPr lang="en-US" sz="4800" dirty="0"/>
+          </a:p>
+        </p:txBody>
+      </p:sp>
+      <p:sp>
+        <p:nvSpPr>
+          <p:cNvPr id="5" name="Text Placeholder 4"/>
           <p:cNvSpPr>
             <a:spLocks noGrp="1"/>
           </p:cNvSpPr>
@@ -4744,14 +4454,135 @@
         </p:nvSpPr>
         <p:spPr/>
         <p:txBody>
-          <a:bodyPr/>
-          <a:lstStyle/>
-          <a:p>
-            <a:r>
-              <a:rPr lang="en-US" dirty="0" smtClean="0"/>
-              <a:t>A collection that contains no duplicate elements</a:t>
-            </a:r>
-            <a:endParaRPr lang="en-US" dirty="0"/>
+          <a:bodyPr>
+            <a:normAutofit/>
+          </a:bodyPr>
+          <a:lstStyle/>
+          <a:p>
+            <a:r>
+              <a:rPr lang="en-US" sz="3200" b="1" dirty="0" err="1" smtClean="0">
+                <a:solidFill>
+                  <a:schemeClr val="tx1"/>
+                </a:solidFill>
+              </a:rPr>
+              <a:t>TreeSet</a:t>
+            </a:r>
+            <a:endParaRPr lang="en-US" sz="3200" b="1" dirty="0">
+              <a:solidFill>
+                <a:schemeClr val="tx1"/>
+              </a:solidFill>
+            </a:endParaRPr>
+          </a:p>
+        </p:txBody>
+      </p:sp>
+      <p:sp>
+        <p:nvSpPr>
+          <p:cNvPr id="3" name="Content Placeholder 2"/>
+          <p:cNvSpPr>
+            <a:spLocks noGrp="1"/>
+          </p:cNvSpPr>
+          <p:nvPr>
+            <p:ph sz="half" idx="2"/>
+          </p:nvPr>
+        </p:nvSpPr>
+        <p:spPr/>
+        <p:txBody>
+          <a:bodyPr anchor="t">
+            <a:normAutofit/>
+          </a:bodyPr>
+          <a:lstStyle/>
+          <a:p>
+            <a:r>
+              <a:rPr lang="en-US" sz="2800" dirty="0" smtClean="0"/>
+              <a:t>Implementation based on tree structure</a:t>
+            </a:r>
+          </a:p>
+          <a:p>
+            <a:r>
+              <a:rPr lang="en-US" sz="2800" dirty="0" smtClean="0"/>
+              <a:t>Elements stored in sorted order</a:t>
+            </a:r>
+          </a:p>
+          <a:p>
+            <a:r>
+              <a:rPr lang="en-US" sz="2800" dirty="0" smtClean="0"/>
+              <a:t>Slower access</a:t>
+            </a:r>
+          </a:p>
+        </p:txBody>
+      </p:sp>
+      <p:sp>
+        <p:nvSpPr>
+          <p:cNvPr id="6" name="Text Placeholder 5"/>
+          <p:cNvSpPr>
+            <a:spLocks noGrp="1"/>
+          </p:cNvSpPr>
+          <p:nvPr>
+            <p:ph type="body" sz="quarter" idx="3"/>
+          </p:nvPr>
+        </p:nvSpPr>
+        <p:spPr/>
+        <p:txBody>
+          <a:bodyPr>
+            <a:normAutofit/>
+          </a:bodyPr>
+          <a:lstStyle/>
+          <a:p>
+            <a:r>
+              <a:rPr lang="en-US" sz="3200" b="1" dirty="0" err="1" smtClean="0">
+                <a:solidFill>
+                  <a:schemeClr val="tx1"/>
+                </a:solidFill>
+              </a:rPr>
+              <a:t>HashSet</a:t>
+            </a:r>
+            <a:endParaRPr lang="en-US" sz="3200" b="1" dirty="0">
+              <a:solidFill>
+                <a:schemeClr val="tx1"/>
+              </a:solidFill>
+            </a:endParaRPr>
+          </a:p>
+        </p:txBody>
+      </p:sp>
+      <p:sp>
+        <p:nvSpPr>
+          <p:cNvPr id="7" name="Content Placeholder 6"/>
+          <p:cNvSpPr>
+            <a:spLocks noGrp="1"/>
+          </p:cNvSpPr>
+          <p:nvPr>
+            <p:ph sz="quarter" idx="4"/>
+          </p:nvPr>
+        </p:nvSpPr>
+        <p:spPr/>
+        <p:txBody>
+          <a:bodyPr anchor="t">
+            <a:noAutofit/>
+          </a:bodyPr>
+          <a:lstStyle/>
+          <a:p>
+            <a:r>
+              <a:rPr lang="en-US" sz="2800" dirty="0" smtClean="0"/>
+              <a:t>Implementation based on </a:t>
+            </a:r>
+            <a:r>
+              <a:rPr lang="en-US" sz="2800" dirty="0" err="1" smtClean="0"/>
+              <a:t>HashMaps</a:t>
+            </a:r>
+            <a:endParaRPr lang="en-US" sz="2800" dirty="0" smtClean="0"/>
+          </a:p>
+          <a:p>
+            <a:r>
+              <a:rPr lang="en-US" sz="2800" dirty="0" smtClean="0"/>
+              <a:t>No guarantee about order</a:t>
+            </a:r>
+          </a:p>
+          <a:p>
+            <a:r>
+              <a:rPr lang="en-US" sz="2800" dirty="0" smtClean="0"/>
+              <a:t>Faster access</a:t>
+            </a:r>
+            <a:endParaRPr lang="en-US" sz="2800" dirty="0"/>
           </a:p>
         </p:txBody>
       </p:sp>
@@ -4783,7 +4614,7 @@
     </p:spTree>
     <p:extLst>
       <p:ext uri="{BB962C8B-B14F-4D97-AF65-F5344CB8AC3E}">
-        <p14:creationId xmlns:p14="http://schemas.microsoft.com/office/powerpoint/2010/main" val="1619270737"/>
+        <p14:creationId xmlns:p14="http://schemas.microsoft.com/office/powerpoint/2010/main" val="321982236"/>
       </p:ext>
     </p:extLst>
   </p:cSld>
@@ -4822,22 +4653,20 @@
         </p:nvSpPr>
         <p:spPr/>
         <p:txBody>
-          <a:bodyPr>
-            <a:normAutofit/>
-          </a:bodyPr>
-          <a:lstStyle/>
-          <a:p>
-            <a:r>
-              <a:rPr lang="en-US" sz="4800" dirty="0" smtClean="0"/>
-              <a:t>Set Implementations</a:t>
-            </a:r>
-            <a:endParaRPr lang="en-US" sz="4800" dirty="0"/>
-          </a:p>
-        </p:txBody>
-      </p:sp>
-      <p:sp>
-        <p:nvSpPr>
-          <p:cNvPr id="5" name="Text Placeholder 4"/>
+          <a:bodyPr/>
+          <a:lstStyle/>
+          <a:p>
+            <a:r>
+              <a:rPr lang="en-US" dirty="0" smtClean="0"/>
+              <a:t>Maps</a:t>
+            </a:r>
+            <a:endParaRPr lang="en-US" dirty="0"/>
+          </a:p>
+        </p:txBody>
+      </p:sp>
+      <p:sp>
+        <p:nvSpPr>
+          <p:cNvPr id="3" name="Text Placeholder 2"/>
           <p:cNvSpPr>
             <a:spLocks noGrp="1"/>
           </p:cNvSpPr>
@@ -4847,135 +4676,17 @@
         </p:nvSpPr>
         <p:spPr/>
         <p:txBody>
-          <a:bodyPr>
-            <a:normAutofit/>
-          </a:bodyPr>
-          <a:lstStyle/>
-          <a:p>
-            <a:r>
-              <a:rPr lang="en-US" sz="3200" b="1" dirty="0" err="1" smtClean="0">
-                <a:solidFill>
-                  <a:schemeClr val="tx1"/>
-                </a:solidFill>
-              </a:rPr>
-              <a:t>TreeSet</a:t>
-            </a:r>
-            <a:endParaRPr lang="en-US" sz="3200" b="1" dirty="0">
-              <a:solidFill>
-                <a:schemeClr val="tx1"/>
-              </a:solidFill>
-            </a:endParaRPr>
-          </a:p>
-        </p:txBody>
-      </p:sp>
-      <p:sp>
-        <p:nvSpPr>
-          <p:cNvPr id="3" name="Content Placeholder 2"/>
-          <p:cNvSpPr>
-            <a:spLocks noGrp="1"/>
-          </p:cNvSpPr>
-          <p:nvPr>
-            <p:ph sz="half" idx="2"/>
-          </p:nvPr>
-        </p:nvSpPr>
-        <p:spPr/>
-        <p:txBody>
-          <a:bodyPr anchor="t">
-            <a:normAutofit/>
-          </a:bodyPr>
-          <a:lstStyle/>
-          <a:p>
-            <a:r>
-              <a:rPr lang="en-US" sz="2800" dirty="0" smtClean="0"/>
-              <a:t>Implementation based on tree structure</a:t>
-            </a:r>
-          </a:p>
-          <a:p>
-            <a:r>
-              <a:rPr lang="en-US" sz="2800" dirty="0" smtClean="0"/>
-              <a:t>Elements stored in sorted order</a:t>
-            </a:r>
-          </a:p>
-          <a:p>
-            <a:r>
-              <a:rPr lang="en-US" sz="2800" dirty="0" smtClean="0"/>
-              <a:t>Slower access</a:t>
-            </a:r>
-          </a:p>
-        </p:txBody>
-      </p:sp>
-      <p:sp>
-        <p:nvSpPr>
-          <p:cNvPr id="6" name="Text Placeholder 5"/>
-          <p:cNvSpPr>
-            <a:spLocks noGrp="1"/>
-          </p:cNvSpPr>
-          <p:nvPr>
-            <p:ph type="body" sz="quarter" idx="3"/>
-          </p:nvPr>
-        </p:nvSpPr>
-        <p:spPr/>
-        <p:txBody>
-          <a:bodyPr>
-            <a:normAutofit/>
-          </a:bodyPr>
-          <a:lstStyle/>
-          <a:p>
-            <a:r>
-              <a:rPr lang="en-US" sz="3200" b="1" dirty="0" err="1" smtClean="0">
-                <a:solidFill>
-                  <a:schemeClr val="tx1"/>
-                </a:solidFill>
-              </a:rPr>
-              <a:t>HashSet</a:t>
-            </a:r>
-            <a:endParaRPr lang="en-US" sz="3200" b="1" dirty="0">
-              <a:solidFill>
-                <a:schemeClr val="tx1"/>
-              </a:solidFill>
-            </a:endParaRPr>
-          </a:p>
-        </p:txBody>
-      </p:sp>
-      <p:sp>
-        <p:nvSpPr>
-          <p:cNvPr id="7" name="Content Placeholder 6"/>
-          <p:cNvSpPr>
-            <a:spLocks noGrp="1"/>
-          </p:cNvSpPr>
-          <p:nvPr>
-            <p:ph sz="quarter" idx="4"/>
-          </p:nvPr>
-        </p:nvSpPr>
-        <p:spPr/>
-        <p:txBody>
-          <a:bodyPr anchor="t">
-            <a:noAutofit/>
-          </a:bodyPr>
-          <a:lstStyle/>
-          <a:p>
-            <a:r>
-              <a:rPr lang="en-US" sz="2800" dirty="0" smtClean="0"/>
-              <a:t>Implementation based on </a:t>
-            </a:r>
-            <a:r>
-              <a:rPr lang="en-US" sz="2800" dirty="0" err="1" smtClean="0"/>
-              <a:t>HashMaps</a:t>
-            </a:r>
-            <a:endParaRPr lang="en-US" sz="2800" dirty="0" smtClean="0"/>
-          </a:p>
-          <a:p>
-            <a:r>
-              <a:rPr lang="en-US" sz="2800" dirty="0" smtClean="0"/>
-              <a:t>No guarantee about order</a:t>
-            </a:r>
-          </a:p>
-          <a:p>
-            <a:r>
-              <a:rPr lang="en-US" sz="2800" dirty="0" smtClean="0"/>
-              <a:t>Faster access</a:t>
-            </a:r>
-            <a:endParaRPr lang="en-US" sz="2800" dirty="0"/>
+          <a:bodyPr/>
+          <a:lstStyle/>
+          <a:p>
+            <a:r>
+              <a:rPr lang="en-US" dirty="0" smtClean="0"/>
+              <a:t>A collection of key/value </a:t>
+            </a:r>
+            <a:r>
+              <a:rPr lang="en-US" dirty="0"/>
+              <a:t>pairs where each key is unique and corresponds to at most one value</a:t>
+            </a:r>
           </a:p>
         </p:txBody>
       </p:sp>
@@ -5007,7 +4718,7 @@
     </p:spTree>
     <p:extLst>
       <p:ext uri="{BB962C8B-B14F-4D97-AF65-F5344CB8AC3E}">
-        <p14:creationId xmlns:p14="http://schemas.microsoft.com/office/powerpoint/2010/main" val="321982236"/>
+        <p14:creationId xmlns:p14="http://schemas.microsoft.com/office/powerpoint/2010/main" val="780207109"/>
       </p:ext>
     </p:extLst>
   </p:cSld>
@@ -5044,48 +4755,426 @@
             <p:ph type="title"/>
           </p:nvPr>
         </p:nvSpPr>
-        <p:spPr/>
-        <p:txBody>
-          <a:bodyPr/>
-          <a:lstStyle/>
-          <a:p>
-            <a:r>
-              <a:rPr lang="en-US" dirty="0" smtClean="0"/>
-              <a:t>Maps</a:t>
-            </a:r>
-            <a:endParaRPr lang="en-US" dirty="0"/>
-          </a:p>
-        </p:txBody>
-      </p:sp>
-      <p:sp>
-        <p:nvSpPr>
-          <p:cNvPr id="3" name="Text Placeholder 2"/>
-          <p:cNvSpPr>
-            <a:spLocks noGrp="1"/>
-          </p:cNvSpPr>
-          <p:nvPr>
-            <p:ph type="body" idx="1"/>
-          </p:nvPr>
-        </p:nvSpPr>
-        <p:spPr/>
-        <p:txBody>
-          <a:bodyPr/>
-          <a:lstStyle/>
-          <a:p>
-            <a:r>
-              <a:rPr lang="en-US" dirty="0" smtClean="0"/>
-              <a:t>A collection of key/value </a:t>
-            </a:r>
-            <a:r>
-              <a:rPr lang="en-US" dirty="0"/>
-              <a:t>pairs where each key is unique and corresponds to at most one value</a:t>
-            </a:r>
-          </a:p>
-        </p:txBody>
-      </p:sp>
-      <p:sp>
-        <p:nvSpPr>
-          <p:cNvPr id="4" name="Slide Number Placeholder 3"/>
+        <p:spPr>
+          <a:xfrm>
+            <a:off x="1261871" y="201637"/>
+            <a:ext cx="9692640" cy="712763"/>
+          </a:xfrm>
+        </p:spPr>
+        <p:txBody>
+          <a:bodyPr>
+            <a:normAutofit fontScale="90000"/>
+          </a:bodyPr>
+          <a:lstStyle/>
+          <a:p>
+            <a:r>
+              <a:rPr lang="en-US" sz="4800" smtClean="0"/>
+              <a:t>Map Interface</a:t>
+            </a:r>
+            <a:endParaRPr lang="en-US" sz="4800" dirty="0"/>
+          </a:p>
+        </p:txBody>
+      </p:sp>
+      <p:graphicFrame>
+        <p:nvGraphicFramePr>
+          <p:cNvPr id="5" name="Content Placeholder 4"/>
+          <p:cNvGraphicFramePr>
+            <a:graphicFrameLocks noGrp="1"/>
+          </p:cNvGraphicFramePr>
+          <p:nvPr>
+            <p:ph idx="1"/>
+            <p:extLst>
+              <p:ext uri="{D42A27DB-BD31-4B8C-83A1-F6EECF244321}">
+                <p14:modId xmlns:p14="http://schemas.microsoft.com/office/powerpoint/2010/main" val="2015340369"/>
+              </p:ext>
+            </p:extLst>
+          </p:nvPr>
+        </p:nvGraphicFramePr>
+        <p:xfrm>
+          <a:off x="583457" y="1090246"/>
+          <a:ext cx="11049469" cy="5603240"/>
+        </p:xfrm>
+        <a:graphic>
+          <a:graphicData uri="http://schemas.openxmlformats.org/drawingml/2006/table">
+            <a:tbl>
+              <a:tblPr firstRow="1" bandRow="1">
+                <a:tableStyleId>{5C22544A-7EE6-4342-B048-85BDC9FD1C3A}</a:tableStyleId>
+              </a:tblPr>
+              <a:tblGrid>
+                <a:gridCol w="4082328"/>
+                <a:gridCol w="6967141"/>
+              </a:tblGrid>
+              <a:tr h="370840">
+                <a:tc>
+                  <a:txBody>
+                    <a:bodyPr/>
+                    <a:lstStyle/>
+                    <a:p>
+                      <a:pPr algn="l"/>
+                      <a:r>
+                        <a:rPr lang="en-US" dirty="0"/>
+                        <a:t>Method</a:t>
+                      </a:r>
+                    </a:p>
+                  </a:txBody>
+                  <a:tcPr anchor="ctr"/>
+                </a:tc>
+                <a:tc>
+                  <a:txBody>
+                    <a:bodyPr/>
+                    <a:lstStyle/>
+                    <a:p>
+                      <a:pPr algn="l"/>
+                      <a:r>
+                        <a:rPr lang="en-US"/>
+                        <a:t>Description</a:t>
+                      </a:r>
+                    </a:p>
+                  </a:txBody>
+                  <a:tcPr anchor="ctr"/>
+                </a:tc>
+              </a:tr>
+              <a:tr h="370840">
+                <a:tc>
+                  <a:txBody>
+                    <a:bodyPr/>
+                    <a:lstStyle/>
+                    <a:p>
+                      <a:pPr algn="l"/>
+                      <a:r>
+                        <a:rPr lang="en-US"/>
+                        <a:t>void clear()</a:t>
+                      </a:r>
+                    </a:p>
+                  </a:txBody>
+                  <a:tcPr anchor="ctr"/>
+                </a:tc>
+                <a:tc>
+                  <a:txBody>
+                    <a:bodyPr/>
+                    <a:lstStyle/>
+                    <a:p>
+                      <a:pPr algn="l"/>
+                      <a:r>
+                        <a:rPr lang="en-US"/>
+                        <a:t>Removes all entries from the map.</a:t>
+                      </a:r>
+                    </a:p>
+                  </a:txBody>
+                  <a:tcPr anchor="ctr"/>
+                </a:tc>
+              </a:tr>
+              <a:tr h="370840">
+                <a:tc>
+                  <a:txBody>
+                    <a:bodyPr/>
+                    <a:lstStyle/>
+                    <a:p>
+                      <a:pPr algn="l"/>
+                      <a:r>
+                        <a:rPr lang="en-US"/>
+                        <a:t>boolean containsKey(Object key)</a:t>
+                      </a:r>
+                    </a:p>
+                  </a:txBody>
+                  <a:tcPr anchor="ctr"/>
+                </a:tc>
+                <a:tc>
+                  <a:txBody>
+                    <a:bodyPr/>
+                    <a:lstStyle/>
+                    <a:p>
+                      <a:pPr algn="l"/>
+                      <a:r>
+                        <a:rPr lang="en-US"/>
+                        <a:t>Returns true when the map contains an entry for the specified </a:t>
+                      </a:r>
+                      <a:r>
+                        <a:rPr lang="en-US" i="1"/>
+                        <a:t>key</a:t>
+                      </a:r>
+                      <a:r>
+                        <a:rPr lang="en-US"/>
+                        <a:t> and false otherwise.</a:t>
+                      </a:r>
+                    </a:p>
+                  </a:txBody>
+                  <a:tcPr anchor="ctr"/>
+                </a:tc>
+              </a:tr>
+              <a:tr h="370840">
+                <a:tc>
+                  <a:txBody>
+                    <a:bodyPr/>
+                    <a:lstStyle/>
+                    <a:p>
+                      <a:pPr algn="l"/>
+                      <a:r>
+                        <a:rPr lang="en-US"/>
+                        <a:t>boolean containsValue(Object value)</a:t>
+                      </a:r>
+                    </a:p>
+                  </a:txBody>
+                  <a:tcPr anchor="ctr"/>
+                </a:tc>
+                <a:tc>
+                  <a:txBody>
+                    <a:bodyPr/>
+                    <a:lstStyle/>
+                    <a:p>
+                      <a:pPr algn="l"/>
+                      <a:r>
+                        <a:rPr lang="en-US" dirty="0"/>
+                        <a:t>Returns true when the map maps one or more keys to </a:t>
+                      </a:r>
+                      <a:r>
+                        <a:rPr lang="en-US" i="1" dirty="0"/>
+                        <a:t>value</a:t>
+                      </a:r>
+                      <a:r>
+                        <a:rPr lang="en-US" dirty="0"/>
+                        <a:t>.</a:t>
+                      </a:r>
+                    </a:p>
+                  </a:txBody>
+                  <a:tcPr anchor="ctr"/>
+                </a:tc>
+              </a:tr>
+              <a:tr h="370840">
+                <a:tc>
+                  <a:txBody>
+                    <a:bodyPr/>
+                    <a:lstStyle/>
+                    <a:p>
+                      <a:pPr algn="l"/>
+                      <a:r>
+                        <a:rPr lang="en-US"/>
+                        <a:t>V get(Object key)</a:t>
+                      </a:r>
+                    </a:p>
+                  </a:txBody>
+                  <a:tcPr anchor="ctr"/>
+                </a:tc>
+                <a:tc>
+                  <a:txBody>
+                    <a:bodyPr/>
+                    <a:lstStyle/>
+                    <a:p>
+                      <a:pPr algn="l"/>
+                      <a:r>
+                        <a:rPr lang="en-US" dirty="0"/>
+                        <a:t>Return the value to which </a:t>
+                      </a:r>
+                      <a:r>
+                        <a:rPr lang="en-US" i="1" dirty="0"/>
+                        <a:t>key</a:t>
+                      </a:r>
+                      <a:r>
+                        <a:rPr lang="en-US" dirty="0"/>
+                        <a:t> is mapped or null if the map doesn't contain the key.</a:t>
+                      </a:r>
+                    </a:p>
+                  </a:txBody>
+                  <a:tcPr anchor="ctr"/>
+                </a:tc>
+              </a:tr>
+              <a:tr h="370840">
+                <a:tc>
+                  <a:txBody>
+                    <a:bodyPr/>
+                    <a:lstStyle/>
+                    <a:p>
+                      <a:pPr algn="l"/>
+                      <a:r>
+                        <a:rPr lang="en-US"/>
+                        <a:t>Set keySet()</a:t>
+                      </a:r>
+                    </a:p>
+                  </a:txBody>
+                  <a:tcPr anchor="ctr"/>
+                </a:tc>
+                <a:tc>
+                  <a:txBody>
+                    <a:bodyPr/>
+                    <a:lstStyle/>
+                    <a:p>
+                      <a:pPr algn="l"/>
+                      <a:r>
+                        <a:rPr lang="en-US"/>
+                        <a:t>returns a Set view of the keys contained in the map. Because this is a view, changes made to the map are reflected in the set and vice versa.</a:t>
+                      </a:r>
+                    </a:p>
+                  </a:txBody>
+                  <a:tcPr anchor="ctr"/>
+                </a:tc>
+              </a:tr>
+              <a:tr h="370840">
+                <a:tc>
+                  <a:txBody>
+                    <a:bodyPr/>
+                    <a:lstStyle/>
+                    <a:p>
+                      <a:pPr algn="l"/>
+                      <a:r>
+                        <a:rPr lang="en-US"/>
+                        <a:t>V put(K key, V value)</a:t>
+                      </a:r>
+                    </a:p>
+                  </a:txBody>
+                  <a:tcPr anchor="ctr"/>
+                </a:tc>
+                <a:tc>
+                  <a:txBody>
+                    <a:bodyPr/>
+                    <a:lstStyle/>
+                    <a:p>
+                      <a:pPr algn="l"/>
+                      <a:r>
+                        <a:rPr lang="en-US"/>
+                        <a:t>Associates </a:t>
+                      </a:r>
+                      <a:r>
+                        <a:rPr lang="en-US" i="1"/>
+                        <a:t>value</a:t>
+                      </a:r>
+                      <a:r>
+                        <a:rPr lang="en-US"/>
+                        <a:t> with </a:t>
+                      </a:r>
+                      <a:r>
+                        <a:rPr lang="en-US" i="1"/>
+                        <a:t>key</a:t>
+                      </a:r>
+                      <a:r>
+                        <a:rPr lang="en-US"/>
+                        <a:t> in the map. If the map previously contained a value for </a:t>
+                      </a:r>
+                      <a:r>
+                        <a:rPr lang="en-US" i="1"/>
+                        <a:t>key</a:t>
+                      </a:r>
+                      <a:r>
+                        <a:rPr lang="en-US"/>
+                        <a:t>, the value is replaced and the old value is returned.</a:t>
+                      </a:r>
+                    </a:p>
+                  </a:txBody>
+                  <a:tcPr anchor="ctr"/>
+                </a:tc>
+              </a:tr>
+              <a:tr h="370840">
+                <a:tc>
+                  <a:txBody>
+                    <a:bodyPr/>
+                    <a:lstStyle/>
+                    <a:p>
+                      <a:pPr algn="l"/>
+                      <a:r>
+                        <a:rPr lang="en-US"/>
+                        <a:t>V remove(Object key)</a:t>
+                      </a:r>
+                    </a:p>
+                  </a:txBody>
+                  <a:tcPr anchor="ctr"/>
+                </a:tc>
+                <a:tc>
+                  <a:txBody>
+                    <a:bodyPr/>
+                    <a:lstStyle/>
+                    <a:p>
+                      <a:pPr algn="l"/>
+                      <a:r>
+                        <a:rPr lang="en-US"/>
+                        <a:t>Removes the entry for </a:t>
+                      </a:r>
+                      <a:r>
+                        <a:rPr lang="en-US" i="1"/>
+                        <a:t>key</a:t>
+                      </a:r>
+                      <a:r>
+                        <a:rPr lang="en-US"/>
+                        <a:t> from the map and returns the associated value if the map contained an entry for </a:t>
+                      </a:r>
+                      <a:r>
+                        <a:rPr lang="en-US" i="1"/>
+                        <a:t>key</a:t>
+                      </a:r>
+                      <a:r>
+                        <a:rPr lang="en-US"/>
+                        <a:t>.</a:t>
+                      </a:r>
+                    </a:p>
+                  </a:txBody>
+                  <a:tcPr anchor="ctr"/>
+                </a:tc>
+              </a:tr>
+              <a:tr h="370840">
+                <a:tc>
+                  <a:txBody>
+                    <a:bodyPr/>
+                    <a:lstStyle/>
+                    <a:p>
+                      <a:pPr algn="l"/>
+                      <a:r>
+                        <a:rPr lang="en-US"/>
+                        <a:t>int size()</a:t>
+                      </a:r>
+                    </a:p>
+                  </a:txBody>
+                  <a:tcPr anchor="ctr"/>
+                </a:tc>
+                <a:tc>
+                  <a:txBody>
+                    <a:bodyPr/>
+                    <a:lstStyle/>
+                    <a:p>
+                      <a:pPr algn="l"/>
+                      <a:r>
+                        <a:rPr lang="en-US"/>
+                        <a:t>Returns the number of entries in the map.</a:t>
+                      </a:r>
+                    </a:p>
+                  </a:txBody>
+                  <a:tcPr anchor="ctr"/>
+                </a:tc>
+              </a:tr>
+              <a:tr h="370840">
+                <a:tc>
+                  <a:txBody>
+                    <a:bodyPr/>
+                    <a:lstStyle/>
+                    <a:p>
+                      <a:pPr algn="l"/>
+                      <a:r>
+                        <a:rPr lang="en-US"/>
+                        <a:t>Collection values()</a:t>
+                      </a:r>
+                    </a:p>
+                  </a:txBody>
+                  <a:tcPr anchor="ctr"/>
+                </a:tc>
+                <a:tc>
+                  <a:txBody>
+                    <a:bodyPr/>
+                    <a:lstStyle/>
+                    <a:p>
+                      <a:pPr algn="l"/>
+                      <a:r>
+                        <a:rPr lang="en-US" dirty="0"/>
+                        <a:t>Returns a Collection view of the values contained in the map.</a:t>
+                      </a:r>
+                    </a:p>
+                  </a:txBody>
+                  <a:tcPr anchor="ctr"/>
+                </a:tc>
+              </a:tr>
+            </a:tbl>
+          </a:graphicData>
+        </a:graphic>
+      </p:graphicFrame>
+      <p:sp>
+        <p:nvSpPr>
+          <p:cNvPr id="3" name="Slide Number Placeholder 2"/>
           <p:cNvSpPr>
             <a:spLocks noGrp="1"/>
           </p:cNvSpPr>
@@ -5111,7 +5200,7 @@
     </p:spTree>
     <p:extLst>
       <p:ext uri="{BB962C8B-B14F-4D97-AF65-F5344CB8AC3E}">
-        <p14:creationId xmlns:p14="http://schemas.microsoft.com/office/powerpoint/2010/main" val="780207109"/>
+        <p14:creationId xmlns:p14="http://schemas.microsoft.com/office/powerpoint/2010/main" val="405732381"/>
       </p:ext>
     </p:extLst>
   </p:cSld>
@@ -5148,426 +5237,162 @@
             <p:ph type="title"/>
           </p:nvPr>
         </p:nvSpPr>
-        <p:spPr>
-          <a:xfrm>
-            <a:off x="1261871" y="201637"/>
-            <a:ext cx="9692640" cy="712763"/>
-          </a:xfrm>
-        </p:spPr>
+        <p:spPr/>
         <p:txBody>
           <a:bodyPr>
-            <a:normAutofit fontScale="90000"/>
+            <a:normAutofit/>
           </a:bodyPr>
           <a:lstStyle/>
           <a:p>
             <a:r>
-              <a:rPr lang="en-US" sz="4800" smtClean="0"/>
-              <a:t>Map Interface</a:t>
+              <a:rPr lang="en-US" sz="4800" dirty="0" smtClean="0"/>
+              <a:t>Map Implementations</a:t>
             </a:r>
             <a:endParaRPr lang="en-US" sz="4800" dirty="0"/>
           </a:p>
         </p:txBody>
       </p:sp>
-      <p:graphicFrame>
-        <p:nvGraphicFramePr>
-          <p:cNvPr id="5" name="Content Placeholder 4"/>
-          <p:cNvGraphicFramePr>
-            <a:graphicFrameLocks noGrp="1"/>
-          </p:cNvGraphicFramePr>
-          <p:nvPr>
-            <p:ph idx="1"/>
-            <p:extLst>
-              <p:ext uri="{D42A27DB-BD31-4B8C-83A1-F6EECF244321}">
-                <p14:modId xmlns:p14="http://schemas.microsoft.com/office/powerpoint/2010/main" val="2015340369"/>
-              </p:ext>
-            </p:extLst>
-          </p:nvPr>
-        </p:nvGraphicFramePr>
-        <p:xfrm>
-          <a:off x="583457" y="1090246"/>
-          <a:ext cx="11049469" cy="5603240"/>
-        </p:xfrm>
-        <a:graphic>
-          <a:graphicData uri="http://schemas.openxmlformats.org/drawingml/2006/table">
-            <a:tbl>
-              <a:tblPr firstRow="1" bandRow="1">
-                <a:tableStyleId>{5C22544A-7EE6-4342-B048-85BDC9FD1C3A}</a:tableStyleId>
-              </a:tblPr>
-              <a:tblGrid>
-                <a:gridCol w="4082328"/>
-                <a:gridCol w="6967141"/>
-              </a:tblGrid>
-              <a:tr h="370840">
-                <a:tc>
-                  <a:txBody>
-                    <a:bodyPr/>
-                    <a:lstStyle/>
-                    <a:p>
-                      <a:pPr algn="l"/>
-                      <a:r>
-                        <a:rPr lang="en-US" dirty="0"/>
-                        <a:t>Method</a:t>
-                      </a:r>
-                    </a:p>
-                  </a:txBody>
-                  <a:tcPr anchor="ctr"/>
-                </a:tc>
-                <a:tc>
-                  <a:txBody>
-                    <a:bodyPr/>
-                    <a:lstStyle/>
-                    <a:p>
-                      <a:pPr algn="l"/>
-                      <a:r>
-                        <a:rPr lang="en-US"/>
-                        <a:t>Description</a:t>
-                      </a:r>
-                    </a:p>
-                  </a:txBody>
-                  <a:tcPr anchor="ctr"/>
-                </a:tc>
-              </a:tr>
-              <a:tr h="370840">
-                <a:tc>
-                  <a:txBody>
-                    <a:bodyPr/>
-                    <a:lstStyle/>
-                    <a:p>
-                      <a:pPr algn="l"/>
-                      <a:r>
-                        <a:rPr lang="en-US"/>
-                        <a:t>void clear()</a:t>
-                      </a:r>
-                    </a:p>
-                  </a:txBody>
-                  <a:tcPr anchor="ctr"/>
-                </a:tc>
-                <a:tc>
-                  <a:txBody>
-                    <a:bodyPr/>
-                    <a:lstStyle/>
-                    <a:p>
-                      <a:pPr algn="l"/>
-                      <a:r>
-                        <a:rPr lang="en-US"/>
-                        <a:t>Removes all entries from the map.</a:t>
-                      </a:r>
-                    </a:p>
-                  </a:txBody>
-                  <a:tcPr anchor="ctr"/>
-                </a:tc>
-              </a:tr>
-              <a:tr h="370840">
-                <a:tc>
-                  <a:txBody>
-                    <a:bodyPr/>
-                    <a:lstStyle/>
-                    <a:p>
-                      <a:pPr algn="l"/>
-                      <a:r>
-                        <a:rPr lang="en-US"/>
-                        <a:t>boolean containsKey(Object key)</a:t>
-                      </a:r>
-                    </a:p>
-                  </a:txBody>
-                  <a:tcPr anchor="ctr"/>
-                </a:tc>
-                <a:tc>
-                  <a:txBody>
-                    <a:bodyPr/>
-                    <a:lstStyle/>
-                    <a:p>
-                      <a:pPr algn="l"/>
-                      <a:r>
-                        <a:rPr lang="en-US"/>
-                        <a:t>Returns true when the map contains an entry for the specified </a:t>
-                      </a:r>
-                      <a:r>
-                        <a:rPr lang="en-US" i="1"/>
-                        <a:t>key</a:t>
-                      </a:r>
-                      <a:r>
-                        <a:rPr lang="en-US"/>
-                        <a:t> and false otherwise.</a:t>
-                      </a:r>
-                    </a:p>
-                  </a:txBody>
-                  <a:tcPr anchor="ctr"/>
-                </a:tc>
-              </a:tr>
-              <a:tr h="370840">
-                <a:tc>
-                  <a:txBody>
-                    <a:bodyPr/>
-                    <a:lstStyle/>
-                    <a:p>
-                      <a:pPr algn="l"/>
-                      <a:r>
-                        <a:rPr lang="en-US"/>
-                        <a:t>boolean containsValue(Object value)</a:t>
-                      </a:r>
-                    </a:p>
-                  </a:txBody>
-                  <a:tcPr anchor="ctr"/>
-                </a:tc>
-                <a:tc>
-                  <a:txBody>
-                    <a:bodyPr/>
-                    <a:lstStyle/>
-                    <a:p>
-                      <a:pPr algn="l"/>
-                      <a:r>
-                        <a:rPr lang="en-US" dirty="0"/>
-                        <a:t>Returns true when the map maps one or more keys to </a:t>
-                      </a:r>
-                      <a:r>
-                        <a:rPr lang="en-US" i="1" dirty="0"/>
-                        <a:t>value</a:t>
-                      </a:r>
-                      <a:r>
-                        <a:rPr lang="en-US" dirty="0"/>
-                        <a:t>.</a:t>
-                      </a:r>
-                    </a:p>
-                  </a:txBody>
-                  <a:tcPr anchor="ctr"/>
-                </a:tc>
-              </a:tr>
-              <a:tr h="370840">
-                <a:tc>
-                  <a:txBody>
-                    <a:bodyPr/>
-                    <a:lstStyle/>
-                    <a:p>
-                      <a:pPr algn="l"/>
-                      <a:r>
-                        <a:rPr lang="en-US"/>
-                        <a:t>V get(Object key)</a:t>
-                      </a:r>
-                    </a:p>
-                  </a:txBody>
-                  <a:tcPr anchor="ctr"/>
-                </a:tc>
-                <a:tc>
-                  <a:txBody>
-                    <a:bodyPr/>
-                    <a:lstStyle/>
-                    <a:p>
-                      <a:pPr algn="l"/>
-                      <a:r>
-                        <a:rPr lang="en-US" dirty="0"/>
-                        <a:t>Return the value to which </a:t>
-                      </a:r>
-                      <a:r>
-                        <a:rPr lang="en-US" i="1" dirty="0"/>
-                        <a:t>key</a:t>
-                      </a:r>
-                      <a:r>
-                        <a:rPr lang="en-US" dirty="0"/>
-                        <a:t> is mapped or null if the map doesn't contain the key.</a:t>
-                      </a:r>
-                    </a:p>
-                  </a:txBody>
-                  <a:tcPr anchor="ctr"/>
-                </a:tc>
-              </a:tr>
-              <a:tr h="370840">
-                <a:tc>
-                  <a:txBody>
-                    <a:bodyPr/>
-                    <a:lstStyle/>
-                    <a:p>
-                      <a:pPr algn="l"/>
-                      <a:r>
-                        <a:rPr lang="en-US"/>
-                        <a:t>Set keySet()</a:t>
-                      </a:r>
-                    </a:p>
-                  </a:txBody>
-                  <a:tcPr anchor="ctr"/>
-                </a:tc>
-                <a:tc>
-                  <a:txBody>
-                    <a:bodyPr/>
-                    <a:lstStyle/>
-                    <a:p>
-                      <a:pPr algn="l"/>
-                      <a:r>
-                        <a:rPr lang="en-US"/>
-                        <a:t>returns a Set view of the keys contained in the map. Because this is a view, changes made to the map are reflected in the set and vice versa.</a:t>
-                      </a:r>
-                    </a:p>
-                  </a:txBody>
-                  <a:tcPr anchor="ctr"/>
-                </a:tc>
-              </a:tr>
-              <a:tr h="370840">
-                <a:tc>
-                  <a:txBody>
-                    <a:bodyPr/>
-                    <a:lstStyle/>
-                    <a:p>
-                      <a:pPr algn="l"/>
-                      <a:r>
-                        <a:rPr lang="en-US"/>
-                        <a:t>V put(K key, V value)</a:t>
-                      </a:r>
-                    </a:p>
-                  </a:txBody>
-                  <a:tcPr anchor="ctr"/>
-                </a:tc>
-                <a:tc>
-                  <a:txBody>
-                    <a:bodyPr/>
-                    <a:lstStyle/>
-                    <a:p>
-                      <a:pPr algn="l"/>
-                      <a:r>
-                        <a:rPr lang="en-US"/>
-                        <a:t>Associates </a:t>
-                      </a:r>
-                      <a:r>
-                        <a:rPr lang="en-US" i="1"/>
-                        <a:t>value</a:t>
-                      </a:r>
-                      <a:r>
-                        <a:rPr lang="en-US"/>
-                        <a:t> with </a:t>
-                      </a:r>
-                      <a:r>
-                        <a:rPr lang="en-US" i="1"/>
-                        <a:t>key</a:t>
-                      </a:r>
-                      <a:r>
-                        <a:rPr lang="en-US"/>
-                        <a:t> in the map. If the map previously contained a value for </a:t>
-                      </a:r>
-                      <a:r>
-                        <a:rPr lang="en-US" i="1"/>
-                        <a:t>key</a:t>
-                      </a:r>
-                      <a:r>
-                        <a:rPr lang="en-US"/>
-                        <a:t>, the value is replaced and the old value is returned.</a:t>
-                      </a:r>
-                    </a:p>
-                  </a:txBody>
-                  <a:tcPr anchor="ctr"/>
-                </a:tc>
-              </a:tr>
-              <a:tr h="370840">
-                <a:tc>
-                  <a:txBody>
-                    <a:bodyPr/>
-                    <a:lstStyle/>
-                    <a:p>
-                      <a:pPr algn="l"/>
-                      <a:r>
-                        <a:rPr lang="en-US"/>
-                        <a:t>V remove(Object key)</a:t>
-                      </a:r>
-                    </a:p>
-                  </a:txBody>
-                  <a:tcPr anchor="ctr"/>
-                </a:tc>
-                <a:tc>
-                  <a:txBody>
-                    <a:bodyPr/>
-                    <a:lstStyle/>
-                    <a:p>
-                      <a:pPr algn="l"/>
-                      <a:r>
-                        <a:rPr lang="en-US"/>
-                        <a:t>Removes the entry for </a:t>
-                      </a:r>
-                      <a:r>
-                        <a:rPr lang="en-US" i="1"/>
-                        <a:t>key</a:t>
-                      </a:r>
-                      <a:r>
-                        <a:rPr lang="en-US"/>
-                        <a:t> from the map and returns the associated value if the map contained an entry for </a:t>
-                      </a:r>
-                      <a:r>
-                        <a:rPr lang="en-US" i="1"/>
-                        <a:t>key</a:t>
-                      </a:r>
-                      <a:r>
-                        <a:rPr lang="en-US"/>
-                        <a:t>.</a:t>
-                      </a:r>
-                    </a:p>
-                  </a:txBody>
-                  <a:tcPr anchor="ctr"/>
-                </a:tc>
-              </a:tr>
-              <a:tr h="370840">
-                <a:tc>
-                  <a:txBody>
-                    <a:bodyPr/>
-                    <a:lstStyle/>
-                    <a:p>
-                      <a:pPr algn="l"/>
-                      <a:r>
-                        <a:rPr lang="en-US"/>
-                        <a:t>int size()</a:t>
-                      </a:r>
-                    </a:p>
-                  </a:txBody>
-                  <a:tcPr anchor="ctr"/>
-                </a:tc>
-                <a:tc>
-                  <a:txBody>
-                    <a:bodyPr/>
-                    <a:lstStyle/>
-                    <a:p>
-                      <a:pPr algn="l"/>
-                      <a:r>
-                        <a:rPr lang="en-US"/>
-                        <a:t>Returns the number of entries in the map.</a:t>
-                      </a:r>
-                    </a:p>
-                  </a:txBody>
-                  <a:tcPr anchor="ctr"/>
-                </a:tc>
-              </a:tr>
-              <a:tr h="370840">
-                <a:tc>
-                  <a:txBody>
-                    <a:bodyPr/>
-                    <a:lstStyle/>
-                    <a:p>
-                      <a:pPr algn="l"/>
-                      <a:r>
-                        <a:rPr lang="en-US"/>
-                        <a:t>Collection values()</a:t>
-                      </a:r>
-                    </a:p>
-                  </a:txBody>
-                  <a:tcPr anchor="ctr"/>
-                </a:tc>
-                <a:tc>
-                  <a:txBody>
-                    <a:bodyPr/>
-                    <a:lstStyle/>
-                    <a:p>
-                      <a:pPr algn="l"/>
-                      <a:r>
-                        <a:rPr lang="en-US" dirty="0"/>
-                        <a:t>Returns a Collection view of the values contained in the map.</a:t>
-                      </a:r>
-                    </a:p>
-                  </a:txBody>
-                  <a:tcPr anchor="ctr"/>
-                </a:tc>
-              </a:tr>
-            </a:tbl>
-          </a:graphicData>
-        </a:graphic>
-      </p:graphicFrame>
-      <p:sp>
-        <p:nvSpPr>
-          <p:cNvPr id="3" name="Slide Number Placeholder 2"/>
+      <p:sp>
+        <p:nvSpPr>
+          <p:cNvPr id="5" name="Text Placeholder 4"/>
+          <p:cNvSpPr>
+            <a:spLocks noGrp="1"/>
+          </p:cNvSpPr>
+          <p:nvPr>
+            <p:ph type="body" idx="1"/>
+          </p:nvPr>
+        </p:nvSpPr>
+        <p:spPr/>
+        <p:txBody>
+          <a:bodyPr>
+            <a:normAutofit/>
+          </a:bodyPr>
+          <a:lstStyle/>
+          <a:p>
+            <a:r>
+              <a:rPr lang="en-US" sz="3200" b="1" dirty="0" err="1" smtClean="0">
+                <a:solidFill>
+                  <a:schemeClr val="tx1"/>
+                </a:solidFill>
+              </a:rPr>
+              <a:t>TreeMap</a:t>
+            </a:r>
+            <a:endParaRPr lang="en-US" sz="3200" b="1" dirty="0">
+              <a:solidFill>
+                <a:schemeClr val="tx1"/>
+              </a:solidFill>
+            </a:endParaRPr>
+          </a:p>
+        </p:txBody>
+      </p:sp>
+      <p:sp>
+        <p:nvSpPr>
+          <p:cNvPr id="3" name="Content Placeholder 2"/>
+          <p:cNvSpPr>
+            <a:spLocks noGrp="1"/>
+          </p:cNvSpPr>
+          <p:nvPr>
+            <p:ph sz="half" idx="2"/>
+          </p:nvPr>
+        </p:nvSpPr>
+        <p:spPr/>
+        <p:txBody>
+          <a:bodyPr anchor="t">
+            <a:normAutofit/>
+          </a:bodyPr>
+          <a:lstStyle/>
+          <a:p>
+            <a:r>
+              <a:rPr lang="en-US" sz="2800" dirty="0" smtClean="0"/>
+              <a:t>Implementation based on tree structure</a:t>
+            </a:r>
+          </a:p>
+          <a:p>
+            <a:r>
+              <a:rPr lang="en-US" sz="2800" dirty="0" smtClean="0"/>
+              <a:t>Entries sorted based on keys</a:t>
+            </a:r>
+          </a:p>
+          <a:p>
+            <a:r>
+              <a:rPr lang="en-US" sz="2800" dirty="0" smtClean="0"/>
+              <a:t>Slower for access</a:t>
+            </a:r>
+          </a:p>
+        </p:txBody>
+      </p:sp>
+      <p:sp>
+        <p:nvSpPr>
+          <p:cNvPr id="6" name="Text Placeholder 5"/>
+          <p:cNvSpPr>
+            <a:spLocks noGrp="1"/>
+          </p:cNvSpPr>
+          <p:nvPr>
+            <p:ph type="body" sz="quarter" idx="3"/>
+          </p:nvPr>
+        </p:nvSpPr>
+        <p:spPr/>
+        <p:txBody>
+          <a:bodyPr>
+            <a:normAutofit/>
+          </a:bodyPr>
+          <a:lstStyle/>
+          <a:p>
+            <a:r>
+              <a:rPr lang="en-US" sz="3200" b="1" dirty="0" err="1" smtClean="0">
+                <a:solidFill>
+                  <a:schemeClr val="tx1"/>
+                </a:solidFill>
+              </a:rPr>
+              <a:t>HashMap</a:t>
+            </a:r>
+            <a:endParaRPr lang="en-US" sz="3200" b="1" dirty="0">
+              <a:solidFill>
+                <a:schemeClr val="tx1"/>
+              </a:solidFill>
+            </a:endParaRPr>
+          </a:p>
+        </p:txBody>
+      </p:sp>
+      <p:sp>
+        <p:nvSpPr>
+          <p:cNvPr id="7" name="Content Placeholder 6"/>
+          <p:cNvSpPr>
+            <a:spLocks noGrp="1"/>
+          </p:cNvSpPr>
+          <p:nvPr>
+            <p:ph sz="quarter" idx="4"/>
+          </p:nvPr>
+        </p:nvSpPr>
+        <p:spPr/>
+        <p:txBody>
+          <a:bodyPr anchor="t">
+            <a:noAutofit/>
+          </a:bodyPr>
+          <a:lstStyle/>
+          <a:p>
+            <a:r>
+              <a:rPr lang="en-US" sz="2800" dirty="0" smtClean="0"/>
+              <a:t>Implementation based on hash table using hash code of keys</a:t>
+            </a:r>
+          </a:p>
+          <a:p>
+            <a:r>
+              <a:rPr lang="en-US" sz="2800" dirty="0" smtClean="0"/>
+              <a:t>No guarantee about order</a:t>
+            </a:r>
+          </a:p>
+          <a:p>
+            <a:r>
+              <a:rPr lang="en-US" sz="2800" dirty="0" smtClean="0"/>
+              <a:t>Faster for access</a:t>
+            </a:r>
+          </a:p>
+        </p:txBody>
+      </p:sp>
+      <p:sp>
+        <p:nvSpPr>
+          <p:cNvPr id="4" name="Slide Number Placeholder 3"/>
           <p:cNvSpPr>
             <a:spLocks noGrp="1"/>
           </p:cNvSpPr>
@@ -5593,7 +5418,7 @@
     </p:spTree>
     <p:extLst>
       <p:ext uri="{BB962C8B-B14F-4D97-AF65-F5344CB8AC3E}">
-        <p14:creationId xmlns:p14="http://schemas.microsoft.com/office/powerpoint/2010/main" val="405732381"/>
+        <p14:creationId xmlns:p14="http://schemas.microsoft.com/office/powerpoint/2010/main" val="883548242"/>
       </p:ext>
     </p:extLst>
   </p:cSld>
@@ -5632,49 +5457,14 @@
         </p:nvSpPr>
         <p:spPr/>
         <p:txBody>
-          <a:bodyPr>
-            <a:normAutofit/>
-          </a:bodyPr>
-          <a:lstStyle/>
-          <a:p>
-            <a:r>
-              <a:rPr lang="en-US" sz="4800" dirty="0" smtClean="0"/>
-              <a:t>Map Implementations</a:t>
-            </a:r>
-            <a:endParaRPr lang="en-US" sz="4800" dirty="0"/>
-          </a:p>
-        </p:txBody>
-      </p:sp>
-      <p:sp>
-        <p:nvSpPr>
-          <p:cNvPr id="5" name="Text Placeholder 4"/>
-          <p:cNvSpPr>
-            <a:spLocks noGrp="1"/>
-          </p:cNvSpPr>
-          <p:nvPr>
-            <p:ph type="body" idx="1"/>
-          </p:nvPr>
-        </p:nvSpPr>
-        <p:spPr/>
-        <p:txBody>
-          <a:bodyPr>
-            <a:normAutofit/>
-          </a:bodyPr>
-          <a:lstStyle/>
-          <a:p>
-            <a:r>
-              <a:rPr lang="en-US" sz="3200" b="1" dirty="0" err="1" smtClean="0">
-                <a:solidFill>
-                  <a:schemeClr val="tx1"/>
-                </a:solidFill>
-              </a:rPr>
-              <a:t>TreeMap</a:t>
-            </a:r>
-            <a:endParaRPr lang="en-US" sz="3200" b="1" dirty="0">
-              <a:solidFill>
-                <a:schemeClr val="tx1"/>
-              </a:solidFill>
-            </a:endParaRPr>
+          <a:bodyPr/>
+          <a:lstStyle/>
+          <a:p>
+            <a:r>
+              <a:rPr lang="en-US" dirty="0" smtClean="0"/>
+              <a:t>Exercise</a:t>
+            </a:r>
+            <a:endParaRPr lang="en-US" dirty="0"/>
           </a:p>
         </p:txBody>
       </p:sp>
@@ -5685,100 +5475,53 @@
             <a:spLocks noGrp="1"/>
           </p:cNvSpPr>
           <p:nvPr>
-            <p:ph sz="half" idx="2"/>
-          </p:nvPr>
-        </p:nvSpPr>
-        <p:spPr/>
-        <p:txBody>
-          <a:bodyPr anchor="t">
-            <a:normAutofit/>
-          </a:bodyPr>
-          <a:lstStyle/>
-          <a:p>
-            <a:r>
-              <a:rPr lang="en-US" sz="2800" dirty="0" smtClean="0"/>
-              <a:t>Implementation based on tree structure</a:t>
-            </a:r>
-          </a:p>
-          <a:p>
-            <a:r>
-              <a:rPr lang="en-US" sz="2800" dirty="0" smtClean="0"/>
-              <a:t>Entries sorted based on keys</a:t>
-            </a:r>
-          </a:p>
-          <a:p>
-            <a:r>
-              <a:rPr lang="en-US" sz="2800" dirty="0" smtClean="0"/>
-              <a:t>Slower for access</a:t>
-            </a:r>
-          </a:p>
-        </p:txBody>
-      </p:sp>
-      <p:sp>
-        <p:nvSpPr>
-          <p:cNvPr id="6" name="Text Placeholder 5"/>
-          <p:cNvSpPr>
-            <a:spLocks noGrp="1"/>
-          </p:cNvSpPr>
-          <p:nvPr>
-            <p:ph type="body" sz="quarter" idx="3"/>
-          </p:nvPr>
-        </p:nvSpPr>
-        <p:spPr/>
-        <p:txBody>
-          <a:bodyPr>
-            <a:normAutofit/>
-          </a:bodyPr>
-          <a:lstStyle/>
-          <a:p>
-            <a:r>
-              <a:rPr lang="en-US" sz="3200" b="1" dirty="0" err="1" smtClean="0">
-                <a:solidFill>
-                  <a:schemeClr val="tx1"/>
-                </a:solidFill>
-              </a:rPr>
-              <a:t>HashMap</a:t>
-            </a:r>
-            <a:endParaRPr lang="en-US" sz="3200" b="1" dirty="0">
-              <a:solidFill>
-                <a:schemeClr val="tx1"/>
-              </a:solidFill>
-            </a:endParaRPr>
-          </a:p>
-        </p:txBody>
-      </p:sp>
-      <p:sp>
-        <p:nvSpPr>
-          <p:cNvPr id="7" name="Content Placeholder 6"/>
-          <p:cNvSpPr>
-            <a:spLocks noGrp="1"/>
-          </p:cNvSpPr>
-          <p:nvPr>
-            <p:ph sz="quarter" idx="4"/>
-          </p:nvPr>
-        </p:nvSpPr>
-        <p:spPr/>
-        <p:txBody>
-          <a:bodyPr anchor="t">
-            <a:noAutofit/>
-          </a:bodyPr>
-          <a:lstStyle/>
-          <a:p>
-            <a:r>
-              <a:rPr lang="en-US" sz="2800" dirty="0" smtClean="0"/>
-              <a:t>Implementation based on hash table using hash code of keys</a:t>
-            </a:r>
-          </a:p>
-          <a:p>
-            <a:r>
-              <a:rPr lang="en-US" sz="2800" dirty="0" smtClean="0"/>
-              <a:t>No guarantee about order</a:t>
-            </a:r>
-          </a:p>
-          <a:p>
-            <a:r>
-              <a:rPr lang="en-US" sz="2800" dirty="0" smtClean="0"/>
-              <a:t>Faster for access</a:t>
+            <p:ph idx="1"/>
+          </p:nvPr>
+        </p:nvSpPr>
+        <p:spPr/>
+        <p:txBody>
+          <a:bodyPr/>
+          <a:lstStyle/>
+          <a:p>
+            <a:pPr marL="0" indent="0">
+              <a:buNone/>
+            </a:pPr>
+            <a:r>
+              <a:rPr lang="en-US" dirty="0"/>
+              <a:t>Write a program that first prompts the user to enter a list of city names, one at a time until the user specifies "END". Next, the program should prompt the user to enter the average daily temperature for each of the next five days for each city. The program should store the user's cities and temperature data in one data structure. Next, calculate the five-day average for each city.</a:t>
+            </a:r>
+            <a:br>
+              <a:rPr lang="en-US" dirty="0"/>
+            </a:br>
+            <a:r>
+              <a:rPr lang="en-US" dirty="0"/>
+              <a:t>Finally, display a message containing the city's name and the average for each city.</a:t>
+            </a:r>
+          </a:p>
+          <a:p>
+            <a:pPr marL="0" indent="0">
+              <a:buNone/>
+            </a:pPr>
+            <a:r>
+              <a:rPr lang="en-US" dirty="0"/>
+              <a:t>The code to prompt the user for input, to calculate the five-day average, and to display the results should be in separate methods.</a:t>
+            </a:r>
+          </a:p>
+          <a:p>
+            <a:pPr marL="0" indent="0">
+              <a:buNone/>
+            </a:pPr>
+            <a:r>
+              <a:rPr lang="en-US" dirty="0"/>
+              <a:t>Hint: You can use </a:t>
+            </a:r>
+            <a:r>
+              <a:rPr lang="en-US" dirty="0" err="1"/>
+              <a:t>String.split</a:t>
+            </a:r>
+            <a:r>
+              <a:rPr lang="en-US" dirty="0"/>
+              <a:t>(" ") to split a string into an array of strings based on where spaces occur in the original string. </a:t>
             </a:r>
           </a:p>
         </p:txBody>
@@ -5803,142 +5546,6 @@
             <a:fld id="{4FAB73BC-B049-4115-A692-8D63A059BFB8}" type="slidenum">
               <a:rPr lang="en-US" smtClean="0"/>
               <a:t>17</a:t>
-            </a:fld>
-            <a:endParaRPr lang="en-US" dirty="0"/>
-          </a:p>
-        </p:txBody>
-      </p:sp>
-    </p:spTree>
-    <p:extLst>
-      <p:ext uri="{BB962C8B-B14F-4D97-AF65-F5344CB8AC3E}">
-        <p14:creationId xmlns:p14="http://schemas.microsoft.com/office/powerpoint/2010/main" val="883548242"/>
-      </p:ext>
-    </p:extLst>
-  </p:cSld>
-  <p:clrMapOvr>
-    <a:masterClrMapping/>
-  </p:clrMapOvr>
-</p:sld>
-</file>
-
-<file path=ppt/slides/slide18.xml><?xml version="1.0" encoding="utf-8"?>
-<p:sld xmlns:a="http://schemas.openxmlformats.org/drawingml/2006/main" xmlns:r="http://schemas.openxmlformats.org/officeDocument/2006/relationships" xmlns:p="http://schemas.openxmlformats.org/presentationml/2006/main">
-  <p:cSld>
-    <p:spTree>
-      <p:nvGrpSpPr>
-        <p:cNvPr id="1" name=""/>
-        <p:cNvGrpSpPr/>
-        <p:nvPr/>
-      </p:nvGrpSpPr>
-      <p:grpSpPr>
-        <a:xfrm>
-          <a:off x="0" y="0"/>
-          <a:ext cx="0" cy="0"/>
-          <a:chOff x="0" y="0"/>
-          <a:chExt cx="0" cy="0"/>
-        </a:xfrm>
-      </p:grpSpPr>
-      <p:sp>
-        <p:nvSpPr>
-          <p:cNvPr id="2" name="Title 1"/>
-          <p:cNvSpPr>
-            <a:spLocks noGrp="1"/>
-          </p:cNvSpPr>
-          <p:nvPr>
-            <p:ph type="title"/>
-          </p:nvPr>
-        </p:nvSpPr>
-        <p:spPr/>
-        <p:txBody>
-          <a:bodyPr/>
-          <a:lstStyle/>
-          <a:p>
-            <a:r>
-              <a:rPr lang="en-US" dirty="0" smtClean="0"/>
-              <a:t>Exercise</a:t>
-            </a:r>
-            <a:endParaRPr lang="en-US" dirty="0"/>
-          </a:p>
-        </p:txBody>
-      </p:sp>
-      <p:sp>
-        <p:nvSpPr>
-          <p:cNvPr id="3" name="Content Placeholder 2"/>
-          <p:cNvSpPr>
-            <a:spLocks noGrp="1"/>
-          </p:cNvSpPr>
-          <p:nvPr>
-            <p:ph idx="1"/>
-          </p:nvPr>
-        </p:nvSpPr>
-        <p:spPr/>
-        <p:txBody>
-          <a:bodyPr/>
-          <a:lstStyle/>
-          <a:p>
-            <a:pPr marL="0" indent="0">
-              <a:buNone/>
-            </a:pPr>
-            <a:r>
-              <a:rPr lang="en-US" dirty="0"/>
-              <a:t>Write a program that first prompts the user to enter a list of city names, one at a time until the user specifies "END". Next, the program should prompt the user to enter the average daily temperature for each of the next five days for each city. The program should store the user's cities and temperature data in one data structure. Next, calculate the five-day average for each city.</a:t>
-            </a:r>
-            <a:br>
-              <a:rPr lang="en-US" dirty="0"/>
-            </a:br>
-            <a:r>
-              <a:rPr lang="en-US" dirty="0"/>
-              <a:t>Finally, display a message containing the city's name and the average for each city.</a:t>
-            </a:r>
-          </a:p>
-          <a:p>
-            <a:pPr marL="0" indent="0">
-              <a:buNone/>
-            </a:pPr>
-            <a:r>
-              <a:rPr lang="en-US" dirty="0"/>
-              <a:t>The code to prompt the user for input, to calculate the five-day average, and to display the results should be in separate methods.</a:t>
-            </a:r>
-          </a:p>
-          <a:p>
-            <a:pPr marL="0" indent="0">
-              <a:buNone/>
-            </a:pPr>
-            <a:r>
-              <a:rPr lang="en-US" dirty="0"/>
-              <a:t>Hint: You can use </a:t>
-            </a:r>
-            <a:r>
-              <a:rPr lang="en-US" dirty="0" err="1"/>
-              <a:t>String.split</a:t>
-            </a:r>
-            <a:r>
-              <a:rPr lang="en-US" dirty="0"/>
-              <a:t>(" ") to split a string into an array of strings based on where spaces occur in the original string. </a:t>
-            </a:r>
-          </a:p>
-        </p:txBody>
-      </p:sp>
-      <p:sp>
-        <p:nvSpPr>
-          <p:cNvPr id="4" name="Slide Number Placeholder 3"/>
-          <p:cNvSpPr>
-            <a:spLocks noGrp="1"/>
-          </p:cNvSpPr>
-          <p:nvPr>
-            <p:ph type="sldNum" sz="quarter" idx="12"/>
-          </p:nvPr>
-        </p:nvSpPr>
-        <p:spPr/>
-        <p:txBody>
-          <a:bodyPr>
-            <a:normAutofit lnSpcReduction="10000"/>
-          </a:bodyPr>
-          <a:lstStyle/>
-          <a:p>
-            <a:fld id="{4FAB73BC-B049-4115-A692-8D63A059BFB8}" type="slidenum">
-              <a:rPr lang="en-US" smtClean="0"/>
-              <a:t>18</a:t>
             </a:fld>
             <a:endParaRPr lang="en-US" dirty="0"/>
           </a:p>
@@ -5991,7 +5598,7 @@
           <a:p>
             <a:r>
               <a:rPr lang="en-US" dirty="0" smtClean="0"/>
-              <a:t>Reminders</a:t>
+              <a:t>Corresponding Text</a:t>
             </a:r>
             <a:endParaRPr lang="en-US" dirty="0"/>
           </a:p>
@@ -6015,22 +5622,14 @@
           <a:lstStyle/>
           <a:p>
             <a:r>
-              <a:rPr lang="en-US" sz="3600" dirty="0" smtClean="0"/>
-              <a:t>Project 1 due today</a:t>
-            </a:r>
-          </a:p>
-          <a:p>
-            <a:r>
-              <a:rPr lang="en-US" sz="3600" dirty="0" smtClean="0"/>
-              <a:t>Project 2 available today</a:t>
-            </a:r>
-          </a:p>
-          <a:p>
-            <a:r>
-              <a:rPr lang="en-US" sz="3600" dirty="0" smtClean="0"/>
-              <a:t>Weekly exercises and projects submitted using GitHub URLs</a:t>
-            </a:r>
-            <a:endParaRPr lang="en-US" sz="3600" dirty="0"/>
+              <a:rPr lang="en-US" sz="2800" i="1" dirty="0" smtClean="0"/>
+              <a:t>Learn Java for Android Development</a:t>
+            </a:r>
+            <a:r>
+              <a:rPr lang="en-US" sz="2800" dirty="0" smtClean="0"/>
+              <a:t>, pp. 305-318, 404-425, 448-456</a:t>
+            </a:r>
+            <a:endParaRPr lang="en-US" sz="2800" i="1" dirty="0"/>
           </a:p>
         </p:txBody>
       </p:sp>
@@ -6062,7 +5661,7 @@
     </p:spTree>
     <p:extLst>
       <p:ext uri="{BB962C8B-B14F-4D97-AF65-F5344CB8AC3E}">
-        <p14:creationId xmlns:p14="http://schemas.microsoft.com/office/powerpoint/2010/main" val="705223229"/>
+        <p14:creationId xmlns:p14="http://schemas.microsoft.com/office/powerpoint/2010/main" val="562899132"/>
       </p:ext>
     </p:extLst>
   </p:cSld>
@@ -6091,7 +5690,7 @@
       </p:grpSpPr>
       <p:sp>
         <p:nvSpPr>
-          <p:cNvPr id="2" name="Title 1"/>
+          <p:cNvPr id="9" name="Title 8"/>
           <p:cNvSpPr>
             <a:spLocks noGrp="1"/>
           </p:cNvSpPr>
@@ -6106,44 +5705,38 @@
           <a:p>
             <a:r>
               <a:rPr lang="en-US" dirty="0" smtClean="0"/>
-              <a:t>Corresponding Text</a:t>
-            </a:r>
-            <a:endParaRPr lang="en-US" dirty="0"/>
-          </a:p>
-        </p:txBody>
-      </p:sp>
-      <p:sp>
-        <p:nvSpPr>
-          <p:cNvPr id="3" name="Content Placeholder 2"/>
-          <p:cNvSpPr>
-            <a:spLocks noGrp="1"/>
-          </p:cNvSpPr>
-          <p:nvPr>
-            <p:ph idx="1"/>
-          </p:nvPr>
-        </p:nvSpPr>
-        <p:spPr/>
-        <p:txBody>
-          <a:bodyPr anchor="ctr">
-            <a:normAutofit/>
-          </a:bodyPr>
-          <a:lstStyle/>
-          <a:p>
-            <a:r>
-              <a:rPr lang="en-US" sz="2800" i="1" dirty="0" smtClean="0"/>
-              <a:t>Learn Java for Android Development</a:t>
-            </a:r>
-            <a:r>
-              <a:rPr lang="en-US" sz="2800" dirty="0" smtClean="0"/>
-              <a:t>, pp. 305-318, 404-425, 448-456</a:t>
-            </a:r>
-            <a:endParaRPr lang="en-US" sz="2800" i="1" dirty="0"/>
-          </a:p>
-        </p:txBody>
-      </p:sp>
-      <p:sp>
-        <p:nvSpPr>
-          <p:cNvPr id="4" name="Slide Number Placeholder 3"/>
+              <a:t>Introduction to Object-Oriented Programming Topics</a:t>
+            </a:r>
+            <a:endParaRPr lang="en-US" dirty="0"/>
+          </a:p>
+        </p:txBody>
+      </p:sp>
+      <p:sp>
+        <p:nvSpPr>
+          <p:cNvPr id="10" name="Text Placeholder 9"/>
+          <p:cNvSpPr>
+            <a:spLocks noGrp="1"/>
+          </p:cNvSpPr>
+          <p:nvPr>
+            <p:ph type="body" idx="1"/>
+          </p:nvPr>
+        </p:nvSpPr>
+        <p:spPr/>
+        <p:txBody>
+          <a:bodyPr/>
+          <a:lstStyle/>
+          <a:p>
+            <a:r>
+              <a:rPr lang="en-US" dirty="0" smtClean="0"/>
+              <a:t>Classes, Instances, Interfaces, and Objects</a:t>
+            </a:r>
+            <a:endParaRPr lang="en-US" dirty="0"/>
+          </a:p>
+        </p:txBody>
+      </p:sp>
+      <p:sp>
+        <p:nvSpPr>
+          <p:cNvPr id="2" name="Slide Number Placeholder 1"/>
           <p:cNvSpPr>
             <a:spLocks noGrp="1"/>
           </p:cNvSpPr>
@@ -6169,7 +5762,7 @@
     </p:spTree>
     <p:extLst>
       <p:ext uri="{BB962C8B-B14F-4D97-AF65-F5344CB8AC3E}">
-        <p14:creationId xmlns:p14="http://schemas.microsoft.com/office/powerpoint/2010/main" val="562899132"/>
+        <p14:creationId xmlns:p14="http://schemas.microsoft.com/office/powerpoint/2010/main" val="797379249"/>
       </p:ext>
     </p:extLst>
   </p:cSld>
@@ -6198,7 +5791,7 @@
       </p:grpSpPr>
       <p:sp>
         <p:nvSpPr>
-          <p:cNvPr id="9" name="Title 8"/>
+          <p:cNvPr id="2" name="Title 1"/>
           <p:cNvSpPr>
             <a:spLocks noGrp="1"/>
           </p:cNvSpPr>
@@ -6213,38 +5806,194 @@
           <a:p>
             <a:r>
               <a:rPr lang="en-US" dirty="0" smtClean="0"/>
-              <a:t>Introduction to Object-Oriented Programming Topics</a:t>
-            </a:r>
-            <a:endParaRPr lang="en-US" dirty="0"/>
-          </a:p>
-        </p:txBody>
-      </p:sp>
-      <p:sp>
-        <p:nvSpPr>
-          <p:cNvPr id="10" name="Text Placeholder 9"/>
-          <p:cNvSpPr>
-            <a:spLocks noGrp="1"/>
-          </p:cNvSpPr>
-          <p:nvPr>
-            <p:ph type="body" idx="1"/>
-          </p:nvPr>
-        </p:nvSpPr>
-        <p:spPr/>
-        <p:txBody>
-          <a:bodyPr/>
-          <a:lstStyle/>
-          <a:p>
-            <a:r>
-              <a:rPr lang="en-US" dirty="0" smtClean="0"/>
-              <a:t>Classes, Instances, Interfaces, and Objects</a:t>
-            </a:r>
-            <a:endParaRPr lang="en-US" dirty="0"/>
-          </a:p>
-        </p:txBody>
-      </p:sp>
-      <p:sp>
-        <p:nvSpPr>
-          <p:cNvPr id="2" name="Slide Number Placeholder 1"/>
+              <a:t>Definitions</a:t>
+            </a:r>
+            <a:endParaRPr lang="en-US" dirty="0"/>
+          </a:p>
+        </p:txBody>
+      </p:sp>
+      <p:sp>
+        <p:nvSpPr>
+          <p:cNvPr id="3" name="Content Placeholder 2"/>
+          <p:cNvSpPr>
+            <a:spLocks noGrp="1"/>
+          </p:cNvSpPr>
+          <p:nvPr>
+            <p:ph idx="1"/>
+          </p:nvPr>
+        </p:nvSpPr>
+        <p:spPr/>
+        <p:txBody>
+          <a:bodyPr anchor="ctr">
+            <a:normAutofit/>
+          </a:bodyPr>
+          <a:lstStyle/>
+          <a:p>
+            <a:pPr>
+              <a:lnSpc>
+                <a:spcPct val="100000"/>
+              </a:lnSpc>
+              <a:spcBef>
+                <a:spcPts val="0"/>
+              </a:spcBef>
+              <a:spcAft>
+                <a:spcPts val="600"/>
+              </a:spcAft>
+            </a:pPr>
+            <a:r>
+              <a:rPr lang="en-US" sz="2400" dirty="0" smtClean="0">
+                <a:ea typeface="Consolas" charset="0"/>
+                <a:cs typeface="Consolas" charset="0"/>
+              </a:rPr>
+              <a:t>An </a:t>
+            </a:r>
+            <a:r>
+              <a:rPr lang="en-US" sz="2400" b="1" i="1" dirty="0" smtClean="0">
+                <a:ea typeface="Consolas" charset="0"/>
+                <a:cs typeface="Consolas" charset="0"/>
+              </a:rPr>
+              <a:t>class </a:t>
+            </a:r>
+            <a:r>
+              <a:rPr lang="en-US" sz="2400" dirty="0" smtClean="0">
+                <a:ea typeface="Consolas" charset="0"/>
+                <a:cs typeface="Consolas" charset="0"/>
+              </a:rPr>
+              <a:t>specifies a structure consisting of data attributes and code for acting on these attributes</a:t>
+            </a:r>
+          </a:p>
+          <a:p>
+            <a:pPr>
+              <a:lnSpc>
+                <a:spcPct val="100000"/>
+              </a:lnSpc>
+              <a:spcBef>
+                <a:spcPts val="0"/>
+              </a:spcBef>
+              <a:spcAft>
+                <a:spcPts val="600"/>
+              </a:spcAft>
+            </a:pPr>
+            <a:r>
+              <a:rPr lang="en-US" sz="2400" dirty="0" smtClean="0">
+                <a:ea typeface="Consolas" charset="0"/>
+                <a:cs typeface="Consolas" charset="0"/>
+              </a:rPr>
+              <a:t>An </a:t>
+            </a:r>
+            <a:r>
+              <a:rPr lang="en-US" sz="2400" b="1" i="1" dirty="0" smtClean="0">
+                <a:ea typeface="Consolas" charset="0"/>
+                <a:cs typeface="Consolas" charset="0"/>
+              </a:rPr>
+              <a:t>object</a:t>
+            </a:r>
+            <a:r>
+              <a:rPr lang="en-US" sz="2400" b="1" dirty="0" smtClean="0">
+                <a:ea typeface="Consolas" charset="0"/>
+                <a:cs typeface="Consolas" charset="0"/>
+              </a:rPr>
+              <a:t> </a:t>
+            </a:r>
+            <a:r>
+              <a:rPr lang="en-US" sz="2400" dirty="0" smtClean="0">
+                <a:ea typeface="Consolas" charset="0"/>
+                <a:cs typeface="Consolas" charset="0"/>
+              </a:rPr>
+              <a:t>is a specific instance of a class, created with the </a:t>
+            </a:r>
+            <a:r>
+              <a:rPr lang="en-US" sz="2400" i="1" dirty="0" smtClean="0">
+                <a:ea typeface="Consolas" charset="0"/>
+                <a:cs typeface="Consolas" charset="0"/>
+              </a:rPr>
+              <a:t>new</a:t>
+            </a:r>
+            <a:r>
+              <a:rPr lang="en-US" sz="2400" dirty="0" smtClean="0">
+                <a:ea typeface="Consolas" charset="0"/>
+                <a:cs typeface="Consolas" charset="0"/>
+              </a:rPr>
+              <a:t> operator,  allowing us to use specific values for attributes</a:t>
+            </a:r>
+          </a:p>
+          <a:p>
+            <a:pPr>
+              <a:lnSpc>
+                <a:spcPct val="100000"/>
+              </a:lnSpc>
+              <a:spcBef>
+                <a:spcPts val="0"/>
+              </a:spcBef>
+              <a:spcAft>
+                <a:spcPts val="600"/>
+              </a:spcAft>
+            </a:pPr>
+            <a:r>
+              <a:rPr lang="en-US" sz="2400" dirty="0" smtClean="0">
+                <a:ea typeface="Consolas" charset="0"/>
+                <a:cs typeface="Consolas" charset="0"/>
+              </a:rPr>
+              <a:t>An </a:t>
+            </a:r>
+            <a:r>
+              <a:rPr lang="en-US" sz="2400" b="1" i="1" dirty="0" smtClean="0">
+                <a:ea typeface="Consolas" charset="0"/>
+                <a:cs typeface="Consolas" charset="0"/>
+              </a:rPr>
+              <a:t>instance method</a:t>
+            </a:r>
+            <a:r>
+              <a:rPr lang="en-US" sz="2400" dirty="0" smtClean="0">
+                <a:ea typeface="Consolas" charset="0"/>
+                <a:cs typeface="Consolas" charset="0"/>
+              </a:rPr>
+              <a:t> allow us to use or alter values unique to a given object</a:t>
+            </a:r>
+          </a:p>
+          <a:p>
+            <a:pPr>
+              <a:lnSpc>
+                <a:spcPct val="100000"/>
+              </a:lnSpc>
+              <a:spcBef>
+                <a:spcPts val="0"/>
+              </a:spcBef>
+              <a:spcAft>
+                <a:spcPts val="600"/>
+              </a:spcAft>
+            </a:pPr>
+            <a:r>
+              <a:rPr lang="en-US" sz="2400" dirty="0" smtClean="0">
+                <a:ea typeface="Consolas" charset="0"/>
+                <a:cs typeface="Consolas" charset="0"/>
+              </a:rPr>
+              <a:t>An </a:t>
+            </a:r>
+            <a:r>
+              <a:rPr lang="en-US" sz="2400" b="1" i="1" dirty="0" smtClean="0">
+                <a:ea typeface="Consolas" charset="0"/>
+                <a:cs typeface="Consolas" charset="0"/>
+              </a:rPr>
+              <a:t>interface </a:t>
+            </a:r>
+            <a:r>
+              <a:rPr lang="en-US" sz="2400" dirty="0" smtClean="0">
+                <a:ea typeface="Consolas" charset="0"/>
+                <a:cs typeface="Consolas" charset="0"/>
+              </a:rPr>
+              <a:t>specifies what attributes or methods a class will have.</a:t>
+            </a:r>
+            <a:endParaRPr lang="en-US" sz="2400" dirty="0">
+              <a:ea typeface="Consolas" charset="0"/>
+              <a:cs typeface="Consolas" charset="0"/>
+            </a:endParaRPr>
+          </a:p>
+        </p:txBody>
+      </p:sp>
+      <p:sp>
+        <p:nvSpPr>
+          <p:cNvPr id="4" name="Slide Number Placeholder 3"/>
           <p:cNvSpPr>
             <a:spLocks noGrp="1"/>
           </p:cNvSpPr>
@@ -6270,7 +6019,7 @@
     </p:spTree>
     <p:extLst>
       <p:ext uri="{BB962C8B-B14F-4D97-AF65-F5344CB8AC3E}">
-        <p14:creationId xmlns:p14="http://schemas.microsoft.com/office/powerpoint/2010/main" val="797379249"/>
+        <p14:creationId xmlns:p14="http://schemas.microsoft.com/office/powerpoint/2010/main" val="1548663387"/>
       </p:ext>
     </p:extLst>
   </p:cSld>
@@ -6299,7 +6048,7 @@
       </p:grpSpPr>
       <p:sp>
         <p:nvSpPr>
-          <p:cNvPr id="2" name="Title 1"/>
+          <p:cNvPr id="4" name="Title 3"/>
           <p:cNvSpPr>
             <a:spLocks noGrp="1"/>
           </p:cNvSpPr>
@@ -6314,194 +6063,332 @@
           <a:p>
             <a:r>
               <a:rPr lang="en-US" dirty="0" smtClean="0"/>
-              <a:t>Definitions</a:t>
-            </a:r>
-            <a:endParaRPr lang="en-US" dirty="0"/>
-          </a:p>
-        </p:txBody>
-      </p:sp>
-      <p:sp>
-        <p:nvSpPr>
-          <p:cNvPr id="3" name="Content Placeholder 2"/>
-          <p:cNvSpPr>
-            <a:spLocks noGrp="1"/>
-          </p:cNvSpPr>
+              <a:t>Collection Interface</a:t>
+            </a:r>
+            <a:endParaRPr lang="en-US" dirty="0"/>
+          </a:p>
+        </p:txBody>
+      </p:sp>
+      <p:graphicFrame>
+        <p:nvGraphicFramePr>
+          <p:cNvPr id="7" name="Content Placeholder 6"/>
+          <p:cNvGraphicFramePr>
+            <a:graphicFrameLocks noGrp="1"/>
+          </p:cNvGraphicFramePr>
           <p:nvPr>
             <p:ph idx="1"/>
-          </p:nvPr>
-        </p:nvSpPr>
-        <p:spPr/>
-        <p:txBody>
-          <a:bodyPr anchor="ctr">
-            <a:normAutofit/>
-          </a:bodyPr>
-          <a:lstStyle/>
-          <a:p>
-            <a:pPr>
-              <a:lnSpc>
-                <a:spcPct val="100000"/>
-              </a:lnSpc>
-              <a:spcBef>
-                <a:spcPts val="0"/>
-              </a:spcBef>
-              <a:spcAft>
-                <a:spcPts val="600"/>
-              </a:spcAft>
-            </a:pPr>
-            <a:r>
-              <a:rPr lang="en-US" sz="2400" dirty="0" smtClean="0">
-                <a:ea typeface="Consolas" charset="0"/>
-                <a:cs typeface="Consolas" charset="0"/>
-              </a:rPr>
-              <a:t>An </a:t>
-            </a:r>
-            <a:r>
-              <a:rPr lang="en-US" sz="2400" b="1" i="1" dirty="0" smtClean="0">
-                <a:ea typeface="Consolas" charset="0"/>
-                <a:cs typeface="Consolas" charset="0"/>
-              </a:rPr>
-              <a:t>class </a:t>
-            </a:r>
-            <a:r>
-              <a:rPr lang="en-US" sz="2400" dirty="0" smtClean="0">
-                <a:ea typeface="Consolas" charset="0"/>
-                <a:cs typeface="Consolas" charset="0"/>
-              </a:rPr>
-              <a:t>specifies a structure consisting of data attributes and code for acting on these attributes</a:t>
-            </a:r>
-          </a:p>
-          <a:p>
-            <a:pPr>
-              <a:lnSpc>
-                <a:spcPct val="100000"/>
-              </a:lnSpc>
-              <a:spcBef>
-                <a:spcPts val="0"/>
-              </a:spcBef>
-              <a:spcAft>
-                <a:spcPts val="600"/>
-              </a:spcAft>
-            </a:pPr>
-            <a:r>
-              <a:rPr lang="en-US" sz="2400" dirty="0" smtClean="0">
-                <a:ea typeface="Consolas" charset="0"/>
-                <a:cs typeface="Consolas" charset="0"/>
-              </a:rPr>
-              <a:t>An </a:t>
-            </a:r>
-            <a:r>
-              <a:rPr lang="en-US" sz="2400" b="1" i="1" dirty="0" smtClean="0">
-                <a:ea typeface="Consolas" charset="0"/>
-                <a:cs typeface="Consolas" charset="0"/>
-              </a:rPr>
-              <a:t>object</a:t>
-            </a:r>
-            <a:r>
-              <a:rPr lang="en-US" sz="2400" b="1" dirty="0" smtClean="0">
-                <a:ea typeface="Consolas" charset="0"/>
-                <a:cs typeface="Consolas" charset="0"/>
-              </a:rPr>
-              <a:t> </a:t>
-            </a:r>
-            <a:r>
-              <a:rPr lang="en-US" sz="2400" dirty="0" smtClean="0">
-                <a:ea typeface="Consolas" charset="0"/>
-                <a:cs typeface="Consolas" charset="0"/>
-              </a:rPr>
-              <a:t>is a specific instance of a class, created with the </a:t>
-            </a:r>
-            <a:r>
-              <a:rPr lang="en-US" sz="2400" i="1" dirty="0" smtClean="0">
-                <a:ea typeface="Consolas" charset="0"/>
-                <a:cs typeface="Consolas" charset="0"/>
-              </a:rPr>
-              <a:t>new</a:t>
-            </a:r>
-            <a:r>
-              <a:rPr lang="en-US" sz="2400" dirty="0" smtClean="0">
-                <a:ea typeface="Consolas" charset="0"/>
-                <a:cs typeface="Consolas" charset="0"/>
-              </a:rPr>
-              <a:t> operator,  allowing us to use specific values for attributes</a:t>
-            </a:r>
-          </a:p>
-          <a:p>
-            <a:pPr>
-              <a:lnSpc>
-                <a:spcPct val="100000"/>
-              </a:lnSpc>
-              <a:spcBef>
-                <a:spcPts val="0"/>
-              </a:spcBef>
-              <a:spcAft>
-                <a:spcPts val="600"/>
-              </a:spcAft>
-            </a:pPr>
-            <a:r>
-              <a:rPr lang="en-US" sz="2400" dirty="0" smtClean="0">
-                <a:ea typeface="Consolas" charset="0"/>
-                <a:cs typeface="Consolas" charset="0"/>
-              </a:rPr>
-              <a:t>An </a:t>
-            </a:r>
-            <a:r>
-              <a:rPr lang="en-US" sz="2400" b="1" i="1" dirty="0" smtClean="0">
-                <a:ea typeface="Consolas" charset="0"/>
-                <a:cs typeface="Consolas" charset="0"/>
-              </a:rPr>
-              <a:t>instance method</a:t>
-            </a:r>
-            <a:r>
-              <a:rPr lang="en-US" sz="2400" dirty="0" smtClean="0">
-                <a:ea typeface="Consolas" charset="0"/>
-                <a:cs typeface="Consolas" charset="0"/>
-              </a:rPr>
-              <a:t> allow us to use or alter values unique to a given object</a:t>
-            </a:r>
-          </a:p>
-          <a:p>
-            <a:pPr>
-              <a:lnSpc>
-                <a:spcPct val="100000"/>
-              </a:lnSpc>
-              <a:spcBef>
-                <a:spcPts val="0"/>
-              </a:spcBef>
-              <a:spcAft>
-                <a:spcPts val="600"/>
-              </a:spcAft>
-            </a:pPr>
-            <a:r>
-              <a:rPr lang="en-US" sz="2400" dirty="0" smtClean="0">
-                <a:ea typeface="Consolas" charset="0"/>
-                <a:cs typeface="Consolas" charset="0"/>
-              </a:rPr>
-              <a:t>An </a:t>
-            </a:r>
-            <a:r>
-              <a:rPr lang="en-US" sz="2400" b="1" i="1" dirty="0" smtClean="0">
-                <a:ea typeface="Consolas" charset="0"/>
-                <a:cs typeface="Consolas" charset="0"/>
-              </a:rPr>
-              <a:t>interface </a:t>
-            </a:r>
-            <a:r>
-              <a:rPr lang="en-US" sz="2400" dirty="0" smtClean="0">
-                <a:ea typeface="Consolas" charset="0"/>
-                <a:cs typeface="Consolas" charset="0"/>
-              </a:rPr>
-              <a:t>specifies what attributes or methods a class will have.</a:t>
-            </a:r>
-            <a:endParaRPr lang="en-US" sz="2400" dirty="0">
-              <a:ea typeface="Consolas" charset="0"/>
-              <a:cs typeface="Consolas" charset="0"/>
-            </a:endParaRPr>
-          </a:p>
-        </p:txBody>
-      </p:sp>
-      <p:sp>
-        <p:nvSpPr>
-          <p:cNvPr id="4" name="Slide Number Placeholder 3"/>
+            <p:extLst>
+              <p:ext uri="{D42A27DB-BD31-4B8C-83A1-F6EECF244321}">
+                <p14:modId xmlns:p14="http://schemas.microsoft.com/office/powerpoint/2010/main" val="1935234159"/>
+              </p:ext>
+            </p:extLst>
+          </p:nvPr>
+        </p:nvGraphicFramePr>
+        <p:xfrm>
+          <a:off x="1262063" y="1828800"/>
+          <a:ext cx="8594726" cy="4460240"/>
+        </p:xfrm>
+        <a:graphic>
+          <a:graphicData uri="http://schemas.openxmlformats.org/drawingml/2006/table">
+            <a:tbl>
+              <a:tblPr firstRow="1" bandRow="1">
+                <a:tableStyleId>{5C22544A-7EE6-4342-B048-85BDC9FD1C3A}</a:tableStyleId>
+              </a:tblPr>
+              <a:tblGrid>
+                <a:gridCol w="2770675"/>
+                <a:gridCol w="5824051"/>
+              </a:tblGrid>
+              <a:tr h="370840">
+                <a:tc>
+                  <a:txBody>
+                    <a:bodyPr/>
+                    <a:lstStyle/>
+                    <a:p>
+                      <a:pPr algn="l"/>
+                      <a:r>
+                        <a:rPr lang="en-US" sz="1600" dirty="0"/>
+                        <a:t>Method Signature</a:t>
+                      </a:r>
+                    </a:p>
+                  </a:txBody>
+                  <a:tcPr marL="129257" marR="129257" anchor="ctr"/>
+                </a:tc>
+                <a:tc>
+                  <a:txBody>
+                    <a:bodyPr/>
+                    <a:lstStyle/>
+                    <a:p>
+                      <a:pPr algn="l"/>
+                      <a:r>
+                        <a:rPr lang="en-US" sz="1600"/>
+                        <a:t>Description</a:t>
+                      </a:r>
+                    </a:p>
+                  </a:txBody>
+                  <a:tcPr marL="129257" marR="129257" anchor="ctr"/>
+                </a:tc>
+              </a:tr>
+              <a:tr h="370840">
+                <a:tc>
+                  <a:txBody>
+                    <a:bodyPr/>
+                    <a:lstStyle/>
+                    <a:p>
+                      <a:pPr algn="l"/>
+                      <a:r>
+                        <a:rPr lang="en-US" sz="1600"/>
+                        <a:t>boolean add(E e)</a:t>
+                      </a:r>
+                    </a:p>
+                  </a:txBody>
+                  <a:tcPr marL="129257" marR="129257" anchor="ctr"/>
+                </a:tc>
+                <a:tc>
+                  <a:txBody>
+                    <a:bodyPr/>
+                    <a:lstStyle/>
+                    <a:p>
+                      <a:pPr algn="l"/>
+                      <a:r>
+                        <a:rPr lang="en-US" sz="1600"/>
+                        <a:t>Add an element, </a:t>
+                      </a:r>
+                      <a:r>
+                        <a:rPr lang="en-US" sz="1600" i="1"/>
+                        <a:t>e</a:t>
+                      </a:r>
+                      <a:r>
+                        <a:rPr lang="en-US" sz="1600"/>
+                        <a:t> of type </a:t>
+                      </a:r>
+                      <a:r>
+                        <a:rPr lang="en-US" sz="1600" i="1"/>
+                        <a:t>E</a:t>
+                      </a:r>
+                      <a:r>
+                        <a:rPr lang="en-US" sz="1600"/>
+                        <a:t> to the collection; returns true if the element is added and false otherwise</a:t>
+                      </a:r>
+                    </a:p>
+                  </a:txBody>
+                  <a:tcPr marL="129257" marR="129257" anchor="ctr"/>
+                </a:tc>
+              </a:tr>
+              <a:tr h="370840">
+                <a:tc>
+                  <a:txBody>
+                    <a:bodyPr/>
+                    <a:lstStyle/>
+                    <a:p>
+                      <a:pPr algn="l"/>
+                      <a:r>
+                        <a:rPr lang="en-US" sz="1600"/>
+                        <a:t>void clear()</a:t>
+                      </a:r>
+                    </a:p>
+                  </a:txBody>
+                  <a:tcPr marL="129257" marR="129257" anchor="ctr"/>
+                </a:tc>
+                <a:tc>
+                  <a:txBody>
+                    <a:bodyPr/>
+                    <a:lstStyle/>
+                    <a:p>
+                      <a:pPr algn="l"/>
+                      <a:r>
+                        <a:rPr lang="en-US" sz="1600"/>
+                        <a:t>Remove all elements from the collection</a:t>
+                      </a:r>
+                    </a:p>
+                  </a:txBody>
+                  <a:tcPr marL="129257" marR="129257" anchor="ctr"/>
+                </a:tc>
+              </a:tr>
+              <a:tr h="370840">
+                <a:tc>
+                  <a:txBody>
+                    <a:bodyPr/>
+                    <a:lstStyle/>
+                    <a:p>
+                      <a:pPr algn="l"/>
+                      <a:r>
+                        <a:rPr lang="en-US" sz="1600"/>
+                        <a:t>boolean contains(Object o)</a:t>
+                      </a:r>
+                    </a:p>
+                  </a:txBody>
+                  <a:tcPr marL="129257" marR="129257" anchor="ctr"/>
+                </a:tc>
+                <a:tc>
+                  <a:txBody>
+                    <a:bodyPr/>
+                    <a:lstStyle/>
+                    <a:p>
+                      <a:pPr algn="l"/>
+                      <a:r>
+                        <a:rPr lang="en-US" sz="1600" dirty="0"/>
+                        <a:t>Returns true if the element </a:t>
+                      </a:r>
+                      <a:r>
+                        <a:rPr lang="en-US" sz="1600" i="1" dirty="0"/>
+                        <a:t>o</a:t>
+                      </a:r>
+                      <a:r>
+                        <a:rPr lang="en-US" sz="1600" dirty="0"/>
+                        <a:t> is present in the collection and false otherwise</a:t>
+                      </a:r>
+                    </a:p>
+                  </a:txBody>
+                  <a:tcPr marL="129257" marR="129257" anchor="ctr"/>
+                </a:tc>
+              </a:tr>
+              <a:tr h="370840">
+                <a:tc>
+                  <a:txBody>
+                    <a:bodyPr/>
+                    <a:lstStyle/>
+                    <a:p>
+                      <a:pPr algn="l"/>
+                      <a:r>
+                        <a:rPr lang="en-US" sz="1600" dirty="0" err="1"/>
+                        <a:t>boolean</a:t>
+                      </a:r>
+                      <a:r>
+                        <a:rPr lang="en-US" sz="1600" dirty="0"/>
+                        <a:t> </a:t>
+                      </a:r>
+                      <a:r>
+                        <a:rPr lang="en-US" sz="1600" dirty="0" err="1"/>
+                        <a:t>isEmpty</a:t>
+                      </a:r>
+                      <a:r>
+                        <a:rPr lang="en-US" sz="1600" dirty="0"/>
+                        <a:t>()</a:t>
+                      </a:r>
+                    </a:p>
+                  </a:txBody>
+                  <a:tcPr marL="129257" marR="129257" anchor="ctr"/>
+                </a:tc>
+                <a:tc>
+                  <a:txBody>
+                    <a:bodyPr/>
+                    <a:lstStyle/>
+                    <a:p>
+                      <a:pPr algn="l"/>
+                      <a:r>
+                        <a:rPr lang="en-US" sz="1600"/>
+                        <a:t>Returns true when the collection has no elements and false otherwise</a:t>
+                      </a:r>
+                    </a:p>
+                  </a:txBody>
+                  <a:tcPr marL="129257" marR="129257" anchor="ctr"/>
+                </a:tc>
+              </a:tr>
+              <a:tr h="370840">
+                <a:tc>
+                  <a:txBody>
+                    <a:bodyPr/>
+                    <a:lstStyle/>
+                    <a:p>
+                      <a:pPr algn="l"/>
+                      <a:r>
+                        <a:rPr lang="en-US" sz="1600"/>
+                        <a:t>boolean remove(Object o)</a:t>
+                      </a:r>
+                    </a:p>
+                  </a:txBody>
+                  <a:tcPr marL="129257" marR="129257" anchor="ctr"/>
+                </a:tc>
+                <a:tc>
+                  <a:txBody>
+                    <a:bodyPr/>
+                    <a:lstStyle/>
+                    <a:p>
+                      <a:pPr algn="l"/>
+                      <a:r>
+                        <a:rPr lang="en-US" sz="1600"/>
+                        <a:t>Removes the element identified as </a:t>
+                      </a:r>
+                      <a:r>
+                        <a:rPr lang="en-US" sz="1600" i="1"/>
+                        <a:t>o</a:t>
+                      </a:r>
+                      <a:r>
+                        <a:rPr lang="en-US" sz="1600"/>
+                        <a:t> from the collection; returns true if the element is removed and false otherwise</a:t>
+                      </a:r>
+                    </a:p>
+                  </a:txBody>
+                  <a:tcPr marL="129257" marR="129257" anchor="ctr"/>
+                </a:tc>
+              </a:tr>
+              <a:tr h="370840">
+                <a:tc>
+                  <a:txBody>
+                    <a:bodyPr/>
+                    <a:lstStyle/>
+                    <a:p>
+                      <a:pPr algn="l"/>
+                      <a:r>
+                        <a:rPr lang="en-US" sz="1600"/>
+                        <a:t>int size()</a:t>
+                      </a:r>
+                    </a:p>
+                  </a:txBody>
+                  <a:tcPr marL="129257" marR="129257" anchor="ctr"/>
+                </a:tc>
+                <a:tc>
+                  <a:txBody>
+                    <a:bodyPr/>
+                    <a:lstStyle/>
+                    <a:p>
+                      <a:pPr algn="l"/>
+                      <a:r>
+                        <a:rPr lang="en-US" sz="1600"/>
+                        <a:t>Returns the number of elements in the collection or java.lang.Integer.MAX_VALUE if there are more elements than the the largest value represented by an int</a:t>
+                      </a:r>
+                    </a:p>
+                  </a:txBody>
+                  <a:tcPr marL="129257" marR="129257" anchor="ctr"/>
+                </a:tc>
+              </a:tr>
+              <a:tr h="370840">
+                <a:tc>
+                  <a:txBody>
+                    <a:bodyPr/>
+                    <a:lstStyle/>
+                    <a:p>
+                      <a:pPr algn="l"/>
+                      <a:r>
+                        <a:rPr lang="en-US" sz="1600"/>
+                        <a:t>Object[] toArray()</a:t>
+                      </a:r>
+                    </a:p>
+                  </a:txBody>
+                  <a:tcPr marL="129257" marR="129257" anchor="ctr"/>
+                </a:tc>
+                <a:tc>
+                  <a:txBody>
+                    <a:bodyPr/>
+                    <a:lstStyle/>
+                    <a:p>
+                      <a:pPr algn="l"/>
+                      <a:r>
+                        <a:rPr lang="en-US" sz="1600" dirty="0"/>
+                        <a:t>Returns an array containing all the elements stored in the collection</a:t>
+                      </a:r>
+                    </a:p>
+                  </a:txBody>
+                  <a:tcPr marL="129257" marR="129257" anchor="ctr"/>
+                </a:tc>
+              </a:tr>
+            </a:tbl>
+          </a:graphicData>
+        </a:graphic>
+      </p:graphicFrame>
+      <p:sp>
+        <p:nvSpPr>
+          <p:cNvPr id="2" name="Slide Number Placeholder 1"/>
           <p:cNvSpPr>
             <a:spLocks noGrp="1"/>
           </p:cNvSpPr>
@@ -6527,7 +6414,7 @@
     </p:spTree>
     <p:extLst>
       <p:ext uri="{BB962C8B-B14F-4D97-AF65-F5344CB8AC3E}">
-        <p14:creationId xmlns:p14="http://schemas.microsoft.com/office/powerpoint/2010/main" val="1548663387"/>
+        <p14:creationId xmlns:p14="http://schemas.microsoft.com/office/powerpoint/2010/main" val="431935434"/>
       </p:ext>
     </p:extLst>
   </p:cSld>
@@ -6566,334 +6453,88 @@
         </p:nvSpPr>
         <p:spPr/>
         <p:txBody>
-          <a:bodyPr/>
-          <a:lstStyle/>
-          <a:p>
-            <a:r>
-              <a:rPr lang="en-US" dirty="0" smtClean="0"/>
-              <a:t>Collection Interface</a:t>
-            </a:r>
-            <a:endParaRPr lang="en-US" dirty="0"/>
-          </a:p>
-        </p:txBody>
-      </p:sp>
-      <p:graphicFrame>
-        <p:nvGraphicFramePr>
-          <p:cNvPr id="7" name="Content Placeholder 6"/>
-          <p:cNvGraphicFramePr>
-            <a:graphicFrameLocks noGrp="1"/>
-          </p:cNvGraphicFramePr>
+          <a:bodyPr>
+            <a:normAutofit/>
+          </a:bodyPr>
+          <a:lstStyle/>
+          <a:p>
+            <a:r>
+              <a:rPr lang="en-US" sz="4800" dirty="0" smtClean="0"/>
+              <a:t>Primitive Type Wrappers</a:t>
+            </a:r>
+            <a:endParaRPr lang="en-US" sz="4800" dirty="0"/>
+          </a:p>
+        </p:txBody>
+      </p:sp>
+      <p:sp>
+        <p:nvSpPr>
+          <p:cNvPr id="5" name="Content Placeholder 4"/>
+          <p:cNvSpPr>
+            <a:spLocks noGrp="1"/>
+          </p:cNvSpPr>
           <p:nvPr>
             <p:ph idx="1"/>
-            <p:extLst>
-              <p:ext uri="{D42A27DB-BD31-4B8C-83A1-F6EECF244321}">
-                <p14:modId xmlns:p14="http://schemas.microsoft.com/office/powerpoint/2010/main" val="1935234159"/>
-              </p:ext>
-            </p:extLst>
-          </p:nvPr>
-        </p:nvGraphicFramePr>
-        <p:xfrm>
-          <a:off x="1262063" y="1828800"/>
-          <a:ext cx="8594726" cy="4460240"/>
-        </p:xfrm>
-        <a:graphic>
-          <a:graphicData uri="http://schemas.openxmlformats.org/drawingml/2006/table">
-            <a:tbl>
-              <a:tblPr firstRow="1" bandRow="1">
-                <a:tableStyleId>{5C22544A-7EE6-4342-B048-85BDC9FD1C3A}</a:tableStyleId>
-              </a:tblPr>
-              <a:tblGrid>
-                <a:gridCol w="2770675"/>
-                <a:gridCol w="5824051"/>
-              </a:tblGrid>
-              <a:tr h="370840">
-                <a:tc>
-                  <a:txBody>
-                    <a:bodyPr/>
-                    <a:lstStyle/>
-                    <a:p>
-                      <a:pPr algn="l"/>
-                      <a:r>
-                        <a:rPr lang="en-US" sz="1600" dirty="0"/>
-                        <a:t>Method Signature</a:t>
-                      </a:r>
-                    </a:p>
-                  </a:txBody>
-                  <a:tcPr marL="129257" marR="129257" anchor="ctr"/>
-                </a:tc>
-                <a:tc>
-                  <a:txBody>
-                    <a:bodyPr/>
-                    <a:lstStyle/>
-                    <a:p>
-                      <a:pPr algn="l"/>
-                      <a:r>
-                        <a:rPr lang="en-US" sz="1600"/>
-                        <a:t>Description</a:t>
-                      </a:r>
-                    </a:p>
-                  </a:txBody>
-                  <a:tcPr marL="129257" marR="129257" anchor="ctr"/>
-                </a:tc>
-              </a:tr>
-              <a:tr h="370840">
-                <a:tc>
-                  <a:txBody>
-                    <a:bodyPr/>
-                    <a:lstStyle/>
-                    <a:p>
-                      <a:pPr algn="l"/>
-                      <a:r>
-                        <a:rPr lang="en-US" sz="1600"/>
-                        <a:t>boolean add(E e)</a:t>
-                      </a:r>
-                    </a:p>
-                  </a:txBody>
-                  <a:tcPr marL="129257" marR="129257" anchor="ctr"/>
-                </a:tc>
-                <a:tc>
-                  <a:txBody>
-                    <a:bodyPr/>
-                    <a:lstStyle/>
-                    <a:p>
-                      <a:pPr algn="l"/>
-                      <a:r>
-                        <a:rPr lang="en-US" sz="1600"/>
-                        <a:t>Add an element, </a:t>
-                      </a:r>
-                      <a:r>
-                        <a:rPr lang="en-US" sz="1600" i="1"/>
-                        <a:t>e</a:t>
-                      </a:r>
-                      <a:r>
-                        <a:rPr lang="en-US" sz="1600"/>
-                        <a:t> of type </a:t>
-                      </a:r>
-                      <a:r>
-                        <a:rPr lang="en-US" sz="1600" i="1"/>
-                        <a:t>E</a:t>
-                      </a:r>
-                      <a:r>
-                        <a:rPr lang="en-US" sz="1600"/>
-                        <a:t> to the collection; returns true if the element is added and false otherwise</a:t>
-                      </a:r>
-                    </a:p>
-                  </a:txBody>
-                  <a:tcPr marL="129257" marR="129257" anchor="ctr"/>
-                </a:tc>
-              </a:tr>
-              <a:tr h="370840">
-                <a:tc>
-                  <a:txBody>
-                    <a:bodyPr/>
-                    <a:lstStyle/>
-                    <a:p>
-                      <a:pPr algn="l"/>
-                      <a:r>
-                        <a:rPr lang="en-US" sz="1600"/>
-                        <a:t>void clear()</a:t>
-                      </a:r>
-                    </a:p>
-                  </a:txBody>
-                  <a:tcPr marL="129257" marR="129257" anchor="ctr"/>
-                </a:tc>
-                <a:tc>
-                  <a:txBody>
-                    <a:bodyPr/>
-                    <a:lstStyle/>
-                    <a:p>
-                      <a:pPr algn="l"/>
-                      <a:r>
-                        <a:rPr lang="en-US" sz="1600"/>
-                        <a:t>Remove all elements from the collection</a:t>
-                      </a:r>
-                    </a:p>
-                  </a:txBody>
-                  <a:tcPr marL="129257" marR="129257" anchor="ctr"/>
-                </a:tc>
-              </a:tr>
-              <a:tr h="370840">
-                <a:tc>
-                  <a:txBody>
-                    <a:bodyPr/>
-                    <a:lstStyle/>
-                    <a:p>
-                      <a:pPr algn="l"/>
-                      <a:r>
-                        <a:rPr lang="en-US" sz="1600"/>
-                        <a:t>boolean contains(Object o)</a:t>
-                      </a:r>
-                    </a:p>
-                  </a:txBody>
-                  <a:tcPr marL="129257" marR="129257" anchor="ctr"/>
-                </a:tc>
-                <a:tc>
-                  <a:txBody>
-                    <a:bodyPr/>
-                    <a:lstStyle/>
-                    <a:p>
-                      <a:pPr algn="l"/>
-                      <a:r>
-                        <a:rPr lang="en-US" sz="1600" dirty="0"/>
-                        <a:t>Returns true if the element </a:t>
-                      </a:r>
-                      <a:r>
-                        <a:rPr lang="en-US" sz="1600" i="1" dirty="0"/>
-                        <a:t>o</a:t>
-                      </a:r>
-                      <a:r>
-                        <a:rPr lang="en-US" sz="1600" dirty="0"/>
-                        <a:t> is present in the collection and false otherwise</a:t>
-                      </a:r>
-                    </a:p>
-                  </a:txBody>
-                  <a:tcPr marL="129257" marR="129257" anchor="ctr"/>
-                </a:tc>
-              </a:tr>
-              <a:tr h="370840">
-                <a:tc>
-                  <a:txBody>
-                    <a:bodyPr/>
-                    <a:lstStyle/>
-                    <a:p>
-                      <a:pPr algn="l"/>
-                      <a:r>
-                        <a:rPr lang="en-US" sz="1600" dirty="0" err="1"/>
-                        <a:t>boolean</a:t>
-                      </a:r>
-                      <a:r>
-                        <a:rPr lang="en-US" sz="1600" dirty="0"/>
-                        <a:t> </a:t>
-                      </a:r>
-                      <a:r>
-                        <a:rPr lang="en-US" sz="1600" dirty="0" err="1"/>
-                        <a:t>isEmpty</a:t>
-                      </a:r>
-                      <a:r>
-                        <a:rPr lang="en-US" sz="1600" dirty="0"/>
-                        <a:t>()</a:t>
-                      </a:r>
-                    </a:p>
-                  </a:txBody>
-                  <a:tcPr marL="129257" marR="129257" anchor="ctr"/>
-                </a:tc>
-                <a:tc>
-                  <a:txBody>
-                    <a:bodyPr/>
-                    <a:lstStyle/>
-                    <a:p>
-                      <a:pPr algn="l"/>
-                      <a:r>
-                        <a:rPr lang="en-US" sz="1600"/>
-                        <a:t>Returns true when the collection has no elements and false otherwise</a:t>
-                      </a:r>
-                    </a:p>
-                  </a:txBody>
-                  <a:tcPr marL="129257" marR="129257" anchor="ctr"/>
-                </a:tc>
-              </a:tr>
-              <a:tr h="370840">
-                <a:tc>
-                  <a:txBody>
-                    <a:bodyPr/>
-                    <a:lstStyle/>
-                    <a:p>
-                      <a:pPr algn="l"/>
-                      <a:r>
-                        <a:rPr lang="en-US" sz="1600"/>
-                        <a:t>boolean remove(Object o)</a:t>
-                      </a:r>
-                    </a:p>
-                  </a:txBody>
-                  <a:tcPr marL="129257" marR="129257" anchor="ctr"/>
-                </a:tc>
-                <a:tc>
-                  <a:txBody>
-                    <a:bodyPr/>
-                    <a:lstStyle/>
-                    <a:p>
-                      <a:pPr algn="l"/>
-                      <a:r>
-                        <a:rPr lang="en-US" sz="1600"/>
-                        <a:t>Removes the element identified as </a:t>
-                      </a:r>
-                      <a:r>
-                        <a:rPr lang="en-US" sz="1600" i="1"/>
-                        <a:t>o</a:t>
-                      </a:r>
-                      <a:r>
-                        <a:rPr lang="en-US" sz="1600"/>
-                        <a:t> from the collection; returns true if the element is removed and false otherwise</a:t>
-                      </a:r>
-                    </a:p>
-                  </a:txBody>
-                  <a:tcPr marL="129257" marR="129257" anchor="ctr"/>
-                </a:tc>
-              </a:tr>
-              <a:tr h="370840">
-                <a:tc>
-                  <a:txBody>
-                    <a:bodyPr/>
-                    <a:lstStyle/>
-                    <a:p>
-                      <a:pPr algn="l"/>
-                      <a:r>
-                        <a:rPr lang="en-US" sz="1600"/>
-                        <a:t>int size()</a:t>
-                      </a:r>
-                    </a:p>
-                  </a:txBody>
-                  <a:tcPr marL="129257" marR="129257" anchor="ctr"/>
-                </a:tc>
-                <a:tc>
-                  <a:txBody>
-                    <a:bodyPr/>
-                    <a:lstStyle/>
-                    <a:p>
-                      <a:pPr algn="l"/>
-                      <a:r>
-                        <a:rPr lang="en-US" sz="1600"/>
-                        <a:t>Returns the number of elements in the collection or java.lang.Integer.MAX_VALUE if there are more elements than the the largest value represented by an int</a:t>
-                      </a:r>
-                    </a:p>
-                  </a:txBody>
-                  <a:tcPr marL="129257" marR="129257" anchor="ctr"/>
-                </a:tc>
-              </a:tr>
-              <a:tr h="370840">
-                <a:tc>
-                  <a:txBody>
-                    <a:bodyPr/>
-                    <a:lstStyle/>
-                    <a:p>
-                      <a:pPr algn="l"/>
-                      <a:r>
-                        <a:rPr lang="en-US" sz="1600"/>
-                        <a:t>Object[] toArray()</a:t>
-                      </a:r>
-                    </a:p>
-                  </a:txBody>
-                  <a:tcPr marL="129257" marR="129257" anchor="ctr"/>
-                </a:tc>
-                <a:tc>
-                  <a:txBody>
-                    <a:bodyPr/>
-                    <a:lstStyle/>
-                    <a:p>
-                      <a:pPr algn="l"/>
-                      <a:r>
-                        <a:rPr lang="en-US" sz="1600" dirty="0"/>
-                        <a:t>Returns an array containing all the elements stored in the collection</a:t>
-                      </a:r>
-                    </a:p>
-                  </a:txBody>
-                  <a:tcPr marL="129257" marR="129257" anchor="ctr"/>
-                </a:tc>
-              </a:tr>
-            </a:tbl>
-          </a:graphicData>
-        </a:graphic>
-      </p:graphicFrame>
+          </p:nvPr>
+        </p:nvSpPr>
+        <p:spPr/>
+        <p:txBody>
+          <a:bodyPr anchor="ctr">
+            <a:normAutofit lnSpcReduction="10000"/>
+          </a:bodyPr>
+          <a:lstStyle/>
+          <a:p>
+            <a:r>
+              <a:rPr lang="en-US" sz="2800" dirty="0" smtClean="0"/>
+              <a:t>Objects created from classes implementing the Collection interface cannot store elements with primitive types</a:t>
+            </a:r>
+          </a:p>
+          <a:p>
+            <a:r>
+              <a:rPr lang="en-US" sz="2800" dirty="0" smtClean="0"/>
+              <a:t>Special classes exist to represent primitive types</a:t>
+            </a:r>
+          </a:p>
+          <a:p>
+            <a:pPr lvl="1"/>
+            <a:r>
+              <a:rPr lang="en-US" sz="2800" dirty="0" smtClean="0"/>
+              <a:t>Boolean</a:t>
+            </a:r>
+          </a:p>
+          <a:p>
+            <a:pPr lvl="1"/>
+            <a:r>
+              <a:rPr lang="en-US" sz="2800" dirty="0" smtClean="0"/>
+              <a:t>Character</a:t>
+            </a:r>
+          </a:p>
+          <a:p>
+            <a:pPr lvl="1"/>
+            <a:r>
+              <a:rPr lang="en-US" sz="2800" dirty="0" smtClean="0"/>
+              <a:t>Float and Double</a:t>
+            </a:r>
+          </a:p>
+          <a:p>
+            <a:pPr lvl="1"/>
+            <a:r>
+              <a:rPr lang="en-US" sz="2800" dirty="0" smtClean="0"/>
+              <a:t>Byte, Short, Integer, and </a:t>
+            </a:r>
+            <a:r>
+              <a:rPr lang="en-US" sz="2800" dirty="0" smtClean="0"/>
+              <a:t>Long</a:t>
+            </a:r>
+            <a:endParaRPr lang="en-US" sz="2600" dirty="0"/>
+          </a:p>
+          <a:p>
+            <a:r>
+              <a:rPr lang="en-US" sz="3000" dirty="0" smtClean="0"/>
+              <a:t>Include convenience methods and attributes</a:t>
+            </a:r>
+          </a:p>
+        </p:txBody>
+      </p:sp>
       <p:sp>
         <p:nvSpPr>
           <p:cNvPr id="2" name="Slide Number Placeholder 1"/>
@@ -6922,7 +6563,7 @@
     </p:spTree>
     <p:extLst>
       <p:ext uri="{BB962C8B-B14F-4D97-AF65-F5344CB8AC3E}">
-        <p14:creationId xmlns:p14="http://schemas.microsoft.com/office/powerpoint/2010/main" val="431935434"/>
+        <p14:creationId xmlns:p14="http://schemas.microsoft.com/office/powerpoint/2010/main" val="984603941"/>
       </p:ext>
     </p:extLst>
   </p:cSld>
@@ -6951,7 +6592,7 @@
       </p:grpSpPr>
       <p:sp>
         <p:nvSpPr>
-          <p:cNvPr id="4" name="Title 3"/>
+          <p:cNvPr id="2" name="Title 1"/>
           <p:cNvSpPr>
             <a:spLocks noGrp="1"/>
           </p:cNvSpPr>
@@ -6968,7 +6609,7 @@
           <a:p>
             <a:r>
               <a:rPr lang="en-US" sz="4800" dirty="0" smtClean="0"/>
-              <a:t>Primitive Type Wrappers</a:t>
+              <a:t>Packages</a:t>
             </a:r>
             <a:endParaRPr lang="en-US" sz="4800" dirty="0"/>
           </a:p>
@@ -6976,7 +6617,7 @@
       </p:sp>
       <p:sp>
         <p:nvSpPr>
-          <p:cNvPr id="5" name="Content Placeholder 4"/>
+          <p:cNvPr id="3" name="Content Placeholder 2"/>
           <p:cNvSpPr>
             <a:spLocks noGrp="1"/>
           </p:cNvSpPr>
@@ -6992,49 +6633,49 @@
           <a:lstStyle/>
           <a:p>
             <a:r>
-              <a:rPr lang="en-US" sz="2800" dirty="0" smtClean="0"/>
-              <a:t>Objects created from classes implementing the Collection interface cannot store elements with primitive types</a:t>
-            </a:r>
-          </a:p>
-          <a:p>
-            <a:r>
-              <a:rPr lang="en-US" sz="2800" dirty="0" smtClean="0"/>
-              <a:t>Special classes exist to represent primitive types</a:t>
-            </a:r>
-          </a:p>
-          <a:p>
-            <a:pPr lvl="1"/>
-            <a:r>
-              <a:rPr lang="en-US" sz="2800" dirty="0" smtClean="0"/>
-              <a:t>Boolean</a:t>
-            </a:r>
-          </a:p>
-          <a:p>
-            <a:pPr lvl="1"/>
-            <a:r>
-              <a:rPr lang="en-US" sz="2800" dirty="0" smtClean="0"/>
-              <a:t>Character</a:t>
-            </a:r>
-          </a:p>
-          <a:p>
-            <a:pPr lvl="1"/>
-            <a:r>
-              <a:rPr lang="en-US" sz="2800" dirty="0" smtClean="0"/>
-              <a:t>Float and Double</a:t>
-            </a:r>
-          </a:p>
-          <a:p>
-            <a:pPr lvl="1"/>
-            <a:r>
-              <a:rPr lang="en-US" sz="2800" dirty="0" smtClean="0"/>
-              <a:t>Byte, Short, Integer, and Long</a:t>
-            </a:r>
-          </a:p>
-        </p:txBody>
-      </p:sp>
-      <p:sp>
-        <p:nvSpPr>
-          <p:cNvPr id="2" name="Slide Number Placeholder 1"/>
+              <a:rPr lang="en-US" sz="3200" dirty="0" smtClean="0"/>
+              <a:t>Unique namespace that contains classes and sub-packages</a:t>
+            </a:r>
+          </a:p>
+          <a:p>
+            <a:r>
+              <a:rPr lang="en-US" sz="3200" dirty="0" smtClean="0"/>
+              <a:t>Allow us to organize code similar to a folder structure for files</a:t>
+            </a:r>
+          </a:p>
+          <a:p>
+            <a:r>
+              <a:rPr lang="en-US" sz="3200" dirty="0" smtClean="0"/>
+              <a:t>Declare packages with </a:t>
+            </a:r>
+            <a:r>
+              <a:rPr lang="en-US" sz="3200" i="1" dirty="0" smtClean="0"/>
+              <a:t>package</a:t>
+            </a:r>
+            <a:r>
+              <a:rPr lang="en-US" sz="3200" dirty="0" smtClean="0"/>
+              <a:t> statement</a:t>
+            </a:r>
+          </a:p>
+          <a:p>
+            <a:r>
+              <a:rPr lang="en-US" sz="3200" dirty="0" smtClean="0"/>
+              <a:t>Use packages with the </a:t>
+            </a:r>
+            <a:r>
+              <a:rPr lang="en-US" sz="3200" i="1" dirty="0" smtClean="0"/>
+              <a:t>import</a:t>
+            </a:r>
+            <a:r>
+              <a:rPr lang="en-US" sz="3200" dirty="0" smtClean="0"/>
+              <a:t> statement</a:t>
+            </a:r>
+          </a:p>
+        </p:txBody>
+      </p:sp>
+      <p:sp>
+        <p:nvSpPr>
+          <p:cNvPr id="4" name="Slide Number Placeholder 3"/>
           <p:cNvSpPr>
             <a:spLocks noGrp="1"/>
           </p:cNvSpPr>
@@ -7060,7 +6701,7 @@
     </p:spTree>
     <p:extLst>
       <p:ext uri="{BB962C8B-B14F-4D97-AF65-F5344CB8AC3E}">
-        <p14:creationId xmlns:p14="http://schemas.microsoft.com/office/powerpoint/2010/main" val="984603941"/>
+        <p14:creationId xmlns:p14="http://schemas.microsoft.com/office/powerpoint/2010/main" val="6759569"/>
       </p:ext>
     </p:extLst>
   </p:cSld>
@@ -7099,74 +6740,37 @@
         </p:nvSpPr>
         <p:spPr/>
         <p:txBody>
-          <a:bodyPr>
-            <a:normAutofit/>
-          </a:bodyPr>
-          <a:lstStyle/>
-          <a:p>
-            <a:r>
-              <a:rPr lang="en-US" sz="4800" dirty="0" smtClean="0"/>
-              <a:t>Packages</a:t>
-            </a:r>
-            <a:endParaRPr lang="en-US" sz="4800" dirty="0"/>
-          </a:p>
-        </p:txBody>
-      </p:sp>
-      <p:sp>
-        <p:nvSpPr>
-          <p:cNvPr id="3" name="Content Placeholder 2"/>
-          <p:cNvSpPr>
-            <a:spLocks noGrp="1"/>
-          </p:cNvSpPr>
-          <p:nvPr>
-            <p:ph idx="1"/>
-          </p:nvPr>
-        </p:nvSpPr>
-        <p:spPr/>
-        <p:txBody>
-          <a:bodyPr anchor="ctr">
-            <a:normAutofit/>
-          </a:bodyPr>
-          <a:lstStyle/>
-          <a:p>
-            <a:r>
-              <a:rPr lang="en-US" sz="3200" dirty="0" smtClean="0"/>
-              <a:t>Unique namespace that contains classes and sub-packages</a:t>
-            </a:r>
-          </a:p>
-          <a:p>
-            <a:r>
-              <a:rPr lang="en-US" sz="3200" dirty="0" smtClean="0"/>
-              <a:t>Allow us to organize code similar to a folder structure for files</a:t>
-            </a:r>
-          </a:p>
-          <a:p>
-            <a:r>
-              <a:rPr lang="en-US" sz="3200" dirty="0" smtClean="0"/>
-              <a:t>Declare packages with </a:t>
-            </a:r>
-            <a:r>
-              <a:rPr lang="en-US" sz="3200" i="1" dirty="0" smtClean="0"/>
-              <a:t>package</a:t>
-            </a:r>
-            <a:r>
-              <a:rPr lang="en-US" sz="3200" dirty="0" smtClean="0"/>
-              <a:t> statement</a:t>
-            </a:r>
-          </a:p>
-          <a:p>
-            <a:r>
-              <a:rPr lang="en-US" sz="3200" dirty="0" smtClean="0"/>
-              <a:t>Use packages with the </a:t>
-            </a:r>
-            <a:r>
-              <a:rPr lang="en-US" sz="3200" i="1" dirty="0" smtClean="0"/>
-              <a:t>import</a:t>
-            </a:r>
-            <a:r>
-              <a:rPr lang="en-US" sz="3200" dirty="0" smtClean="0"/>
-              <a:t> statement</a:t>
-            </a:r>
+          <a:bodyPr/>
+          <a:lstStyle/>
+          <a:p>
+            <a:r>
+              <a:rPr lang="en-US" dirty="0" smtClean="0"/>
+              <a:t>Lists</a:t>
+            </a:r>
+            <a:endParaRPr lang="en-US" dirty="0"/>
+          </a:p>
+        </p:txBody>
+      </p:sp>
+      <p:sp>
+        <p:nvSpPr>
+          <p:cNvPr id="3" name="Text Placeholder 2"/>
+          <p:cNvSpPr>
+            <a:spLocks noGrp="1"/>
+          </p:cNvSpPr>
+          <p:nvPr>
+            <p:ph type="body" idx="1"/>
+          </p:nvPr>
+        </p:nvSpPr>
+        <p:spPr/>
+        <p:txBody>
+          <a:bodyPr/>
+          <a:lstStyle/>
+          <a:p>
+            <a:r>
+              <a:rPr lang="en-US" dirty="0" smtClean="0"/>
+              <a:t>An ordered collection of elements</a:t>
+            </a:r>
+            <a:endParaRPr lang="en-US" dirty="0"/>
           </a:p>
         </p:txBody>
       </p:sp>
@@ -7198,7 +6802,7 @@
     </p:spTree>
     <p:extLst>
       <p:ext uri="{BB962C8B-B14F-4D97-AF65-F5344CB8AC3E}">
-        <p14:creationId xmlns:p14="http://schemas.microsoft.com/office/powerpoint/2010/main" val="6759569"/>
+        <p14:creationId xmlns:p14="http://schemas.microsoft.com/office/powerpoint/2010/main" val="657677305"/>
       </p:ext>
     </p:extLst>
   </p:cSld>
@@ -7237,43 +6841,334 @@
         </p:nvSpPr>
         <p:spPr/>
         <p:txBody>
-          <a:bodyPr/>
-          <a:lstStyle/>
-          <a:p>
-            <a:r>
-              <a:rPr lang="en-US" dirty="0" smtClean="0"/>
-              <a:t>Lists</a:t>
-            </a:r>
-            <a:endParaRPr lang="en-US" dirty="0"/>
-          </a:p>
-        </p:txBody>
-      </p:sp>
-      <p:sp>
-        <p:nvSpPr>
-          <p:cNvPr id="3" name="Text Placeholder 2"/>
-          <p:cNvSpPr>
-            <a:spLocks noGrp="1"/>
-          </p:cNvSpPr>
-          <p:nvPr>
-            <p:ph type="body" idx="1"/>
-          </p:nvPr>
-        </p:nvSpPr>
-        <p:spPr/>
-        <p:txBody>
-          <a:bodyPr/>
-          <a:lstStyle/>
-          <a:p>
-            <a:r>
-              <a:rPr lang="en-US" dirty="0" smtClean="0"/>
-              <a:t>An ordered collection of elements</a:t>
-            </a:r>
-            <a:endParaRPr lang="en-US" dirty="0"/>
-          </a:p>
-        </p:txBody>
-      </p:sp>
-      <p:sp>
-        <p:nvSpPr>
-          <p:cNvPr id="4" name="Slide Number Placeholder 3"/>
+          <a:bodyPr>
+            <a:normAutofit/>
+          </a:bodyPr>
+          <a:lstStyle/>
+          <a:p>
+            <a:r>
+              <a:rPr lang="en-US" sz="4800" dirty="0" smtClean="0"/>
+              <a:t>List Interface</a:t>
+            </a:r>
+            <a:endParaRPr lang="en-US" sz="4800" dirty="0"/>
+          </a:p>
+        </p:txBody>
+      </p:sp>
+      <p:graphicFrame>
+        <p:nvGraphicFramePr>
+          <p:cNvPr id="4" name="Content Placeholder 3"/>
+          <p:cNvGraphicFramePr>
+            <a:graphicFrameLocks noGrp="1"/>
+          </p:cNvGraphicFramePr>
+          <p:nvPr>
+            <p:ph idx="1"/>
+            <p:extLst>
+              <p:ext uri="{D42A27DB-BD31-4B8C-83A1-F6EECF244321}">
+                <p14:modId xmlns:p14="http://schemas.microsoft.com/office/powerpoint/2010/main" val="507152792"/>
+              </p:ext>
+            </p:extLst>
+          </p:nvPr>
+        </p:nvGraphicFramePr>
+        <p:xfrm>
+          <a:off x="1262063" y="1828800"/>
+          <a:ext cx="8594726" cy="4211320"/>
+        </p:xfrm>
+        <a:graphic>
+          <a:graphicData uri="http://schemas.openxmlformats.org/drawingml/2006/table">
+            <a:tbl>
+              <a:tblPr firstRow="1" bandRow="1">
+                <a:tableStyleId>{5C22544A-7EE6-4342-B048-85BDC9FD1C3A}</a:tableStyleId>
+              </a:tblPr>
+              <a:tblGrid>
+                <a:gridCol w="3239599"/>
+                <a:gridCol w="5355127"/>
+              </a:tblGrid>
+              <a:tr h="370840">
+                <a:tc>
+                  <a:txBody>
+                    <a:bodyPr/>
+                    <a:lstStyle/>
+                    <a:p>
+                      <a:pPr algn="l"/>
+                      <a:r>
+                        <a:rPr lang="en-US" dirty="0"/>
+                        <a:t>Method</a:t>
+                      </a:r>
+                    </a:p>
+                  </a:txBody>
+                  <a:tcPr anchor="ctr"/>
+                </a:tc>
+                <a:tc>
+                  <a:txBody>
+                    <a:bodyPr/>
+                    <a:lstStyle/>
+                    <a:p>
+                      <a:pPr algn="l"/>
+                      <a:r>
+                        <a:rPr lang="en-US"/>
+                        <a:t>Description</a:t>
+                      </a:r>
+                    </a:p>
+                  </a:txBody>
+                  <a:tcPr anchor="ctr"/>
+                </a:tc>
+              </a:tr>
+              <a:tr h="370840">
+                <a:tc>
+                  <a:txBody>
+                    <a:bodyPr/>
+                    <a:lstStyle/>
+                    <a:p>
+                      <a:pPr algn="l"/>
+                      <a:r>
+                        <a:rPr lang="en-US"/>
+                        <a:t>void add(int index, E e)</a:t>
+                      </a:r>
+                    </a:p>
+                  </a:txBody>
+                  <a:tcPr anchor="ctr"/>
+                </a:tc>
+                <a:tc>
+                  <a:txBody>
+                    <a:bodyPr/>
+                    <a:lstStyle/>
+                    <a:p>
+                      <a:pPr algn="l"/>
+                      <a:r>
+                        <a:rPr lang="en-US"/>
+                        <a:t>Insert element </a:t>
+                      </a:r>
+                      <a:r>
+                        <a:rPr lang="en-US" i="1"/>
+                        <a:t>e</a:t>
+                      </a:r>
+                      <a:r>
+                        <a:rPr lang="en-US"/>
+                        <a:t> into the list at position </a:t>
+                      </a:r>
+                      <a:r>
+                        <a:rPr lang="en-US" i="1"/>
+                        <a:t>index</a:t>
+                      </a:r>
+                      <a:r>
+                        <a:rPr lang="en-US"/>
+                        <a:t> and shift elements to the right as necessary</a:t>
+                      </a:r>
+                    </a:p>
+                  </a:txBody>
+                  <a:tcPr anchor="ctr"/>
+                </a:tc>
+              </a:tr>
+              <a:tr h="370840">
+                <a:tc>
+                  <a:txBody>
+                    <a:bodyPr/>
+                    <a:lstStyle/>
+                    <a:p>
+                      <a:pPr algn="l"/>
+                      <a:r>
+                        <a:rPr lang="en-US"/>
+                        <a:t>E get(int index)</a:t>
+                      </a:r>
+                    </a:p>
+                  </a:txBody>
+                  <a:tcPr anchor="ctr"/>
+                </a:tc>
+                <a:tc>
+                  <a:txBody>
+                    <a:bodyPr/>
+                    <a:lstStyle/>
+                    <a:p>
+                      <a:pPr algn="l"/>
+                      <a:r>
+                        <a:rPr lang="en-US"/>
+                        <a:t>Returns the element of type </a:t>
+                      </a:r>
+                      <a:r>
+                        <a:rPr lang="en-US" i="1"/>
+                        <a:t>E</a:t>
+                      </a:r>
+                      <a:r>
+                        <a:rPr lang="en-US"/>
+                        <a:t> stored at position </a:t>
+                      </a:r>
+                      <a:r>
+                        <a:rPr lang="en-US" i="1"/>
+                        <a:t>index</a:t>
+                      </a:r>
+                      <a:endParaRPr lang="en-US"/>
+                    </a:p>
+                  </a:txBody>
+                  <a:tcPr anchor="ctr"/>
+                </a:tc>
+              </a:tr>
+              <a:tr h="370840">
+                <a:tc>
+                  <a:txBody>
+                    <a:bodyPr/>
+                    <a:lstStyle/>
+                    <a:p>
+                      <a:pPr algn="l"/>
+                      <a:r>
+                        <a:rPr lang="en-US"/>
+                        <a:t>int indexOf(Object o)</a:t>
+                      </a:r>
+                    </a:p>
+                  </a:txBody>
+                  <a:tcPr anchor="ctr"/>
+                </a:tc>
+                <a:tc>
+                  <a:txBody>
+                    <a:bodyPr/>
+                    <a:lstStyle/>
+                    <a:p>
+                      <a:pPr algn="l"/>
+                      <a:r>
+                        <a:rPr lang="en-US"/>
+                        <a:t>Returns the index of the first occurrence of element </a:t>
+                      </a:r>
+                      <a:r>
+                        <a:rPr lang="en-US" i="1"/>
+                        <a:t>o</a:t>
+                      </a:r>
+                      <a:r>
+                        <a:rPr lang="en-US"/>
+                        <a:t> in the list</a:t>
+                      </a:r>
+                    </a:p>
+                  </a:txBody>
+                  <a:tcPr anchor="ctr"/>
+                </a:tc>
+              </a:tr>
+              <a:tr h="370840">
+                <a:tc>
+                  <a:txBody>
+                    <a:bodyPr/>
+                    <a:lstStyle/>
+                    <a:p>
+                      <a:pPr algn="l"/>
+                      <a:r>
+                        <a:rPr lang="en-US"/>
+                        <a:t>int lastIndexOf(Object o)</a:t>
+                      </a:r>
+                    </a:p>
+                  </a:txBody>
+                  <a:tcPr anchor="ctr"/>
+                </a:tc>
+                <a:tc>
+                  <a:txBody>
+                    <a:bodyPr/>
+                    <a:lstStyle/>
+                    <a:p>
+                      <a:pPr algn="l"/>
+                      <a:r>
+                        <a:rPr lang="en-US"/>
+                        <a:t>Returns the index of the last occurrence of element </a:t>
+                      </a:r>
+                      <a:r>
+                        <a:rPr lang="en-US" i="1"/>
+                        <a:t>o</a:t>
+                      </a:r>
+                      <a:r>
+                        <a:rPr lang="en-US"/>
+                        <a:t> in the list</a:t>
+                      </a:r>
+                    </a:p>
+                  </a:txBody>
+                  <a:tcPr anchor="ctr"/>
+                </a:tc>
+              </a:tr>
+              <a:tr h="370840">
+                <a:tc>
+                  <a:txBody>
+                    <a:bodyPr/>
+                    <a:lstStyle/>
+                    <a:p>
+                      <a:pPr algn="l"/>
+                      <a:r>
+                        <a:rPr lang="en-US"/>
+                        <a:t>E remove(int index)</a:t>
+                      </a:r>
+                    </a:p>
+                  </a:txBody>
+                  <a:tcPr anchor="ctr"/>
+                </a:tc>
+                <a:tc>
+                  <a:txBody>
+                    <a:bodyPr/>
+                    <a:lstStyle/>
+                    <a:p>
+                      <a:pPr algn="l"/>
+                      <a:r>
+                        <a:rPr lang="en-US"/>
+                        <a:t>Remove and return the element at </a:t>
+                      </a:r>
+                      <a:r>
+                        <a:rPr lang="en-US" i="1"/>
+                        <a:t>index</a:t>
+                      </a:r>
+                      <a:r>
+                        <a:rPr lang="en-US"/>
+                        <a:t> in the list</a:t>
+                      </a:r>
+                    </a:p>
+                  </a:txBody>
+                  <a:tcPr anchor="ctr"/>
+                </a:tc>
+              </a:tr>
+              <a:tr h="370840">
+                <a:tc>
+                  <a:txBody>
+                    <a:bodyPr/>
+                    <a:lstStyle/>
+                    <a:p>
+                      <a:pPr algn="l"/>
+                      <a:r>
+                        <a:rPr lang="en-US"/>
+                        <a:t>E set(int index, E e)</a:t>
+                      </a:r>
+                    </a:p>
+                  </a:txBody>
+                  <a:tcPr anchor="ctr"/>
+                </a:tc>
+                <a:tc>
+                  <a:txBody>
+                    <a:bodyPr/>
+                    <a:lstStyle/>
+                    <a:p>
+                      <a:pPr algn="l"/>
+                      <a:r>
+                        <a:rPr lang="en-US" dirty="0"/>
+                        <a:t>Replace the element at position </a:t>
+                      </a:r>
+                      <a:r>
+                        <a:rPr lang="en-US" i="1" dirty="0"/>
+                        <a:t>index</a:t>
+                      </a:r>
+                      <a:r>
+                        <a:rPr lang="en-US" dirty="0"/>
+                        <a:t> in the list with element </a:t>
+                      </a:r>
+                      <a:r>
+                        <a:rPr lang="en-US" i="1" dirty="0"/>
+                        <a:t>e</a:t>
+                      </a:r>
+                      <a:r>
+                        <a:rPr lang="en-US" dirty="0"/>
+                        <a:t> and return the previous element</a:t>
+                      </a:r>
+                    </a:p>
+                  </a:txBody>
+                  <a:tcPr anchor="ctr"/>
+                </a:tc>
+              </a:tr>
+            </a:tbl>
+          </a:graphicData>
+        </a:graphic>
+      </p:graphicFrame>
+      <p:sp>
+        <p:nvSpPr>
+          <p:cNvPr id="3" name="Slide Number Placeholder 2"/>
           <p:cNvSpPr>
             <a:spLocks noGrp="1"/>
           </p:cNvSpPr>
@@ -7299,7 +7194,7 @@
     </p:spTree>
     <p:extLst>
       <p:ext uri="{BB962C8B-B14F-4D97-AF65-F5344CB8AC3E}">
-        <p14:creationId xmlns:p14="http://schemas.microsoft.com/office/powerpoint/2010/main" val="657677305"/>
+        <p14:creationId xmlns:p14="http://schemas.microsoft.com/office/powerpoint/2010/main" val="1501518188"/>
       </p:ext>
     </p:extLst>
   </p:cSld>

</xml_diff>